<commit_message>
ppt intro version control
</commit_message>
<xml_diff>
--- a/powerpoints/github_part1.pptx
+++ b/powerpoints/github_part1.pptx
@@ -5,18 +5,30 @@
     <p:sldMasterId id="2147483648" r:id="rId1"/>
   </p:sldMasterIdLst>
   <p:notesMasterIdLst>
-    <p:notesMasterId r:id="rId11"/>
+    <p:notesMasterId r:id="rId23"/>
   </p:notesMasterIdLst>
   <p:sldIdLst>
     <p:sldId id="256" r:id="rId2"/>
-    <p:sldId id="257" r:id="rId3"/>
-    <p:sldId id="260" r:id="rId4"/>
-    <p:sldId id="261" r:id="rId5"/>
-    <p:sldId id="262" r:id="rId6"/>
-    <p:sldId id="258" r:id="rId7"/>
-    <p:sldId id="263" r:id="rId8"/>
-    <p:sldId id="259" r:id="rId9"/>
-    <p:sldId id="264" r:id="rId10"/>
+    <p:sldId id="266" r:id="rId3"/>
+    <p:sldId id="257" r:id="rId4"/>
+    <p:sldId id="260" r:id="rId5"/>
+    <p:sldId id="268" r:id="rId6"/>
+    <p:sldId id="274" r:id="rId7"/>
+    <p:sldId id="269" r:id="rId8"/>
+    <p:sldId id="258" r:id="rId9"/>
+    <p:sldId id="271" r:id="rId10"/>
+    <p:sldId id="270" r:id="rId11"/>
+    <p:sldId id="272" r:id="rId12"/>
+    <p:sldId id="262" r:id="rId13"/>
+    <p:sldId id="275" r:id="rId14"/>
+    <p:sldId id="276" r:id="rId15"/>
+    <p:sldId id="264" r:id="rId16"/>
+    <p:sldId id="259" r:id="rId17"/>
+    <p:sldId id="273" r:id="rId18"/>
+    <p:sldId id="277" r:id="rId19"/>
+    <p:sldId id="267" r:id="rId20"/>
+    <p:sldId id="265" r:id="rId21"/>
+    <p:sldId id="278" r:id="rId22"/>
   </p:sldIdLst>
   <p:sldSz cx="12192000" cy="6858000"/>
   <p:notesSz cx="6858000" cy="9144000"/>
@@ -512,6 +524,202 @@
           <a:bodyPr/>
           <a:lstStyle/>
           <a:p>
+            <a:endParaRPr lang="en-GB" dirty="0"/>
+          </a:p>
+          <a:p>
+            <a:r>
+              <a:rPr lang="en-GB" dirty="0"/>
+              <a:t>A</a:t>
+            </a:r>
+            <a:r>
+              <a:rPr lang="en-NL" dirty="0"/>
+              <a:t>lthough track changes is actually horrible, as it involves lots of clicking and accepting, and you cannot easily go back to a previous version.</a:t>
+            </a:r>
+          </a:p>
+        </p:txBody>
+      </p:sp>
+      <p:sp>
+        <p:nvSpPr>
+          <p:cNvPr id="4" name="Slide Number Placeholder 3"/>
+          <p:cNvSpPr>
+            <a:spLocks noGrp="1"/>
+          </p:cNvSpPr>
+          <p:nvPr>
+            <p:ph type="sldNum" sz="quarter" idx="5"/>
+          </p:nvPr>
+        </p:nvSpPr>
+        <p:spPr/>
+        <p:txBody>
+          <a:bodyPr/>
+          <a:lstStyle/>
+          <a:p>
+            <a:fld id="{49AF2050-A35D-D84D-8840-74500D44AACF}" type="slidenum">
+              <a:rPr lang="en-NL" smtClean="0"/>
+              <a:t>5</a:t>
+            </a:fld>
+            <a:endParaRPr lang="en-NL"/>
+          </a:p>
+        </p:txBody>
+      </p:sp>
+    </p:spTree>
+    <p:extLst>
+      <p:ext uri="{BB962C8B-B14F-4D97-AF65-F5344CB8AC3E}">
+        <p14:creationId xmlns:p14="http://schemas.microsoft.com/office/powerpoint/2010/main" val="105617524"/>
+      </p:ext>
+    </p:extLst>
+  </p:cSld>
+  <p:clrMapOvr>
+    <a:masterClrMapping/>
+  </p:clrMapOvr>
+</p:notes>
+</file>
+
+<file path=ppt/notesSlides/notesSlide2.xml><?xml version="1.0" encoding="utf-8"?>
+<p:notes xmlns:a="http://schemas.openxmlformats.org/drawingml/2006/main" xmlns:r="http://schemas.openxmlformats.org/officeDocument/2006/relationships" xmlns:p="http://schemas.openxmlformats.org/presentationml/2006/main">
+  <p:cSld>
+    <p:spTree>
+      <p:nvGrpSpPr>
+        <p:cNvPr id="1" name=""/>
+        <p:cNvGrpSpPr/>
+        <p:nvPr/>
+      </p:nvGrpSpPr>
+      <p:grpSpPr>
+        <a:xfrm>
+          <a:off x="0" y="0"/>
+          <a:ext cx="0" cy="0"/>
+          <a:chOff x="0" y="0"/>
+          <a:chExt cx="0" cy="0"/>
+        </a:xfrm>
+      </p:grpSpPr>
+      <p:sp>
+        <p:nvSpPr>
+          <p:cNvPr id="2" name="Slide Image Placeholder 1"/>
+          <p:cNvSpPr>
+            <a:spLocks noGrp="1" noRot="1" noChangeAspect="1"/>
+          </p:cNvSpPr>
+          <p:nvPr>
+            <p:ph type="sldImg"/>
+          </p:nvPr>
+        </p:nvSpPr>
+        <p:spPr/>
+      </p:sp>
+      <p:sp>
+        <p:nvSpPr>
+          <p:cNvPr id="3" name="Notes Placeholder 2"/>
+          <p:cNvSpPr>
+            <a:spLocks noGrp="1"/>
+          </p:cNvSpPr>
+          <p:nvPr>
+            <p:ph type="body" idx="1"/>
+          </p:nvPr>
+        </p:nvSpPr>
+        <p:spPr/>
+        <p:txBody>
+          <a:bodyPr/>
+          <a:lstStyle/>
+          <a:p>
+            <a:r>
+              <a:rPr lang="en-GB" dirty="0"/>
+              <a:t>W</a:t>
+            </a:r>
+            <a:r>
+              <a:rPr lang="en-NL" dirty="0"/>
+              <a:t>hich is weird, because journals then import your document to indesign or </a:t>
+            </a:r>
+            <a:r>
+              <a:rPr lang="en-GB" b="0" i="0" dirty="0">
+                <a:solidFill>
+                  <a:srgbClr val="4D5156"/>
+                </a:solidFill>
+                <a:effectLst/>
+                <a:latin typeface="arial" panose="020B0604020202020204" pitchFamily="34" charset="0"/>
+              </a:rPr>
+              <a:t>QuarkXPress, which want plain text. Not executables (a docx is actually an executable, not a text document)</a:t>
+            </a:r>
+            <a:endParaRPr lang="en-NL" dirty="0"/>
+          </a:p>
+        </p:txBody>
+      </p:sp>
+      <p:sp>
+        <p:nvSpPr>
+          <p:cNvPr id="4" name="Slide Number Placeholder 3"/>
+          <p:cNvSpPr>
+            <a:spLocks noGrp="1"/>
+          </p:cNvSpPr>
+          <p:nvPr>
+            <p:ph type="sldNum" sz="quarter" idx="5"/>
+          </p:nvPr>
+        </p:nvSpPr>
+        <p:spPr/>
+        <p:txBody>
+          <a:bodyPr/>
+          <a:lstStyle/>
+          <a:p>
+            <a:fld id="{49AF2050-A35D-D84D-8840-74500D44AACF}" type="slidenum">
+              <a:rPr lang="en-NL" smtClean="0"/>
+              <a:t>6</a:t>
+            </a:fld>
+            <a:endParaRPr lang="en-NL"/>
+          </a:p>
+        </p:txBody>
+      </p:sp>
+    </p:spTree>
+    <p:extLst>
+      <p:ext uri="{BB962C8B-B14F-4D97-AF65-F5344CB8AC3E}">
+        <p14:creationId xmlns:p14="http://schemas.microsoft.com/office/powerpoint/2010/main" val="3163584357"/>
+      </p:ext>
+    </p:extLst>
+  </p:cSld>
+  <p:clrMapOvr>
+    <a:masterClrMapping/>
+  </p:clrMapOvr>
+</p:notes>
+</file>
+
+<file path=ppt/notesSlides/notesSlide3.xml><?xml version="1.0" encoding="utf-8"?>
+<p:notes xmlns:a="http://schemas.openxmlformats.org/drawingml/2006/main" xmlns:r="http://schemas.openxmlformats.org/officeDocument/2006/relationships" xmlns:p="http://schemas.openxmlformats.org/presentationml/2006/main">
+  <p:cSld>
+    <p:spTree>
+      <p:nvGrpSpPr>
+        <p:cNvPr id="1" name=""/>
+        <p:cNvGrpSpPr/>
+        <p:nvPr/>
+      </p:nvGrpSpPr>
+      <p:grpSpPr>
+        <a:xfrm>
+          <a:off x="0" y="0"/>
+          <a:ext cx="0" cy="0"/>
+          <a:chOff x="0" y="0"/>
+          <a:chExt cx="0" cy="0"/>
+        </a:xfrm>
+      </p:grpSpPr>
+      <p:sp>
+        <p:nvSpPr>
+          <p:cNvPr id="2" name="Slide Image Placeholder 1"/>
+          <p:cNvSpPr>
+            <a:spLocks noGrp="1" noRot="1" noChangeAspect="1"/>
+          </p:cNvSpPr>
+          <p:nvPr>
+            <p:ph type="sldImg"/>
+          </p:nvPr>
+        </p:nvSpPr>
+        <p:spPr/>
+      </p:sp>
+      <p:sp>
+        <p:nvSpPr>
+          <p:cNvPr id="3" name="Notes Placeholder 2"/>
+          <p:cNvSpPr>
+            <a:spLocks noGrp="1"/>
+          </p:cNvSpPr>
+          <p:nvPr>
+            <p:ph type="body" idx="1"/>
+          </p:nvPr>
+        </p:nvSpPr>
+        <p:spPr/>
+        <p:txBody>
+          <a:bodyPr/>
+          <a:lstStyle/>
+          <a:p>
             <a:r>
               <a:rPr lang="en-GB" dirty="0"/>
               <a:t>N</a:t>
@@ -640,7 +848,7 @@
           <a:p>
             <a:fld id="{49AF2050-A35D-D84D-8840-74500D44AACF}" type="slidenum">
               <a:rPr lang="en-NL" smtClean="0"/>
-              <a:t>6</a:t>
+              <a:t>8</a:t>
             </a:fld>
             <a:endParaRPr lang="en-NL"/>
           </a:p>
@@ -650,6 +858,283 @@
     <p:extLst>
       <p:ext uri="{BB962C8B-B14F-4D97-AF65-F5344CB8AC3E}">
         <p14:creationId xmlns:p14="http://schemas.microsoft.com/office/powerpoint/2010/main" val="1712425029"/>
+      </p:ext>
+    </p:extLst>
+  </p:cSld>
+  <p:clrMapOvr>
+    <a:masterClrMapping/>
+  </p:clrMapOvr>
+</p:notes>
+</file>
+
+<file path=ppt/notesSlides/notesSlide4.xml><?xml version="1.0" encoding="utf-8"?>
+<p:notes xmlns:a="http://schemas.openxmlformats.org/drawingml/2006/main" xmlns:r="http://schemas.openxmlformats.org/officeDocument/2006/relationships" xmlns:p="http://schemas.openxmlformats.org/presentationml/2006/main">
+  <p:cSld>
+    <p:spTree>
+      <p:nvGrpSpPr>
+        <p:cNvPr id="1" name=""/>
+        <p:cNvGrpSpPr/>
+        <p:nvPr/>
+      </p:nvGrpSpPr>
+      <p:grpSpPr>
+        <a:xfrm>
+          <a:off x="0" y="0"/>
+          <a:ext cx="0" cy="0"/>
+          <a:chOff x="0" y="0"/>
+          <a:chExt cx="0" cy="0"/>
+        </a:xfrm>
+      </p:grpSpPr>
+      <p:sp>
+        <p:nvSpPr>
+          <p:cNvPr id="2" name="Slide Image Placeholder 1"/>
+          <p:cNvSpPr>
+            <a:spLocks noGrp="1" noRot="1" noChangeAspect="1"/>
+          </p:cNvSpPr>
+          <p:nvPr>
+            <p:ph type="sldImg"/>
+          </p:nvPr>
+        </p:nvSpPr>
+        <p:spPr/>
+      </p:sp>
+      <p:sp>
+        <p:nvSpPr>
+          <p:cNvPr id="3" name="Notes Placeholder 2"/>
+          <p:cNvSpPr>
+            <a:spLocks noGrp="1"/>
+          </p:cNvSpPr>
+          <p:nvPr>
+            <p:ph type="body" idx="1"/>
+          </p:nvPr>
+        </p:nvSpPr>
+        <p:spPr/>
+        <p:txBody>
+          <a:bodyPr/>
+          <a:lstStyle/>
+          <a:p>
+            <a:r>
+              <a:rPr lang="en-GB" dirty="0"/>
+              <a:t>N</a:t>
+            </a:r>
+            <a:r>
+              <a:rPr lang="en-NL" dirty="0"/>
+              <a:t>oth platofrm offer a version history. </a:t>
+            </a:r>
+            <a:r>
+              <a:rPr lang="en-GB" dirty="0"/>
+              <a:t>B</a:t>
+            </a:r>
+            <a:r>
+              <a:rPr lang="en-NL" dirty="0"/>
+              <a:t>etter than track changes or low-fi options</a:t>
+            </a:r>
+          </a:p>
+        </p:txBody>
+      </p:sp>
+      <p:sp>
+        <p:nvSpPr>
+          <p:cNvPr id="4" name="Slide Number Placeholder 3"/>
+          <p:cNvSpPr>
+            <a:spLocks noGrp="1"/>
+          </p:cNvSpPr>
+          <p:nvPr>
+            <p:ph type="sldNum" sz="quarter" idx="5"/>
+          </p:nvPr>
+        </p:nvSpPr>
+        <p:spPr/>
+        <p:txBody>
+          <a:bodyPr/>
+          <a:lstStyle/>
+          <a:p>
+            <a:fld id="{49AF2050-A35D-D84D-8840-74500D44AACF}" type="slidenum">
+              <a:rPr lang="en-NL" smtClean="0"/>
+              <a:t>10</a:t>
+            </a:fld>
+            <a:endParaRPr lang="en-NL"/>
+          </a:p>
+        </p:txBody>
+      </p:sp>
+    </p:spTree>
+    <p:extLst>
+      <p:ext uri="{BB962C8B-B14F-4D97-AF65-F5344CB8AC3E}">
+        <p14:creationId xmlns:p14="http://schemas.microsoft.com/office/powerpoint/2010/main" val="132305671"/>
+      </p:ext>
+    </p:extLst>
+  </p:cSld>
+  <p:clrMapOvr>
+    <a:masterClrMapping/>
+  </p:clrMapOvr>
+</p:notes>
+</file>
+
+<file path=ppt/notesSlides/notesSlide5.xml><?xml version="1.0" encoding="utf-8"?>
+<p:notes xmlns:a="http://schemas.openxmlformats.org/drawingml/2006/main" xmlns:r="http://schemas.openxmlformats.org/officeDocument/2006/relationships" xmlns:p="http://schemas.openxmlformats.org/presentationml/2006/main">
+  <p:cSld>
+    <p:spTree>
+      <p:nvGrpSpPr>
+        <p:cNvPr id="1" name=""/>
+        <p:cNvGrpSpPr/>
+        <p:nvPr/>
+      </p:nvGrpSpPr>
+      <p:grpSpPr>
+        <a:xfrm>
+          <a:off x="0" y="0"/>
+          <a:ext cx="0" cy="0"/>
+          <a:chOff x="0" y="0"/>
+          <a:chExt cx="0" cy="0"/>
+        </a:xfrm>
+      </p:grpSpPr>
+      <p:sp>
+        <p:nvSpPr>
+          <p:cNvPr id="2" name="Slide Image Placeholder 1"/>
+          <p:cNvSpPr>
+            <a:spLocks noGrp="1" noRot="1" noChangeAspect="1"/>
+          </p:cNvSpPr>
+          <p:nvPr>
+            <p:ph type="sldImg"/>
+          </p:nvPr>
+        </p:nvSpPr>
+        <p:spPr/>
+      </p:sp>
+      <p:sp>
+        <p:nvSpPr>
+          <p:cNvPr id="3" name="Notes Placeholder 2"/>
+          <p:cNvSpPr>
+            <a:spLocks noGrp="1"/>
+          </p:cNvSpPr>
+          <p:nvPr>
+            <p:ph type="body" idx="1"/>
+          </p:nvPr>
+        </p:nvSpPr>
+        <p:spPr/>
+        <p:txBody>
+          <a:bodyPr/>
+          <a:lstStyle/>
+          <a:p>
+            <a:r>
+              <a:rPr lang="en-NL" dirty="0"/>
+              <a:t>Zoals zoveel handige tools: je meot wel kunnen programmeren</a:t>
+            </a:r>
+          </a:p>
+        </p:txBody>
+      </p:sp>
+      <p:sp>
+        <p:nvSpPr>
+          <p:cNvPr id="4" name="Slide Number Placeholder 3"/>
+          <p:cNvSpPr>
+            <a:spLocks noGrp="1"/>
+          </p:cNvSpPr>
+          <p:nvPr>
+            <p:ph type="sldNum" sz="quarter" idx="5"/>
+          </p:nvPr>
+        </p:nvSpPr>
+        <p:spPr/>
+        <p:txBody>
+          <a:bodyPr/>
+          <a:lstStyle/>
+          <a:p>
+            <a:fld id="{49AF2050-A35D-D84D-8840-74500D44AACF}" type="slidenum">
+              <a:rPr lang="en-NL" smtClean="0"/>
+              <a:t>12</a:t>
+            </a:fld>
+            <a:endParaRPr lang="en-NL"/>
+          </a:p>
+        </p:txBody>
+      </p:sp>
+    </p:spTree>
+    <p:extLst>
+      <p:ext uri="{BB962C8B-B14F-4D97-AF65-F5344CB8AC3E}">
+        <p14:creationId xmlns:p14="http://schemas.microsoft.com/office/powerpoint/2010/main" val="949562447"/>
+      </p:ext>
+    </p:extLst>
+  </p:cSld>
+  <p:clrMapOvr>
+    <a:masterClrMapping/>
+  </p:clrMapOvr>
+</p:notes>
+</file>
+
+<file path=ppt/notesSlides/notesSlide6.xml><?xml version="1.0" encoding="utf-8"?>
+<p:notes xmlns:a="http://schemas.openxmlformats.org/drawingml/2006/main" xmlns:r="http://schemas.openxmlformats.org/officeDocument/2006/relationships" xmlns:p="http://schemas.openxmlformats.org/presentationml/2006/main">
+  <p:cSld>
+    <p:spTree>
+      <p:nvGrpSpPr>
+        <p:cNvPr id="1" name=""/>
+        <p:cNvGrpSpPr/>
+        <p:nvPr/>
+      </p:nvGrpSpPr>
+      <p:grpSpPr>
+        <a:xfrm>
+          <a:off x="0" y="0"/>
+          <a:ext cx="0" cy="0"/>
+          <a:chOff x="0" y="0"/>
+          <a:chExt cx="0" cy="0"/>
+        </a:xfrm>
+      </p:grpSpPr>
+      <p:sp>
+        <p:nvSpPr>
+          <p:cNvPr id="2" name="Slide Image Placeholder 1"/>
+          <p:cNvSpPr>
+            <a:spLocks noGrp="1" noRot="1" noChangeAspect="1"/>
+          </p:cNvSpPr>
+          <p:nvPr>
+            <p:ph type="sldImg"/>
+          </p:nvPr>
+        </p:nvSpPr>
+        <p:spPr/>
+      </p:sp>
+      <p:sp>
+        <p:nvSpPr>
+          <p:cNvPr id="3" name="Notes Placeholder 2"/>
+          <p:cNvSpPr>
+            <a:spLocks noGrp="1"/>
+          </p:cNvSpPr>
+          <p:nvPr>
+            <p:ph type="body" idx="1"/>
+          </p:nvPr>
+        </p:nvSpPr>
+        <p:spPr/>
+        <p:txBody>
+          <a:bodyPr/>
+          <a:lstStyle/>
+          <a:p>
+            <a:r>
+              <a:rPr lang="en-GB" dirty="0"/>
+              <a:t>U</a:t>
+            </a:r>
+            <a:r>
+              <a:rPr lang="en-NL" dirty="0"/>
+              <a:t>sed for living documents. When done: give it a doi</a:t>
+            </a:r>
+          </a:p>
+        </p:txBody>
+      </p:sp>
+      <p:sp>
+        <p:nvSpPr>
+          <p:cNvPr id="4" name="Slide Number Placeholder 3"/>
+          <p:cNvSpPr>
+            <a:spLocks noGrp="1"/>
+          </p:cNvSpPr>
+          <p:nvPr>
+            <p:ph type="sldNum" sz="quarter" idx="5"/>
+          </p:nvPr>
+        </p:nvSpPr>
+        <p:spPr/>
+        <p:txBody>
+          <a:bodyPr/>
+          <a:lstStyle/>
+          <a:p>
+            <a:fld id="{49AF2050-A35D-D84D-8840-74500D44AACF}" type="slidenum">
+              <a:rPr lang="en-NL" smtClean="0"/>
+              <a:t>20</a:t>
+            </a:fld>
+            <a:endParaRPr lang="en-NL"/>
+          </a:p>
+        </p:txBody>
+      </p:sp>
+    </p:spTree>
+    <p:extLst>
+      <p:ext uri="{BB962C8B-B14F-4D97-AF65-F5344CB8AC3E}">
+        <p14:creationId xmlns:p14="http://schemas.microsoft.com/office/powerpoint/2010/main" val="2769587828"/>
       </p:ext>
     </p:extLst>
   </p:cSld>
@@ -3915,32 +4400,51 @@
           <a:bodyPr/>
           <a:lstStyle/>
           <a:p>
+            <a:r>
+              <a:rPr lang="en-NL" dirty="0"/>
+              <a:t>Git &amp; Github</a:t>
+            </a:r>
+          </a:p>
+        </p:txBody>
+      </p:sp>
+      <p:sp>
+        <p:nvSpPr>
+          <p:cNvPr id="3" name="Subtitle 2">
+            <a:extLst>
+              <a:ext uri="{FF2B5EF4-FFF2-40B4-BE49-F238E27FC236}">
+                <a16:creationId xmlns:a16="http://schemas.microsoft.com/office/drawing/2014/main" id="{EAC53259-A044-C749-B7CB-9C77D115DFC2}"/>
+              </a:ext>
+            </a:extLst>
+          </p:cNvPr>
+          <p:cNvSpPr>
+            <a:spLocks noGrp="1"/>
+          </p:cNvSpPr>
+          <p:nvPr>
+            <p:ph type="subTitle" idx="1"/>
+          </p:nvPr>
+        </p:nvSpPr>
+        <p:spPr/>
+        <p:txBody>
+          <a:bodyPr/>
+          <a:lstStyle/>
+          <a:p>
+            <a:r>
+              <a:rPr lang="en-GB" dirty="0"/>
+              <a:t>C</a:t>
+            </a:r>
+            <a:r>
+              <a:rPr lang="en-NL" dirty="0"/>
+              <a:t>rash course</a:t>
+            </a:r>
+          </a:p>
+          <a:p>
             <a:endParaRPr lang="en-NL" dirty="0"/>
           </a:p>
-        </p:txBody>
-      </p:sp>
-      <p:sp>
-        <p:nvSpPr>
-          <p:cNvPr id="3" name="Subtitle 2">
-            <a:extLst>
-              <a:ext uri="{FF2B5EF4-FFF2-40B4-BE49-F238E27FC236}">
-                <a16:creationId xmlns:a16="http://schemas.microsoft.com/office/drawing/2014/main" id="{EAC53259-A044-C749-B7CB-9C77D115DFC2}"/>
-              </a:ext>
-            </a:extLst>
-          </p:cNvPr>
-          <p:cNvSpPr>
-            <a:spLocks noGrp="1"/>
-          </p:cNvSpPr>
-          <p:nvPr>
-            <p:ph type="subTitle" idx="1"/>
-          </p:nvPr>
-        </p:nvSpPr>
-        <p:spPr/>
-        <p:txBody>
-          <a:bodyPr/>
-          <a:lstStyle/>
-          <a:p>
-            <a:endParaRPr lang="en-NL"/>
+          <a:p>
+            <a:r>
+              <a:rPr lang="en-NL" dirty="0"/>
+              <a:t>Alyanne de Haan, Marc Teunis</a:t>
+            </a:r>
           </a:p>
         </p:txBody>
       </p:sp>
@@ -3948,6 +4452,1903 @@
     <p:extLst>
       <p:ext uri="{BB962C8B-B14F-4D97-AF65-F5344CB8AC3E}">
         <p14:creationId xmlns:p14="http://schemas.microsoft.com/office/powerpoint/2010/main" val="2485366636"/>
+      </p:ext>
+    </p:extLst>
+  </p:cSld>
+  <p:clrMapOvr>
+    <a:masterClrMapping/>
+  </p:clrMapOvr>
+</p:sld>
+</file>
+
+<file path=ppt/slides/slide10.xml><?xml version="1.0" encoding="utf-8"?>
+<p:sld xmlns:a="http://schemas.openxmlformats.org/drawingml/2006/main" xmlns:r="http://schemas.openxmlformats.org/officeDocument/2006/relationships" xmlns:p="http://schemas.openxmlformats.org/presentationml/2006/main">
+  <p:cSld>
+    <p:spTree>
+      <p:nvGrpSpPr>
+        <p:cNvPr id="1" name=""/>
+        <p:cNvGrpSpPr/>
+        <p:nvPr/>
+      </p:nvGrpSpPr>
+      <p:grpSpPr>
+        <a:xfrm>
+          <a:off x="0" y="0"/>
+          <a:ext cx="0" cy="0"/>
+          <a:chOff x="0" y="0"/>
+          <a:chExt cx="0" cy="0"/>
+        </a:xfrm>
+      </p:grpSpPr>
+      <p:sp>
+        <p:nvSpPr>
+          <p:cNvPr id="2" name="Title 1">
+            <a:extLst>
+              <a:ext uri="{FF2B5EF4-FFF2-40B4-BE49-F238E27FC236}">
+                <a16:creationId xmlns:a16="http://schemas.microsoft.com/office/drawing/2014/main" id="{C6A2BC3D-7B1F-EB01-E107-6E6F29DDBD87}"/>
+              </a:ext>
+            </a:extLst>
+          </p:cNvPr>
+          <p:cNvSpPr>
+            <a:spLocks noGrp="1"/>
+          </p:cNvSpPr>
+          <p:nvPr>
+            <p:ph type="title"/>
+          </p:nvPr>
+        </p:nvSpPr>
+        <p:spPr/>
+        <p:txBody>
+          <a:bodyPr/>
+          <a:lstStyle/>
+          <a:p>
+            <a:r>
+              <a:rPr lang="en-GB" dirty="0"/>
+              <a:t>M</a:t>
+            </a:r>
+            <a:r>
+              <a:rPr lang="en-NL" dirty="0"/>
+              <a:t>edium-fi version control:</a:t>
+            </a:r>
+            <a:br>
+              <a:rPr lang="en-NL" dirty="0"/>
+            </a:br>
+            <a:r>
+              <a:rPr lang="en-NL" dirty="0"/>
+              <a:t>google docs, onedrive</a:t>
+            </a:r>
+          </a:p>
+        </p:txBody>
+      </p:sp>
+      <p:sp>
+        <p:nvSpPr>
+          <p:cNvPr id="3" name="Content Placeholder 2">
+            <a:extLst>
+              <a:ext uri="{FF2B5EF4-FFF2-40B4-BE49-F238E27FC236}">
+                <a16:creationId xmlns:a16="http://schemas.microsoft.com/office/drawing/2014/main" id="{05B3B04B-BB0B-5608-4971-CDB9D2DCC036}"/>
+              </a:ext>
+            </a:extLst>
+          </p:cNvPr>
+          <p:cNvSpPr>
+            <a:spLocks noGrp="1"/>
+          </p:cNvSpPr>
+          <p:nvPr>
+            <p:ph idx="1"/>
+          </p:nvPr>
+        </p:nvSpPr>
+        <p:spPr/>
+        <p:txBody>
+          <a:bodyPr/>
+          <a:lstStyle/>
+          <a:p>
+            <a:endParaRPr lang="en-NL" dirty="0"/>
+          </a:p>
+        </p:txBody>
+      </p:sp>
+      <p:pic>
+        <p:nvPicPr>
+          <p:cNvPr id="3074" name="Picture 2" descr="Image titled Check Google Doc History Step 2">
+            <a:extLst>
+              <a:ext uri="{FF2B5EF4-FFF2-40B4-BE49-F238E27FC236}">
+                <a16:creationId xmlns:a16="http://schemas.microsoft.com/office/drawing/2014/main" id="{21D8E30A-82C7-E41A-8C72-90777DD6AE54}"/>
+              </a:ext>
+            </a:extLst>
+          </p:cNvPr>
+          <p:cNvPicPr>
+            <a:picLocks noChangeAspect="1" noChangeArrowheads="1"/>
+          </p:cNvPicPr>
+          <p:nvPr/>
+        </p:nvPicPr>
+        <p:blipFill rotWithShape="1">
+          <a:blip r:embed="rId3">
+            <a:extLst>
+              <a:ext uri="{28A0092B-C50C-407E-A947-70E740481C1C}">
+                <a14:useLocalDpi xmlns:a14="http://schemas.microsoft.com/office/drawing/2010/main" val="0"/>
+              </a:ext>
+            </a:extLst>
+          </a:blip>
+          <a:srcRect b="15791"/>
+          <a:stretch/>
+        </p:blipFill>
+        <p:spPr bwMode="auto">
+          <a:xfrm>
+            <a:off x="0" y="1690688"/>
+            <a:ext cx="6889749" cy="4351338"/>
+          </a:xfrm>
+          <a:prstGeom prst="rect">
+            <a:avLst/>
+          </a:prstGeom>
+          <a:noFill/>
+          <a:extLst>
+            <a:ext uri="{909E8E84-426E-40DD-AFC4-6F175D3DCCD1}">
+              <a14:hiddenFill xmlns:a14="http://schemas.microsoft.com/office/drawing/2010/main">
+                <a:solidFill>
+                  <a:srgbClr val="FFFFFF"/>
+                </a:solidFill>
+              </a14:hiddenFill>
+            </a:ext>
+          </a:extLst>
+        </p:spPr>
+      </p:pic>
+      <p:sp>
+        <p:nvSpPr>
+          <p:cNvPr id="4" name="TextBox 3">
+            <a:extLst>
+              <a:ext uri="{FF2B5EF4-FFF2-40B4-BE49-F238E27FC236}">
+                <a16:creationId xmlns:a16="http://schemas.microsoft.com/office/drawing/2014/main" id="{0475B711-C6A1-AB4E-5312-80630C59F585}"/>
+              </a:ext>
+            </a:extLst>
+          </p:cNvPr>
+          <p:cNvSpPr txBox="1"/>
+          <p:nvPr/>
+        </p:nvSpPr>
+        <p:spPr>
+          <a:xfrm>
+            <a:off x="254833" y="6340839"/>
+            <a:ext cx="7285219" cy="307777"/>
+          </a:xfrm>
+          <a:prstGeom prst="rect">
+            <a:avLst/>
+          </a:prstGeom>
+          <a:noFill/>
+        </p:spPr>
+        <p:txBody>
+          <a:bodyPr wrap="square" rtlCol="0">
+            <a:spAutoFit/>
+          </a:bodyPr>
+          <a:lstStyle/>
+          <a:p>
+            <a:r>
+              <a:rPr lang="en-GB" sz="1400" dirty="0"/>
+              <a:t>I</a:t>
+            </a:r>
+            <a:r>
+              <a:rPr lang="en-NL" sz="1400" dirty="0"/>
+              <a:t>mage: </a:t>
+            </a:r>
+            <a:r>
+              <a:rPr lang="en-GB" sz="1400" dirty="0"/>
+              <a:t>https://</a:t>
+            </a:r>
+            <a:r>
+              <a:rPr lang="en-GB" sz="1400" dirty="0" err="1"/>
+              <a:t>www.wikihow.com</a:t>
+            </a:r>
+            <a:r>
+              <a:rPr lang="en-GB" sz="1400" dirty="0"/>
+              <a:t>/Check-Google-Doc-History</a:t>
+            </a:r>
+            <a:endParaRPr lang="en-NL" sz="1400" dirty="0"/>
+          </a:p>
+        </p:txBody>
+      </p:sp>
+      <p:pic>
+        <p:nvPicPr>
+          <p:cNvPr id="3076" name="Picture 4" descr="File Explorer menu including the Version history option.">
+            <a:extLst>
+              <a:ext uri="{FF2B5EF4-FFF2-40B4-BE49-F238E27FC236}">
+                <a16:creationId xmlns:a16="http://schemas.microsoft.com/office/drawing/2014/main" id="{94ACBD12-A7A9-5EF0-C424-94971D6C7944}"/>
+              </a:ext>
+            </a:extLst>
+          </p:cNvPr>
+          <p:cNvPicPr>
+            <a:picLocks noChangeAspect="1" noChangeArrowheads="1"/>
+          </p:cNvPicPr>
+          <p:nvPr/>
+        </p:nvPicPr>
+        <p:blipFill>
+          <a:blip r:embed="rId4">
+            <a:extLst>
+              <a:ext uri="{28A0092B-C50C-407E-A947-70E740481C1C}">
+                <a14:useLocalDpi xmlns:a14="http://schemas.microsoft.com/office/drawing/2010/main" val="0"/>
+              </a:ext>
+            </a:extLst>
+          </a:blip>
+          <a:srcRect/>
+          <a:stretch>
+            <a:fillRect/>
+          </a:stretch>
+        </p:blipFill>
+        <p:spPr bwMode="auto">
+          <a:xfrm>
+            <a:off x="7238688" y="1661749"/>
+            <a:ext cx="4610100" cy="3505200"/>
+          </a:xfrm>
+          <a:prstGeom prst="rect">
+            <a:avLst/>
+          </a:prstGeom>
+          <a:noFill/>
+          <a:extLst>
+            <a:ext uri="{909E8E84-426E-40DD-AFC4-6F175D3DCCD1}">
+              <a14:hiddenFill xmlns:a14="http://schemas.microsoft.com/office/drawing/2010/main">
+                <a:solidFill>
+                  <a:srgbClr val="FFFFFF"/>
+                </a:solidFill>
+              </a14:hiddenFill>
+            </a:ext>
+          </a:extLst>
+        </p:spPr>
+      </p:pic>
+      <p:sp>
+        <p:nvSpPr>
+          <p:cNvPr id="5" name="TextBox 4">
+            <a:extLst>
+              <a:ext uri="{FF2B5EF4-FFF2-40B4-BE49-F238E27FC236}">
+                <a16:creationId xmlns:a16="http://schemas.microsoft.com/office/drawing/2014/main" id="{86B68471-1423-10A1-D334-A07519D30FC1}"/>
+              </a:ext>
+            </a:extLst>
+          </p:cNvPr>
+          <p:cNvSpPr txBox="1"/>
+          <p:nvPr/>
+        </p:nvSpPr>
+        <p:spPr>
+          <a:xfrm>
+            <a:off x="10056559" y="5196251"/>
+            <a:ext cx="7285219" cy="307777"/>
+          </a:xfrm>
+          <a:prstGeom prst="rect">
+            <a:avLst/>
+          </a:prstGeom>
+          <a:noFill/>
+        </p:spPr>
+        <p:txBody>
+          <a:bodyPr wrap="square" rtlCol="0">
+            <a:spAutoFit/>
+          </a:bodyPr>
+          <a:lstStyle/>
+          <a:p>
+            <a:r>
+              <a:rPr lang="en-GB" sz="1400" dirty="0"/>
+              <a:t>I</a:t>
+            </a:r>
+            <a:r>
+              <a:rPr lang="en-NL" sz="1400" dirty="0"/>
+              <a:t>mage: </a:t>
+            </a:r>
+            <a:r>
+              <a:rPr lang="en-GB" sz="1400" dirty="0" err="1"/>
+              <a:t>microsoft.com</a:t>
+            </a:r>
+            <a:endParaRPr lang="en-NL" sz="1400" dirty="0"/>
+          </a:p>
+        </p:txBody>
+      </p:sp>
+    </p:spTree>
+    <p:extLst>
+      <p:ext uri="{BB962C8B-B14F-4D97-AF65-F5344CB8AC3E}">
+        <p14:creationId xmlns:p14="http://schemas.microsoft.com/office/powerpoint/2010/main" val="3715739778"/>
+      </p:ext>
+    </p:extLst>
+  </p:cSld>
+  <p:clrMapOvr>
+    <a:masterClrMapping/>
+  </p:clrMapOvr>
+</p:sld>
+</file>
+
+<file path=ppt/slides/slide11.xml><?xml version="1.0" encoding="utf-8"?>
+<p:sld xmlns:a="http://schemas.openxmlformats.org/drawingml/2006/main" xmlns:r="http://schemas.openxmlformats.org/officeDocument/2006/relationships" xmlns:p="http://schemas.openxmlformats.org/presentationml/2006/main">
+  <p:cSld>
+    <p:spTree>
+      <p:nvGrpSpPr>
+        <p:cNvPr id="1" name=""/>
+        <p:cNvGrpSpPr/>
+        <p:nvPr/>
+      </p:nvGrpSpPr>
+      <p:grpSpPr>
+        <a:xfrm>
+          <a:off x="0" y="0"/>
+          <a:ext cx="0" cy="0"/>
+          <a:chOff x="0" y="0"/>
+          <a:chExt cx="0" cy="0"/>
+        </a:xfrm>
+      </p:grpSpPr>
+      <p:sp>
+        <p:nvSpPr>
+          <p:cNvPr id="2" name="Title 1">
+            <a:extLst>
+              <a:ext uri="{FF2B5EF4-FFF2-40B4-BE49-F238E27FC236}">
+                <a16:creationId xmlns:a16="http://schemas.microsoft.com/office/drawing/2014/main" id="{C6A2BC3D-7B1F-EB01-E107-6E6F29DDBD87}"/>
+              </a:ext>
+            </a:extLst>
+          </p:cNvPr>
+          <p:cNvSpPr>
+            <a:spLocks noGrp="1"/>
+          </p:cNvSpPr>
+          <p:nvPr>
+            <p:ph type="title"/>
+          </p:nvPr>
+        </p:nvSpPr>
+        <p:spPr/>
+        <p:txBody>
+          <a:bodyPr/>
+          <a:lstStyle/>
+          <a:p>
+            <a:r>
+              <a:rPr lang="en-GB" dirty="0"/>
+              <a:t>M</a:t>
+            </a:r>
+            <a:r>
+              <a:rPr lang="en-NL" dirty="0"/>
+              <a:t>edium-fi version control:</a:t>
+            </a:r>
+            <a:br>
+              <a:rPr lang="en-NL" dirty="0"/>
+            </a:br>
+            <a:r>
+              <a:rPr lang="en-NL" dirty="0"/>
+              <a:t>google docs, onedrive</a:t>
+            </a:r>
+          </a:p>
+        </p:txBody>
+      </p:sp>
+      <p:sp>
+        <p:nvSpPr>
+          <p:cNvPr id="3" name="Content Placeholder 2">
+            <a:extLst>
+              <a:ext uri="{FF2B5EF4-FFF2-40B4-BE49-F238E27FC236}">
+                <a16:creationId xmlns:a16="http://schemas.microsoft.com/office/drawing/2014/main" id="{05B3B04B-BB0B-5608-4971-CDB9D2DCC036}"/>
+              </a:ext>
+            </a:extLst>
+          </p:cNvPr>
+          <p:cNvSpPr>
+            <a:spLocks noGrp="1"/>
+          </p:cNvSpPr>
+          <p:nvPr>
+            <p:ph idx="1"/>
+          </p:nvPr>
+        </p:nvSpPr>
+        <p:spPr/>
+        <p:txBody>
+          <a:bodyPr>
+            <a:normAutofit fontScale="77500" lnSpcReduction="20000"/>
+          </a:bodyPr>
+          <a:lstStyle/>
+          <a:p>
+            <a:pPr marL="0" indent="0">
+              <a:buNone/>
+            </a:pPr>
+            <a:r>
+              <a:rPr lang="en-NL" dirty="0"/>
+              <a:t>Pros:</a:t>
+            </a:r>
+          </a:p>
+          <a:p>
+            <a:r>
+              <a:rPr lang="en-GB" dirty="0"/>
+              <a:t>E</a:t>
+            </a:r>
+            <a:r>
+              <a:rPr lang="en-NL" dirty="0"/>
+              <a:t>asy</a:t>
+            </a:r>
+          </a:p>
+          <a:p>
+            <a:r>
+              <a:rPr lang="en-GB" dirty="0"/>
+              <a:t>S</a:t>
+            </a:r>
+            <a:r>
+              <a:rPr lang="en-NL" dirty="0"/>
+              <a:t>tored in the cloud</a:t>
+            </a:r>
+          </a:p>
+          <a:p>
+            <a:r>
+              <a:rPr lang="en-GB" dirty="0"/>
+              <a:t>D</a:t>
+            </a:r>
+            <a:r>
+              <a:rPr lang="en-NL" dirty="0"/>
+              <a:t>oes merge changes by collaborators</a:t>
+            </a:r>
+          </a:p>
+          <a:p>
+            <a:pPr marL="0" indent="0">
+              <a:buNone/>
+            </a:pPr>
+            <a:endParaRPr lang="en-NL" dirty="0"/>
+          </a:p>
+          <a:p>
+            <a:pPr marL="0" indent="0">
+              <a:buNone/>
+            </a:pPr>
+            <a:r>
+              <a:rPr lang="en-NL" dirty="0"/>
+              <a:t>Cons:</a:t>
+            </a:r>
+          </a:p>
+          <a:p>
+            <a:r>
+              <a:rPr lang="en-GB" dirty="0"/>
+              <a:t>N</a:t>
+            </a:r>
+            <a:r>
+              <a:rPr lang="en-NL" dirty="0"/>
+              <a:t>o branching (we’ll get to that)</a:t>
+            </a:r>
+          </a:p>
+          <a:p>
+            <a:r>
+              <a:rPr lang="en-GB" dirty="0"/>
+              <a:t>N</a:t>
+            </a:r>
+            <a:r>
+              <a:rPr lang="en-NL" dirty="0"/>
+              <a:t>o meta data, so not actually more insightful than the low-fi option: going back to “before a bug” means manually scrolling and guessing which version to use.</a:t>
+            </a:r>
+          </a:p>
+          <a:p>
+            <a:r>
+              <a:rPr lang="en-GB" dirty="0"/>
+              <a:t>R</a:t>
+            </a:r>
+            <a:r>
+              <a:rPr lang="en-NL" dirty="0"/>
+              <a:t>eproducibility = low</a:t>
+            </a:r>
+          </a:p>
+          <a:p>
+            <a:r>
+              <a:rPr lang="en-GB" dirty="0"/>
+              <a:t>N</a:t>
+            </a:r>
+            <a:r>
+              <a:rPr lang="en-NL" dirty="0"/>
+              <a:t>o releases (other than low-fi)</a:t>
+            </a:r>
+          </a:p>
+          <a:p>
+            <a:r>
+              <a:rPr lang="en-GB" dirty="0"/>
+              <a:t>N</a:t>
+            </a:r>
+            <a:r>
+              <a:rPr lang="en-NL" dirty="0"/>
+              <a:t>ot distributed (easy to destroy the backup)</a:t>
+            </a:r>
+          </a:p>
+        </p:txBody>
+      </p:sp>
+    </p:spTree>
+    <p:extLst>
+      <p:ext uri="{BB962C8B-B14F-4D97-AF65-F5344CB8AC3E}">
+        <p14:creationId xmlns:p14="http://schemas.microsoft.com/office/powerpoint/2010/main" val="2277844298"/>
+      </p:ext>
+    </p:extLst>
+  </p:cSld>
+  <p:clrMapOvr>
+    <a:masterClrMapping/>
+  </p:clrMapOvr>
+</p:sld>
+</file>
+
+<file path=ppt/slides/slide12.xml><?xml version="1.0" encoding="utf-8"?>
+<p:sld xmlns:a="http://schemas.openxmlformats.org/drawingml/2006/main" xmlns:r="http://schemas.openxmlformats.org/officeDocument/2006/relationships" xmlns:p="http://schemas.openxmlformats.org/presentationml/2006/main">
+  <p:cSld>
+    <p:spTree>
+      <p:nvGrpSpPr>
+        <p:cNvPr id="1" name=""/>
+        <p:cNvGrpSpPr/>
+        <p:nvPr/>
+      </p:nvGrpSpPr>
+      <p:grpSpPr>
+        <a:xfrm>
+          <a:off x="0" y="0"/>
+          <a:ext cx="0" cy="0"/>
+          <a:chOff x="0" y="0"/>
+          <a:chExt cx="0" cy="0"/>
+        </a:xfrm>
+      </p:grpSpPr>
+      <p:sp>
+        <p:nvSpPr>
+          <p:cNvPr id="2" name="Title 1">
+            <a:extLst>
+              <a:ext uri="{FF2B5EF4-FFF2-40B4-BE49-F238E27FC236}">
+                <a16:creationId xmlns:a16="http://schemas.microsoft.com/office/drawing/2014/main" id="{E34F496F-695F-309F-9C3E-E208495B2A3F}"/>
+              </a:ext>
+            </a:extLst>
+          </p:cNvPr>
+          <p:cNvSpPr>
+            <a:spLocks noGrp="1"/>
+          </p:cNvSpPr>
+          <p:nvPr>
+            <p:ph type="title"/>
+          </p:nvPr>
+        </p:nvSpPr>
+        <p:spPr/>
+        <p:txBody>
+          <a:bodyPr/>
+          <a:lstStyle/>
+          <a:p>
+            <a:r>
+              <a:rPr lang="en-NL" dirty="0"/>
+              <a:t>High-fi version control : Git</a:t>
+            </a:r>
+          </a:p>
+        </p:txBody>
+      </p:sp>
+      <p:sp>
+        <p:nvSpPr>
+          <p:cNvPr id="3" name="Content Placeholder 2">
+            <a:extLst>
+              <a:ext uri="{FF2B5EF4-FFF2-40B4-BE49-F238E27FC236}">
+                <a16:creationId xmlns:a16="http://schemas.microsoft.com/office/drawing/2014/main" id="{CDF8188A-DEE1-7826-9007-442680241ADE}"/>
+              </a:ext>
+            </a:extLst>
+          </p:cNvPr>
+          <p:cNvSpPr>
+            <a:spLocks noGrp="1"/>
+          </p:cNvSpPr>
+          <p:nvPr>
+            <p:ph idx="1"/>
+          </p:nvPr>
+        </p:nvSpPr>
+        <p:spPr/>
+        <p:txBody>
+          <a:bodyPr/>
+          <a:lstStyle/>
+          <a:p>
+            <a:endParaRPr lang="en-GB" sz="1800" dirty="0">
+              <a:latin typeface="Arial" panose="020B0604020202020204" pitchFamily="34" charset="0"/>
+            </a:endParaRPr>
+          </a:p>
+          <a:p>
+            <a:endParaRPr lang="en-NL" dirty="0"/>
+          </a:p>
+        </p:txBody>
+      </p:sp>
+      <p:pic>
+        <p:nvPicPr>
+          <p:cNvPr id="5122" name="Picture 2" descr="Git - Wikipedia">
+            <a:extLst>
+              <a:ext uri="{FF2B5EF4-FFF2-40B4-BE49-F238E27FC236}">
+                <a16:creationId xmlns:a16="http://schemas.microsoft.com/office/drawing/2014/main" id="{E998B144-BE1B-7821-DFF7-C204C5EC675E}"/>
+              </a:ext>
+            </a:extLst>
+          </p:cNvPr>
+          <p:cNvPicPr>
+            <a:picLocks noChangeAspect="1" noChangeArrowheads="1"/>
+          </p:cNvPicPr>
+          <p:nvPr/>
+        </p:nvPicPr>
+        <p:blipFill>
+          <a:blip r:embed="rId3">
+            <a:extLst>
+              <a:ext uri="{28A0092B-C50C-407E-A947-70E740481C1C}">
+                <a14:useLocalDpi xmlns:a14="http://schemas.microsoft.com/office/drawing/2010/main" val="0"/>
+              </a:ext>
+            </a:extLst>
+          </a:blip>
+          <a:srcRect/>
+          <a:stretch>
+            <a:fillRect/>
+          </a:stretch>
+        </p:blipFill>
+        <p:spPr bwMode="auto">
+          <a:xfrm>
+            <a:off x="2502568" y="1955980"/>
+            <a:ext cx="8393965" cy="4421040"/>
+          </a:xfrm>
+          <a:prstGeom prst="rect">
+            <a:avLst/>
+          </a:prstGeom>
+          <a:noFill/>
+          <a:extLst>
+            <a:ext uri="{909E8E84-426E-40DD-AFC4-6F175D3DCCD1}">
+              <a14:hiddenFill xmlns:a14="http://schemas.microsoft.com/office/drawing/2010/main">
+                <a:solidFill>
+                  <a:srgbClr val="FFFFFF"/>
+                </a:solidFill>
+              </a14:hiddenFill>
+            </a:ext>
+          </a:extLst>
+        </p:spPr>
+      </p:pic>
+      <p:sp>
+        <p:nvSpPr>
+          <p:cNvPr id="5" name="TextBox 4">
+            <a:extLst>
+              <a:ext uri="{FF2B5EF4-FFF2-40B4-BE49-F238E27FC236}">
+                <a16:creationId xmlns:a16="http://schemas.microsoft.com/office/drawing/2014/main" id="{FE2CA156-3235-9829-1911-53F710A4068D}"/>
+              </a:ext>
+            </a:extLst>
+          </p:cNvPr>
+          <p:cNvSpPr txBox="1"/>
+          <p:nvPr/>
+        </p:nvSpPr>
+        <p:spPr>
+          <a:xfrm>
+            <a:off x="4385247" y="6377020"/>
+            <a:ext cx="9394922" cy="369332"/>
+          </a:xfrm>
+          <a:prstGeom prst="rect">
+            <a:avLst/>
+          </a:prstGeom>
+          <a:noFill/>
+        </p:spPr>
+        <p:txBody>
+          <a:bodyPr wrap="square">
+            <a:spAutoFit/>
+          </a:bodyPr>
+          <a:lstStyle/>
+          <a:p>
+            <a:r>
+              <a:rPr lang="en-NL" dirty="0"/>
+              <a:t>image: Chris Down Vector:  Holek, Public domain, via Wikimedia Commons</a:t>
+            </a:r>
+          </a:p>
+        </p:txBody>
+      </p:sp>
+    </p:spTree>
+    <p:extLst>
+      <p:ext uri="{BB962C8B-B14F-4D97-AF65-F5344CB8AC3E}">
+        <p14:creationId xmlns:p14="http://schemas.microsoft.com/office/powerpoint/2010/main" val="4044323634"/>
+      </p:ext>
+    </p:extLst>
+  </p:cSld>
+  <p:clrMapOvr>
+    <a:masterClrMapping/>
+  </p:clrMapOvr>
+</p:sld>
+</file>
+
+<file path=ppt/slides/slide13.xml><?xml version="1.0" encoding="utf-8"?>
+<p:sld xmlns:a="http://schemas.openxmlformats.org/drawingml/2006/main" xmlns:r="http://schemas.openxmlformats.org/officeDocument/2006/relationships" xmlns:p="http://schemas.openxmlformats.org/presentationml/2006/main">
+  <p:cSld>
+    <p:spTree>
+      <p:nvGrpSpPr>
+        <p:cNvPr id="1" name=""/>
+        <p:cNvGrpSpPr/>
+        <p:nvPr/>
+      </p:nvGrpSpPr>
+      <p:grpSpPr>
+        <a:xfrm>
+          <a:off x="0" y="0"/>
+          <a:ext cx="0" cy="0"/>
+          <a:chOff x="0" y="0"/>
+          <a:chExt cx="0" cy="0"/>
+        </a:xfrm>
+      </p:grpSpPr>
+      <p:sp>
+        <p:nvSpPr>
+          <p:cNvPr id="2" name="Title 1">
+            <a:extLst>
+              <a:ext uri="{FF2B5EF4-FFF2-40B4-BE49-F238E27FC236}">
+                <a16:creationId xmlns:a16="http://schemas.microsoft.com/office/drawing/2014/main" id="{46CBF11B-25B1-1154-B0BD-F2AC4493D97C}"/>
+              </a:ext>
+            </a:extLst>
+          </p:cNvPr>
+          <p:cNvSpPr>
+            <a:spLocks noGrp="1"/>
+          </p:cNvSpPr>
+          <p:nvPr>
+            <p:ph type="title"/>
+          </p:nvPr>
+        </p:nvSpPr>
+        <p:spPr/>
+        <p:txBody>
+          <a:bodyPr/>
+          <a:lstStyle/>
+          <a:p>
+            <a:r>
+              <a:rPr lang="en-NL" dirty="0"/>
+              <a:t>High-fi version control : Git</a:t>
+            </a:r>
+          </a:p>
+        </p:txBody>
+      </p:sp>
+      <p:sp>
+        <p:nvSpPr>
+          <p:cNvPr id="3" name="Content Placeholder 2">
+            <a:extLst>
+              <a:ext uri="{FF2B5EF4-FFF2-40B4-BE49-F238E27FC236}">
+                <a16:creationId xmlns:a16="http://schemas.microsoft.com/office/drawing/2014/main" id="{5FF6D385-011B-B96A-B94D-F66FDEEC16D2}"/>
+              </a:ext>
+            </a:extLst>
+          </p:cNvPr>
+          <p:cNvSpPr>
+            <a:spLocks noGrp="1"/>
+          </p:cNvSpPr>
+          <p:nvPr>
+            <p:ph idx="1"/>
+          </p:nvPr>
+        </p:nvSpPr>
+        <p:spPr/>
+        <p:txBody>
+          <a:bodyPr/>
+          <a:lstStyle/>
+          <a:p>
+            <a:pPr marL="0" indent="0" algn="ctr">
+              <a:buNone/>
+            </a:pPr>
+            <a:r>
+              <a:rPr lang="en-NL" i="1" dirty="0"/>
+              <a:t>“Oh great. But we are not programmers. So helaas pindakaas.”</a:t>
+            </a:r>
+          </a:p>
+        </p:txBody>
+      </p:sp>
+    </p:spTree>
+    <p:extLst>
+      <p:ext uri="{BB962C8B-B14F-4D97-AF65-F5344CB8AC3E}">
+        <p14:creationId xmlns:p14="http://schemas.microsoft.com/office/powerpoint/2010/main" val="3223172593"/>
+      </p:ext>
+    </p:extLst>
+  </p:cSld>
+  <p:clrMapOvr>
+    <a:masterClrMapping/>
+  </p:clrMapOvr>
+</p:sld>
+</file>
+
+<file path=ppt/slides/slide14.xml><?xml version="1.0" encoding="utf-8"?>
+<p:sld xmlns:a="http://schemas.openxmlformats.org/drawingml/2006/main" xmlns:r="http://schemas.openxmlformats.org/officeDocument/2006/relationships" xmlns:p="http://schemas.openxmlformats.org/presentationml/2006/main">
+  <p:cSld>
+    <p:spTree>
+      <p:nvGrpSpPr>
+        <p:cNvPr id="1" name=""/>
+        <p:cNvGrpSpPr/>
+        <p:nvPr/>
+      </p:nvGrpSpPr>
+      <p:grpSpPr>
+        <a:xfrm>
+          <a:off x="0" y="0"/>
+          <a:ext cx="0" cy="0"/>
+          <a:chOff x="0" y="0"/>
+          <a:chExt cx="0" cy="0"/>
+        </a:xfrm>
+      </p:grpSpPr>
+      <p:sp>
+        <p:nvSpPr>
+          <p:cNvPr id="2" name="Title 1">
+            <a:extLst>
+              <a:ext uri="{FF2B5EF4-FFF2-40B4-BE49-F238E27FC236}">
+                <a16:creationId xmlns:a16="http://schemas.microsoft.com/office/drawing/2014/main" id="{134BB777-0A04-D3D5-3FA5-756671BD452A}"/>
+              </a:ext>
+            </a:extLst>
+          </p:cNvPr>
+          <p:cNvSpPr>
+            <a:spLocks noGrp="1"/>
+          </p:cNvSpPr>
+          <p:nvPr>
+            <p:ph type="title"/>
+          </p:nvPr>
+        </p:nvSpPr>
+        <p:spPr/>
+        <p:txBody>
+          <a:bodyPr/>
+          <a:lstStyle/>
+          <a:p>
+            <a:r>
+              <a:rPr lang="en-NL" dirty="0"/>
+              <a:t>High-fi version control : Git with Github</a:t>
+            </a:r>
+          </a:p>
+        </p:txBody>
+      </p:sp>
+      <p:sp>
+        <p:nvSpPr>
+          <p:cNvPr id="3" name="Content Placeholder 2">
+            <a:extLst>
+              <a:ext uri="{FF2B5EF4-FFF2-40B4-BE49-F238E27FC236}">
+                <a16:creationId xmlns:a16="http://schemas.microsoft.com/office/drawing/2014/main" id="{879CFE73-1DF0-EFE0-80F4-CCA6BDAD6D8E}"/>
+              </a:ext>
+            </a:extLst>
+          </p:cNvPr>
+          <p:cNvSpPr>
+            <a:spLocks noGrp="1"/>
+          </p:cNvSpPr>
+          <p:nvPr>
+            <p:ph idx="1"/>
+          </p:nvPr>
+        </p:nvSpPr>
+        <p:spPr/>
+        <p:txBody>
+          <a:bodyPr/>
+          <a:lstStyle/>
+          <a:p>
+            <a:endParaRPr lang="en-NL" dirty="0"/>
+          </a:p>
+        </p:txBody>
+      </p:sp>
+      <p:pic>
+        <p:nvPicPr>
+          <p:cNvPr id="4" name="Picture 3">
+            <a:extLst>
+              <a:ext uri="{FF2B5EF4-FFF2-40B4-BE49-F238E27FC236}">
+                <a16:creationId xmlns:a16="http://schemas.microsoft.com/office/drawing/2014/main" id="{38BBD1C0-7824-C9D7-2D0C-4268413DB162}"/>
+              </a:ext>
+            </a:extLst>
+          </p:cNvPr>
+          <p:cNvPicPr>
+            <a:picLocks noChangeAspect="1"/>
+          </p:cNvPicPr>
+          <p:nvPr/>
+        </p:nvPicPr>
+        <p:blipFill>
+          <a:blip r:embed="rId2"/>
+          <a:stretch>
+            <a:fillRect/>
+          </a:stretch>
+        </p:blipFill>
+        <p:spPr>
+          <a:xfrm>
+            <a:off x="8067310" y="2482850"/>
+            <a:ext cx="1333500" cy="685800"/>
+          </a:xfrm>
+          <a:prstGeom prst="rect">
+            <a:avLst/>
+          </a:prstGeom>
+        </p:spPr>
+      </p:pic>
+      <p:pic>
+        <p:nvPicPr>
+          <p:cNvPr id="5" name="Picture 4">
+            <a:extLst>
+              <a:ext uri="{FF2B5EF4-FFF2-40B4-BE49-F238E27FC236}">
+                <a16:creationId xmlns:a16="http://schemas.microsoft.com/office/drawing/2014/main" id="{AC3CC089-93CB-965F-1D77-5BFB7162DEA3}"/>
+              </a:ext>
+            </a:extLst>
+          </p:cNvPr>
+          <p:cNvPicPr>
+            <a:picLocks noChangeAspect="1"/>
+          </p:cNvPicPr>
+          <p:nvPr/>
+        </p:nvPicPr>
+        <p:blipFill>
+          <a:blip r:embed="rId3"/>
+          <a:stretch>
+            <a:fillRect/>
+          </a:stretch>
+        </p:blipFill>
+        <p:spPr>
+          <a:xfrm>
+            <a:off x="9761355" y="1820004"/>
+            <a:ext cx="2070100" cy="609600"/>
+          </a:xfrm>
+          <a:prstGeom prst="rect">
+            <a:avLst/>
+          </a:prstGeom>
+        </p:spPr>
+      </p:pic>
+      <p:pic>
+        <p:nvPicPr>
+          <p:cNvPr id="6" name="Picture 5">
+            <a:extLst>
+              <a:ext uri="{FF2B5EF4-FFF2-40B4-BE49-F238E27FC236}">
+                <a16:creationId xmlns:a16="http://schemas.microsoft.com/office/drawing/2014/main" id="{323FEE9B-E489-6939-2ECA-0A078DCAC5FB}"/>
+              </a:ext>
+            </a:extLst>
+          </p:cNvPr>
+          <p:cNvPicPr>
+            <a:picLocks noChangeAspect="1"/>
+          </p:cNvPicPr>
+          <p:nvPr/>
+        </p:nvPicPr>
+        <p:blipFill>
+          <a:blip r:embed="rId4"/>
+          <a:stretch>
+            <a:fillRect/>
+          </a:stretch>
+        </p:blipFill>
+        <p:spPr>
+          <a:xfrm>
+            <a:off x="9821315" y="2565400"/>
+            <a:ext cx="2451100" cy="520700"/>
+          </a:xfrm>
+          <a:prstGeom prst="rect">
+            <a:avLst/>
+          </a:prstGeom>
+        </p:spPr>
+      </p:pic>
+      <p:pic>
+        <p:nvPicPr>
+          <p:cNvPr id="7" name="Picture 6">
+            <a:extLst>
+              <a:ext uri="{FF2B5EF4-FFF2-40B4-BE49-F238E27FC236}">
+                <a16:creationId xmlns:a16="http://schemas.microsoft.com/office/drawing/2014/main" id="{E1F64C69-A1A2-0DA3-CAA0-C786946033AC}"/>
+              </a:ext>
+            </a:extLst>
+          </p:cNvPr>
+          <p:cNvPicPr>
+            <a:picLocks noChangeAspect="1"/>
+          </p:cNvPicPr>
+          <p:nvPr/>
+        </p:nvPicPr>
+        <p:blipFill>
+          <a:blip r:embed="rId5"/>
+          <a:stretch>
+            <a:fillRect/>
+          </a:stretch>
+        </p:blipFill>
+        <p:spPr>
+          <a:xfrm>
+            <a:off x="9818505" y="3287296"/>
+            <a:ext cx="1955800" cy="622300"/>
+          </a:xfrm>
+          <a:prstGeom prst="rect">
+            <a:avLst/>
+          </a:prstGeom>
+        </p:spPr>
+      </p:pic>
+      <p:pic>
+        <p:nvPicPr>
+          <p:cNvPr id="8" name="Picture 7">
+            <a:extLst>
+              <a:ext uri="{FF2B5EF4-FFF2-40B4-BE49-F238E27FC236}">
+                <a16:creationId xmlns:a16="http://schemas.microsoft.com/office/drawing/2014/main" id="{B756B507-60E0-F0F6-5458-48EAF404EF59}"/>
+              </a:ext>
+            </a:extLst>
+          </p:cNvPr>
+          <p:cNvPicPr>
+            <a:picLocks noChangeAspect="1"/>
+          </p:cNvPicPr>
+          <p:nvPr/>
+        </p:nvPicPr>
+        <p:blipFill>
+          <a:blip r:embed="rId6"/>
+          <a:stretch>
+            <a:fillRect/>
+          </a:stretch>
+        </p:blipFill>
+        <p:spPr>
+          <a:xfrm>
+            <a:off x="603926" y="1596232"/>
+            <a:ext cx="11170379" cy="4351337"/>
+          </a:xfrm>
+          <a:prstGeom prst="rect">
+            <a:avLst/>
+          </a:prstGeom>
+        </p:spPr>
+      </p:pic>
+    </p:spTree>
+    <p:extLst>
+      <p:ext uri="{BB962C8B-B14F-4D97-AF65-F5344CB8AC3E}">
+        <p14:creationId xmlns:p14="http://schemas.microsoft.com/office/powerpoint/2010/main" val="2425700469"/>
+      </p:ext>
+    </p:extLst>
+  </p:cSld>
+  <p:clrMapOvr>
+    <a:masterClrMapping/>
+  </p:clrMapOvr>
+  <p:timing>
+    <p:tnLst>
+      <p:par>
+        <p:cTn id="1" dur="indefinite" restart="never" nodeType="tmRoot">
+          <p:childTnLst>
+            <p:seq concurrent="1" nextAc="seek">
+              <p:cTn id="2" dur="indefinite" nodeType="mainSeq">
+                <p:childTnLst>
+                  <p:par>
+                    <p:cTn id="3" fill="hold">
+                      <p:stCondLst>
+                        <p:cond delay="indefinite"/>
+                      </p:stCondLst>
+                      <p:childTnLst>
+                        <p:par>
+                          <p:cTn id="4" fill="hold">
+                            <p:stCondLst>
+                              <p:cond delay="0"/>
+                            </p:stCondLst>
+                            <p:childTnLst>
+                              <p:par>
+                                <p:cTn id="5" presetID="1" presetClass="entr" presetSubtype="0" fill="hold" nodeType="clickEffect">
+                                  <p:stCondLst>
+                                    <p:cond delay="0"/>
+                                  </p:stCondLst>
+                                  <p:childTnLst>
+                                    <p:set>
+                                      <p:cBhvr>
+                                        <p:cTn id="6" dur="1" fill="hold">
+                                          <p:stCondLst>
+                                            <p:cond delay="0"/>
+                                          </p:stCondLst>
+                                        </p:cTn>
+                                        <p:tgtEl>
+                                          <p:spTgt spid="8"/>
+                                        </p:tgtEl>
+                                        <p:attrNameLst>
+                                          <p:attrName>style.visibility</p:attrName>
+                                        </p:attrNameLst>
+                                      </p:cBhvr>
+                                      <p:to>
+                                        <p:strVal val="visible"/>
+                                      </p:to>
+                                    </p:set>
+                                  </p:childTnLst>
+                                </p:cTn>
+                              </p:par>
+                            </p:childTnLst>
+                          </p:cTn>
+                        </p:par>
+                      </p:childTnLst>
+                    </p:cTn>
+                  </p:par>
+                </p:childTnLst>
+              </p:cTn>
+              <p:prevCondLst>
+                <p:cond evt="onPrev" delay="0">
+                  <p:tgtEl>
+                    <p:sldTgt/>
+                  </p:tgtEl>
+                </p:cond>
+              </p:prevCondLst>
+              <p:nextCondLst>
+                <p:cond evt="onNext" delay="0">
+                  <p:tgtEl>
+                    <p:sldTgt/>
+                  </p:tgtEl>
+                </p:cond>
+              </p:nextCondLst>
+            </p:seq>
+          </p:childTnLst>
+        </p:cTn>
+      </p:par>
+    </p:tnLst>
+  </p:timing>
+</p:sld>
+</file>
+
+<file path=ppt/slides/slide15.xml><?xml version="1.0" encoding="utf-8"?>
+<p:sld xmlns:a="http://schemas.openxmlformats.org/drawingml/2006/main" xmlns:r="http://schemas.openxmlformats.org/officeDocument/2006/relationships" xmlns:p="http://schemas.openxmlformats.org/presentationml/2006/main">
+  <p:cSld>
+    <p:spTree>
+      <p:nvGrpSpPr>
+        <p:cNvPr id="1" name=""/>
+        <p:cNvGrpSpPr/>
+        <p:nvPr/>
+      </p:nvGrpSpPr>
+      <p:grpSpPr>
+        <a:xfrm>
+          <a:off x="0" y="0"/>
+          <a:ext cx="0" cy="0"/>
+          <a:chOff x="0" y="0"/>
+          <a:chExt cx="0" cy="0"/>
+        </a:xfrm>
+      </p:grpSpPr>
+      <p:sp>
+        <p:nvSpPr>
+          <p:cNvPr id="2" name="Title 1">
+            <a:extLst>
+              <a:ext uri="{FF2B5EF4-FFF2-40B4-BE49-F238E27FC236}">
+                <a16:creationId xmlns:a16="http://schemas.microsoft.com/office/drawing/2014/main" id="{B23F1F98-532D-ABB2-5410-DD5A2A497D1B}"/>
+              </a:ext>
+            </a:extLst>
+          </p:cNvPr>
+          <p:cNvSpPr>
+            <a:spLocks noGrp="1"/>
+          </p:cNvSpPr>
+          <p:nvPr>
+            <p:ph type="title"/>
+          </p:nvPr>
+        </p:nvSpPr>
+        <p:spPr/>
+        <p:txBody>
+          <a:bodyPr/>
+          <a:lstStyle/>
+          <a:p>
+            <a:r>
+              <a:rPr lang="en-NL" dirty="0"/>
+              <a:t>High-fi version control : Git with Github</a:t>
+            </a:r>
+            <a:br>
+              <a:rPr lang="en-NL" dirty="0"/>
+            </a:br>
+            <a:endParaRPr lang="en-NL" dirty="0"/>
+          </a:p>
+        </p:txBody>
+      </p:sp>
+      <p:sp>
+        <p:nvSpPr>
+          <p:cNvPr id="3" name="Content Placeholder 2">
+            <a:extLst>
+              <a:ext uri="{FF2B5EF4-FFF2-40B4-BE49-F238E27FC236}">
+                <a16:creationId xmlns:a16="http://schemas.microsoft.com/office/drawing/2014/main" id="{99CAB18F-DF42-3D7D-8CE2-A7A676C890CB}"/>
+              </a:ext>
+            </a:extLst>
+          </p:cNvPr>
+          <p:cNvSpPr>
+            <a:spLocks noGrp="1"/>
+          </p:cNvSpPr>
+          <p:nvPr>
+            <p:ph idx="1"/>
+          </p:nvPr>
+        </p:nvSpPr>
+        <p:spPr/>
+        <p:txBody>
+          <a:bodyPr/>
+          <a:lstStyle/>
+          <a:p>
+            <a:pPr rtl="0" fontAlgn="base">
+              <a:spcBef>
+                <a:spcPts val="0"/>
+              </a:spcBef>
+              <a:spcAft>
+                <a:spcPts val="0"/>
+              </a:spcAft>
+              <a:buFont typeface="Arial" panose="020B0604020202020204" pitchFamily="34" charset="0"/>
+              <a:buChar char="•"/>
+            </a:pPr>
+            <a:r>
+              <a:rPr lang="en-GB" sz="2400" b="0" i="0" u="none" strike="noStrike" dirty="0">
+                <a:effectLst/>
+                <a:latin typeface="Trebuchet MS" panose="020B0703020202090204" pitchFamily="34" charset="0"/>
+              </a:rPr>
+              <a:t>GitHub is a cloud storage system for git repositories.</a:t>
+            </a:r>
+          </a:p>
+          <a:p>
+            <a:pPr rtl="0" fontAlgn="base">
+              <a:spcBef>
+                <a:spcPts val="0"/>
+              </a:spcBef>
+              <a:spcAft>
+                <a:spcPts val="0"/>
+              </a:spcAft>
+              <a:buFont typeface="Arial" panose="020B0604020202020204" pitchFamily="34" charset="0"/>
+              <a:buChar char="•"/>
+            </a:pPr>
+            <a:endParaRPr lang="en-GB" sz="2400" dirty="0">
+              <a:latin typeface="Trebuchet MS" panose="020B0703020202090204" pitchFamily="34" charset="0"/>
+            </a:endParaRPr>
+          </a:p>
+          <a:p>
+            <a:pPr rtl="0" fontAlgn="base">
+              <a:spcBef>
+                <a:spcPts val="0"/>
+              </a:spcBef>
+              <a:spcAft>
+                <a:spcPts val="0"/>
+              </a:spcAft>
+              <a:buFont typeface="Arial" panose="020B0604020202020204" pitchFamily="34" charset="0"/>
+              <a:buChar char="•"/>
+            </a:pPr>
+            <a:r>
+              <a:rPr lang="en-GB" sz="2400" dirty="0">
+                <a:latin typeface="Trebuchet MS" panose="020B0703020202090204" pitchFamily="34" charset="0"/>
+              </a:rPr>
+              <a:t>Offers additional tools for collaboration</a:t>
+            </a:r>
+          </a:p>
+          <a:p>
+            <a:pPr marL="0" indent="0" rtl="0" fontAlgn="base">
+              <a:spcBef>
+                <a:spcPts val="0"/>
+              </a:spcBef>
+              <a:spcAft>
+                <a:spcPts val="0"/>
+              </a:spcAft>
+              <a:buNone/>
+            </a:pPr>
+            <a:endParaRPr lang="en-GB" sz="2400" dirty="0">
+              <a:latin typeface="Trebuchet MS" panose="020B0703020202090204" pitchFamily="34" charset="0"/>
+            </a:endParaRPr>
+          </a:p>
+          <a:p>
+            <a:pPr marL="0" indent="0" rtl="0" fontAlgn="base">
+              <a:spcBef>
+                <a:spcPts val="0"/>
+              </a:spcBef>
+              <a:spcAft>
+                <a:spcPts val="0"/>
+              </a:spcAft>
+              <a:buNone/>
+            </a:pPr>
+            <a:endParaRPr lang="en-GB" sz="2400" dirty="0">
+              <a:latin typeface="Trebuchet MS" panose="020B0703020202090204" pitchFamily="34" charset="0"/>
+            </a:endParaRPr>
+          </a:p>
+          <a:p>
+            <a:pPr rtl="0" fontAlgn="base">
+              <a:spcBef>
+                <a:spcPts val="0"/>
+              </a:spcBef>
+              <a:spcAft>
+                <a:spcPts val="0"/>
+              </a:spcAft>
+              <a:buFont typeface="Arial" panose="020B0604020202020204" pitchFamily="34" charset="0"/>
+              <a:buChar char="•"/>
+            </a:pPr>
+            <a:r>
+              <a:rPr lang="en-GB" sz="2400" dirty="0">
+                <a:latin typeface="Trebuchet MS" panose="020B0703020202090204" pitchFamily="34" charset="0"/>
+              </a:rPr>
+              <a:t>Works with web interface, </a:t>
+            </a:r>
+            <a:br>
+              <a:rPr lang="en-GB" sz="2400" dirty="0">
+                <a:latin typeface="Trebuchet MS" panose="020B0703020202090204" pitchFamily="34" charset="0"/>
+              </a:rPr>
+            </a:br>
+            <a:r>
+              <a:rPr lang="en-GB" sz="2400" dirty="0">
+                <a:latin typeface="Trebuchet MS" panose="020B0703020202090204" pitchFamily="34" charset="0"/>
+              </a:rPr>
+              <a:t>or </a:t>
+            </a:r>
+            <a:r>
+              <a:rPr lang="en-GB" sz="2400" b="0" i="0" u="none" strike="noStrike" dirty="0" err="1">
+                <a:effectLst/>
+                <a:latin typeface="Trebuchet MS" panose="020B0703020202090204" pitchFamily="34" charset="0"/>
+              </a:rPr>
+              <a:t>Github</a:t>
+            </a:r>
+            <a:r>
+              <a:rPr lang="en-GB" sz="2400" b="0" i="0" u="none" strike="noStrike" dirty="0">
+                <a:effectLst/>
+                <a:latin typeface="Trebuchet MS" panose="020B0703020202090204" pitchFamily="34" charset="0"/>
+              </a:rPr>
+              <a:t> Desktop App , </a:t>
+            </a:r>
+            <a:br>
+              <a:rPr lang="en-GB" sz="2400" b="0" i="0" u="none" strike="noStrike" dirty="0">
+                <a:effectLst/>
+                <a:latin typeface="Trebuchet MS" panose="020B0703020202090204" pitchFamily="34" charset="0"/>
+              </a:rPr>
+            </a:br>
+            <a:r>
+              <a:rPr lang="en-GB" sz="2400" b="0" i="0" u="none" strike="noStrike" dirty="0">
+                <a:effectLst/>
+                <a:latin typeface="Trebuchet MS" panose="020B0703020202090204" pitchFamily="34" charset="0"/>
+              </a:rPr>
+              <a:t>or </a:t>
+            </a:r>
+            <a:r>
+              <a:rPr lang="en-GB" sz="2400" dirty="0">
+                <a:latin typeface="Trebuchet MS" panose="020B0703020202090204" pitchFamily="34" charset="0"/>
+              </a:rPr>
+              <a:t>Connects to </a:t>
+            </a:r>
+            <a:r>
+              <a:rPr lang="en-GB" sz="2400" dirty="0" err="1">
+                <a:latin typeface="Trebuchet MS" panose="020B0703020202090204" pitchFamily="34" charset="0"/>
+              </a:rPr>
+              <a:t>Rstudio</a:t>
+            </a:r>
+            <a:r>
+              <a:rPr lang="en-GB" sz="2400" dirty="0">
+                <a:latin typeface="Trebuchet MS" panose="020B0703020202090204" pitchFamily="34" charset="0"/>
+              </a:rPr>
+              <a:t>, </a:t>
+            </a:r>
+            <a:br>
+              <a:rPr lang="en-GB" sz="2400" dirty="0">
+                <a:latin typeface="Trebuchet MS" panose="020B0703020202090204" pitchFamily="34" charset="0"/>
+              </a:rPr>
+            </a:br>
+            <a:r>
+              <a:rPr lang="en-GB" sz="2400" dirty="0">
+                <a:latin typeface="Trebuchet MS" panose="020B0703020202090204" pitchFamily="34" charset="0"/>
+              </a:rPr>
+              <a:t>or command line, </a:t>
+            </a:r>
+            <a:br>
+              <a:rPr lang="en-GB" sz="2400" dirty="0">
+                <a:latin typeface="Trebuchet MS" panose="020B0703020202090204" pitchFamily="34" charset="0"/>
+              </a:rPr>
+            </a:br>
+            <a:r>
+              <a:rPr lang="en-GB" sz="2400" dirty="0">
+                <a:latin typeface="Trebuchet MS" panose="020B0703020202090204" pitchFamily="34" charset="0"/>
+              </a:rPr>
+              <a:t>or..</a:t>
+            </a:r>
+          </a:p>
+          <a:p>
+            <a:endParaRPr lang="en-NL" dirty="0"/>
+          </a:p>
+        </p:txBody>
+      </p:sp>
+    </p:spTree>
+    <p:extLst>
+      <p:ext uri="{BB962C8B-B14F-4D97-AF65-F5344CB8AC3E}">
+        <p14:creationId xmlns:p14="http://schemas.microsoft.com/office/powerpoint/2010/main" val="3623605110"/>
+      </p:ext>
+    </p:extLst>
+  </p:cSld>
+  <p:clrMapOvr>
+    <a:masterClrMapping/>
+  </p:clrMapOvr>
+</p:sld>
+</file>
+
+<file path=ppt/slides/slide16.xml><?xml version="1.0" encoding="utf-8"?>
+<p:sld xmlns:a="http://schemas.openxmlformats.org/drawingml/2006/main" xmlns:r="http://schemas.openxmlformats.org/officeDocument/2006/relationships" xmlns:p="http://schemas.openxmlformats.org/presentationml/2006/main">
+  <p:cSld>
+    <p:spTree>
+      <p:nvGrpSpPr>
+        <p:cNvPr id="1" name=""/>
+        <p:cNvGrpSpPr/>
+        <p:nvPr/>
+      </p:nvGrpSpPr>
+      <p:grpSpPr>
+        <a:xfrm>
+          <a:off x="0" y="0"/>
+          <a:ext cx="0" cy="0"/>
+          <a:chOff x="0" y="0"/>
+          <a:chExt cx="0" cy="0"/>
+        </a:xfrm>
+      </p:grpSpPr>
+      <p:sp>
+        <p:nvSpPr>
+          <p:cNvPr id="2" name="Title 1">
+            <a:extLst>
+              <a:ext uri="{FF2B5EF4-FFF2-40B4-BE49-F238E27FC236}">
+                <a16:creationId xmlns:a16="http://schemas.microsoft.com/office/drawing/2014/main" id="{B23F1F98-532D-ABB2-5410-DD5A2A497D1B}"/>
+              </a:ext>
+            </a:extLst>
+          </p:cNvPr>
+          <p:cNvSpPr>
+            <a:spLocks noGrp="1"/>
+          </p:cNvSpPr>
+          <p:nvPr>
+            <p:ph type="title"/>
+          </p:nvPr>
+        </p:nvSpPr>
+        <p:spPr/>
+        <p:txBody>
+          <a:bodyPr/>
+          <a:lstStyle/>
+          <a:p>
+            <a:r>
+              <a:rPr lang="en-NL" dirty="0"/>
+              <a:t>High-fi version control : Git with Github</a:t>
+            </a:r>
+            <a:br>
+              <a:rPr lang="en-NL" dirty="0"/>
+            </a:br>
+            <a:endParaRPr lang="en-NL" dirty="0"/>
+          </a:p>
+        </p:txBody>
+      </p:sp>
+      <p:sp>
+        <p:nvSpPr>
+          <p:cNvPr id="3" name="Content Placeholder 2">
+            <a:extLst>
+              <a:ext uri="{FF2B5EF4-FFF2-40B4-BE49-F238E27FC236}">
+                <a16:creationId xmlns:a16="http://schemas.microsoft.com/office/drawing/2014/main" id="{99CAB18F-DF42-3D7D-8CE2-A7A676C890CB}"/>
+              </a:ext>
+            </a:extLst>
+          </p:cNvPr>
+          <p:cNvSpPr>
+            <a:spLocks noGrp="1"/>
+          </p:cNvSpPr>
+          <p:nvPr>
+            <p:ph idx="1"/>
+          </p:nvPr>
+        </p:nvSpPr>
+        <p:spPr/>
+        <p:txBody>
+          <a:bodyPr/>
+          <a:lstStyle/>
+          <a:p>
+            <a:pPr rtl="0" fontAlgn="base">
+              <a:spcBef>
+                <a:spcPts val="0"/>
+              </a:spcBef>
+              <a:spcAft>
+                <a:spcPts val="0"/>
+              </a:spcAft>
+              <a:buFont typeface="Arial" panose="020B0604020202020204" pitchFamily="34" charset="0"/>
+              <a:buChar char="•"/>
+            </a:pPr>
+            <a:r>
+              <a:rPr lang="en-GB" sz="2400" b="0" i="0" u="none" strike="noStrike" dirty="0">
+                <a:effectLst/>
+                <a:latin typeface="Trebuchet MS" panose="020B0703020202090204" pitchFamily="34" charset="0"/>
+              </a:rPr>
+              <a:t>Git handles version control on your repo</a:t>
+            </a:r>
+          </a:p>
+          <a:p>
+            <a:pPr rtl="0" fontAlgn="base">
+              <a:spcBef>
+                <a:spcPts val="0"/>
+              </a:spcBef>
+              <a:spcAft>
+                <a:spcPts val="0"/>
+              </a:spcAft>
+              <a:buFont typeface="Arial" panose="020B0604020202020204" pitchFamily="34" charset="0"/>
+              <a:buChar char="•"/>
+            </a:pPr>
+            <a:endParaRPr lang="en-GB" sz="2400" b="0" i="0" u="none" strike="noStrike" dirty="0">
+              <a:effectLst/>
+              <a:latin typeface="Trebuchet MS" panose="020B0703020202090204" pitchFamily="34" charset="0"/>
+            </a:endParaRPr>
+          </a:p>
+          <a:p>
+            <a:pPr rtl="0" fontAlgn="base">
+              <a:spcBef>
+                <a:spcPts val="0"/>
+              </a:spcBef>
+              <a:spcAft>
+                <a:spcPts val="1600"/>
+              </a:spcAft>
+              <a:buFont typeface="Arial" panose="020B0604020202020204" pitchFamily="34" charset="0"/>
+              <a:buChar char="•"/>
+            </a:pPr>
+            <a:r>
+              <a:rPr lang="en-GB" sz="2400" b="0" i="0" u="none" strike="noStrike" dirty="0">
+                <a:effectLst/>
+                <a:latin typeface="Trebuchet MS" panose="020B0703020202090204" pitchFamily="34" charset="0"/>
+              </a:rPr>
+              <a:t>When you use GitHub, Git is working behind the scenes.</a:t>
+            </a:r>
+          </a:p>
+          <a:p>
+            <a:endParaRPr lang="en-NL" dirty="0"/>
+          </a:p>
+        </p:txBody>
+      </p:sp>
+    </p:spTree>
+    <p:extLst>
+      <p:ext uri="{BB962C8B-B14F-4D97-AF65-F5344CB8AC3E}">
+        <p14:creationId xmlns:p14="http://schemas.microsoft.com/office/powerpoint/2010/main" val="3607726894"/>
+      </p:ext>
+    </p:extLst>
+  </p:cSld>
+  <p:clrMapOvr>
+    <a:masterClrMapping/>
+  </p:clrMapOvr>
+</p:sld>
+</file>
+
+<file path=ppt/slides/slide17.xml><?xml version="1.0" encoding="utf-8"?>
+<p:sld xmlns:a="http://schemas.openxmlformats.org/drawingml/2006/main" xmlns:r="http://schemas.openxmlformats.org/officeDocument/2006/relationships" xmlns:p="http://schemas.openxmlformats.org/presentationml/2006/main">
+  <p:cSld>
+    <p:spTree>
+      <p:nvGrpSpPr>
+        <p:cNvPr id="1" name=""/>
+        <p:cNvGrpSpPr/>
+        <p:nvPr/>
+      </p:nvGrpSpPr>
+      <p:grpSpPr>
+        <a:xfrm>
+          <a:off x="0" y="0"/>
+          <a:ext cx="0" cy="0"/>
+          <a:chOff x="0" y="0"/>
+          <a:chExt cx="0" cy="0"/>
+        </a:xfrm>
+      </p:grpSpPr>
+      <p:sp>
+        <p:nvSpPr>
+          <p:cNvPr id="2" name="Title 1">
+            <a:extLst>
+              <a:ext uri="{FF2B5EF4-FFF2-40B4-BE49-F238E27FC236}">
+                <a16:creationId xmlns:a16="http://schemas.microsoft.com/office/drawing/2014/main" id="{5BA6F976-0B28-225A-2CE4-295D93B80657}"/>
+              </a:ext>
+            </a:extLst>
+          </p:cNvPr>
+          <p:cNvSpPr>
+            <a:spLocks noGrp="1"/>
+          </p:cNvSpPr>
+          <p:nvPr>
+            <p:ph type="title"/>
+          </p:nvPr>
+        </p:nvSpPr>
+        <p:spPr/>
+        <p:txBody>
+          <a:bodyPr/>
+          <a:lstStyle/>
+          <a:p>
+            <a:r>
+              <a:rPr lang="en-NL" dirty="0"/>
+              <a:t>High-fi version control : Git with Github</a:t>
+            </a:r>
+          </a:p>
+        </p:txBody>
+      </p:sp>
+      <p:sp>
+        <p:nvSpPr>
+          <p:cNvPr id="3" name="Content Placeholder 2">
+            <a:extLst>
+              <a:ext uri="{FF2B5EF4-FFF2-40B4-BE49-F238E27FC236}">
+                <a16:creationId xmlns:a16="http://schemas.microsoft.com/office/drawing/2014/main" id="{D98C64F1-D4B8-F0EF-8C83-CF9E4E44089E}"/>
+              </a:ext>
+            </a:extLst>
+          </p:cNvPr>
+          <p:cNvSpPr>
+            <a:spLocks noGrp="1"/>
+          </p:cNvSpPr>
+          <p:nvPr>
+            <p:ph idx="1"/>
+          </p:nvPr>
+        </p:nvSpPr>
+        <p:spPr>
+          <a:xfrm>
+            <a:off x="838200" y="1690688"/>
+            <a:ext cx="10515600" cy="4486275"/>
+          </a:xfrm>
+        </p:spPr>
+        <p:txBody>
+          <a:bodyPr/>
+          <a:lstStyle/>
+          <a:p>
+            <a:pPr marL="0" indent="0">
+              <a:buNone/>
+            </a:pPr>
+            <a:r>
+              <a:rPr lang="en-GB" dirty="0"/>
+              <a:t>C</a:t>
+            </a:r>
+            <a:r>
+              <a:rPr lang="en-NL" dirty="0"/>
+              <a:t>ons</a:t>
+            </a:r>
+          </a:p>
+          <a:p>
+            <a:r>
+              <a:rPr lang="en-GB" dirty="0"/>
+              <a:t>D</a:t>
+            </a:r>
+            <a:r>
+              <a:rPr lang="en-NL" dirty="0"/>
+              <a:t>esigned for and by IT crowd</a:t>
+            </a:r>
+          </a:p>
+          <a:p>
+            <a:r>
+              <a:rPr lang="en-GB" dirty="0"/>
+              <a:t>P</a:t>
+            </a:r>
+            <a:r>
+              <a:rPr lang="en-NL" dirty="0"/>
+              <a:t>refers text files (but can handle all)</a:t>
+            </a:r>
+          </a:p>
+          <a:p>
+            <a:r>
+              <a:rPr lang="en-GB" dirty="0"/>
+              <a:t>N</a:t>
+            </a:r>
+            <a:r>
+              <a:rPr lang="en-NL" dirty="0"/>
+              <a:t>o automatic syncing </a:t>
+            </a:r>
+          </a:p>
+        </p:txBody>
+      </p:sp>
+    </p:spTree>
+    <p:extLst>
+      <p:ext uri="{BB962C8B-B14F-4D97-AF65-F5344CB8AC3E}">
+        <p14:creationId xmlns:p14="http://schemas.microsoft.com/office/powerpoint/2010/main" val="639242225"/>
+      </p:ext>
+    </p:extLst>
+  </p:cSld>
+  <p:clrMapOvr>
+    <a:masterClrMapping/>
+  </p:clrMapOvr>
+</p:sld>
+</file>
+
+<file path=ppt/slides/slide18.xml><?xml version="1.0" encoding="utf-8"?>
+<p:sld xmlns:a="http://schemas.openxmlformats.org/drawingml/2006/main" xmlns:r="http://schemas.openxmlformats.org/officeDocument/2006/relationships" xmlns:p="http://schemas.openxmlformats.org/presentationml/2006/main">
+  <p:cSld>
+    <p:spTree>
+      <p:nvGrpSpPr>
+        <p:cNvPr id="1" name=""/>
+        <p:cNvGrpSpPr/>
+        <p:nvPr/>
+      </p:nvGrpSpPr>
+      <p:grpSpPr>
+        <a:xfrm>
+          <a:off x="0" y="0"/>
+          <a:ext cx="0" cy="0"/>
+          <a:chOff x="0" y="0"/>
+          <a:chExt cx="0" cy="0"/>
+        </a:xfrm>
+      </p:grpSpPr>
+      <p:sp>
+        <p:nvSpPr>
+          <p:cNvPr id="2" name="Title 1">
+            <a:extLst>
+              <a:ext uri="{FF2B5EF4-FFF2-40B4-BE49-F238E27FC236}">
+                <a16:creationId xmlns:a16="http://schemas.microsoft.com/office/drawing/2014/main" id="{97A1BDC4-9D12-C835-2B23-559522E7C169}"/>
+              </a:ext>
+            </a:extLst>
+          </p:cNvPr>
+          <p:cNvSpPr>
+            <a:spLocks noGrp="1"/>
+          </p:cNvSpPr>
+          <p:nvPr>
+            <p:ph type="title"/>
+          </p:nvPr>
+        </p:nvSpPr>
+        <p:spPr/>
+        <p:txBody>
+          <a:bodyPr/>
+          <a:lstStyle/>
+          <a:p>
+            <a:r>
+              <a:rPr lang="en-NL" dirty="0"/>
+              <a:t>High-fi version control : Git</a:t>
+            </a:r>
+          </a:p>
+        </p:txBody>
+      </p:sp>
+      <p:sp>
+        <p:nvSpPr>
+          <p:cNvPr id="3" name="Content Placeholder 2">
+            <a:extLst>
+              <a:ext uri="{FF2B5EF4-FFF2-40B4-BE49-F238E27FC236}">
+                <a16:creationId xmlns:a16="http://schemas.microsoft.com/office/drawing/2014/main" id="{30A679FB-C3CD-E8FE-C907-60AA53D7F45B}"/>
+              </a:ext>
+            </a:extLst>
+          </p:cNvPr>
+          <p:cNvSpPr>
+            <a:spLocks noGrp="1"/>
+          </p:cNvSpPr>
+          <p:nvPr>
+            <p:ph idx="1"/>
+          </p:nvPr>
+        </p:nvSpPr>
+        <p:spPr/>
+        <p:txBody>
+          <a:bodyPr>
+            <a:normAutofit/>
+          </a:bodyPr>
+          <a:lstStyle/>
+          <a:p>
+            <a:pPr marL="0" indent="0">
+              <a:buNone/>
+            </a:pPr>
+            <a:r>
+              <a:rPr lang="en-GB" sz="2400" dirty="0"/>
+              <a:t>Pros:</a:t>
+            </a:r>
+          </a:p>
+          <a:p>
+            <a:r>
+              <a:rPr lang="en-GB" sz="2400" dirty="0"/>
+              <a:t>N</a:t>
+            </a:r>
+            <a:r>
+              <a:rPr lang="en-NL" sz="2400" dirty="0"/>
+              <a:t>o automatic syncing! You are in control </a:t>
+            </a:r>
+            <a:endParaRPr lang="en-GB" sz="2400" dirty="0"/>
+          </a:p>
+          <a:p>
+            <a:r>
+              <a:rPr lang="en-GB" sz="2400" dirty="0"/>
+              <a:t>Go back to a working version (releases)</a:t>
+            </a:r>
+          </a:p>
+          <a:p>
+            <a:r>
+              <a:rPr lang="en-GB" sz="2400" dirty="0"/>
+              <a:t>Work on stuff without breaking the working version (branches)</a:t>
+            </a:r>
+          </a:p>
+          <a:p>
+            <a:r>
+              <a:rPr lang="en-GB" sz="2400" dirty="0"/>
+              <a:t>W</a:t>
+            </a:r>
+            <a:r>
+              <a:rPr lang="en-NL" sz="2400" dirty="0"/>
+              <a:t>ork on the same file with multiple people and have git solve the merging .. </a:t>
+            </a:r>
+            <a:r>
+              <a:rPr lang="en-GB" sz="2400" dirty="0"/>
+              <a:t>a</a:t>
+            </a:r>
+            <a:r>
+              <a:rPr lang="en-NL" sz="2400" dirty="0"/>
+              <a:t>lso when you worked offline and upload later (distributed)</a:t>
+            </a:r>
+          </a:p>
+          <a:p>
+            <a:r>
+              <a:rPr lang="en-GB" sz="2400" dirty="0"/>
+              <a:t>W</a:t>
+            </a:r>
+            <a:r>
+              <a:rPr lang="en-NL" sz="2400" dirty="0"/>
+              <a:t>hen you find a bug, you can retrace when it was (meta data on changes)</a:t>
+            </a:r>
+          </a:p>
+          <a:p>
+            <a:endParaRPr lang="en-NL" sz="2400" dirty="0"/>
+          </a:p>
+        </p:txBody>
+      </p:sp>
+    </p:spTree>
+    <p:extLst>
+      <p:ext uri="{BB962C8B-B14F-4D97-AF65-F5344CB8AC3E}">
+        <p14:creationId xmlns:p14="http://schemas.microsoft.com/office/powerpoint/2010/main" val="1936265544"/>
+      </p:ext>
+    </p:extLst>
+  </p:cSld>
+  <p:clrMapOvr>
+    <a:masterClrMapping/>
+  </p:clrMapOvr>
+</p:sld>
+</file>
+
+<file path=ppt/slides/slide19.xml><?xml version="1.0" encoding="utf-8"?>
+<p:sld xmlns:a="http://schemas.openxmlformats.org/drawingml/2006/main" xmlns:r="http://schemas.openxmlformats.org/officeDocument/2006/relationships" xmlns:p="http://schemas.openxmlformats.org/presentationml/2006/main">
+  <p:cSld>
+    <p:spTree>
+      <p:nvGrpSpPr>
+        <p:cNvPr id="1" name=""/>
+        <p:cNvGrpSpPr/>
+        <p:nvPr/>
+      </p:nvGrpSpPr>
+      <p:grpSpPr>
+        <a:xfrm>
+          <a:off x="0" y="0"/>
+          <a:ext cx="0" cy="0"/>
+          <a:chOff x="0" y="0"/>
+          <a:chExt cx="0" cy="0"/>
+        </a:xfrm>
+      </p:grpSpPr>
+      <p:pic>
+        <p:nvPicPr>
+          <p:cNvPr id="4" name="Picture 2">
+            <a:extLst>
+              <a:ext uri="{FF2B5EF4-FFF2-40B4-BE49-F238E27FC236}">
+                <a16:creationId xmlns:a16="http://schemas.microsoft.com/office/drawing/2014/main" id="{532D4E50-D8FB-432F-9A74-A856B26CC7F7}"/>
+              </a:ext>
+            </a:extLst>
+          </p:cNvPr>
+          <p:cNvPicPr>
+            <a:picLocks noChangeAspect="1" noChangeArrowheads="1"/>
+          </p:cNvPicPr>
+          <p:nvPr/>
+        </p:nvPicPr>
+        <p:blipFill rotWithShape="1">
+          <a:blip r:embed="rId2">
+            <a:extLst>
+              <a:ext uri="{28A0092B-C50C-407E-A947-70E740481C1C}">
+                <a14:useLocalDpi xmlns:a14="http://schemas.microsoft.com/office/drawing/2010/main" val="0"/>
+              </a:ext>
+            </a:extLst>
+          </a:blip>
+          <a:srcRect l="43288"/>
+          <a:stretch/>
+        </p:blipFill>
+        <p:spPr bwMode="auto">
+          <a:xfrm>
+            <a:off x="3694485" y="365125"/>
+            <a:ext cx="8324538" cy="6452682"/>
+          </a:xfrm>
+          <a:prstGeom prst="rect">
+            <a:avLst/>
+          </a:prstGeom>
+          <a:noFill/>
+          <a:extLst>
+            <a:ext uri="{909E8E84-426E-40DD-AFC4-6F175D3DCCD1}">
+              <a14:hiddenFill xmlns:a14="http://schemas.microsoft.com/office/drawing/2010/main">
+                <a:solidFill>
+                  <a:srgbClr val="FFFFFF"/>
+                </a:solidFill>
+              </a14:hiddenFill>
+            </a:ext>
+          </a:extLst>
+        </p:spPr>
+      </p:pic>
+      <p:sp>
+        <p:nvSpPr>
+          <p:cNvPr id="2" name="Title 1">
+            <a:extLst>
+              <a:ext uri="{FF2B5EF4-FFF2-40B4-BE49-F238E27FC236}">
+                <a16:creationId xmlns:a16="http://schemas.microsoft.com/office/drawing/2014/main" id="{A8A032CF-C64F-87C2-7D19-CD16E62C77B9}"/>
+              </a:ext>
+            </a:extLst>
+          </p:cNvPr>
+          <p:cNvSpPr>
+            <a:spLocks noGrp="1"/>
+          </p:cNvSpPr>
+          <p:nvPr>
+            <p:ph type="title"/>
+          </p:nvPr>
+        </p:nvSpPr>
+        <p:spPr/>
+        <p:txBody>
+          <a:bodyPr/>
+          <a:lstStyle/>
+          <a:p>
+            <a:r>
+              <a:rPr lang="en-GB" dirty="0"/>
+              <a:t>D</a:t>
+            </a:r>
+            <a:r>
+              <a:rPr lang="en-NL" dirty="0"/>
+              <a:t>istributed?</a:t>
+            </a:r>
+          </a:p>
+        </p:txBody>
+      </p:sp>
+      <p:sp>
+        <p:nvSpPr>
+          <p:cNvPr id="3" name="Content Placeholder 2">
+            <a:extLst>
+              <a:ext uri="{FF2B5EF4-FFF2-40B4-BE49-F238E27FC236}">
+                <a16:creationId xmlns:a16="http://schemas.microsoft.com/office/drawing/2014/main" id="{CFB37296-ADF3-6271-73DC-3F98A34A4047}"/>
+              </a:ext>
+            </a:extLst>
+          </p:cNvPr>
+          <p:cNvSpPr>
+            <a:spLocks noGrp="1"/>
+          </p:cNvSpPr>
+          <p:nvPr>
+            <p:ph idx="1"/>
+          </p:nvPr>
+        </p:nvSpPr>
+        <p:spPr>
+          <a:xfrm>
+            <a:off x="172978" y="1825625"/>
+            <a:ext cx="3521508" cy="4351338"/>
+          </a:xfrm>
+        </p:spPr>
+        <p:txBody>
+          <a:bodyPr>
+            <a:normAutofit/>
+          </a:bodyPr>
+          <a:lstStyle/>
+          <a:p>
+            <a:r>
+              <a:rPr lang="en-GB" sz="2400" dirty="0"/>
+              <a:t>Y</a:t>
+            </a:r>
+            <a:r>
+              <a:rPr lang="en-NL" sz="2400" dirty="0"/>
+              <a:t>ou do not add changes directly to the base camp (aka github)</a:t>
+            </a:r>
+          </a:p>
+          <a:p>
+            <a:endParaRPr lang="en-NL" sz="2400" dirty="0"/>
+          </a:p>
+          <a:p>
+            <a:pPr marL="0" indent="0">
+              <a:buNone/>
+            </a:pPr>
+            <a:r>
+              <a:rPr lang="en-GB" sz="2400" dirty="0"/>
+              <a:t>N</a:t>
+            </a:r>
+            <a:r>
+              <a:rPr lang="en-NL" sz="2400" dirty="0"/>
+              <a:t>o single point of failure:</a:t>
+            </a:r>
+          </a:p>
+          <a:p>
+            <a:r>
+              <a:rPr lang="en-NL" sz="2400" dirty="0"/>
+              <a:t>Every local repo is a backup</a:t>
+            </a:r>
+          </a:p>
+          <a:p>
+            <a:r>
+              <a:rPr lang="en-NL" sz="2400" dirty="0"/>
+              <a:t>You can mess up locally</a:t>
+            </a:r>
+          </a:p>
+        </p:txBody>
+      </p:sp>
+    </p:spTree>
+    <p:extLst>
+      <p:ext uri="{BB962C8B-B14F-4D97-AF65-F5344CB8AC3E}">
+        <p14:creationId xmlns:p14="http://schemas.microsoft.com/office/powerpoint/2010/main" val="176230377"/>
       </p:ext>
     </p:extLst>
   </p:cSld>
@@ -3976,10 +6377,10 @@
       </p:grpSpPr>
       <p:sp>
         <p:nvSpPr>
-          <p:cNvPr id="4" name="Title 3">
-            <a:extLst>
-              <a:ext uri="{FF2B5EF4-FFF2-40B4-BE49-F238E27FC236}">
-                <a16:creationId xmlns:a16="http://schemas.microsoft.com/office/drawing/2014/main" id="{AAC1D9A6-86F7-DDFC-D91E-A7C0985F373B}"/>
+          <p:cNvPr id="2" name="Title 1">
+            <a:extLst>
+              <a:ext uri="{FF2B5EF4-FFF2-40B4-BE49-F238E27FC236}">
+                <a16:creationId xmlns:a16="http://schemas.microsoft.com/office/drawing/2014/main" id="{D580AB74-DC2D-5EB1-B4DD-6A5C4FA946F9}"/>
               </a:ext>
             </a:extLst>
           </p:cNvPr>
@@ -3996,45 +6397,417 @@
           <a:lstStyle/>
           <a:p>
             <a:r>
-              <a:rPr lang="en-GB" dirty="0"/>
-              <a:t>V</a:t>
-            </a:r>
-            <a:r>
               <a:rPr lang="en-NL" dirty="0"/>
-              <a:t>ersion control</a:t>
-            </a:r>
-          </a:p>
-        </p:txBody>
-      </p:sp>
-      <p:sp>
-        <p:nvSpPr>
-          <p:cNvPr id="5" name="Text Placeholder 4">
-            <a:extLst>
-              <a:ext uri="{FF2B5EF4-FFF2-40B4-BE49-F238E27FC236}">
-                <a16:creationId xmlns:a16="http://schemas.microsoft.com/office/drawing/2014/main" id="{F64DF517-124B-C4E9-43AB-7410A1654874}"/>
-              </a:ext>
-            </a:extLst>
-          </p:cNvPr>
-          <p:cNvSpPr>
-            <a:spLocks noGrp="1"/>
-          </p:cNvSpPr>
-          <p:nvPr>
-            <p:ph type="body" idx="1"/>
-          </p:nvPr>
-        </p:nvSpPr>
-        <p:spPr/>
-        <p:txBody>
-          <a:bodyPr/>
-          <a:lstStyle/>
-          <a:p>
-            <a:endParaRPr lang="en-NL"/>
+              <a:t>What is git?</a:t>
+            </a:r>
+          </a:p>
+        </p:txBody>
+      </p:sp>
+      <p:sp>
+        <p:nvSpPr>
+          <p:cNvPr id="3" name="Content Placeholder 2">
+            <a:extLst>
+              <a:ext uri="{FF2B5EF4-FFF2-40B4-BE49-F238E27FC236}">
+                <a16:creationId xmlns:a16="http://schemas.microsoft.com/office/drawing/2014/main" id="{47E90F93-A3D8-FAB4-555E-5DD3979949A1}"/>
+              </a:ext>
+            </a:extLst>
+          </p:cNvPr>
+          <p:cNvSpPr>
+            <a:spLocks noGrp="1"/>
+          </p:cNvSpPr>
+          <p:nvPr>
+            <p:ph idx="1"/>
+          </p:nvPr>
+        </p:nvSpPr>
+        <p:spPr>
+          <a:xfrm>
+            <a:off x="838200" y="1825625"/>
+            <a:ext cx="4198495" cy="4351338"/>
+          </a:xfrm>
+        </p:spPr>
+        <p:txBody>
+          <a:bodyPr>
+            <a:normAutofit/>
+          </a:bodyPr>
+          <a:lstStyle/>
+          <a:p>
+            <a:r>
+              <a:rPr lang="en-GB" sz="1800" b="0" i="0" dirty="0">
+                <a:solidFill>
+                  <a:schemeClr val="accent1"/>
+                </a:solidFill>
+                <a:effectLst/>
+                <a:latin typeface="Fira Sans" panose="020B0503050000020004" pitchFamily="34" charset="0"/>
+              </a:rPr>
+              <a:t>Distributed</a:t>
+            </a:r>
+            <a:r>
+              <a:rPr lang="en-GB" sz="1800" b="0" i="0" dirty="0">
+                <a:solidFill>
+                  <a:srgbClr val="000000"/>
+                </a:solidFill>
+                <a:effectLst/>
+                <a:latin typeface="Fira Sans" panose="020B0503050000020004" pitchFamily="34" charset="0"/>
+              </a:rPr>
+              <a:t> </a:t>
+            </a:r>
+            <a:r>
+              <a:rPr lang="en-GB" sz="1800" b="0" i="0" dirty="0">
+                <a:solidFill>
+                  <a:schemeClr val="accent2"/>
+                </a:solidFill>
+                <a:effectLst/>
+                <a:latin typeface="Fira Sans" panose="020B0503050000020004" pitchFamily="34" charset="0"/>
+              </a:rPr>
+              <a:t>Version Control </a:t>
+            </a:r>
+            <a:r>
+              <a:rPr lang="en-GB" sz="1800" b="0" i="0" dirty="0">
+                <a:solidFill>
+                  <a:srgbClr val="000000"/>
+                </a:solidFill>
+                <a:effectLst/>
+                <a:latin typeface="Fira Sans" panose="020B0503050000020004" pitchFamily="34" charset="0"/>
+              </a:rPr>
+              <a:t>system written by Linus Torvalds (Linux)</a:t>
+            </a:r>
+          </a:p>
+          <a:p>
+            <a:endParaRPr lang="en-GB" sz="1800" b="0" i="0" dirty="0">
+              <a:solidFill>
+                <a:srgbClr val="000000"/>
+              </a:solidFill>
+              <a:effectLst/>
+              <a:latin typeface="Fira Sans" panose="020B0503050000020004" pitchFamily="34" charset="0"/>
+            </a:endParaRPr>
+          </a:p>
+          <a:p>
+            <a:pPr algn="l">
+              <a:buFont typeface="Arial" panose="020B0604020202020204" pitchFamily="34" charset="0"/>
+              <a:buChar char="•"/>
+            </a:pPr>
+            <a:r>
+              <a:rPr lang="en-GB" sz="1800" b="0" i="0" dirty="0">
+                <a:solidFill>
+                  <a:srgbClr val="000000"/>
+                </a:solidFill>
+                <a:effectLst/>
+                <a:latin typeface="Fira Sans" panose="020B0503050000020004" pitchFamily="34" charset="0"/>
+              </a:rPr>
+              <a:t>Open Source software written for the command line</a:t>
+            </a:r>
+            <a:br>
+              <a:rPr lang="en-GB" sz="1800" b="0" i="0" dirty="0">
+                <a:solidFill>
+                  <a:srgbClr val="000000"/>
+                </a:solidFill>
+                <a:effectLst/>
+                <a:latin typeface="Fira Sans" panose="020B0503050000020004" pitchFamily="34" charset="0"/>
+              </a:rPr>
+            </a:br>
+            <a:br>
+              <a:rPr lang="en-GB" sz="1800" b="0" i="0" dirty="0">
+                <a:solidFill>
+                  <a:srgbClr val="000000"/>
+                </a:solidFill>
+                <a:effectLst/>
+                <a:latin typeface="Fira Sans" panose="020B0503050000020004" pitchFamily="34" charset="0"/>
+              </a:rPr>
+            </a:br>
+            <a:r>
+              <a:rPr lang="en-GB" sz="1800" b="0" i="0" dirty="0">
+                <a:solidFill>
+                  <a:srgbClr val="000000"/>
+                </a:solidFill>
+                <a:effectLst/>
+                <a:latin typeface="Fira Sans" panose="020B0503050000020004" pitchFamily="34" charset="0"/>
+              </a:rPr>
+              <a:t>But many GUI-clients exist</a:t>
+            </a:r>
+            <a:endParaRPr lang="en-NL" sz="1800" dirty="0"/>
           </a:p>
         </p:txBody>
       </p:sp>
     </p:spTree>
     <p:extLst>
       <p:ext uri="{BB962C8B-B14F-4D97-AF65-F5344CB8AC3E}">
-        <p14:creationId xmlns:p14="http://schemas.microsoft.com/office/powerpoint/2010/main" val="254432769"/>
+        <p14:creationId xmlns:p14="http://schemas.microsoft.com/office/powerpoint/2010/main" val="2561643545"/>
+      </p:ext>
+    </p:extLst>
+  </p:cSld>
+  <p:clrMapOvr>
+    <a:masterClrMapping/>
+  </p:clrMapOvr>
+</p:sld>
+</file>
+
+<file path=ppt/slides/slide20.xml><?xml version="1.0" encoding="utf-8"?>
+<p:sld xmlns:a="http://schemas.openxmlformats.org/drawingml/2006/main" xmlns:r="http://schemas.openxmlformats.org/officeDocument/2006/relationships" xmlns:p="http://schemas.openxmlformats.org/presentationml/2006/main">
+  <p:cSld>
+    <p:spTree>
+      <p:nvGrpSpPr>
+        <p:cNvPr id="1" name=""/>
+        <p:cNvGrpSpPr/>
+        <p:nvPr/>
+      </p:nvGrpSpPr>
+      <p:grpSpPr>
+        <a:xfrm>
+          <a:off x="0" y="0"/>
+          <a:ext cx="0" cy="0"/>
+          <a:chOff x="0" y="0"/>
+          <a:chExt cx="0" cy="0"/>
+        </a:xfrm>
+      </p:grpSpPr>
+      <p:sp>
+        <p:nvSpPr>
+          <p:cNvPr id="2" name="Title 1">
+            <a:extLst>
+              <a:ext uri="{FF2B5EF4-FFF2-40B4-BE49-F238E27FC236}">
+                <a16:creationId xmlns:a16="http://schemas.microsoft.com/office/drawing/2014/main" id="{E5E3E03F-A95A-B88C-94EF-4B39278CDFAE}"/>
+              </a:ext>
+            </a:extLst>
+          </p:cNvPr>
+          <p:cNvSpPr>
+            <a:spLocks noGrp="1"/>
+          </p:cNvSpPr>
+          <p:nvPr>
+            <p:ph type="title"/>
+          </p:nvPr>
+        </p:nvSpPr>
+        <p:spPr/>
+        <p:txBody>
+          <a:bodyPr/>
+          <a:lstStyle/>
+          <a:p>
+            <a:r>
+              <a:rPr lang="en-NL" dirty="0"/>
+              <a:t>Where do you publish code?</a:t>
+            </a:r>
+          </a:p>
+        </p:txBody>
+      </p:sp>
+      <p:sp>
+        <p:nvSpPr>
+          <p:cNvPr id="3" name="Content Placeholder 2">
+            <a:extLst>
+              <a:ext uri="{FF2B5EF4-FFF2-40B4-BE49-F238E27FC236}">
+                <a16:creationId xmlns:a16="http://schemas.microsoft.com/office/drawing/2014/main" id="{ED6CF073-87C8-6B8F-C260-B84B8823EB4F}"/>
+              </a:ext>
+            </a:extLst>
+          </p:cNvPr>
+          <p:cNvSpPr>
+            <a:spLocks noGrp="1"/>
+          </p:cNvSpPr>
+          <p:nvPr>
+            <p:ph idx="1"/>
+          </p:nvPr>
+        </p:nvSpPr>
+        <p:spPr/>
+        <p:txBody>
+          <a:bodyPr/>
+          <a:lstStyle/>
+          <a:p>
+            <a:r>
+              <a:rPr lang="en-GB" dirty="0"/>
+              <a:t>L</a:t>
+            </a:r>
+            <a:r>
+              <a:rPr lang="en-NL" dirty="0"/>
+              <a:t>iving project: github</a:t>
+            </a:r>
+          </a:p>
+          <a:p>
+            <a:pPr lvl="1"/>
+            <a:r>
+              <a:rPr lang="en-GB" b="0" i="0" dirty="0">
+                <a:solidFill>
+                  <a:srgbClr val="000000"/>
+                </a:solidFill>
+                <a:effectLst/>
+                <a:latin typeface="Fira Sans" panose="020B0503050000020004" pitchFamily="34" charset="0"/>
+              </a:rPr>
+              <a:t>Version control</a:t>
+            </a:r>
+          </a:p>
+          <a:p>
+            <a:pPr lvl="1"/>
+            <a:r>
+              <a:rPr lang="en-GB" b="0" i="0" dirty="0">
+                <a:solidFill>
+                  <a:srgbClr val="000000"/>
+                </a:solidFill>
+                <a:effectLst/>
+                <a:latin typeface="Fira Sans" panose="020B0503050000020004" pitchFamily="34" charset="0"/>
+              </a:rPr>
+              <a:t>allows publication of different releases</a:t>
+            </a:r>
+          </a:p>
+          <a:p>
+            <a:pPr lvl="1"/>
+            <a:r>
+              <a:rPr lang="en-GB" b="0" i="0" dirty="0">
+                <a:solidFill>
+                  <a:srgbClr val="000000"/>
+                </a:solidFill>
+                <a:effectLst/>
+                <a:latin typeface="Fira Sans" panose="020B0503050000020004" pitchFamily="34" charset="0"/>
+              </a:rPr>
+              <a:t>platform for collaboration</a:t>
+            </a:r>
+            <a:endParaRPr lang="en-NL" dirty="0"/>
+          </a:p>
+          <a:p>
+            <a:endParaRPr lang="en-NL" dirty="0"/>
+          </a:p>
+          <a:p>
+            <a:r>
+              <a:rPr lang="en-GB" dirty="0"/>
+              <a:t>D</a:t>
+            </a:r>
+            <a:r>
+              <a:rPr lang="en-NL" dirty="0"/>
+              <a:t>one: repositories such as OSF</a:t>
+            </a:r>
+          </a:p>
+          <a:p>
+            <a:pPr lvl="1"/>
+            <a:r>
+              <a:rPr lang="en-GB" dirty="0"/>
+              <a:t>Why </a:t>
+            </a:r>
+            <a:r>
+              <a:rPr lang="en-GB" dirty="0">
+                <a:sym typeface="Wingdings" pitchFamily="2" charset="2"/>
+              </a:rPr>
+              <a:t> </a:t>
+            </a:r>
+            <a:r>
+              <a:rPr lang="en-GB" dirty="0"/>
+              <a:t>G</a:t>
+            </a:r>
+            <a:r>
+              <a:rPr lang="en-NL" dirty="0"/>
+              <a:t>ives a doi : makes code citeable </a:t>
+            </a:r>
+          </a:p>
+        </p:txBody>
+      </p:sp>
+    </p:spTree>
+    <p:extLst>
+      <p:ext uri="{BB962C8B-B14F-4D97-AF65-F5344CB8AC3E}">
+        <p14:creationId xmlns:p14="http://schemas.microsoft.com/office/powerpoint/2010/main" val="1796995553"/>
+      </p:ext>
+    </p:extLst>
+  </p:cSld>
+  <p:clrMapOvr>
+    <a:masterClrMapping/>
+  </p:clrMapOvr>
+</p:sld>
+</file>
+
+<file path=ppt/slides/slide21.xml><?xml version="1.0" encoding="utf-8"?>
+<p:sld xmlns:a="http://schemas.openxmlformats.org/drawingml/2006/main" xmlns:r="http://schemas.openxmlformats.org/officeDocument/2006/relationships" xmlns:p="http://schemas.openxmlformats.org/presentationml/2006/main">
+  <p:cSld>
+    <p:spTree>
+      <p:nvGrpSpPr>
+        <p:cNvPr id="1" name=""/>
+        <p:cNvGrpSpPr/>
+        <p:nvPr/>
+      </p:nvGrpSpPr>
+      <p:grpSpPr>
+        <a:xfrm>
+          <a:off x="0" y="0"/>
+          <a:ext cx="0" cy="0"/>
+          <a:chOff x="0" y="0"/>
+          <a:chExt cx="0" cy="0"/>
+        </a:xfrm>
+      </p:grpSpPr>
+      <p:sp>
+        <p:nvSpPr>
+          <p:cNvPr id="2" name="Title 1">
+            <a:extLst>
+              <a:ext uri="{FF2B5EF4-FFF2-40B4-BE49-F238E27FC236}">
+                <a16:creationId xmlns:a16="http://schemas.microsoft.com/office/drawing/2014/main" id="{EF7DD337-19B5-91AB-0BFB-4277EE103940}"/>
+              </a:ext>
+            </a:extLst>
+          </p:cNvPr>
+          <p:cNvSpPr>
+            <a:spLocks noGrp="1"/>
+          </p:cNvSpPr>
+          <p:nvPr>
+            <p:ph type="title"/>
+          </p:nvPr>
+        </p:nvSpPr>
+        <p:spPr/>
+        <p:txBody>
+          <a:bodyPr/>
+          <a:lstStyle/>
+          <a:p>
+            <a:r>
+              <a:rPr lang="en-NL" dirty="0"/>
+              <a:t>Let’s do this</a:t>
+            </a:r>
+          </a:p>
+        </p:txBody>
+      </p:sp>
+      <p:sp>
+        <p:nvSpPr>
+          <p:cNvPr id="3" name="Content Placeholder 2">
+            <a:extLst>
+              <a:ext uri="{FF2B5EF4-FFF2-40B4-BE49-F238E27FC236}">
+                <a16:creationId xmlns:a16="http://schemas.microsoft.com/office/drawing/2014/main" id="{0AACFFFB-9CC9-CC6C-DE8E-A6D005086127}"/>
+              </a:ext>
+            </a:extLst>
+          </p:cNvPr>
+          <p:cNvSpPr>
+            <a:spLocks noGrp="1"/>
+          </p:cNvSpPr>
+          <p:nvPr>
+            <p:ph idx="1"/>
+          </p:nvPr>
+        </p:nvSpPr>
+        <p:spPr/>
+        <p:txBody>
+          <a:bodyPr/>
+          <a:lstStyle/>
+          <a:p>
+            <a:pPr marL="514350" indent="-514350">
+              <a:buFont typeface="+mj-lt"/>
+              <a:buAutoNum type="arabicPeriod"/>
+            </a:pPr>
+            <a:r>
+              <a:rPr lang="en-NL" dirty="0"/>
+              <a:t>Explore a github repo (Exercise 1)</a:t>
+            </a:r>
+          </a:p>
+          <a:p>
+            <a:pPr marL="514350" indent="-514350">
+              <a:buFont typeface="+mj-lt"/>
+              <a:buAutoNum type="arabicPeriod"/>
+            </a:pPr>
+            <a:r>
+              <a:rPr lang="en-GB" dirty="0"/>
+              <a:t>M</a:t>
+            </a:r>
+            <a:r>
+              <a:rPr lang="en-NL" dirty="0"/>
+              <a:t>ake a github repo , </a:t>
+            </a:r>
+            <a:r>
+              <a:rPr lang="en-GB" dirty="0"/>
+              <a:t>c</a:t>
+            </a:r>
+            <a:r>
+              <a:rPr lang="en-NL" dirty="0"/>
+              <a:t>hange stuff in your repo and see what happens (Exercise 2)</a:t>
+            </a:r>
+          </a:p>
+        </p:txBody>
+      </p:sp>
+    </p:spTree>
+    <p:extLst>
+      <p:ext uri="{BB962C8B-B14F-4D97-AF65-F5344CB8AC3E}">
+        <p14:creationId xmlns:p14="http://schemas.microsoft.com/office/powerpoint/2010/main" val="2751601727"/>
       </p:ext>
     </p:extLst>
   </p:cSld>
@@ -4066,7 +6839,7 @@
           <p:cNvPr id="4" name="Title 3">
             <a:extLst>
               <a:ext uri="{FF2B5EF4-FFF2-40B4-BE49-F238E27FC236}">
-                <a16:creationId xmlns:a16="http://schemas.microsoft.com/office/drawing/2014/main" id="{1A4CD198-A9AB-27D2-B365-6060F21B2699}"/>
+                <a16:creationId xmlns:a16="http://schemas.microsoft.com/office/drawing/2014/main" id="{AAC1D9A6-86F7-DDFC-D91E-A7C0985F373B}"/>
               </a:ext>
             </a:extLst>
           </p:cNvPr>
@@ -4083,171 +6856,45 @@
           <a:lstStyle/>
           <a:p>
             <a:r>
+              <a:rPr lang="en-GB" dirty="0"/>
+              <a:t>V</a:t>
+            </a:r>
+            <a:r>
               <a:rPr lang="en-NL" dirty="0"/>
-              <a:t>Why version control?</a:t>
-            </a:r>
-          </a:p>
-        </p:txBody>
-      </p:sp>
-      <p:sp>
-        <p:nvSpPr>
-          <p:cNvPr id="5" name="Content Placeholder 4">
-            <a:extLst>
-              <a:ext uri="{FF2B5EF4-FFF2-40B4-BE49-F238E27FC236}">
-                <a16:creationId xmlns:a16="http://schemas.microsoft.com/office/drawing/2014/main" id="{D46A5619-1B5F-B62D-1846-D800A84355A9}"/>
-              </a:ext>
-            </a:extLst>
-          </p:cNvPr>
-          <p:cNvSpPr>
-            <a:spLocks noGrp="1"/>
-          </p:cNvSpPr>
-          <p:nvPr>
-            <p:ph idx="1"/>
-          </p:nvPr>
-        </p:nvSpPr>
-        <p:spPr/>
-        <p:txBody>
-          <a:bodyPr>
-            <a:normAutofit/>
-          </a:bodyPr>
-          <a:lstStyle/>
-          <a:p>
-            <a:pPr algn="l">
-              <a:buFont typeface="Arial" panose="020B0604020202020204" pitchFamily="34" charset="0"/>
-              <a:buChar char="•"/>
-            </a:pPr>
-            <a:r>
-              <a:rPr lang="en-GB" b="0" i="1" dirty="0">
-                <a:solidFill>
-                  <a:srgbClr val="242424"/>
-                </a:solidFill>
-                <a:effectLst/>
-                <a:latin typeface="Lato" panose="020F0502020204030203" pitchFamily="34" charset="0"/>
-              </a:rPr>
-              <a:t>“I will just finish my work and then you can start with your changes.”</a:t>
-            </a:r>
-            <a:endParaRPr lang="en-GB" b="0" i="0" dirty="0">
-              <a:solidFill>
-                <a:srgbClr val="242424"/>
-              </a:solidFill>
-              <a:effectLst/>
-              <a:latin typeface="Lato" panose="020F0502020204030203" pitchFamily="34" charset="0"/>
-            </a:endParaRPr>
-          </a:p>
-          <a:p>
-            <a:pPr algn="l">
-              <a:buFont typeface="Arial" panose="020B0604020202020204" pitchFamily="34" charset="0"/>
-              <a:buChar char="•"/>
-            </a:pPr>
-            <a:endParaRPr lang="en-GB" b="0" i="1" dirty="0">
-              <a:solidFill>
-                <a:srgbClr val="242424"/>
-              </a:solidFill>
-              <a:effectLst/>
-              <a:latin typeface="Lato" panose="020F0502020204030203" pitchFamily="34" charset="0"/>
-            </a:endParaRPr>
-          </a:p>
-          <a:p>
-            <a:pPr algn="l">
-              <a:buFont typeface="Arial" panose="020B0604020202020204" pitchFamily="34" charset="0"/>
-              <a:buChar char="•"/>
-            </a:pPr>
-            <a:r>
-              <a:rPr lang="en-GB" b="0" i="1" dirty="0">
-                <a:solidFill>
-                  <a:srgbClr val="242424"/>
-                </a:solidFill>
-                <a:effectLst/>
-                <a:latin typeface="Lato" panose="020F0502020204030203" pitchFamily="34" charset="0"/>
-              </a:rPr>
-              <a:t>“Oh, co-authors A </a:t>
-            </a:r>
-            <a:r>
-              <a:rPr lang="en-GB" i="1" dirty="0">
-                <a:solidFill>
-                  <a:srgbClr val="242424"/>
-                </a:solidFill>
-                <a:latin typeface="Lato" panose="020F0502020204030203" pitchFamily="34" charset="0"/>
-              </a:rPr>
-              <a:t>and B both worked on this file synchronously, and now I have to merge their changes. Also, they disagree.”</a:t>
-            </a:r>
-          </a:p>
-          <a:p>
-            <a:pPr algn="l">
-              <a:buFont typeface="Arial" panose="020B0604020202020204" pitchFamily="34" charset="0"/>
-              <a:buChar char="•"/>
-            </a:pPr>
-            <a:endParaRPr lang="en-GB" i="1" dirty="0">
-              <a:solidFill>
-                <a:srgbClr val="242424"/>
-              </a:solidFill>
-              <a:latin typeface="Lato" panose="020F0502020204030203" pitchFamily="34" charset="0"/>
-            </a:endParaRPr>
-          </a:p>
-          <a:p>
-            <a:pPr algn="l">
-              <a:buFont typeface="Arial" panose="020B0604020202020204" pitchFamily="34" charset="0"/>
-              <a:buChar char="•"/>
-            </a:pPr>
-            <a:r>
-              <a:rPr lang="en-GB" b="0" i="1" dirty="0">
-                <a:solidFill>
-                  <a:srgbClr val="242424"/>
-                </a:solidFill>
-                <a:effectLst/>
-                <a:latin typeface="Lato" panose="020F0502020204030203" pitchFamily="34" charset="0"/>
-              </a:rPr>
-              <a:t>“Can you please send me the latest version?”</a:t>
-            </a:r>
-          </a:p>
-          <a:p>
-            <a:pPr marL="0" indent="0" algn="l">
-              <a:buNone/>
-            </a:pPr>
-            <a:endParaRPr lang="en-GB" b="0" i="1" dirty="0">
-              <a:solidFill>
-                <a:srgbClr val="242424"/>
-              </a:solidFill>
-              <a:effectLst/>
-              <a:latin typeface="Lato" panose="020F0502020204030203" pitchFamily="34" charset="0"/>
-            </a:endParaRPr>
-          </a:p>
-          <a:p>
-            <a:pPr algn="l">
-              <a:buFont typeface="Arial" panose="020B0604020202020204" pitchFamily="34" charset="0"/>
-              <a:buChar char="•"/>
-            </a:pPr>
-            <a:r>
-              <a:rPr lang="en-GB" b="0" i="1" dirty="0">
-                <a:solidFill>
-                  <a:srgbClr val="242424"/>
-                </a:solidFill>
-                <a:effectLst/>
-                <a:latin typeface="Lato" panose="020F0502020204030203" pitchFamily="34" charset="0"/>
-              </a:rPr>
-              <a:t>“</a:t>
-            </a:r>
-            <a:r>
-              <a:rPr lang="en-GB" dirty="0"/>
-              <a:t>thesis_final_final_v2_thisone_THISONE.docx”</a:t>
-            </a:r>
-            <a:endParaRPr lang="en-GB" b="0" i="0" dirty="0">
-              <a:solidFill>
-                <a:srgbClr val="242424"/>
-              </a:solidFill>
-              <a:effectLst/>
-              <a:latin typeface="Lato" panose="020F0502020204030203" pitchFamily="34" charset="0"/>
-            </a:endParaRPr>
-          </a:p>
-          <a:p>
-            <a:endParaRPr lang="en-NL" dirty="0"/>
+              <a:t>ersion control</a:t>
+            </a:r>
+          </a:p>
+        </p:txBody>
+      </p:sp>
+      <p:sp>
+        <p:nvSpPr>
+          <p:cNvPr id="5" name="Text Placeholder 4">
+            <a:extLst>
+              <a:ext uri="{FF2B5EF4-FFF2-40B4-BE49-F238E27FC236}">
+                <a16:creationId xmlns:a16="http://schemas.microsoft.com/office/drawing/2014/main" id="{F64DF517-124B-C4E9-43AB-7410A1654874}"/>
+              </a:ext>
+            </a:extLst>
+          </p:cNvPr>
+          <p:cNvSpPr>
+            <a:spLocks noGrp="1"/>
+          </p:cNvSpPr>
+          <p:nvPr>
+            <p:ph type="body" idx="1"/>
+          </p:nvPr>
+        </p:nvSpPr>
+        <p:spPr/>
+        <p:txBody>
+          <a:bodyPr/>
+          <a:lstStyle/>
+          <a:p>
+            <a:endParaRPr lang="en-NL"/>
           </a:p>
         </p:txBody>
       </p:sp>
     </p:spTree>
     <p:extLst>
       <p:ext uri="{BB962C8B-B14F-4D97-AF65-F5344CB8AC3E}">
-        <p14:creationId xmlns:p14="http://schemas.microsoft.com/office/powerpoint/2010/main" val="2677363186"/>
+        <p14:creationId xmlns:p14="http://schemas.microsoft.com/office/powerpoint/2010/main" val="254432769"/>
       </p:ext>
     </p:extLst>
   </p:cSld>
@@ -4276,10 +6923,10 @@
       </p:grpSpPr>
       <p:sp>
         <p:nvSpPr>
-          <p:cNvPr id="2" name="Title 1">
-            <a:extLst>
-              <a:ext uri="{FF2B5EF4-FFF2-40B4-BE49-F238E27FC236}">
-                <a16:creationId xmlns:a16="http://schemas.microsoft.com/office/drawing/2014/main" id="{97A1BDC4-9D12-C835-2B23-559522E7C169}"/>
+          <p:cNvPr id="4" name="Title 3">
+            <a:extLst>
+              <a:ext uri="{FF2B5EF4-FFF2-40B4-BE49-F238E27FC236}">
+                <a16:creationId xmlns:a16="http://schemas.microsoft.com/office/drawing/2014/main" id="{1A4CD198-A9AB-27D2-B365-6060F21B2699}"/>
               </a:ext>
             </a:extLst>
           </p:cNvPr>
@@ -4297,94 +6944,160 @@
           <a:p>
             <a:r>
               <a:rPr lang="en-NL" dirty="0"/>
-              <a:t>Why version control? </a:t>
+              <a:t>Why version control?</a:t>
+            </a:r>
+          </a:p>
+        </p:txBody>
+      </p:sp>
+      <p:sp>
+        <p:nvSpPr>
+          <p:cNvPr id="5" name="Content Placeholder 4">
+            <a:extLst>
+              <a:ext uri="{FF2B5EF4-FFF2-40B4-BE49-F238E27FC236}">
+                <a16:creationId xmlns:a16="http://schemas.microsoft.com/office/drawing/2014/main" id="{D46A5619-1B5F-B62D-1846-D800A84355A9}"/>
+              </a:ext>
+            </a:extLst>
+          </p:cNvPr>
+          <p:cNvSpPr>
+            <a:spLocks noGrp="1"/>
+          </p:cNvSpPr>
+          <p:nvPr>
+            <p:ph idx="1"/>
+          </p:nvPr>
+        </p:nvSpPr>
+        <p:spPr/>
+        <p:txBody>
+          <a:bodyPr>
+            <a:normAutofit/>
+          </a:bodyPr>
+          <a:lstStyle/>
+          <a:p>
+            <a:pPr algn="l">
+              <a:buFont typeface="Arial" panose="020B0604020202020204" pitchFamily="34" charset="0"/>
+              <a:buChar char="•"/>
+            </a:pPr>
+            <a:r>
+              <a:rPr lang="en-GB" b="0" i="1" dirty="0">
+                <a:solidFill>
+                  <a:srgbClr val="242424"/>
+                </a:solidFill>
+                <a:effectLst/>
+                <a:latin typeface="Lato" panose="020F0502020204030203" pitchFamily="34" charset="0"/>
+              </a:rPr>
+              <a:t>“I will just finish my work and then you can start with your changes.”</a:t>
+            </a:r>
+            <a:endParaRPr lang="en-GB" b="0" i="0" dirty="0">
+              <a:solidFill>
+                <a:srgbClr val="242424"/>
+              </a:solidFill>
+              <a:effectLst/>
+              <a:latin typeface="Lato" panose="020F0502020204030203" pitchFamily="34" charset="0"/>
+            </a:endParaRPr>
+          </a:p>
+          <a:p>
+            <a:pPr algn="l">
+              <a:buFont typeface="Arial" panose="020B0604020202020204" pitchFamily="34" charset="0"/>
+              <a:buChar char="•"/>
+            </a:pPr>
+            <a:endParaRPr lang="en-GB" b="0" i="1" dirty="0">
+              <a:solidFill>
+                <a:srgbClr val="242424"/>
+              </a:solidFill>
+              <a:effectLst/>
+              <a:latin typeface="Lato" panose="020F0502020204030203" pitchFamily="34" charset="0"/>
+            </a:endParaRPr>
+          </a:p>
+          <a:p>
+            <a:pPr algn="l">
+              <a:buFont typeface="Arial" panose="020B0604020202020204" pitchFamily="34" charset="0"/>
+              <a:buChar char="•"/>
+            </a:pPr>
+            <a:r>
+              <a:rPr lang="en-GB" b="0" i="1" dirty="0">
+                <a:solidFill>
+                  <a:srgbClr val="242424"/>
+                </a:solidFill>
+                <a:effectLst/>
+                <a:latin typeface="Lato" panose="020F0502020204030203" pitchFamily="34" charset="0"/>
+              </a:rPr>
+              <a:t>“Oh, co-authors A </a:t>
+            </a:r>
+            <a:r>
+              <a:rPr lang="en-GB" i="1" dirty="0">
+                <a:solidFill>
+                  <a:srgbClr val="242424"/>
+                </a:solidFill>
+                <a:latin typeface="Lato" panose="020F0502020204030203" pitchFamily="34" charset="0"/>
+              </a:rPr>
+              <a:t>and B both worked on this file synchronously, and now I have to merge their changes. Also, they disagree.”</a:t>
+            </a:r>
+          </a:p>
+          <a:p>
+            <a:pPr algn="l">
+              <a:buFont typeface="Arial" panose="020B0604020202020204" pitchFamily="34" charset="0"/>
+              <a:buChar char="•"/>
+            </a:pPr>
+            <a:endParaRPr lang="en-GB" i="1" dirty="0">
+              <a:solidFill>
+                <a:srgbClr val="242424"/>
+              </a:solidFill>
+              <a:latin typeface="Lato" panose="020F0502020204030203" pitchFamily="34" charset="0"/>
+            </a:endParaRPr>
+          </a:p>
+          <a:p>
+            <a:pPr algn="l">
+              <a:buFont typeface="Arial" panose="020B0604020202020204" pitchFamily="34" charset="0"/>
+              <a:buChar char="•"/>
+            </a:pPr>
+            <a:r>
+              <a:rPr lang="en-GB" b="0" i="1" dirty="0">
+                <a:solidFill>
+                  <a:srgbClr val="242424"/>
+                </a:solidFill>
+                <a:effectLst/>
+                <a:latin typeface="Lato" panose="020F0502020204030203" pitchFamily="34" charset="0"/>
+              </a:rPr>
+              <a:t>“Can you please send me the latest version?”</a:t>
+            </a:r>
+          </a:p>
+          <a:p>
+            <a:pPr marL="0" indent="0" algn="l">
+              <a:buNone/>
+            </a:pPr>
+            <a:endParaRPr lang="en-GB" b="0" i="1" dirty="0">
+              <a:solidFill>
+                <a:srgbClr val="242424"/>
+              </a:solidFill>
+              <a:effectLst/>
+              <a:latin typeface="Lato" panose="020F0502020204030203" pitchFamily="34" charset="0"/>
+            </a:endParaRPr>
+          </a:p>
+          <a:p>
+            <a:pPr algn="l">
+              <a:buFont typeface="Arial" panose="020B0604020202020204" pitchFamily="34" charset="0"/>
+              <a:buChar char="•"/>
+            </a:pPr>
+            <a:r>
+              <a:rPr lang="en-GB" b="0" i="1" dirty="0">
+                <a:solidFill>
+                  <a:srgbClr val="242424"/>
+                </a:solidFill>
+                <a:effectLst/>
+                <a:latin typeface="Lato" panose="020F0502020204030203" pitchFamily="34" charset="0"/>
+              </a:rPr>
+              <a:t>“</a:t>
             </a:r>
             <a:r>
               <a:rPr lang="en-GB" dirty="0"/>
-              <a:t>Y</a:t>
-            </a:r>
-            <a:r>
-              <a:rPr lang="en-NL" dirty="0"/>
-              <a:t>ou can:</a:t>
-            </a:r>
-          </a:p>
-        </p:txBody>
-      </p:sp>
-      <p:sp>
-        <p:nvSpPr>
-          <p:cNvPr id="3" name="Content Placeholder 2">
-            <a:extLst>
-              <a:ext uri="{FF2B5EF4-FFF2-40B4-BE49-F238E27FC236}">
-                <a16:creationId xmlns:a16="http://schemas.microsoft.com/office/drawing/2014/main" id="{30A679FB-C3CD-E8FE-C907-60AA53D7F45B}"/>
-              </a:ext>
-            </a:extLst>
-          </p:cNvPr>
-          <p:cNvSpPr>
-            <a:spLocks noGrp="1"/>
-          </p:cNvSpPr>
-          <p:nvPr>
-            <p:ph idx="1"/>
-          </p:nvPr>
-        </p:nvSpPr>
-        <p:spPr/>
-        <p:txBody>
-          <a:bodyPr/>
-          <a:lstStyle/>
-          <a:p>
-            <a:r>
-              <a:rPr lang="en-GB" dirty="0"/>
-              <a:t>Go back to a working version (releases)</a:t>
-            </a:r>
-          </a:p>
-          <a:p>
-            <a:r>
-              <a:rPr lang="en-GB" dirty="0"/>
-              <a:t>W</a:t>
-            </a:r>
-            <a:r>
-              <a:rPr lang="en-NL" dirty="0"/>
-              <a:t>ork on the same file with multiple people and have git solve the merging</a:t>
-            </a:r>
-          </a:p>
-          <a:p>
-            <a:r>
-              <a:rPr lang="en-GB" dirty="0"/>
-              <a:t>A</a:t>
-            </a:r>
-            <a:r>
-              <a:rPr lang="en-NL" dirty="0"/>
-              <a:t>lso when you worked offline</a:t>
-            </a:r>
-          </a:p>
-          <a:p>
-            <a:r>
-              <a:rPr lang="en-GB" dirty="0"/>
-              <a:t>W</a:t>
-            </a:r>
-            <a:r>
-              <a:rPr lang="en-NL" dirty="0"/>
-              <a:t>hen you find a bug, you can retrace when it was </a:t>
-            </a:r>
-          </a:p>
-          <a:p>
-            <a:r>
-              <a:rPr lang="en-GB" dirty="0"/>
-              <a:t>A</a:t>
-            </a:r>
-            <a:r>
-              <a:rPr lang="en-NL" dirty="0"/>
-              <a:t>lways find the latest version on the same spot</a:t>
-            </a:r>
-          </a:p>
-          <a:p>
-            <a:endParaRPr lang="en-NL" dirty="0"/>
-          </a:p>
-          <a:p>
-            <a:r>
-              <a:rPr lang="en-GB" dirty="0"/>
-              <a:t>No more “thesis_final_final_v2_thisone_THISONE.docx”</a:t>
-            </a:r>
-            <a:endParaRPr lang="en-NL" dirty="0"/>
+              <a:t>thesis_final_final_v2_thisone_THISONE.docx”</a:t>
+            </a:r>
+            <a:endParaRPr lang="en-GB" b="0" i="0" dirty="0">
+              <a:solidFill>
+                <a:srgbClr val="242424"/>
+              </a:solidFill>
+              <a:effectLst/>
+              <a:latin typeface="Lato" panose="020F0502020204030203" pitchFamily="34" charset="0"/>
+            </a:endParaRPr>
           </a:p>
           <a:p>
             <a:endParaRPr lang="en-NL" dirty="0"/>
@@ -4394,7 +7107,7 @@
     </p:spTree>
     <p:extLst>
       <p:ext uri="{BB962C8B-B14F-4D97-AF65-F5344CB8AC3E}">
-        <p14:creationId xmlns:p14="http://schemas.microsoft.com/office/powerpoint/2010/main" val="2887343483"/>
+        <p14:creationId xmlns:p14="http://schemas.microsoft.com/office/powerpoint/2010/main" val="2677363186"/>
       </p:ext>
     </p:extLst>
   </p:cSld>
@@ -4423,10 +7136,10 @@
       </p:grpSpPr>
       <p:sp>
         <p:nvSpPr>
-          <p:cNvPr id="2" name="Title 1">
-            <a:extLst>
-              <a:ext uri="{FF2B5EF4-FFF2-40B4-BE49-F238E27FC236}">
-                <a16:creationId xmlns:a16="http://schemas.microsoft.com/office/drawing/2014/main" id="{E34F496F-695F-309F-9C3E-E208495B2A3F}"/>
+          <p:cNvPr id="4" name="Title 3">
+            <a:extLst>
+              <a:ext uri="{FF2B5EF4-FFF2-40B4-BE49-F238E27FC236}">
+                <a16:creationId xmlns:a16="http://schemas.microsoft.com/office/drawing/2014/main" id="{6EAB51D9-9651-2643-49C2-F22558611FC9}"/>
               </a:ext>
             </a:extLst>
           </p:cNvPr>
@@ -4444,17 +7157,17 @@
           <a:p>
             <a:r>
               <a:rPr lang="en-NL" dirty="0"/>
-              <a:t>Git is a version control system</a:t>
-            </a:r>
-          </a:p>
-        </p:txBody>
-      </p:sp>
-      <p:sp>
-        <p:nvSpPr>
-          <p:cNvPr id="3" name="Content Placeholder 2">
-            <a:extLst>
-              <a:ext uri="{FF2B5EF4-FFF2-40B4-BE49-F238E27FC236}">
-                <a16:creationId xmlns:a16="http://schemas.microsoft.com/office/drawing/2014/main" id="{CDF8188A-DEE1-7826-9007-442680241ADE}"/>
+              <a:t>What is version control?</a:t>
+            </a:r>
+          </a:p>
+        </p:txBody>
+      </p:sp>
+      <p:sp>
+        <p:nvSpPr>
+          <p:cNvPr id="5" name="Content Placeholder 4">
+            <a:extLst>
+              <a:ext uri="{FF2B5EF4-FFF2-40B4-BE49-F238E27FC236}">
+                <a16:creationId xmlns:a16="http://schemas.microsoft.com/office/drawing/2014/main" id="{98BC13DC-32E0-2029-8F85-DF2A5EAA29F6}"/>
               </a:ext>
             </a:extLst>
           </p:cNvPr>
@@ -4467,49 +7180,96 @@
         </p:nvSpPr>
         <p:spPr/>
         <p:txBody>
-          <a:bodyPr/>
-          <a:lstStyle/>
-          <a:p>
-            <a:r>
-              <a:rPr lang="en-GB" sz="1800" b="0" i="0" u="none" strike="noStrike" dirty="0">
+          <a:bodyPr>
+            <a:normAutofit/>
+          </a:bodyPr>
+          <a:lstStyle/>
+          <a:p>
+            <a:r>
+              <a:rPr lang="en-GB" b="0" i="0" dirty="0">
                 <a:effectLst/>
-                <a:latin typeface="Arial" panose="020B0604020202020204" pitchFamily="34" charset="0"/>
+                <a:latin typeface="Open Sans" panose="020B0606030504020204" pitchFamily="34" charset="0"/>
               </a:rPr>
-              <a:t>Versioning manages changes to a piece of content.</a:t>
-            </a:r>
-          </a:p>
-          <a:p>
-            <a:endParaRPr lang="en-GB" sz="1800" dirty="0">
-              <a:latin typeface="Arial" panose="020B0604020202020204" pitchFamily="34" charset="0"/>
+              <a:t>“management of changes to documents, computer programs, large web sites, and other collections of information.” (Wikipedia)</a:t>
+            </a:r>
+          </a:p>
+          <a:p>
+            <a:endParaRPr lang="en-GB" dirty="0">
+              <a:latin typeface="Open Sans" panose="020B0606030504020204" pitchFamily="34" charset="0"/>
             </a:endParaRPr>
           </a:p>
           <a:p>
-            <a:endParaRPr lang="en-GB" sz="1800" b="0" i="0" u="none" strike="noStrike" dirty="0">
-              <a:effectLst/>
-              <a:latin typeface="Arial" panose="020B0604020202020204" pitchFamily="34" charset="0"/>
+            <a:r>
+              <a:rPr lang="en-GB" dirty="0">
+                <a:latin typeface="Open Sans" panose="020B0606030504020204" pitchFamily="34" charset="0"/>
+              </a:rPr>
+              <a:t>E.g. track changes</a:t>
+            </a:r>
+            <a:br>
+              <a:rPr lang="en-GB" dirty="0">
+                <a:latin typeface="Open Sans" panose="020B0606030504020204" pitchFamily="34" charset="0"/>
+              </a:rPr>
+            </a:br>
+            <a:r>
+              <a:rPr lang="en-GB" sz="2400" dirty="0">
+                <a:latin typeface="Open Sans" panose="020B0606030504020204" pitchFamily="34" charset="0"/>
+              </a:rPr>
+              <a:t>(which is a pain to use and you cannot go back to a previous version)</a:t>
+            </a:r>
+          </a:p>
+          <a:p>
+            <a:endParaRPr lang="en-GB" dirty="0">
+              <a:solidFill>
+                <a:srgbClr val="797979"/>
+              </a:solidFill>
+              <a:latin typeface="Open Sans" panose="020B0606030504020204" pitchFamily="34" charset="0"/>
             </a:endParaRPr>
           </a:p>
           <a:p>
-            <a:r>
-              <a:rPr lang="en-GB" sz="1800" dirty="0">
-                <a:latin typeface="Arial" panose="020B0604020202020204" pitchFamily="34" charset="0"/>
+            <a:pPr marL="0" indent="0" algn="r">
+              <a:buNone/>
+            </a:pPr>
+            <a:r>
+              <a:rPr lang="en-GB" dirty="0">
+                <a:solidFill>
+                  <a:schemeClr val="bg1">
+                    <a:lumMod val="50000"/>
+                  </a:schemeClr>
+                </a:solidFill>
               </a:rPr>
-              <a:t>XXX </a:t>
-            </a:r>
-            <a:r>
-              <a:rPr lang="en-GB" sz="1800" dirty="0" err="1">
-                <a:latin typeface="Arial" panose="020B0604020202020204" pitchFamily="34" charset="0"/>
+              <a:t>A</a:t>
+            </a:r>
+            <a:r>
+              <a:rPr lang="en-NL" dirty="0">
+                <a:solidFill>
+                  <a:schemeClr val="bg1">
+                    <a:lumMod val="50000"/>
+                  </a:schemeClr>
+                </a:solidFill>
               </a:rPr>
-              <a:t>plaatje</a:t>
-            </a:r>
-            <a:endParaRPr lang="en-GB" sz="1800" b="0" i="0" u="none" strike="noStrike" dirty="0">
-              <a:effectLst/>
-              <a:latin typeface="Arial" panose="020B0604020202020204" pitchFamily="34" charset="0"/>
-            </a:endParaRPr>
-          </a:p>
-          <a:p>
-            <a:endParaRPr lang="en-GB" sz="1800" dirty="0">
-              <a:latin typeface="Arial" panose="020B0604020202020204" pitchFamily="34" charset="0"/>
+              <a:t>lways find the latest version on the same spot</a:t>
+            </a:r>
+          </a:p>
+          <a:p>
+            <a:pPr marL="0" indent="0" algn="r">
+              <a:buNone/>
+            </a:pPr>
+            <a:r>
+              <a:rPr lang="en-GB" dirty="0">
+                <a:solidFill>
+                  <a:schemeClr val="bg1">
+                    <a:lumMod val="50000"/>
+                  </a:schemeClr>
+                </a:solidFill>
+              </a:rPr>
+              <a:t>No more “thesis_final_final_v2_thisone_THISONE.docx”</a:t>
+            </a:r>
+            <a:endParaRPr lang="en-NL" dirty="0">
+              <a:solidFill>
+                <a:schemeClr val="bg1">
+                  <a:lumMod val="50000"/>
+                </a:schemeClr>
+              </a:solidFill>
             </a:endParaRPr>
           </a:p>
           <a:p>
@@ -4520,7 +7280,7 @@
     </p:spTree>
     <p:extLst>
       <p:ext uri="{BB962C8B-B14F-4D97-AF65-F5344CB8AC3E}">
-        <p14:creationId xmlns:p14="http://schemas.microsoft.com/office/powerpoint/2010/main" val="4044323634"/>
+        <p14:creationId xmlns:p14="http://schemas.microsoft.com/office/powerpoint/2010/main" val="1542763091"/>
       </p:ext>
     </p:extLst>
   </p:cSld>
@@ -4549,10 +7309,10 @@
       </p:grpSpPr>
       <p:sp>
         <p:nvSpPr>
-          <p:cNvPr id="4" name="Title 3">
-            <a:extLst>
-              <a:ext uri="{FF2B5EF4-FFF2-40B4-BE49-F238E27FC236}">
-                <a16:creationId xmlns:a16="http://schemas.microsoft.com/office/drawing/2014/main" id="{1C536A61-130E-4C44-68FA-579C287B2A8A}"/>
+          <p:cNvPr id="2" name="Title 1">
+            <a:extLst>
+              <a:ext uri="{FF2B5EF4-FFF2-40B4-BE49-F238E27FC236}">
+                <a16:creationId xmlns:a16="http://schemas.microsoft.com/office/drawing/2014/main" id="{2FF43F79-AB2E-6D47-5CF7-AB97A69A7683}"/>
               </a:ext>
             </a:extLst>
           </p:cNvPr>
@@ -4569,18 +7329,22 @@
           <a:lstStyle/>
           <a:p>
             <a:r>
+              <a:rPr lang="en-GB" dirty="0"/>
+              <a:t>C</a:t>
+            </a:r>
+            <a:r>
               <a:rPr lang="en-NL" dirty="0"/>
-              <a:t>Git is a version control system</a:t>
-            </a:r>
-          </a:p>
-        </p:txBody>
-      </p:sp>
-      <p:sp>
-        <p:nvSpPr>
-          <p:cNvPr id="5" name="Content Placeholder 4">
-            <a:extLst>
-              <a:ext uri="{FF2B5EF4-FFF2-40B4-BE49-F238E27FC236}">
-                <a16:creationId xmlns:a16="http://schemas.microsoft.com/office/drawing/2014/main" id="{F0C97E9D-5D44-B334-9B7F-A22FF1208829}"/>
+              <a:t>rappy version control: track changes</a:t>
+            </a:r>
+          </a:p>
+        </p:txBody>
+      </p:sp>
+      <p:sp>
+        <p:nvSpPr>
+          <p:cNvPr id="3" name="Content Placeholder 2">
+            <a:extLst>
+              <a:ext uri="{FF2B5EF4-FFF2-40B4-BE49-F238E27FC236}">
+                <a16:creationId xmlns:a16="http://schemas.microsoft.com/office/drawing/2014/main" id="{A2A44DB5-38E6-4318-4EE9-87C4564A5C0A}"/>
               </a:ext>
             </a:extLst>
           </p:cNvPr>
@@ -4591,56 +7355,105 @@
             <p:ph idx="1"/>
           </p:nvPr>
         </p:nvSpPr>
-        <p:spPr/>
+        <p:spPr>
+          <a:xfrm>
+            <a:off x="838200" y="1837657"/>
+            <a:ext cx="10515600" cy="4351338"/>
+          </a:xfrm>
+        </p:spPr>
         <p:txBody>
           <a:bodyPr/>
           <a:lstStyle/>
           <a:p>
             <a:r>
               <a:rPr lang="en-GB" dirty="0"/>
-              <a:t>L</a:t>
+              <a:t>D</a:t>
             </a:r>
             <a:r>
               <a:rPr lang="en-NL" dirty="0"/>
-              <a:t>ow-fi version control</a:t>
-            </a:r>
+              <a:t>oes not actually let you control versions. </a:t>
+            </a:r>
+          </a:p>
+          <a:p>
+            <a:endParaRPr lang="en-NL" dirty="0"/>
+          </a:p>
+          <a:p>
+            <a:pPr marL="0" indent="0">
+              <a:buNone/>
+            </a:pPr>
+            <a:r>
+              <a:rPr lang="en-GB" dirty="0"/>
+              <a:t>P</a:t>
+            </a:r>
+            <a:r>
+              <a:rPr lang="en-NL" dirty="0"/>
+              <a:t>ros:</a:t>
+            </a:r>
+          </a:p>
+          <a:p>
+            <a:r>
+              <a:rPr lang="en-GB" dirty="0"/>
+              <a:t>E</a:t>
+            </a:r>
+            <a:r>
+              <a:rPr lang="en-NL" dirty="0"/>
+              <a:t>ditors love it</a:t>
+            </a:r>
+          </a:p>
+          <a:p>
+            <a:endParaRPr lang="en-NL" dirty="0"/>
           </a:p>
         </p:txBody>
       </p:sp>
       <p:pic>
         <p:nvPicPr>
-          <p:cNvPr id="8" name="Picture 7">
-            <a:extLst>
-              <a:ext uri="{FF2B5EF4-FFF2-40B4-BE49-F238E27FC236}">
-                <a16:creationId xmlns:a16="http://schemas.microsoft.com/office/drawing/2014/main" id="{1C4DB24D-BD6C-84A0-7210-7A80EA27E5B1}"/>
+          <p:cNvPr id="7170" name="Picture 2">
+            <a:extLst>
+              <a:ext uri="{FF2B5EF4-FFF2-40B4-BE49-F238E27FC236}">
+                <a16:creationId xmlns:a16="http://schemas.microsoft.com/office/drawing/2014/main" id="{BFDD251C-6FB9-9069-5F2B-912D092F6434}"/>
               </a:ext>
             </a:extLst>
           </p:cNvPr>
           <p:cNvPicPr>
-            <a:picLocks noChangeAspect="1"/>
+            <a:picLocks noChangeAspect="1" noChangeArrowheads="1"/>
           </p:cNvPicPr>
           <p:nvPr/>
         </p:nvPicPr>
-        <p:blipFill>
-          <a:blip r:embed="rId3"/>
-          <a:stretch>
-            <a:fillRect/>
-          </a:stretch>
+        <p:blipFill rotWithShape="1">
+          <a:blip r:embed="rId3">
+            <a:extLst>
+              <a:ext uri="{28A0092B-C50C-407E-A947-70E740481C1C}">
+                <a14:useLocalDpi xmlns:a14="http://schemas.microsoft.com/office/drawing/2010/main" val="0"/>
+              </a:ext>
+            </a:extLst>
+          </a:blip>
+          <a:srcRect t="53169"/>
+          <a:stretch/>
         </p:blipFill>
-        <p:spPr>
+        <p:spPr bwMode="auto">
           <a:xfrm>
-            <a:off x="4559300" y="1693863"/>
-            <a:ext cx="7632700" cy="4483100"/>
+            <a:off x="9367862" y="3886138"/>
+            <a:ext cx="2164393" cy="2401467"/>
           </a:xfrm>
           <a:prstGeom prst="rect">
             <a:avLst/>
           </a:prstGeom>
+          <a:noFill/>
+          <a:extLst>
+            <a:ext uri="{909E8E84-426E-40DD-AFC4-6F175D3DCCD1}">
+              <a14:hiddenFill xmlns:a14="http://schemas.microsoft.com/office/drawing/2010/main">
+                <a:solidFill>
+                  <a:srgbClr val="FFFFFF"/>
+                </a:solidFill>
+              </a14:hiddenFill>
+            </a:ext>
+          </a:extLst>
         </p:spPr>
       </p:pic>
     </p:spTree>
     <p:extLst>
       <p:ext uri="{BB962C8B-B14F-4D97-AF65-F5344CB8AC3E}">
-        <p14:creationId xmlns:p14="http://schemas.microsoft.com/office/powerpoint/2010/main" val="2012840357"/>
+        <p14:creationId xmlns:p14="http://schemas.microsoft.com/office/powerpoint/2010/main" val="991918368"/>
       </p:ext>
     </p:extLst>
   </p:cSld>
@@ -4672,7 +7485,7 @@
           <p:cNvPr id="2" name="Title 1">
             <a:extLst>
               <a:ext uri="{FF2B5EF4-FFF2-40B4-BE49-F238E27FC236}">
-                <a16:creationId xmlns:a16="http://schemas.microsoft.com/office/drawing/2014/main" id="{A050981F-F998-066E-D2CF-B77CDA40965D}"/>
+                <a16:creationId xmlns:a16="http://schemas.microsoft.com/office/drawing/2014/main" id="{2F6F3DD4-F45A-48C6-6242-AE42710FAE0A}"/>
               </a:ext>
             </a:extLst>
           </p:cNvPr>
@@ -4689,8 +7502,12 @@
           <a:lstStyle/>
           <a:p>
             <a:r>
+              <a:rPr lang="en-GB" dirty="0"/>
+              <a:t>L</a:t>
+            </a:r>
+            <a:r>
               <a:rPr lang="en-NL" dirty="0"/>
-              <a:t>Git as VCS</a:t>
+              <a:t>ow-fi version control</a:t>
             </a:r>
           </a:p>
         </p:txBody>
@@ -4700,7 +7517,7 @@
           <p:cNvPr id="3" name="Content Placeholder 2">
             <a:extLst>
               <a:ext uri="{FF2B5EF4-FFF2-40B4-BE49-F238E27FC236}">
-                <a16:creationId xmlns:a16="http://schemas.microsoft.com/office/drawing/2014/main" id="{FB775FF8-C787-191B-29F4-5264B07AF48C}"/>
+                <a16:creationId xmlns:a16="http://schemas.microsoft.com/office/drawing/2014/main" id="{51B929C5-44DC-A8CA-AEBC-A78341680D6D}"/>
               </a:ext>
             </a:extLst>
           </p:cNvPr>
@@ -4716,14 +7533,53 @@
           <a:bodyPr/>
           <a:lstStyle/>
           <a:p>
-            <a:endParaRPr lang="en-NL"/>
+            <a:r>
+              <a:rPr lang="en-NL" dirty="0">
+                <a:solidFill>
+                  <a:schemeClr val="bg1">
+                    <a:lumMod val="50000"/>
+                  </a:schemeClr>
+                </a:solidFill>
+              </a:rPr>
+              <a:t>deHaan_etal_Nature_try315_2019_01_18</a:t>
+            </a:r>
+          </a:p>
+          <a:p>
+            <a:r>
+              <a:rPr lang="en-NL" dirty="0">
+                <a:solidFill>
+                  <a:schemeClr val="bg1">
+                    <a:lumMod val="50000"/>
+                  </a:schemeClr>
+                </a:solidFill>
+              </a:rPr>
+              <a:t>deHaan_etal_Nature_try315_2019_01_22</a:t>
+            </a:r>
+          </a:p>
+          <a:p>
+            <a:r>
+              <a:rPr lang="en-NL" dirty="0">
+                <a:solidFill>
+                  <a:schemeClr val="bg1">
+                    <a:lumMod val="50000"/>
+                  </a:schemeClr>
+                </a:solidFill>
+              </a:rPr>
+              <a:t>deHaan_etal_Nature_try315_2019_02_01</a:t>
+            </a:r>
+          </a:p>
+          <a:p>
+            <a:endParaRPr lang="en-NL" dirty="0"/>
+          </a:p>
+          <a:p>
+            <a:endParaRPr lang="en-NL" dirty="0"/>
           </a:p>
         </p:txBody>
       </p:sp>
     </p:spTree>
     <p:extLst>
       <p:ext uri="{BB962C8B-B14F-4D97-AF65-F5344CB8AC3E}">
-        <p14:creationId xmlns:p14="http://schemas.microsoft.com/office/powerpoint/2010/main" val="2104549981"/>
+        <p14:creationId xmlns:p14="http://schemas.microsoft.com/office/powerpoint/2010/main" val="3983883280"/>
       </p:ext>
     </p:extLst>
   </p:cSld>
@@ -4752,10 +7608,10 @@
       </p:grpSpPr>
       <p:sp>
         <p:nvSpPr>
-          <p:cNvPr id="2" name="Title 1">
-            <a:extLst>
-              <a:ext uri="{FF2B5EF4-FFF2-40B4-BE49-F238E27FC236}">
-                <a16:creationId xmlns:a16="http://schemas.microsoft.com/office/drawing/2014/main" id="{B23F1F98-532D-ABB2-5410-DD5A2A497D1B}"/>
+          <p:cNvPr id="4" name="Title 3">
+            <a:extLst>
+              <a:ext uri="{FF2B5EF4-FFF2-40B4-BE49-F238E27FC236}">
+                <a16:creationId xmlns:a16="http://schemas.microsoft.com/office/drawing/2014/main" id="{1C536A61-130E-4C44-68FA-579C287B2A8A}"/>
               </a:ext>
             </a:extLst>
           </p:cNvPr>
@@ -4772,22 +7628,52 @@
           <a:lstStyle/>
           <a:p>
             <a:r>
+              <a:rPr lang="en-GB" dirty="0"/>
+              <a:t>L</a:t>
+            </a:r>
+            <a:r>
               <a:rPr lang="en-NL" dirty="0"/>
-              <a:t>Git vs github</a:t>
-            </a:r>
-            <a:br>
-              <a:rPr lang="en-NL" dirty="0"/>
-            </a:br>
-            <a:endParaRPr lang="en-NL" dirty="0"/>
-          </a:p>
-        </p:txBody>
-      </p:sp>
-      <p:sp>
-        <p:nvSpPr>
-          <p:cNvPr id="3" name="Content Placeholder 2">
-            <a:extLst>
-              <a:ext uri="{FF2B5EF4-FFF2-40B4-BE49-F238E27FC236}">
-                <a16:creationId xmlns:a16="http://schemas.microsoft.com/office/drawing/2014/main" id="{99CAB18F-DF42-3D7D-8CE2-A7A676C890CB}"/>
+              <a:t>ow-fi version control</a:t>
+            </a:r>
+          </a:p>
+        </p:txBody>
+      </p:sp>
+      <p:pic>
+        <p:nvPicPr>
+          <p:cNvPr id="8" name="Picture 7">
+            <a:extLst>
+              <a:ext uri="{FF2B5EF4-FFF2-40B4-BE49-F238E27FC236}">
+                <a16:creationId xmlns:a16="http://schemas.microsoft.com/office/drawing/2014/main" id="{1C4DB24D-BD6C-84A0-7210-7A80EA27E5B1}"/>
+              </a:ext>
+            </a:extLst>
+          </p:cNvPr>
+          <p:cNvPicPr>
+            <a:picLocks noChangeAspect="1"/>
+          </p:cNvPicPr>
+          <p:nvPr/>
+        </p:nvPicPr>
+        <p:blipFill>
+          <a:blip r:embed="rId3"/>
+          <a:stretch>
+            <a:fillRect/>
+          </a:stretch>
+        </p:blipFill>
+        <p:spPr>
+          <a:xfrm>
+            <a:off x="4559300" y="1693863"/>
+            <a:ext cx="7632700" cy="4483100"/>
+          </a:xfrm>
+          <a:prstGeom prst="rect">
+            <a:avLst/>
+          </a:prstGeom>
+        </p:spPr>
+      </p:pic>
+      <p:sp>
+        <p:nvSpPr>
+          <p:cNvPr id="10" name="Content Placeholder 9">
+            <a:extLst>
+              <a:ext uri="{FF2B5EF4-FFF2-40B4-BE49-F238E27FC236}">
+                <a16:creationId xmlns:a16="http://schemas.microsoft.com/office/drawing/2014/main" id="{1CF819DA-539A-47A5-D1BA-0D9DA8FC16A4}"/>
               </a:ext>
             </a:extLst>
           </p:cNvPr>
@@ -4798,57 +7684,103 @@
             <p:ph idx="1"/>
           </p:nvPr>
         </p:nvSpPr>
-        <p:spPr/>
-        <p:txBody>
-          <a:bodyPr/>
-          <a:lstStyle/>
-          <a:p>
-            <a:pPr rtl="0" fontAlgn="base">
-              <a:spcBef>
-                <a:spcPts val="0"/>
-              </a:spcBef>
-              <a:spcAft>
-                <a:spcPts val="0"/>
-              </a:spcAft>
-              <a:buFont typeface="Arial" panose="020B0604020202020204" pitchFamily="34" charset="0"/>
-              <a:buChar char="•"/>
+        <p:spPr>
+          <a:xfrm>
+            <a:off x="838200" y="1825625"/>
+            <a:ext cx="3517232" cy="4351338"/>
+          </a:xfrm>
+        </p:spPr>
+        <p:txBody>
+          <a:bodyPr>
+            <a:normAutofit lnSpcReduction="10000"/>
+          </a:bodyPr>
+          <a:lstStyle/>
+          <a:p>
+            <a:pPr marL="0" indent="0">
+              <a:buNone/>
             </a:pPr>
             <a:r>
-              <a:rPr lang="en-GB" sz="1800" b="0" i="0" u="none" strike="noStrike" dirty="0">
-                <a:effectLst/>
-                <a:latin typeface="Trebuchet MS" panose="020B0703020202090204" pitchFamily="34" charset="0"/>
-              </a:rPr>
-              <a:t>Git is the command line software handles version control on your repository.</a:t>
-            </a:r>
-          </a:p>
-          <a:p>
-            <a:pPr rtl="0" fontAlgn="base">
-              <a:spcBef>
-                <a:spcPts val="0"/>
-              </a:spcBef>
-              <a:spcAft>
-                <a:spcPts val="1600"/>
-              </a:spcAft>
-              <a:buFont typeface="Arial" panose="020B0604020202020204" pitchFamily="34" charset="0"/>
-              <a:buChar char="•"/>
+              <a:rPr lang="en-GB" sz="2400" dirty="0"/>
+              <a:t>Pros</a:t>
+            </a:r>
+          </a:p>
+          <a:p>
+            <a:r>
+              <a:rPr lang="en-GB" sz="2400" dirty="0"/>
+              <a:t>Works with every file</a:t>
+            </a:r>
+          </a:p>
+          <a:p>
+            <a:r>
+              <a:rPr lang="en-GB" sz="2400" dirty="0"/>
+              <a:t>No software needed</a:t>
+            </a:r>
+          </a:p>
+          <a:p>
+            <a:pPr marL="0" indent="0">
+              <a:buNone/>
             </a:pPr>
-            <a:r>
-              <a:rPr lang="en-GB" sz="1800" b="0" i="0" u="none" strike="noStrike" dirty="0">
-                <a:effectLst/>
-                <a:latin typeface="Trebuchet MS" panose="020B0703020202090204" pitchFamily="34" charset="0"/>
-              </a:rPr>
-              <a:t>When you use GitHub, Git is always doing its thing behind the scenes.</a:t>
-            </a:r>
-          </a:p>
-          <a:p>
-            <a:endParaRPr lang="en-NL" dirty="0"/>
+            <a:endParaRPr lang="en-GB" sz="2400" dirty="0"/>
+          </a:p>
+          <a:p>
+            <a:pPr marL="0" indent="0">
+              <a:buNone/>
+            </a:pPr>
+            <a:r>
+              <a:rPr lang="nl-NL" sz="2400" dirty="0" err="1"/>
+              <a:t>Cons</a:t>
+            </a:r>
+            <a:r>
+              <a:rPr lang="en-NL" sz="2400" dirty="0"/>
+              <a:t>:</a:t>
+            </a:r>
+          </a:p>
+          <a:p>
+            <a:r>
+              <a:rPr lang="en-GB" sz="2400" dirty="0"/>
+              <a:t>C</a:t>
+            </a:r>
+            <a:r>
+              <a:rPr lang="en-NL" sz="2400" dirty="0"/>
+              <a:t>ollaboration</a:t>
+            </a:r>
+          </a:p>
+          <a:p>
+            <a:r>
+              <a:rPr lang="en-GB" sz="2400" dirty="0"/>
+              <a:t>B</a:t>
+            </a:r>
+            <a:r>
+              <a:rPr lang="en-NL" sz="2400" dirty="0"/>
+              <a:t>ugs</a:t>
+            </a:r>
+          </a:p>
+          <a:p>
+            <a:r>
+              <a:rPr lang="en-GB" sz="2400" dirty="0"/>
+              <a:t>C</a:t>
+            </a:r>
+            <a:r>
+              <a:rPr lang="en-NL" sz="2400" dirty="0"/>
+              <a:t>ompatibility between files</a:t>
+            </a:r>
+          </a:p>
+          <a:p>
+            <a:r>
+              <a:rPr lang="en-GB" sz="2400" dirty="0"/>
+              <a:t>I</a:t>
+            </a:r>
+            <a:r>
+              <a:rPr lang="en-NL" sz="2400" dirty="0"/>
+              <a:t>t makes a mess of my laptop</a:t>
+            </a:r>
           </a:p>
         </p:txBody>
       </p:sp>
     </p:spTree>
     <p:extLst>
       <p:ext uri="{BB962C8B-B14F-4D97-AF65-F5344CB8AC3E}">
-        <p14:creationId xmlns:p14="http://schemas.microsoft.com/office/powerpoint/2010/main" val="3607726894"/>
+        <p14:creationId xmlns:p14="http://schemas.microsoft.com/office/powerpoint/2010/main" val="2012840357"/>
       </p:ext>
     </p:extLst>
   </p:cSld>
@@ -4880,7 +7812,7 @@
           <p:cNvPr id="2" name="Title 1">
             <a:extLst>
               <a:ext uri="{FF2B5EF4-FFF2-40B4-BE49-F238E27FC236}">
-                <a16:creationId xmlns:a16="http://schemas.microsoft.com/office/drawing/2014/main" id="{B23F1F98-532D-ABB2-5410-DD5A2A497D1B}"/>
+                <a16:creationId xmlns:a16="http://schemas.microsoft.com/office/drawing/2014/main" id="{E9850AE6-B82B-7D91-F2E4-BCF49827D90C}"/>
               </a:ext>
             </a:extLst>
           </p:cNvPr>
@@ -4896,14 +7828,7 @@
           <a:bodyPr/>
           <a:lstStyle/>
           <a:p>
-            <a:r>
-              <a:rPr lang="en-NL" dirty="0"/>
-              <a:t>Git vs github</a:t>
-            </a:r>
-            <a:br>
-              <a:rPr lang="en-NL" dirty="0"/>
-            </a:br>
-            <a:endParaRPr lang="en-NL" dirty="0"/>
+            <a:endParaRPr lang="en-NL"/>
           </a:p>
         </p:txBody>
       </p:sp>
@@ -4912,7 +7837,7 @@
           <p:cNvPr id="3" name="Content Placeholder 2">
             <a:extLst>
               <a:ext uri="{FF2B5EF4-FFF2-40B4-BE49-F238E27FC236}">
-                <a16:creationId xmlns:a16="http://schemas.microsoft.com/office/drawing/2014/main" id="{99CAB18F-DF42-3D7D-8CE2-A7A676C890CB}"/>
+                <a16:creationId xmlns:a16="http://schemas.microsoft.com/office/drawing/2014/main" id="{E210F277-257C-75A6-8E87-6470F7EC0579}"/>
               </a:ext>
             </a:extLst>
           </p:cNvPr>
@@ -4928,163 +7853,39 @@
           <a:bodyPr/>
           <a:lstStyle/>
           <a:p>
-            <a:pPr rtl="0" fontAlgn="base">
-              <a:spcBef>
-                <a:spcPts val="0"/>
-              </a:spcBef>
-              <a:spcAft>
-                <a:spcPts val="0"/>
-              </a:spcAft>
-              <a:buFont typeface="Arial" panose="020B0604020202020204" pitchFamily="34" charset="0"/>
-              <a:buChar char="•"/>
-            </a:pPr>
-            <a:r>
-              <a:rPr lang="en-GB" sz="1800" b="0" i="0" u="none" strike="noStrike" dirty="0">
-                <a:effectLst/>
-                <a:latin typeface="Trebuchet MS" panose="020B0703020202090204" pitchFamily="34" charset="0"/>
-              </a:rPr>
-              <a:t>GitHub is a cloud storage system for git repositories.</a:t>
-            </a:r>
-          </a:p>
-          <a:p>
-            <a:pPr rtl="0" fontAlgn="base">
-              <a:spcBef>
-                <a:spcPts val="0"/>
-              </a:spcBef>
-              <a:spcAft>
-                <a:spcPts val="0"/>
-              </a:spcAft>
-              <a:buFont typeface="Arial" panose="020B0604020202020204" pitchFamily="34" charset="0"/>
-              <a:buChar char="•"/>
-            </a:pPr>
-            <a:endParaRPr lang="en-GB" sz="1800" dirty="0">
-              <a:latin typeface="Trebuchet MS" panose="020B0703020202090204" pitchFamily="34" charset="0"/>
-            </a:endParaRPr>
-          </a:p>
-          <a:p>
-            <a:pPr rtl="0" fontAlgn="base">
-              <a:spcBef>
-                <a:spcPts val="0"/>
-              </a:spcBef>
-              <a:spcAft>
-                <a:spcPts val="0"/>
-              </a:spcAft>
-              <a:buFont typeface="Arial" panose="020B0604020202020204" pitchFamily="34" charset="0"/>
-              <a:buChar char="•"/>
-            </a:pPr>
-            <a:r>
-              <a:rPr lang="en-GB" sz="1800" dirty="0">
-                <a:latin typeface="Trebuchet MS" panose="020B0703020202090204" pitchFamily="34" charset="0"/>
-              </a:rPr>
-              <a:t>Offers additional tools for collaboration</a:t>
-            </a:r>
-          </a:p>
-          <a:p>
-            <a:pPr marL="0" indent="0" rtl="0" fontAlgn="base">
-              <a:spcBef>
-                <a:spcPts val="0"/>
-              </a:spcBef>
-              <a:spcAft>
-                <a:spcPts val="0"/>
-              </a:spcAft>
+            <a:pPr marL="0" indent="0" algn="ctr">
               <a:buNone/>
             </a:pPr>
-            <a:endParaRPr lang="en-GB" sz="1800" dirty="0">
-              <a:latin typeface="Trebuchet MS" panose="020B0703020202090204" pitchFamily="34" charset="0"/>
-            </a:endParaRPr>
-          </a:p>
-          <a:p>
-            <a:pPr rtl="0" fontAlgn="base">
-              <a:spcBef>
-                <a:spcPts val="0"/>
-              </a:spcBef>
-              <a:spcAft>
-                <a:spcPts val="0"/>
-              </a:spcAft>
-              <a:buFont typeface="Arial" panose="020B0604020202020204" pitchFamily="34" charset="0"/>
-              <a:buChar char="•"/>
+            <a:endParaRPr lang="en-NL" i="1" dirty="0"/>
+          </a:p>
+          <a:p>
+            <a:pPr marL="0" indent="0" algn="ctr">
+              <a:buNone/>
             </a:pPr>
             <a:r>
-              <a:rPr lang="en-GB" sz="1800" dirty="0">
-                <a:latin typeface="Trebuchet MS" panose="020B0703020202090204" pitchFamily="34" charset="0"/>
-              </a:rPr>
-              <a:t>Web interface</a:t>
-            </a:r>
-          </a:p>
-          <a:p>
-            <a:pPr rtl="0" fontAlgn="base">
-              <a:spcBef>
-                <a:spcPts val="0"/>
-              </a:spcBef>
-              <a:spcAft>
-                <a:spcPts val="0"/>
-              </a:spcAft>
-              <a:buFont typeface="Arial" panose="020B0604020202020204" pitchFamily="34" charset="0"/>
-              <a:buChar char="•"/>
+              <a:rPr lang="en-NL" i="1" dirty="0"/>
+              <a:t>“A yes, you must be older than you look. </a:t>
+            </a:r>
+          </a:p>
+          <a:p>
+            <a:pPr marL="0" indent="0" algn="ctr">
+              <a:buNone/>
             </a:pPr>
-            <a:endParaRPr lang="en-GB" sz="1800" dirty="0">
-              <a:latin typeface="Trebuchet MS" panose="020B0703020202090204" pitchFamily="34" charset="0"/>
-            </a:endParaRPr>
-          </a:p>
-          <a:p>
-            <a:pPr rtl="0" fontAlgn="base">
-              <a:spcBef>
-                <a:spcPts val="0"/>
-              </a:spcBef>
-              <a:spcAft>
-                <a:spcPts val="0"/>
-              </a:spcAft>
-              <a:buFont typeface="Arial" panose="020B0604020202020204" pitchFamily="34" charset="0"/>
-              <a:buChar char="•"/>
-            </a:pPr>
-            <a:r>
-              <a:rPr lang="en-GB" sz="1800" dirty="0">
-                <a:latin typeface="Trebuchet MS" panose="020B0703020202090204" pitchFamily="34" charset="0"/>
-              </a:rPr>
-              <a:t>Works with web interface, or </a:t>
-            </a:r>
-            <a:r>
-              <a:rPr lang="en-GB" sz="1800" b="0" i="0" u="none" strike="noStrike" dirty="0" err="1">
-                <a:effectLst/>
-                <a:latin typeface="Trebuchet MS" panose="020B0703020202090204" pitchFamily="34" charset="0"/>
-              </a:rPr>
-              <a:t>Github</a:t>
-            </a:r>
-            <a:r>
-              <a:rPr lang="en-GB" sz="1800" b="0" i="0" u="none" strike="noStrike" dirty="0">
-                <a:effectLst/>
-                <a:latin typeface="Trebuchet MS" panose="020B0703020202090204" pitchFamily="34" charset="0"/>
-              </a:rPr>
-              <a:t> Desktop App , or </a:t>
-            </a:r>
-            <a:r>
-              <a:rPr lang="en-GB" sz="1800" dirty="0">
-                <a:latin typeface="Trebuchet MS" panose="020B0703020202090204" pitchFamily="34" charset="0"/>
-              </a:rPr>
-              <a:t>Connects to </a:t>
-            </a:r>
-            <a:r>
-              <a:rPr lang="en-GB" sz="1800" dirty="0" err="1">
-                <a:latin typeface="Trebuchet MS" panose="020B0703020202090204" pitchFamily="34" charset="0"/>
-              </a:rPr>
-              <a:t>Rstudio</a:t>
-            </a:r>
-            <a:r>
-              <a:rPr lang="en-GB" sz="1800" dirty="0">
-                <a:latin typeface="Trebuchet MS" panose="020B0703020202090204" pitchFamily="34" charset="0"/>
-              </a:rPr>
-              <a:t>, or command line, or..</a:t>
-            </a:r>
-          </a:p>
-          <a:p>
-            <a:endParaRPr lang="en-NL" dirty="0"/>
+            <a:r>
+              <a:rPr lang="en-GB" i="1" dirty="0"/>
+              <a:t>W</a:t>
+            </a:r>
+            <a:r>
+              <a:rPr lang="en-NL" i="1" dirty="0"/>
+              <a:t>e use onedrive / google docs nowadays!”</a:t>
+            </a:r>
           </a:p>
         </p:txBody>
       </p:sp>
     </p:spTree>
     <p:extLst>
       <p:ext uri="{BB962C8B-B14F-4D97-AF65-F5344CB8AC3E}">
-        <p14:creationId xmlns:p14="http://schemas.microsoft.com/office/powerpoint/2010/main" val="3623605110"/>
+        <p14:creationId xmlns:p14="http://schemas.microsoft.com/office/powerpoint/2010/main" val="1788454516"/>
       </p:ext>
     </p:extLst>
   </p:cSld>

</xml_diff>

<commit_message>
github en data in powerpoint
</commit_message>
<xml_diff>
--- a/powerpoints/github_part1.pptx
+++ b/powerpoints/github_part1.pptx
@@ -5,7 +5,7 @@
     <p:sldMasterId id="2147483648" r:id="rId1"/>
   </p:sldMasterIdLst>
   <p:notesMasterIdLst>
-    <p:notesMasterId r:id="rId24"/>
+    <p:notesMasterId r:id="rId25"/>
   </p:notesMasterIdLst>
   <p:sldIdLst>
     <p:sldId id="256" r:id="rId2"/>
@@ -29,7 +29,8 @@
     <p:sldId id="277" r:id="rId20"/>
     <p:sldId id="267" r:id="rId21"/>
     <p:sldId id="265" r:id="rId22"/>
-    <p:sldId id="278" r:id="rId23"/>
+    <p:sldId id="280" r:id="rId23"/>
+    <p:sldId id="278" r:id="rId24"/>
   </p:sldIdLst>
   <p:sldSz cx="12192000" cy="6858000"/>
   <p:notesSz cx="6858000" cy="9144000"/>
@@ -6717,6 +6718,110 @@
 </file>
 
 <file path=ppt/slides/slide22.xml><?xml version="1.0" encoding="utf-8"?>
+<p:sld xmlns:a="http://schemas.openxmlformats.org/drawingml/2006/main" xmlns:r="http://schemas.openxmlformats.org/officeDocument/2006/relationships" xmlns:p="http://schemas.openxmlformats.org/presentationml/2006/main">
+  <p:cSld>
+    <p:spTree>
+      <p:nvGrpSpPr>
+        <p:cNvPr id="1" name=""/>
+        <p:cNvGrpSpPr/>
+        <p:nvPr/>
+      </p:nvGrpSpPr>
+      <p:grpSpPr>
+        <a:xfrm>
+          <a:off x="0" y="0"/>
+          <a:ext cx="0" cy="0"/>
+          <a:chOff x="0" y="0"/>
+          <a:chExt cx="0" cy="0"/>
+        </a:xfrm>
+      </p:grpSpPr>
+      <p:sp>
+        <p:nvSpPr>
+          <p:cNvPr id="2" name="Title 1">
+            <a:extLst>
+              <a:ext uri="{FF2B5EF4-FFF2-40B4-BE49-F238E27FC236}">
+                <a16:creationId xmlns:a16="http://schemas.microsoft.com/office/drawing/2014/main" id="{F21C41D6-3F5F-936A-B859-CF4BB685A2D9}"/>
+              </a:ext>
+            </a:extLst>
+          </p:cNvPr>
+          <p:cNvSpPr>
+            <a:spLocks noGrp="1"/>
+          </p:cNvSpPr>
+          <p:nvPr>
+            <p:ph type="title"/>
+          </p:nvPr>
+        </p:nvSpPr>
+        <p:spPr/>
+        <p:txBody>
+          <a:bodyPr/>
+          <a:lstStyle/>
+          <a:p>
+            <a:r>
+              <a:rPr lang="en-NL" dirty="0"/>
+              <a:t>So what about data?</a:t>
+            </a:r>
+          </a:p>
+        </p:txBody>
+      </p:sp>
+      <p:sp>
+        <p:nvSpPr>
+          <p:cNvPr id="3" name="Content Placeholder 2">
+            <a:extLst>
+              <a:ext uri="{FF2B5EF4-FFF2-40B4-BE49-F238E27FC236}">
+                <a16:creationId xmlns:a16="http://schemas.microsoft.com/office/drawing/2014/main" id="{5A028098-98C5-D14C-EFE7-87EF1430C18D}"/>
+              </a:ext>
+            </a:extLst>
+          </p:cNvPr>
+          <p:cNvSpPr>
+            <a:spLocks noGrp="1"/>
+          </p:cNvSpPr>
+          <p:nvPr>
+            <p:ph idx="1"/>
+          </p:nvPr>
+        </p:nvSpPr>
+        <p:spPr/>
+        <p:txBody>
+          <a:bodyPr/>
+          <a:lstStyle/>
+          <a:p>
+            <a:r>
+              <a:rPr lang="en-NL" dirty="0"/>
+              <a:t>Git is not a data platform</a:t>
+            </a:r>
+          </a:p>
+          <a:p>
+            <a:endParaRPr lang="en-NL" dirty="0"/>
+          </a:p>
+          <a:p>
+            <a:r>
+              <a:rPr lang="en-NL" dirty="0"/>
+              <a:t>But used to version control workflows surrounding data</a:t>
+            </a:r>
+          </a:p>
+          <a:p>
+            <a:endParaRPr lang="en-NL" dirty="0"/>
+          </a:p>
+          <a:p>
+            <a:r>
+              <a:rPr lang="en-NL" dirty="0"/>
+              <a:t>Git workflow stimulates documentation, meta data, accessibility, transparency</a:t>
+            </a:r>
+          </a:p>
+        </p:txBody>
+      </p:sp>
+    </p:spTree>
+    <p:extLst>
+      <p:ext uri="{BB962C8B-B14F-4D97-AF65-F5344CB8AC3E}">
+        <p14:creationId xmlns:p14="http://schemas.microsoft.com/office/powerpoint/2010/main" val="146179425"/>
+      </p:ext>
+    </p:extLst>
+  </p:cSld>
+  <p:clrMapOvr>
+    <a:masterClrMapping/>
+  </p:clrMapOvr>
+</p:sld>
+</file>
+
+<file path=ppt/slides/slide23.xml><?xml version="1.0" encoding="utf-8"?>
 <p:sld xmlns:a="http://schemas.openxmlformats.org/drawingml/2006/main" xmlns:r="http://schemas.openxmlformats.org/officeDocument/2006/relationships" xmlns:p="http://schemas.openxmlformats.org/presentationml/2006/main">
   <p:cSld>
     <p:spTree>

</xml_diff>

<commit_message>
hello world opdracht half af
</commit_message>
<xml_diff>
--- a/powerpoints/github_part1.pptx
+++ b/powerpoints/github_part1.pptx
@@ -5,7 +5,7 @@
     <p:sldMasterId id="2147483648" r:id="rId1"/>
   </p:sldMasterIdLst>
   <p:notesMasterIdLst>
-    <p:notesMasterId r:id="rId26"/>
+    <p:notesMasterId r:id="rId25"/>
   </p:notesMasterIdLst>
   <p:sldIdLst>
     <p:sldId id="256" r:id="rId2"/>
@@ -25,13 +25,12 @@
     <p:sldId id="275" r:id="rId16"/>
     <p:sldId id="276" r:id="rId17"/>
     <p:sldId id="264" r:id="rId18"/>
-    <p:sldId id="259" r:id="rId19"/>
-    <p:sldId id="273" r:id="rId20"/>
-    <p:sldId id="277" r:id="rId21"/>
-    <p:sldId id="267" r:id="rId22"/>
-    <p:sldId id="265" r:id="rId23"/>
-    <p:sldId id="280" r:id="rId24"/>
-    <p:sldId id="278" r:id="rId25"/>
+    <p:sldId id="273" r:id="rId19"/>
+    <p:sldId id="277" r:id="rId20"/>
+    <p:sldId id="267" r:id="rId21"/>
+    <p:sldId id="265" r:id="rId22"/>
+    <p:sldId id="280" r:id="rId23"/>
+    <p:sldId id="278" r:id="rId24"/>
   </p:sldIdLst>
   <p:sldSz cx="12192000" cy="6858000"/>
   <p:notesSz cx="6858000" cy="9144000"/>
@@ -920,12 +919,12 @@
           <a:lstStyle/>
           <a:p>
             <a:r>
-              <a:rPr lang="en-GB" dirty="0"/>
-              <a:t>N</a:t>
+              <a:rPr lang="nl-NL" dirty="0"/>
+              <a:t>Both platforms </a:t>
             </a:r>
             <a:r>
               <a:rPr lang="en-NL" dirty="0"/>
-              <a:t>oth platofrm offer a version history. </a:t>
+              <a:t>offer a version history. </a:t>
             </a:r>
             <a:r>
               <a:rPr lang="en-GB" dirty="0"/>
@@ -1107,6 +1106,97 @@
           <a:p>
             <a:r>
               <a:rPr lang="en-GB" dirty="0"/>
+              <a:t>O</a:t>
+            </a:r>
+            <a:r>
+              <a:rPr lang="en-NL" dirty="0"/>
+              <a:t>r gitlab or bitbucket</a:t>
+            </a:r>
+          </a:p>
+        </p:txBody>
+      </p:sp>
+      <p:sp>
+        <p:nvSpPr>
+          <p:cNvPr id="4" name="Slide Number Placeholder 3"/>
+          <p:cNvSpPr>
+            <a:spLocks noGrp="1"/>
+          </p:cNvSpPr>
+          <p:nvPr>
+            <p:ph type="sldNum" sz="quarter" idx="5"/>
+          </p:nvPr>
+        </p:nvSpPr>
+        <p:spPr/>
+        <p:txBody>
+          <a:bodyPr/>
+          <a:lstStyle/>
+          <a:p>
+            <a:fld id="{49AF2050-A35D-D84D-8840-74500D44AACF}" type="slidenum">
+              <a:rPr lang="en-NL" smtClean="0"/>
+              <a:t>16</a:t>
+            </a:fld>
+            <a:endParaRPr lang="en-NL"/>
+          </a:p>
+        </p:txBody>
+      </p:sp>
+    </p:spTree>
+    <p:extLst>
+      <p:ext uri="{BB962C8B-B14F-4D97-AF65-F5344CB8AC3E}">
+        <p14:creationId xmlns:p14="http://schemas.microsoft.com/office/powerpoint/2010/main" val="3029161824"/>
+      </p:ext>
+    </p:extLst>
+  </p:cSld>
+  <p:clrMapOvr>
+    <a:masterClrMapping/>
+  </p:clrMapOvr>
+</p:notes>
+</file>
+
+<file path=ppt/notesSlides/notesSlide7.xml><?xml version="1.0" encoding="utf-8"?>
+<p:notes xmlns:a="http://schemas.openxmlformats.org/drawingml/2006/main" xmlns:r="http://schemas.openxmlformats.org/officeDocument/2006/relationships" xmlns:p="http://schemas.openxmlformats.org/presentationml/2006/main">
+  <p:cSld>
+    <p:spTree>
+      <p:nvGrpSpPr>
+        <p:cNvPr id="1" name=""/>
+        <p:cNvGrpSpPr/>
+        <p:nvPr/>
+      </p:nvGrpSpPr>
+      <p:grpSpPr>
+        <a:xfrm>
+          <a:off x="0" y="0"/>
+          <a:ext cx="0" cy="0"/>
+          <a:chOff x="0" y="0"/>
+          <a:chExt cx="0" cy="0"/>
+        </a:xfrm>
+      </p:grpSpPr>
+      <p:sp>
+        <p:nvSpPr>
+          <p:cNvPr id="2" name="Slide Image Placeholder 1"/>
+          <p:cNvSpPr>
+            <a:spLocks noGrp="1" noRot="1" noChangeAspect="1"/>
+          </p:cNvSpPr>
+          <p:nvPr>
+            <p:ph type="sldImg"/>
+          </p:nvPr>
+        </p:nvSpPr>
+        <p:spPr/>
+      </p:sp>
+      <p:sp>
+        <p:nvSpPr>
+          <p:cNvPr id="3" name="Notes Placeholder 2"/>
+          <p:cNvSpPr>
+            <a:spLocks noGrp="1"/>
+          </p:cNvSpPr>
+          <p:nvPr>
+            <p:ph type="body" idx="1"/>
+          </p:nvPr>
+        </p:nvSpPr>
+        <p:spPr/>
+        <p:txBody>
+          <a:bodyPr/>
+          <a:lstStyle/>
+          <a:p>
+            <a:r>
+              <a:rPr lang="en-GB" dirty="0"/>
               <a:t>U</a:t>
             </a:r>
             <a:r>
@@ -1133,7 +1223,7 @@
           <a:p>
             <a:fld id="{49AF2050-A35D-D84D-8840-74500D44AACF}" type="slidenum">
               <a:rPr lang="en-NL" smtClean="0"/>
-              <a:t>22</a:t>
+              <a:t>21</a:t>
             </a:fld>
             <a:endParaRPr lang="en-NL"/>
           </a:p>
@@ -5495,7 +5585,16 @@
             </a:pPr>
             <a:r>
               <a:rPr lang="en-NL" i="1" dirty="0"/>
-              <a:t>“Oh great. But we are not programmers. So helaas pindakaas.”</a:t>
+              <a:t>“Oh great. But we are not programmers. </a:t>
+            </a:r>
+          </a:p>
+          <a:p>
+            <a:pPr marL="0" indent="0" algn="ctr">
+              <a:buNone/>
+            </a:pPr>
+            <a:r>
+              <a:rPr lang="en-NL" i="1" dirty="0"/>
+              <a:t>So unfortunately peanutbutter.”</a:t>
             </a:r>
           </a:p>
         </p:txBody>
@@ -5585,40 +5684,10 @@
       </p:sp>
       <p:pic>
         <p:nvPicPr>
-          <p:cNvPr id="4" name="Picture 3">
-            <a:extLst>
-              <a:ext uri="{FF2B5EF4-FFF2-40B4-BE49-F238E27FC236}">
-                <a16:creationId xmlns:a16="http://schemas.microsoft.com/office/drawing/2014/main" id="{38BBD1C0-7824-C9D7-2D0C-4268413DB162}"/>
-              </a:ext>
-            </a:extLst>
-          </p:cNvPr>
-          <p:cNvPicPr>
-            <a:picLocks noChangeAspect="1"/>
-          </p:cNvPicPr>
-          <p:nvPr/>
-        </p:nvPicPr>
-        <p:blipFill>
-          <a:blip r:embed="rId2"/>
-          <a:stretch>
-            <a:fillRect/>
-          </a:stretch>
-        </p:blipFill>
-        <p:spPr>
-          <a:xfrm>
-            <a:off x="8067310" y="2482850"/>
-            <a:ext cx="1333500" cy="685800"/>
-          </a:xfrm>
-          <a:prstGeom prst="rect">
-            <a:avLst/>
-          </a:prstGeom>
-        </p:spPr>
-      </p:pic>
-      <p:pic>
-        <p:nvPicPr>
-          <p:cNvPr id="5" name="Picture 4">
-            <a:extLst>
-              <a:ext uri="{FF2B5EF4-FFF2-40B4-BE49-F238E27FC236}">
-                <a16:creationId xmlns:a16="http://schemas.microsoft.com/office/drawing/2014/main" id="{AC3CC089-93CB-965F-1D77-5BFB7162DEA3}"/>
+          <p:cNvPr id="8" name="Picture 7">
+            <a:extLst>
+              <a:ext uri="{FF2B5EF4-FFF2-40B4-BE49-F238E27FC236}">
+                <a16:creationId xmlns:a16="http://schemas.microsoft.com/office/drawing/2014/main" id="{B756B507-60E0-F0F6-5458-48EAF404EF59}"/>
               </a:ext>
             </a:extLst>
           </p:cNvPr>
@@ -5635,97 +5704,7 @@
         </p:blipFill>
         <p:spPr>
           <a:xfrm>
-            <a:off x="9761355" y="1820004"/>
-            <a:ext cx="2070100" cy="609600"/>
-          </a:xfrm>
-          <a:prstGeom prst="rect">
-            <a:avLst/>
-          </a:prstGeom>
-        </p:spPr>
-      </p:pic>
-      <p:pic>
-        <p:nvPicPr>
-          <p:cNvPr id="6" name="Picture 5">
-            <a:extLst>
-              <a:ext uri="{FF2B5EF4-FFF2-40B4-BE49-F238E27FC236}">
-                <a16:creationId xmlns:a16="http://schemas.microsoft.com/office/drawing/2014/main" id="{323FEE9B-E489-6939-2ECA-0A078DCAC5FB}"/>
-              </a:ext>
-            </a:extLst>
-          </p:cNvPr>
-          <p:cNvPicPr>
-            <a:picLocks noChangeAspect="1"/>
-          </p:cNvPicPr>
-          <p:nvPr/>
-        </p:nvPicPr>
-        <p:blipFill>
-          <a:blip r:embed="rId4"/>
-          <a:stretch>
-            <a:fillRect/>
-          </a:stretch>
-        </p:blipFill>
-        <p:spPr>
-          <a:xfrm>
-            <a:off x="9821315" y="2565400"/>
-            <a:ext cx="2451100" cy="520700"/>
-          </a:xfrm>
-          <a:prstGeom prst="rect">
-            <a:avLst/>
-          </a:prstGeom>
-        </p:spPr>
-      </p:pic>
-      <p:pic>
-        <p:nvPicPr>
-          <p:cNvPr id="7" name="Picture 6">
-            <a:extLst>
-              <a:ext uri="{FF2B5EF4-FFF2-40B4-BE49-F238E27FC236}">
-                <a16:creationId xmlns:a16="http://schemas.microsoft.com/office/drawing/2014/main" id="{E1F64C69-A1A2-0DA3-CAA0-C786946033AC}"/>
-              </a:ext>
-            </a:extLst>
-          </p:cNvPr>
-          <p:cNvPicPr>
-            <a:picLocks noChangeAspect="1"/>
-          </p:cNvPicPr>
-          <p:nvPr/>
-        </p:nvPicPr>
-        <p:blipFill>
-          <a:blip r:embed="rId5"/>
-          <a:stretch>
-            <a:fillRect/>
-          </a:stretch>
-        </p:blipFill>
-        <p:spPr>
-          <a:xfrm>
-            <a:off x="9818505" y="3287296"/>
-            <a:ext cx="1955800" cy="622300"/>
-          </a:xfrm>
-          <a:prstGeom prst="rect">
-            <a:avLst/>
-          </a:prstGeom>
-        </p:spPr>
-      </p:pic>
-      <p:pic>
-        <p:nvPicPr>
-          <p:cNvPr id="8" name="Picture 7">
-            <a:extLst>
-              <a:ext uri="{FF2B5EF4-FFF2-40B4-BE49-F238E27FC236}">
-                <a16:creationId xmlns:a16="http://schemas.microsoft.com/office/drawing/2014/main" id="{B756B507-60E0-F0F6-5458-48EAF404EF59}"/>
-              </a:ext>
-            </a:extLst>
-          </p:cNvPr>
-          <p:cNvPicPr>
-            <a:picLocks noChangeAspect="1"/>
-          </p:cNvPicPr>
-          <p:nvPr/>
-        </p:nvPicPr>
-        <p:blipFill>
-          <a:blip r:embed="rId6"/>
-          <a:stretch>
-            <a:fillRect/>
-          </a:stretch>
-        </p:blipFill>
-        <p:spPr>
-          <a:xfrm>
-            <a:off x="603926" y="1596232"/>
+            <a:off x="183421" y="1337555"/>
             <a:ext cx="11170379" cy="4351337"/>
           </a:xfrm>
           <a:prstGeom prst="rect">
@@ -5733,6 +5712,89 @@
           </a:prstGeom>
         </p:spPr>
       </p:pic>
+      <p:sp>
+        <p:nvSpPr>
+          <p:cNvPr id="10" name="TextBox 9">
+            <a:extLst>
+              <a:ext uri="{FF2B5EF4-FFF2-40B4-BE49-F238E27FC236}">
+                <a16:creationId xmlns:a16="http://schemas.microsoft.com/office/drawing/2014/main" id="{9E315CF4-456D-C16F-EA8E-F46D7AC53861}"/>
+              </a:ext>
+            </a:extLst>
+          </p:cNvPr>
+          <p:cNvSpPr txBox="1"/>
+          <p:nvPr/>
+        </p:nvSpPr>
+        <p:spPr>
+          <a:xfrm>
+            <a:off x="105816" y="5934670"/>
+            <a:ext cx="6136104" cy="923330"/>
+          </a:xfrm>
+          <a:prstGeom prst="rect">
+            <a:avLst/>
+          </a:prstGeom>
+          <a:noFill/>
+        </p:spPr>
+        <p:txBody>
+          <a:bodyPr wrap="square">
+            <a:spAutoFit/>
+          </a:bodyPr>
+          <a:lstStyle/>
+          <a:p>
+            <a:pPr rtl="0" fontAlgn="base">
+              <a:spcBef>
+                <a:spcPts val="0"/>
+              </a:spcBef>
+              <a:spcAft>
+                <a:spcPts val="0"/>
+              </a:spcAft>
+              <a:buFont typeface="Arial" panose="020B0604020202020204" pitchFamily="34" charset="0"/>
+              <a:buChar char="•"/>
+            </a:pPr>
+            <a:r>
+              <a:rPr lang="en-GB" sz="1800" b="0" i="0" u="none" strike="noStrike" dirty="0">
+                <a:effectLst/>
+                <a:latin typeface="Trebuchet MS" panose="020B0703020202090204" pitchFamily="34" charset="0"/>
+              </a:rPr>
+              <a:t>Git handles version control on your repo</a:t>
+            </a:r>
+          </a:p>
+          <a:p>
+            <a:pPr rtl="0" fontAlgn="base">
+              <a:spcBef>
+                <a:spcPts val="0"/>
+              </a:spcBef>
+              <a:spcAft>
+                <a:spcPts val="0"/>
+              </a:spcAft>
+              <a:buFont typeface="Arial" panose="020B0604020202020204" pitchFamily="34" charset="0"/>
+              <a:buChar char="•"/>
+            </a:pPr>
+            <a:endParaRPr lang="en-GB" sz="1800" b="0" i="0" u="none" strike="noStrike" dirty="0">
+              <a:effectLst/>
+              <a:latin typeface="Trebuchet MS" panose="020B0703020202090204" pitchFamily="34" charset="0"/>
+            </a:endParaRPr>
+          </a:p>
+          <a:p>
+            <a:pPr rtl="0" fontAlgn="base">
+              <a:spcBef>
+                <a:spcPts val="0"/>
+              </a:spcBef>
+              <a:spcAft>
+                <a:spcPts val="1600"/>
+              </a:spcAft>
+              <a:buFont typeface="Arial" panose="020B0604020202020204" pitchFamily="34" charset="0"/>
+              <a:buChar char="•"/>
+            </a:pPr>
+            <a:r>
+              <a:rPr lang="en-GB" sz="1800" b="0" i="0" u="none" strike="noStrike" dirty="0">
+                <a:effectLst/>
+                <a:latin typeface="Trebuchet MS" panose="020B0703020202090204" pitchFamily="34" charset="0"/>
+              </a:rPr>
+              <a:t>When you use GitHub, Git is working behind the scenes.</a:t>
+            </a:r>
+          </a:p>
+        </p:txBody>
+      </p:sp>
     </p:spTree>
     <p:extLst>
       <p:ext uri="{BB962C8B-B14F-4D97-AF65-F5344CB8AC3E}">
@@ -5743,81 +5805,6 @@
   <p:clrMapOvr>
     <a:masterClrMapping/>
   </p:clrMapOvr>
-  <p:timing>
-    <p:tnLst>
-      <p:par>
-        <p:cTn id="1" dur="indefinite" restart="never" nodeType="tmRoot">
-          <p:childTnLst>
-            <p:seq concurrent="1" nextAc="seek">
-              <p:cTn id="2" dur="indefinite" nodeType="mainSeq">
-                <p:childTnLst>
-                  <p:par>
-                    <p:cTn id="3" fill="hold">
-                      <p:stCondLst>
-                        <p:cond delay="indefinite"/>
-                      </p:stCondLst>
-                      <p:childTnLst>
-                        <p:par>
-                          <p:cTn id="4" fill="hold">
-                            <p:stCondLst>
-                              <p:cond delay="0"/>
-                            </p:stCondLst>
-                            <p:childTnLst>
-                              <p:par>
-                                <p:cTn id="5" presetID="1" presetClass="entr" presetSubtype="0" fill="hold" nodeType="clickEffect">
-                                  <p:stCondLst>
-                                    <p:cond delay="0"/>
-                                  </p:stCondLst>
-                                  <p:childTnLst>
-                                    <p:set>
-                                      <p:cBhvr>
-                                        <p:cTn id="6" dur="1" fill="hold">
-                                          <p:stCondLst>
-                                            <p:cond delay="0"/>
-                                          </p:stCondLst>
-                                        </p:cTn>
-                                        <p:tgtEl>
-                                          <p:spTgt spid="8"/>
-                                        </p:tgtEl>
-                                        <p:attrNameLst>
-                                          <p:attrName>style.visibility</p:attrName>
-                                        </p:attrNameLst>
-                                      </p:cBhvr>
-                                      <p:to>
-                                        <p:strVal val="visible"/>
-                                      </p:to>
-                                    </p:set>
-                                  </p:childTnLst>
-                                </p:cTn>
-                              </p:par>
-                            </p:childTnLst>
-                          </p:cTn>
-                        </p:par>
-                      </p:childTnLst>
-                    </p:cTn>
-                  </p:par>
-                </p:childTnLst>
-              </p:cTn>
-              <p:prevCondLst>
-                <p:cond evt="onPrev" delay="0">
-                  <p:tgtEl>
-                    <p:sldTgt/>
-                  </p:tgtEl>
-                </p:cond>
-              </p:prevCondLst>
-              <p:nextCondLst>
-                <p:cond evt="onNext" delay="0">
-                  <p:tgtEl>
-                    <p:sldTgt/>
-                  </p:tgtEl>
-                </p:cond>
-              </p:nextCondLst>
-            </p:seq>
-          </p:childTnLst>
-        </p:cTn>
-      </p:par>
-    </p:tnLst>
-  </p:timing>
 </p:sld>
 </file>
 
@@ -5888,7 +5875,9 @@
         </p:nvSpPr>
         <p:spPr/>
         <p:txBody>
-          <a:bodyPr/>
+          <a:bodyPr>
+            <a:normAutofit lnSpcReduction="10000"/>
+          </a:bodyPr>
           <a:lstStyle/>
           <a:p>
             <a:pPr rtl="0" fontAlgn="base">
@@ -5940,6 +5929,72 @@
                 <a:latin typeface="Trebuchet MS" panose="020B0703020202090204" pitchFamily="34" charset="0"/>
               </a:rPr>
               <a:t>Offers additional tools for collaboration</a:t>
+            </a:r>
+          </a:p>
+          <a:p>
+            <a:pPr rtl="0" fontAlgn="base">
+              <a:spcBef>
+                <a:spcPts val="0"/>
+              </a:spcBef>
+              <a:spcAft>
+                <a:spcPts val="0"/>
+              </a:spcAft>
+              <a:buFont typeface="Arial" panose="020B0604020202020204" pitchFamily="34" charset="0"/>
+              <a:buChar char="•"/>
+            </a:pPr>
+            <a:endParaRPr lang="en-GB" sz="2400" dirty="0">
+              <a:latin typeface="Trebuchet MS" panose="020B0703020202090204" pitchFamily="34" charset="0"/>
+            </a:endParaRPr>
+          </a:p>
+          <a:p>
+            <a:pPr rtl="0" fontAlgn="base">
+              <a:spcBef>
+                <a:spcPts val="0"/>
+              </a:spcBef>
+              <a:spcAft>
+                <a:spcPts val="0"/>
+              </a:spcAft>
+              <a:buFont typeface="Arial" panose="020B0604020202020204" pitchFamily="34" charset="0"/>
+              <a:buChar char="•"/>
+            </a:pPr>
+            <a:r>
+              <a:rPr lang="en-GB" sz="2400" dirty="0">
+                <a:latin typeface="Trebuchet MS" panose="020B0703020202090204" pitchFamily="34" charset="0"/>
+              </a:rPr>
+              <a:t>Does not need to be code, also text, or just any file</a:t>
+            </a:r>
+          </a:p>
+          <a:p>
+            <a:pPr rtl="0" fontAlgn="base">
+              <a:spcBef>
+                <a:spcPts val="0"/>
+              </a:spcBef>
+              <a:spcAft>
+                <a:spcPts val="0"/>
+              </a:spcAft>
+              <a:buFont typeface="Arial" panose="020B0604020202020204" pitchFamily="34" charset="0"/>
+              <a:buChar char="•"/>
+            </a:pPr>
+            <a:endParaRPr lang="en-GB" sz="2400" dirty="0">
+              <a:latin typeface="Trebuchet MS" panose="020B0703020202090204" pitchFamily="34" charset="0"/>
+            </a:endParaRPr>
+          </a:p>
+          <a:p>
+            <a:pPr rtl="0" fontAlgn="base">
+              <a:spcBef>
+                <a:spcPts val="0"/>
+              </a:spcBef>
+              <a:spcAft>
+                <a:spcPts val="0"/>
+              </a:spcAft>
+              <a:buFont typeface="Arial" panose="020B0604020202020204" pitchFamily="34" charset="0"/>
+              <a:buChar char="•"/>
+            </a:pPr>
+            <a:r>
+              <a:rPr lang="en-GB" sz="2400" dirty="0">
+                <a:latin typeface="Trebuchet MS" panose="020B0703020202090204" pitchFamily="34" charset="0"/>
+              </a:rPr>
+              <a:t>Reproducible data analysis = code </a:t>
             </a:r>
           </a:p>
           <a:p>
@@ -6106,7 +6161,7 @@
           <p:cNvPr id="2" name="Title 1">
             <a:extLst>
               <a:ext uri="{FF2B5EF4-FFF2-40B4-BE49-F238E27FC236}">
-                <a16:creationId xmlns:a16="http://schemas.microsoft.com/office/drawing/2014/main" id="{B23F1F98-532D-ABB2-5410-DD5A2A497D1B}"/>
+                <a16:creationId xmlns:a16="http://schemas.microsoft.com/office/drawing/2014/main" id="{5BA6F976-0B28-225A-2CE4-295D93B80657}"/>
               </a:ext>
             </a:extLst>
           </p:cNvPr>
@@ -6126,96 +6181,83 @@
               <a:rPr lang="en-NL" dirty="0"/>
               <a:t>High-fi version control : Git with Github</a:t>
             </a:r>
-            <a:br>
+          </a:p>
+        </p:txBody>
+      </p:sp>
+      <p:sp>
+        <p:nvSpPr>
+          <p:cNvPr id="3" name="Content Placeholder 2">
+            <a:extLst>
+              <a:ext uri="{FF2B5EF4-FFF2-40B4-BE49-F238E27FC236}">
+                <a16:creationId xmlns:a16="http://schemas.microsoft.com/office/drawing/2014/main" id="{D98C64F1-D4B8-F0EF-8C83-CF9E4E44089E}"/>
+              </a:ext>
+            </a:extLst>
+          </p:cNvPr>
+          <p:cNvSpPr>
+            <a:spLocks noGrp="1"/>
+          </p:cNvSpPr>
+          <p:nvPr>
+            <p:ph idx="1"/>
+          </p:nvPr>
+        </p:nvSpPr>
+        <p:spPr>
+          <a:xfrm>
+            <a:off x="838200" y="1690688"/>
+            <a:ext cx="10515600" cy="4486275"/>
+          </a:xfrm>
+        </p:spPr>
+        <p:txBody>
+          <a:bodyPr/>
+          <a:lstStyle/>
+          <a:p>
+            <a:pPr marL="0" indent="0">
+              <a:buNone/>
+            </a:pPr>
+            <a:r>
+              <a:rPr lang="en-GB" dirty="0"/>
+              <a:t>C</a:t>
+            </a:r>
+            <a:r>
               <a:rPr lang="en-NL" dirty="0"/>
-            </a:br>
-            <a:endParaRPr lang="en-NL" dirty="0"/>
-          </a:p>
-        </p:txBody>
-      </p:sp>
-      <p:sp>
-        <p:nvSpPr>
-          <p:cNvPr id="3" name="Content Placeholder 2">
-            <a:extLst>
-              <a:ext uri="{FF2B5EF4-FFF2-40B4-BE49-F238E27FC236}">
-                <a16:creationId xmlns:a16="http://schemas.microsoft.com/office/drawing/2014/main" id="{99CAB18F-DF42-3D7D-8CE2-A7A676C890CB}"/>
-              </a:ext>
-            </a:extLst>
-          </p:cNvPr>
-          <p:cNvSpPr>
-            <a:spLocks noGrp="1"/>
-          </p:cNvSpPr>
-          <p:nvPr>
-            <p:ph idx="1"/>
-          </p:nvPr>
-        </p:nvSpPr>
-        <p:spPr/>
-        <p:txBody>
-          <a:bodyPr/>
-          <a:lstStyle/>
-          <a:p>
-            <a:pPr rtl="0" fontAlgn="base">
-              <a:spcBef>
-                <a:spcPts val="0"/>
-              </a:spcBef>
-              <a:spcAft>
-                <a:spcPts val="0"/>
-              </a:spcAft>
-              <a:buFont typeface="Arial" panose="020B0604020202020204" pitchFamily="34" charset="0"/>
-              <a:buChar char="•"/>
-            </a:pPr>
-            <a:r>
-              <a:rPr lang="en-GB" sz="2400" b="0" i="0" u="none" strike="noStrike" dirty="0">
-                <a:effectLst/>
-                <a:latin typeface="Trebuchet MS" panose="020B0703020202090204" pitchFamily="34" charset="0"/>
-              </a:rPr>
-              <a:t>Git handles version control on your repo</a:t>
-            </a:r>
-          </a:p>
-          <a:p>
-            <a:pPr rtl="0" fontAlgn="base">
-              <a:spcBef>
-                <a:spcPts val="0"/>
-              </a:spcBef>
-              <a:spcAft>
-                <a:spcPts val="0"/>
-              </a:spcAft>
-              <a:buFont typeface="Arial" panose="020B0604020202020204" pitchFamily="34" charset="0"/>
-              <a:buChar char="•"/>
-            </a:pPr>
-            <a:endParaRPr lang="en-GB" sz="2400" b="0" i="0" u="none" strike="noStrike" dirty="0">
-              <a:effectLst/>
-              <a:latin typeface="Trebuchet MS" panose="020B0703020202090204" pitchFamily="34" charset="0"/>
-            </a:endParaRPr>
-          </a:p>
-          <a:p>
-            <a:pPr rtl="0" fontAlgn="base">
-              <a:spcBef>
-                <a:spcPts val="0"/>
-              </a:spcBef>
-              <a:spcAft>
-                <a:spcPts val="1600"/>
-              </a:spcAft>
-              <a:buFont typeface="Arial" panose="020B0604020202020204" pitchFamily="34" charset="0"/>
-              <a:buChar char="•"/>
-            </a:pPr>
-            <a:r>
-              <a:rPr lang="en-GB" sz="2400" b="0" i="0" u="none" strike="noStrike" dirty="0">
-                <a:effectLst/>
-                <a:latin typeface="Trebuchet MS" panose="020B0703020202090204" pitchFamily="34" charset="0"/>
-              </a:rPr>
-              <a:t>When you use GitHub, Git is working behind the scenes.</a:t>
-            </a:r>
-          </a:p>
-          <a:p>
-            <a:endParaRPr lang="en-NL" dirty="0"/>
+              <a:t>ons</a:t>
+            </a:r>
+          </a:p>
+          <a:p>
+            <a:r>
+              <a:rPr lang="en-GB" dirty="0"/>
+              <a:t>D</a:t>
+            </a:r>
+            <a:r>
+              <a:rPr lang="en-NL" dirty="0"/>
+              <a:t>esigned for and by IT crowd</a:t>
+            </a:r>
+          </a:p>
+          <a:p>
+            <a:r>
+              <a:rPr lang="en-GB" dirty="0"/>
+              <a:t>P</a:t>
+            </a:r>
+            <a:r>
+              <a:rPr lang="en-NL" dirty="0"/>
+              <a:t>refers text files (but can handle all)</a:t>
+            </a:r>
+          </a:p>
+          <a:p>
+            <a:r>
+              <a:rPr lang="en-GB" dirty="0"/>
+              <a:t>N</a:t>
+            </a:r>
+            <a:r>
+              <a:rPr lang="en-NL" dirty="0"/>
+              <a:t>o automatic syncing </a:t>
+            </a:r>
           </a:p>
         </p:txBody>
       </p:sp>
     </p:spTree>
     <p:extLst>
       <p:ext uri="{BB962C8B-B14F-4D97-AF65-F5344CB8AC3E}">
-        <p14:creationId xmlns:p14="http://schemas.microsoft.com/office/powerpoint/2010/main" val="3607726894"/>
+        <p14:creationId xmlns:p14="http://schemas.microsoft.com/office/powerpoint/2010/main" val="639242225"/>
       </p:ext>
     </p:extLst>
   </p:cSld>
@@ -6247,7 +6289,7 @@
           <p:cNvPr id="2" name="Title 1">
             <a:extLst>
               <a:ext uri="{FF2B5EF4-FFF2-40B4-BE49-F238E27FC236}">
-                <a16:creationId xmlns:a16="http://schemas.microsoft.com/office/drawing/2014/main" id="{5BA6F976-0B28-225A-2CE4-295D93B80657}"/>
+                <a16:creationId xmlns:a16="http://schemas.microsoft.com/office/drawing/2014/main" id="{97A1BDC4-9D12-C835-2B23-559522E7C169}"/>
               </a:ext>
             </a:extLst>
           </p:cNvPr>
@@ -6275,7 +6317,7 @@
           <p:cNvPr id="3" name="Content Placeholder 2">
             <a:extLst>
               <a:ext uri="{FF2B5EF4-FFF2-40B4-BE49-F238E27FC236}">
-                <a16:creationId xmlns:a16="http://schemas.microsoft.com/office/drawing/2014/main" id="{D98C64F1-D4B8-F0EF-8C83-CF9E4E44089E}"/>
+                <a16:creationId xmlns:a16="http://schemas.microsoft.com/office/drawing/2014/main" id="{30A679FB-C3CD-E8FE-C907-60AA53D7F45B}"/>
               </a:ext>
             </a:extLst>
           </p:cNvPr>
@@ -6286,64 +6328,82 @@
             <p:ph idx="1"/>
           </p:nvPr>
         </p:nvSpPr>
-        <p:spPr>
-          <a:xfrm>
-            <a:off x="838200" y="1690688"/>
-            <a:ext cx="10515600" cy="4486275"/>
-          </a:xfrm>
-        </p:spPr>
-        <p:txBody>
-          <a:bodyPr/>
+        <p:spPr/>
+        <p:txBody>
+          <a:bodyPr>
+            <a:normAutofit/>
+          </a:bodyPr>
           <a:lstStyle/>
           <a:p>
             <a:pPr marL="0" indent="0">
               <a:buNone/>
             </a:pPr>
             <a:r>
-              <a:rPr lang="en-GB" dirty="0"/>
-              <a:t>C</a:t>
-            </a:r>
-            <a:r>
-              <a:rPr lang="en-NL" dirty="0"/>
-              <a:t>ons</a:t>
-            </a:r>
-          </a:p>
-          <a:p>
-            <a:r>
-              <a:rPr lang="en-GB" dirty="0"/>
-              <a:t>D</a:t>
-            </a:r>
-            <a:r>
-              <a:rPr lang="en-NL" dirty="0"/>
-              <a:t>esigned for and by IT crowd</a:t>
-            </a:r>
-          </a:p>
-          <a:p>
-            <a:r>
-              <a:rPr lang="en-GB" dirty="0"/>
-              <a:t>P</a:t>
-            </a:r>
-            <a:r>
-              <a:rPr lang="en-NL" dirty="0"/>
-              <a:t>refers text files (but can handle all)</a:t>
-            </a:r>
-          </a:p>
-          <a:p>
-            <a:r>
-              <a:rPr lang="en-GB" dirty="0"/>
+              <a:rPr lang="en-GB" sz="2400" dirty="0"/>
+              <a:t>Pros:</a:t>
+            </a:r>
+          </a:p>
+          <a:p>
+            <a:r>
+              <a:rPr lang="en-GB" sz="2400" dirty="0"/>
               <a:t>N</a:t>
             </a:r>
             <a:r>
-              <a:rPr lang="en-NL" dirty="0"/>
-              <a:t>o automatic syncing </a:t>
-            </a:r>
+              <a:rPr lang="en-NL" sz="2400" dirty="0"/>
+              <a:t>o automatic syncing! You are in control </a:t>
+            </a:r>
+            <a:endParaRPr lang="en-GB" sz="2400" dirty="0"/>
+          </a:p>
+          <a:p>
+            <a:r>
+              <a:rPr lang="en-GB" sz="2400" dirty="0"/>
+              <a:t>Go back to a working version (releases)</a:t>
+            </a:r>
+          </a:p>
+          <a:p>
+            <a:r>
+              <a:rPr lang="en-GB" sz="2400" dirty="0"/>
+              <a:t>Work on stuff without breaking the working version (branches)</a:t>
+            </a:r>
+          </a:p>
+          <a:p>
+            <a:r>
+              <a:rPr lang="en-GB" sz="2400" dirty="0"/>
+              <a:t>W</a:t>
+            </a:r>
+            <a:r>
+              <a:rPr lang="en-NL" sz="2400" dirty="0"/>
+              <a:t>hen you find a bug, you can retrace when it was (meta data on changes)</a:t>
+            </a:r>
+            <a:endParaRPr lang="en-GB" sz="2400" dirty="0"/>
+          </a:p>
+          <a:p>
+            <a:r>
+              <a:rPr lang="en-GB" sz="2400" dirty="0"/>
+              <a:t>W</a:t>
+            </a:r>
+            <a:r>
+              <a:rPr lang="en-NL" sz="2400" dirty="0"/>
+              <a:t>ork on the same file with multiple people and have git solve the merging .. </a:t>
+            </a:r>
+            <a:r>
+              <a:rPr lang="en-GB" sz="2400" dirty="0"/>
+              <a:t>a</a:t>
+            </a:r>
+            <a:r>
+              <a:rPr lang="en-NL" sz="2400" dirty="0"/>
+              <a:t>lso when you worked offline and upload later (distributed)</a:t>
+            </a:r>
+          </a:p>
+          <a:p>
+            <a:endParaRPr lang="en-NL" sz="2400" dirty="0"/>
           </a:p>
         </p:txBody>
       </p:sp>
     </p:spTree>
     <p:extLst>
       <p:ext uri="{BB962C8B-B14F-4D97-AF65-F5344CB8AC3E}">
-        <p14:creationId xmlns:p14="http://schemas.microsoft.com/office/powerpoint/2010/main" val="639242225"/>
+        <p14:creationId xmlns:p14="http://schemas.microsoft.com/office/powerpoint/2010/main" val="1936265544"/>
       </p:ext>
     </p:extLst>
   </p:cSld>
@@ -6535,12 +6595,57 @@
           <a:chExt cx="0" cy="0"/>
         </a:xfrm>
       </p:grpSpPr>
+      <p:pic>
+        <p:nvPicPr>
+          <p:cNvPr id="4" name="Picture 2">
+            <a:extLst>
+              <a:ext uri="{FF2B5EF4-FFF2-40B4-BE49-F238E27FC236}">
+                <a16:creationId xmlns:a16="http://schemas.microsoft.com/office/drawing/2014/main" id="{532D4E50-D8FB-432F-9A74-A856B26CC7F7}"/>
+              </a:ext>
+            </a:extLst>
+          </p:cNvPr>
+          <p:cNvPicPr>
+            <a:picLocks noChangeAspect="1" noChangeArrowheads="1"/>
+          </p:cNvPicPr>
+          <p:nvPr/>
+        </p:nvPicPr>
+        <p:blipFill rotWithShape="1">
+          <a:blip r:embed="rId2">
+            <a:extLst>
+              <a:ext uri="{28A0092B-C50C-407E-A947-70E740481C1C}">
+                <a14:useLocalDpi xmlns:a14="http://schemas.microsoft.com/office/drawing/2010/main" val="0"/>
+              </a:ext>
+            </a:extLst>
+          </a:blip>
+          <a:srcRect l="43288"/>
+          <a:stretch/>
+        </p:blipFill>
+        <p:spPr bwMode="auto">
+          <a:xfrm>
+            <a:off x="3694485" y="365125"/>
+            <a:ext cx="8324538" cy="6452682"/>
+          </a:xfrm>
+          <a:prstGeom prst="rect">
+            <a:avLst/>
+          </a:prstGeom>
+          <a:noFill/>
+          <a:extLst>
+            <a:ext uri="{909E8E84-426E-40DD-AFC4-6F175D3DCCD1}">
+              <a14:hiddenFill xmlns:a14="http://schemas.microsoft.com/office/drawing/2010/main">
+                <a:solidFill>
+                  <a:srgbClr val="FFFFFF"/>
+                </a:solidFill>
+              </a14:hiddenFill>
+            </a:ext>
+          </a:extLst>
+        </p:spPr>
+      </p:pic>
       <p:sp>
         <p:nvSpPr>
           <p:cNvPr id="2" name="Title 1">
             <a:extLst>
               <a:ext uri="{FF2B5EF4-FFF2-40B4-BE49-F238E27FC236}">
-                <a16:creationId xmlns:a16="http://schemas.microsoft.com/office/drawing/2014/main" id="{97A1BDC4-9D12-C835-2B23-559522E7C169}"/>
+                <a16:creationId xmlns:a16="http://schemas.microsoft.com/office/drawing/2014/main" id="{A8A032CF-C64F-87C2-7D19-CD16E62C77B9}"/>
               </a:ext>
             </a:extLst>
           </p:cNvPr>
@@ -6557,8 +6662,12 @@
           <a:lstStyle/>
           <a:p>
             <a:r>
+              <a:rPr lang="en-GB" dirty="0"/>
+              <a:t>D</a:t>
+            </a:r>
+            <a:r>
               <a:rPr lang="en-NL" dirty="0"/>
-              <a:t>High-fi version control : Git</a:t>
+              <a:t>istributed?</a:t>
             </a:r>
           </a:p>
         </p:txBody>
@@ -6568,7 +6677,7 @@
           <p:cNvPr id="3" name="Content Placeholder 2">
             <a:extLst>
               <a:ext uri="{FF2B5EF4-FFF2-40B4-BE49-F238E27FC236}">
-                <a16:creationId xmlns:a16="http://schemas.microsoft.com/office/drawing/2014/main" id="{30A679FB-C3CD-E8FE-C907-60AA53D7F45B}"/>
+                <a16:creationId xmlns:a16="http://schemas.microsoft.com/office/drawing/2014/main" id="{CFB37296-ADF3-6271-73DC-3F98A34A4047}"/>
               </a:ext>
             </a:extLst>
           </p:cNvPr>
@@ -6579,81 +6688,61 @@
             <p:ph idx="1"/>
           </p:nvPr>
         </p:nvSpPr>
-        <p:spPr/>
+        <p:spPr>
+          <a:xfrm>
+            <a:off x="172978" y="1825625"/>
+            <a:ext cx="3521508" cy="4351338"/>
+          </a:xfrm>
+        </p:spPr>
         <p:txBody>
           <a:bodyPr>
             <a:normAutofit/>
           </a:bodyPr>
           <a:lstStyle/>
           <a:p>
+            <a:r>
+              <a:rPr lang="en-GB" sz="2400" dirty="0"/>
+              <a:t>Y</a:t>
+            </a:r>
+            <a:r>
+              <a:rPr lang="en-NL" sz="2400" dirty="0"/>
+              <a:t>ou do not add changes directly to the base camp (aka github)</a:t>
+            </a:r>
+          </a:p>
+          <a:p>
+            <a:endParaRPr lang="en-NL" sz="2400" dirty="0"/>
+          </a:p>
+          <a:p>
             <a:pPr marL="0" indent="0">
               <a:buNone/>
             </a:pPr>
             <a:r>
               <a:rPr lang="en-GB" sz="2400" dirty="0"/>
-              <a:t>Pros:</a:t>
-            </a:r>
-          </a:p>
-          <a:p>
-            <a:r>
-              <a:rPr lang="en-GB" sz="2400" dirty="0"/>
               <a:t>N</a:t>
             </a:r>
             <a:r>
               <a:rPr lang="en-NL" sz="2400" dirty="0"/>
-              <a:t>o automatic syncing! You are in control </a:t>
-            </a:r>
-            <a:endParaRPr lang="en-GB" sz="2400" dirty="0"/>
-          </a:p>
-          <a:p>
-            <a:r>
-              <a:rPr lang="en-GB" sz="2400" dirty="0"/>
-              <a:t>Go back to a working version (releases)</a:t>
-            </a:r>
-          </a:p>
-          <a:p>
-            <a:r>
-              <a:rPr lang="en-GB" sz="2400" dirty="0"/>
-              <a:t>Work on stuff without breaking the working version (branches)</a:t>
-            </a:r>
-          </a:p>
-          <a:p>
-            <a:r>
-              <a:rPr lang="en-GB" sz="2400" dirty="0"/>
-              <a:t>W</a:t>
-            </a:r>
+              <a:t>o single point of failure:</a:t>
+            </a:r>
+          </a:p>
+          <a:p>
             <a:r>
               <a:rPr lang="en-NL" sz="2400" dirty="0"/>
-              <a:t>ork on the same file with multiple people and have git solve the merging .. </a:t>
-            </a:r>
-            <a:r>
-              <a:rPr lang="en-GB" sz="2400" dirty="0"/>
-              <a:t>a</a:t>
-            </a:r>
+              <a:t>Every local repo is a backup</a:t>
+            </a:r>
+          </a:p>
+          <a:p>
             <a:r>
               <a:rPr lang="en-NL" sz="2400" dirty="0"/>
-              <a:t>lso when you worked offline and upload later (distributed)</a:t>
-            </a:r>
-          </a:p>
-          <a:p>
-            <a:r>
-              <a:rPr lang="en-GB" sz="2400" dirty="0"/>
-              <a:t>W</a:t>
-            </a:r>
-            <a:r>
-              <a:rPr lang="en-NL" sz="2400" dirty="0"/>
-              <a:t>hen you find a bug, you can retrace when it was (meta data on changes)</a:t>
-            </a:r>
-          </a:p>
-          <a:p>
-            <a:endParaRPr lang="en-NL" sz="2400" dirty="0"/>
+              <a:t>You can mess up locally</a:t>
+            </a:r>
           </a:p>
         </p:txBody>
       </p:sp>
     </p:spTree>
     <p:extLst>
       <p:ext uri="{BB962C8B-B14F-4D97-AF65-F5344CB8AC3E}">
-        <p14:creationId xmlns:p14="http://schemas.microsoft.com/office/powerpoint/2010/main" val="1936265544"/>
+        <p14:creationId xmlns:p14="http://schemas.microsoft.com/office/powerpoint/2010/main" val="176230377"/>
       </p:ext>
     </p:extLst>
   </p:cSld>
@@ -6680,71 +6769,107 @@
           <a:chExt cx="0" cy="0"/>
         </a:xfrm>
       </p:grpSpPr>
-      <p:pic>
-        <p:nvPicPr>
-          <p:cNvPr id="4" name="Picture 2">
-            <a:extLst>
-              <a:ext uri="{FF2B5EF4-FFF2-40B4-BE49-F238E27FC236}">
-                <a16:creationId xmlns:a16="http://schemas.microsoft.com/office/drawing/2014/main" id="{532D4E50-D8FB-432F-9A74-A856B26CC7F7}"/>
-              </a:ext>
-            </a:extLst>
-          </p:cNvPr>
-          <p:cNvPicPr>
-            <a:picLocks noChangeAspect="1" noChangeArrowheads="1"/>
-          </p:cNvPicPr>
-          <p:nvPr/>
-        </p:nvPicPr>
-        <p:blipFill rotWithShape="1">
-          <a:blip r:embed="rId2">
-            <a:extLst>
-              <a:ext uri="{28A0092B-C50C-407E-A947-70E740481C1C}">
-                <a14:useLocalDpi xmlns:a14="http://schemas.microsoft.com/office/drawing/2010/main" val="0"/>
-              </a:ext>
-            </a:extLst>
-          </a:blip>
-          <a:srcRect l="43288"/>
-          <a:stretch/>
-        </p:blipFill>
-        <p:spPr bwMode="auto">
-          <a:xfrm>
-            <a:off x="3694485" y="365125"/>
-            <a:ext cx="8324538" cy="6452682"/>
-          </a:xfrm>
-          <a:prstGeom prst="rect">
-            <a:avLst/>
-          </a:prstGeom>
-          <a:noFill/>
-          <a:extLst>
-            <a:ext uri="{909E8E84-426E-40DD-AFC4-6F175D3DCCD1}">
-              <a14:hiddenFill xmlns:a14="http://schemas.microsoft.com/office/drawing/2010/main">
+      <p:sp>
+        <p:nvSpPr>
+          <p:cNvPr id="2" name="Title 1">
+            <a:extLst>
+              <a:ext uri="{FF2B5EF4-FFF2-40B4-BE49-F238E27FC236}">
+                <a16:creationId xmlns:a16="http://schemas.microsoft.com/office/drawing/2014/main" id="{E5E3E03F-A95A-B88C-94EF-4B39278CDFAE}"/>
+              </a:ext>
+            </a:extLst>
+          </p:cNvPr>
+          <p:cNvSpPr>
+            <a:spLocks noGrp="1"/>
+          </p:cNvSpPr>
+          <p:nvPr>
+            <p:ph type="title"/>
+          </p:nvPr>
+        </p:nvSpPr>
+        <p:spPr/>
+        <p:txBody>
+          <a:bodyPr/>
+          <a:lstStyle/>
+          <a:p>
+            <a:r>
+              <a:rPr lang="en-NL" dirty="0"/>
+              <a:t>When to use github</a:t>
+            </a:r>
+          </a:p>
+        </p:txBody>
+      </p:sp>
+      <p:sp>
+        <p:nvSpPr>
+          <p:cNvPr id="3" name="Content Placeholder 2">
+            <a:extLst>
+              <a:ext uri="{FF2B5EF4-FFF2-40B4-BE49-F238E27FC236}">
+                <a16:creationId xmlns:a16="http://schemas.microsoft.com/office/drawing/2014/main" id="{ED6CF073-87C8-6B8F-C260-B84B8823EB4F}"/>
+              </a:ext>
+            </a:extLst>
+          </p:cNvPr>
+          <p:cNvSpPr>
+            <a:spLocks noGrp="1"/>
+          </p:cNvSpPr>
+          <p:nvPr>
+            <p:ph idx="1"/>
+          </p:nvPr>
+        </p:nvSpPr>
+        <p:spPr/>
+        <p:txBody>
+          <a:bodyPr/>
+          <a:lstStyle/>
+          <a:p>
+            <a:r>
+              <a:rPr lang="en-GB" dirty="0"/>
+              <a:t>L</a:t>
+            </a:r>
+            <a:r>
+              <a:rPr lang="en-NL" dirty="0"/>
+              <a:t>iving project: github</a:t>
+            </a:r>
+          </a:p>
+          <a:p>
+            <a:pPr lvl="1"/>
+            <a:r>
+              <a:rPr lang="en-GB" b="0" i="0" dirty="0">
                 <a:solidFill>
-                  <a:srgbClr val="FFFFFF"/>
+                  <a:srgbClr val="000000"/>
                 </a:solidFill>
-              </a14:hiddenFill>
-            </a:ext>
-          </a:extLst>
-        </p:spPr>
-      </p:pic>
-      <p:sp>
-        <p:nvSpPr>
-          <p:cNvPr id="2" name="Title 1">
-            <a:extLst>
-              <a:ext uri="{FF2B5EF4-FFF2-40B4-BE49-F238E27FC236}">
-                <a16:creationId xmlns:a16="http://schemas.microsoft.com/office/drawing/2014/main" id="{A8A032CF-C64F-87C2-7D19-CD16E62C77B9}"/>
-              </a:ext>
-            </a:extLst>
-          </p:cNvPr>
-          <p:cNvSpPr>
-            <a:spLocks noGrp="1"/>
-          </p:cNvSpPr>
-          <p:nvPr>
-            <p:ph type="title"/>
-          </p:nvPr>
-        </p:nvSpPr>
-        <p:spPr/>
-        <p:txBody>
-          <a:bodyPr/>
-          <a:lstStyle/>
+                <a:effectLst/>
+                <a:latin typeface="Fira Sans" panose="020B0503050000020004" pitchFamily="34" charset="0"/>
+              </a:rPr>
+              <a:t>Version control</a:t>
+            </a:r>
+          </a:p>
+          <a:p>
+            <a:pPr lvl="1"/>
+            <a:r>
+              <a:rPr lang="en-GB" b="0" i="0" dirty="0">
+                <a:solidFill>
+                  <a:srgbClr val="000000"/>
+                </a:solidFill>
+                <a:effectLst/>
+                <a:latin typeface="Fira Sans" panose="020B0503050000020004" pitchFamily="34" charset="0"/>
+              </a:rPr>
+              <a:t>allows publication of different releases</a:t>
+            </a:r>
+          </a:p>
+          <a:p>
+            <a:pPr lvl="1"/>
+            <a:r>
+              <a:rPr lang="en-GB" b="0" i="0" dirty="0">
+                <a:solidFill>
+                  <a:srgbClr val="000000"/>
+                </a:solidFill>
+                <a:effectLst/>
+                <a:latin typeface="Fira Sans" panose="020B0503050000020004" pitchFamily="34" charset="0"/>
+              </a:rPr>
+              <a:t>platform for collaboration</a:t>
+            </a:r>
+            <a:endParaRPr lang="en-NL" dirty="0"/>
+          </a:p>
+          <a:p>
+            <a:endParaRPr lang="en-NL" dirty="0"/>
+          </a:p>
           <a:p>
             <a:r>
               <a:rPr lang="en-GB" dirty="0"/>
@@ -6752,74 +6877,28 @@
             </a:r>
             <a:r>
               <a:rPr lang="en-NL" dirty="0"/>
-              <a:t>istributed?</a:t>
-            </a:r>
-          </a:p>
-        </p:txBody>
-      </p:sp>
-      <p:sp>
-        <p:nvSpPr>
-          <p:cNvPr id="3" name="Content Placeholder 2">
-            <a:extLst>
-              <a:ext uri="{FF2B5EF4-FFF2-40B4-BE49-F238E27FC236}">
-                <a16:creationId xmlns:a16="http://schemas.microsoft.com/office/drawing/2014/main" id="{CFB37296-ADF3-6271-73DC-3F98A34A4047}"/>
-              </a:ext>
-            </a:extLst>
-          </p:cNvPr>
-          <p:cNvSpPr>
-            <a:spLocks noGrp="1"/>
-          </p:cNvSpPr>
-          <p:nvPr>
-            <p:ph idx="1"/>
-          </p:nvPr>
-        </p:nvSpPr>
-        <p:spPr>
-          <a:xfrm>
-            <a:off x="172978" y="1825625"/>
-            <a:ext cx="3521508" cy="4351338"/>
-          </a:xfrm>
-        </p:spPr>
-        <p:txBody>
-          <a:bodyPr>
-            <a:normAutofit/>
-          </a:bodyPr>
-          <a:lstStyle/>
-          <a:p>
-            <a:r>
-              <a:rPr lang="en-GB" sz="2400" dirty="0"/>
-              <a:t>Y</a:t>
-            </a:r>
-            <a:r>
-              <a:rPr lang="en-NL" sz="2400" dirty="0"/>
-              <a:t>ou do not add changes directly to the base camp (aka github)</a:t>
-            </a:r>
-          </a:p>
-          <a:p>
-            <a:endParaRPr lang="en-NL" sz="2400" dirty="0"/>
-          </a:p>
-          <a:p>
-            <a:pPr marL="0" indent="0">
-              <a:buNone/>
-            </a:pPr>
-            <a:r>
-              <a:rPr lang="en-GB" sz="2400" dirty="0"/>
-              <a:t>N</a:t>
-            </a:r>
-            <a:r>
-              <a:rPr lang="en-NL" sz="2400" dirty="0"/>
-              <a:t>o single point of failure:</a:t>
-            </a:r>
-          </a:p>
-          <a:p>
-            <a:r>
-              <a:rPr lang="en-NL" sz="2400" dirty="0"/>
-              <a:t>Every local repo is a backup</a:t>
-            </a:r>
-          </a:p>
-          <a:p>
-            <a:r>
-              <a:rPr lang="en-NL" sz="2400" dirty="0"/>
-              <a:t>You can mess up locally</a:t>
+              <a:t>one: repositories such as OSF</a:t>
+            </a:r>
+          </a:p>
+          <a:p>
+            <a:pPr lvl="1"/>
+            <a:r>
+              <a:rPr lang="en-GB" dirty="0"/>
+              <a:t>Why </a:t>
+            </a:r>
+            <a:r>
+              <a:rPr lang="en-GB" dirty="0">
+                <a:sym typeface="Wingdings" pitchFamily="2" charset="2"/>
+              </a:rPr>
+              <a:t> </a:t>
+            </a:r>
+            <a:r>
+              <a:rPr lang="en-GB" dirty="0"/>
+              <a:t>G</a:t>
+            </a:r>
+            <a:r>
+              <a:rPr lang="en-NL" dirty="0"/>
+              <a:t>ives a doi : makes code citeable </a:t>
             </a:r>
           </a:p>
         </p:txBody>
@@ -6827,7 +6906,7 @@
     </p:spTree>
     <p:extLst>
       <p:ext uri="{BB962C8B-B14F-4D97-AF65-F5344CB8AC3E}">
-        <p14:creationId xmlns:p14="http://schemas.microsoft.com/office/powerpoint/2010/main" val="176230377"/>
+        <p14:creationId xmlns:p14="http://schemas.microsoft.com/office/powerpoint/2010/main" val="1796995553"/>
       </p:ext>
     </p:extLst>
   </p:cSld>
@@ -6859,170 +6938,6 @@
           <p:cNvPr id="2" name="Title 1">
             <a:extLst>
               <a:ext uri="{FF2B5EF4-FFF2-40B4-BE49-F238E27FC236}">
-                <a16:creationId xmlns:a16="http://schemas.microsoft.com/office/drawing/2014/main" id="{E5E3E03F-A95A-B88C-94EF-4B39278CDFAE}"/>
-              </a:ext>
-            </a:extLst>
-          </p:cNvPr>
-          <p:cNvSpPr>
-            <a:spLocks noGrp="1"/>
-          </p:cNvSpPr>
-          <p:nvPr>
-            <p:ph type="title"/>
-          </p:nvPr>
-        </p:nvSpPr>
-        <p:spPr/>
-        <p:txBody>
-          <a:bodyPr/>
-          <a:lstStyle/>
-          <a:p>
-            <a:r>
-              <a:rPr lang="en-NL" dirty="0"/>
-              <a:t>Where do you publish code?</a:t>
-            </a:r>
-          </a:p>
-        </p:txBody>
-      </p:sp>
-      <p:sp>
-        <p:nvSpPr>
-          <p:cNvPr id="3" name="Content Placeholder 2">
-            <a:extLst>
-              <a:ext uri="{FF2B5EF4-FFF2-40B4-BE49-F238E27FC236}">
-                <a16:creationId xmlns:a16="http://schemas.microsoft.com/office/drawing/2014/main" id="{ED6CF073-87C8-6B8F-C260-B84B8823EB4F}"/>
-              </a:ext>
-            </a:extLst>
-          </p:cNvPr>
-          <p:cNvSpPr>
-            <a:spLocks noGrp="1"/>
-          </p:cNvSpPr>
-          <p:nvPr>
-            <p:ph idx="1"/>
-          </p:nvPr>
-        </p:nvSpPr>
-        <p:spPr/>
-        <p:txBody>
-          <a:bodyPr/>
-          <a:lstStyle/>
-          <a:p>
-            <a:r>
-              <a:rPr lang="en-GB" dirty="0"/>
-              <a:t>L</a:t>
-            </a:r>
-            <a:r>
-              <a:rPr lang="en-NL" dirty="0"/>
-              <a:t>iving project: github</a:t>
-            </a:r>
-          </a:p>
-          <a:p>
-            <a:pPr lvl="1"/>
-            <a:r>
-              <a:rPr lang="en-GB" b="0" i="0" dirty="0">
-                <a:solidFill>
-                  <a:srgbClr val="000000"/>
-                </a:solidFill>
-                <a:effectLst/>
-                <a:latin typeface="Fira Sans" panose="020B0503050000020004" pitchFamily="34" charset="0"/>
-              </a:rPr>
-              <a:t>Version control</a:t>
-            </a:r>
-          </a:p>
-          <a:p>
-            <a:pPr lvl="1"/>
-            <a:r>
-              <a:rPr lang="en-GB" b="0" i="0" dirty="0">
-                <a:solidFill>
-                  <a:srgbClr val="000000"/>
-                </a:solidFill>
-                <a:effectLst/>
-                <a:latin typeface="Fira Sans" panose="020B0503050000020004" pitchFamily="34" charset="0"/>
-              </a:rPr>
-              <a:t>allows publication of different releases</a:t>
-            </a:r>
-          </a:p>
-          <a:p>
-            <a:pPr lvl="1"/>
-            <a:r>
-              <a:rPr lang="en-GB" b="0" i="0" dirty="0">
-                <a:solidFill>
-                  <a:srgbClr val="000000"/>
-                </a:solidFill>
-                <a:effectLst/>
-                <a:latin typeface="Fira Sans" panose="020B0503050000020004" pitchFamily="34" charset="0"/>
-              </a:rPr>
-              <a:t>platform for collaboration</a:t>
-            </a:r>
-            <a:endParaRPr lang="en-NL" dirty="0"/>
-          </a:p>
-          <a:p>
-            <a:endParaRPr lang="en-NL" dirty="0"/>
-          </a:p>
-          <a:p>
-            <a:r>
-              <a:rPr lang="en-GB" dirty="0"/>
-              <a:t>D</a:t>
-            </a:r>
-            <a:r>
-              <a:rPr lang="en-NL" dirty="0"/>
-              <a:t>one: repositories such as OSF</a:t>
-            </a:r>
-          </a:p>
-          <a:p>
-            <a:pPr lvl="1"/>
-            <a:r>
-              <a:rPr lang="en-GB" dirty="0"/>
-              <a:t>Why </a:t>
-            </a:r>
-            <a:r>
-              <a:rPr lang="en-GB" dirty="0">
-                <a:sym typeface="Wingdings" pitchFamily="2" charset="2"/>
-              </a:rPr>
-              <a:t> </a:t>
-            </a:r>
-            <a:r>
-              <a:rPr lang="en-GB" dirty="0"/>
-              <a:t>G</a:t>
-            </a:r>
-            <a:r>
-              <a:rPr lang="en-NL" dirty="0"/>
-              <a:t>ives a doi : makes code citeable </a:t>
-            </a:r>
-          </a:p>
-        </p:txBody>
-      </p:sp>
-    </p:spTree>
-    <p:extLst>
-      <p:ext uri="{BB962C8B-B14F-4D97-AF65-F5344CB8AC3E}">
-        <p14:creationId xmlns:p14="http://schemas.microsoft.com/office/powerpoint/2010/main" val="1796995553"/>
-      </p:ext>
-    </p:extLst>
-  </p:cSld>
-  <p:clrMapOvr>
-    <a:masterClrMapping/>
-  </p:clrMapOvr>
-</p:sld>
-</file>
-
-<file path=ppt/slides/slide23.xml><?xml version="1.0" encoding="utf-8"?>
-<p:sld xmlns:a="http://schemas.openxmlformats.org/drawingml/2006/main" xmlns:r="http://schemas.openxmlformats.org/officeDocument/2006/relationships" xmlns:p="http://schemas.openxmlformats.org/presentationml/2006/main">
-  <p:cSld>
-    <p:spTree>
-      <p:nvGrpSpPr>
-        <p:cNvPr id="1" name=""/>
-        <p:cNvGrpSpPr/>
-        <p:nvPr/>
-      </p:nvGrpSpPr>
-      <p:grpSpPr>
-        <a:xfrm>
-          <a:off x="0" y="0"/>
-          <a:ext cx="0" cy="0"/>
-          <a:chOff x="0" y="0"/>
-          <a:chExt cx="0" cy="0"/>
-        </a:xfrm>
-      </p:grpSpPr>
-      <p:sp>
-        <p:nvSpPr>
-          <p:cNvPr id="2" name="Title 1">
-            <a:extLst>
-              <a:ext uri="{FF2B5EF4-FFF2-40B4-BE49-F238E27FC236}">
                 <a16:creationId xmlns:a16="http://schemas.microsoft.com/office/drawing/2014/main" id="{F21C41D6-3F5F-936A-B859-CF4BB685A2D9}"/>
               </a:ext>
             </a:extLst>
@@ -7105,7 +7020,7 @@
 </p:sld>
 </file>
 
-<file path=ppt/slides/slide24.xml><?xml version="1.0" encoding="utf-8"?>
+<file path=ppt/slides/slide23.xml><?xml version="1.0" encoding="utf-8"?>
 <p:sld xmlns:a="http://schemas.openxmlformats.org/drawingml/2006/main" xmlns:r="http://schemas.openxmlformats.org/officeDocument/2006/relationships" xmlns:p="http://schemas.openxmlformats.org/presentationml/2006/main">
   <p:cSld>
     <p:spTree>
@@ -7257,7 +7172,7 @@
           <a:p>
             <a:r>
               <a:rPr lang="en-NL" dirty="0"/>
-              <a:t>Starting with github</a:t>
+              <a:t>Git/github: why would you use it?</a:t>
             </a:r>
           </a:p>
         </p:txBody>
@@ -7283,7 +7198,7 @@
           <a:bodyPr/>
           <a:lstStyle/>
           <a:p>
-            <a:endParaRPr lang="en-NL"/>
+            <a:endParaRPr lang="en-NL" dirty="0"/>
           </a:p>
         </p:txBody>
       </p:sp>
@@ -8207,7 +8122,7 @@
                   </a:schemeClr>
                 </a:solidFill>
               </a:rPr>
-              <a:t>deHaan_etal_Nature_try315_2019_01_18</a:t>
+              <a:t>deHaan_etal_Nature_hopelesstry315_2019_01_18.docx</a:t>
             </a:r>
           </a:p>
           <a:p>
@@ -8219,7 +8134,7 @@
                   </a:schemeClr>
                 </a:solidFill>
               </a:rPr>
-              <a:t>deHaan_etal_Nature_try315_2019_01_22</a:t>
+              <a:t>deHaan_etal_Nature_hopelesstry315_2019_01_22.docx</a:t>
             </a:r>
           </a:p>
           <a:p>
@@ -8231,7 +8146,7 @@
                   </a:schemeClr>
                 </a:solidFill>
               </a:rPr>
-              <a:t>deHaan_etal_Nature_try315_2019_02_01</a:t>
+              <a:t>deHaan_etal_Nature_hopelesstry315_2019_02_01.docx</a:t>
             </a:r>
           </a:p>
           <a:p>

</xml_diff>

<commit_message>
lesplan en ppt af for now
</commit_message>
<xml_diff>
--- a/powerpoints/github_part1.pptx
+++ b/powerpoints/github_part1.pptx
@@ -5,7 +5,7 @@
     <p:sldMasterId id="2147483648" r:id="rId1"/>
   </p:sldMasterIdLst>
   <p:notesMasterIdLst>
-    <p:notesMasterId r:id="rId25"/>
+    <p:notesMasterId r:id="rId32"/>
   </p:notesMasterIdLst>
   <p:sldIdLst>
     <p:sldId id="256" r:id="rId2"/>
@@ -21,16 +21,23 @@
     <p:sldId id="271" r:id="rId12"/>
     <p:sldId id="270" r:id="rId13"/>
     <p:sldId id="272" r:id="rId14"/>
-    <p:sldId id="262" r:id="rId15"/>
-    <p:sldId id="275" r:id="rId16"/>
-    <p:sldId id="276" r:id="rId17"/>
-    <p:sldId id="264" r:id="rId18"/>
-    <p:sldId id="273" r:id="rId19"/>
-    <p:sldId id="277" r:id="rId20"/>
-    <p:sldId id="267" r:id="rId21"/>
-    <p:sldId id="265" r:id="rId22"/>
-    <p:sldId id="280" r:id="rId23"/>
-    <p:sldId id="278" r:id="rId24"/>
+    <p:sldId id="285" r:id="rId15"/>
+    <p:sldId id="286" r:id="rId16"/>
+    <p:sldId id="287" r:id="rId17"/>
+    <p:sldId id="262" r:id="rId18"/>
+    <p:sldId id="275" r:id="rId19"/>
+    <p:sldId id="276" r:id="rId20"/>
+    <p:sldId id="264" r:id="rId21"/>
+    <p:sldId id="273" r:id="rId22"/>
+    <p:sldId id="277" r:id="rId23"/>
+    <p:sldId id="288" r:id="rId24"/>
+    <p:sldId id="267" r:id="rId25"/>
+    <p:sldId id="265" r:id="rId26"/>
+    <p:sldId id="280" r:id="rId27"/>
+    <p:sldId id="284" r:id="rId28"/>
+    <p:sldId id="278" r:id="rId29"/>
+    <p:sldId id="283" r:id="rId30"/>
+    <p:sldId id="282" r:id="rId31"/>
   </p:sldIdLst>
   <p:sldSz cx="12192000" cy="6858000"/>
   <p:notesSz cx="6858000" cy="9144000"/>
@@ -581,6 +588,188 @@
 </p:notes>
 </file>
 
+<file path=ppt/notesSlides/notesSlide10.xml><?xml version="1.0" encoding="utf-8"?>
+<p:notes xmlns:a="http://schemas.openxmlformats.org/drawingml/2006/main" xmlns:r="http://schemas.openxmlformats.org/officeDocument/2006/relationships" xmlns:p="http://schemas.openxmlformats.org/presentationml/2006/main">
+  <p:cSld>
+    <p:spTree>
+      <p:nvGrpSpPr>
+        <p:cNvPr id="1" name=""/>
+        <p:cNvGrpSpPr/>
+        <p:nvPr/>
+      </p:nvGrpSpPr>
+      <p:grpSpPr>
+        <a:xfrm>
+          <a:off x="0" y="0"/>
+          <a:ext cx="0" cy="0"/>
+          <a:chOff x="0" y="0"/>
+          <a:chExt cx="0" cy="0"/>
+        </a:xfrm>
+      </p:grpSpPr>
+      <p:sp>
+        <p:nvSpPr>
+          <p:cNvPr id="2" name="Slide Image Placeholder 1"/>
+          <p:cNvSpPr>
+            <a:spLocks noGrp="1" noRot="1" noChangeAspect="1"/>
+          </p:cNvSpPr>
+          <p:nvPr>
+            <p:ph type="sldImg"/>
+          </p:nvPr>
+        </p:nvSpPr>
+        <p:spPr/>
+      </p:sp>
+      <p:sp>
+        <p:nvSpPr>
+          <p:cNvPr id="3" name="Notes Placeholder 2"/>
+          <p:cNvSpPr>
+            <a:spLocks noGrp="1"/>
+          </p:cNvSpPr>
+          <p:nvPr>
+            <p:ph type="body" idx="1"/>
+          </p:nvPr>
+        </p:nvSpPr>
+        <p:spPr/>
+        <p:txBody>
+          <a:bodyPr/>
+          <a:lstStyle/>
+          <a:p>
+            <a:r>
+              <a:rPr lang="en-GB" dirty="0"/>
+              <a:t>C</a:t>
+            </a:r>
+            <a:r>
+              <a:rPr lang="en-NL" dirty="0"/>
+              <a:t>overed the version control part, what about distributed?</a:t>
+            </a:r>
+          </a:p>
+        </p:txBody>
+      </p:sp>
+      <p:sp>
+        <p:nvSpPr>
+          <p:cNvPr id="4" name="Slide Number Placeholder 3"/>
+          <p:cNvSpPr>
+            <a:spLocks noGrp="1"/>
+          </p:cNvSpPr>
+          <p:nvPr>
+            <p:ph type="sldNum" sz="quarter" idx="5"/>
+          </p:nvPr>
+        </p:nvSpPr>
+        <p:spPr/>
+        <p:txBody>
+          <a:bodyPr/>
+          <a:lstStyle/>
+          <a:p>
+            <a:fld id="{49AF2050-A35D-D84D-8840-74500D44AACF}" type="slidenum">
+              <a:rPr lang="en-NL" smtClean="0"/>
+              <a:t>24</a:t>
+            </a:fld>
+            <a:endParaRPr lang="en-NL"/>
+          </a:p>
+        </p:txBody>
+      </p:sp>
+    </p:spTree>
+    <p:extLst>
+      <p:ext uri="{BB962C8B-B14F-4D97-AF65-F5344CB8AC3E}">
+        <p14:creationId xmlns:p14="http://schemas.microsoft.com/office/powerpoint/2010/main" val="1857665948"/>
+      </p:ext>
+    </p:extLst>
+  </p:cSld>
+  <p:clrMapOvr>
+    <a:masterClrMapping/>
+  </p:clrMapOvr>
+</p:notes>
+</file>
+
+<file path=ppt/notesSlides/notesSlide11.xml><?xml version="1.0" encoding="utf-8"?>
+<p:notes xmlns:a="http://schemas.openxmlformats.org/drawingml/2006/main" xmlns:r="http://schemas.openxmlformats.org/officeDocument/2006/relationships" xmlns:p="http://schemas.openxmlformats.org/presentationml/2006/main">
+  <p:cSld>
+    <p:spTree>
+      <p:nvGrpSpPr>
+        <p:cNvPr id="1" name=""/>
+        <p:cNvGrpSpPr/>
+        <p:nvPr/>
+      </p:nvGrpSpPr>
+      <p:grpSpPr>
+        <a:xfrm>
+          <a:off x="0" y="0"/>
+          <a:ext cx="0" cy="0"/>
+          <a:chOff x="0" y="0"/>
+          <a:chExt cx="0" cy="0"/>
+        </a:xfrm>
+      </p:grpSpPr>
+      <p:sp>
+        <p:nvSpPr>
+          <p:cNvPr id="2" name="Slide Image Placeholder 1"/>
+          <p:cNvSpPr>
+            <a:spLocks noGrp="1" noRot="1" noChangeAspect="1"/>
+          </p:cNvSpPr>
+          <p:nvPr>
+            <p:ph type="sldImg"/>
+          </p:nvPr>
+        </p:nvSpPr>
+        <p:spPr/>
+      </p:sp>
+      <p:sp>
+        <p:nvSpPr>
+          <p:cNvPr id="3" name="Notes Placeholder 2"/>
+          <p:cNvSpPr>
+            <a:spLocks noGrp="1"/>
+          </p:cNvSpPr>
+          <p:nvPr>
+            <p:ph type="body" idx="1"/>
+          </p:nvPr>
+        </p:nvSpPr>
+        <p:spPr/>
+        <p:txBody>
+          <a:bodyPr/>
+          <a:lstStyle/>
+          <a:p>
+            <a:r>
+              <a:rPr lang="en-GB" dirty="0"/>
+              <a:t>U</a:t>
+            </a:r>
+            <a:r>
+              <a:rPr lang="en-NL" dirty="0"/>
+              <a:t>sed for living documents. When done: give it a doi</a:t>
+            </a:r>
+          </a:p>
+        </p:txBody>
+      </p:sp>
+      <p:sp>
+        <p:nvSpPr>
+          <p:cNvPr id="4" name="Slide Number Placeholder 3"/>
+          <p:cNvSpPr>
+            <a:spLocks noGrp="1"/>
+          </p:cNvSpPr>
+          <p:nvPr>
+            <p:ph type="sldNum" sz="quarter" idx="5"/>
+          </p:nvPr>
+        </p:nvSpPr>
+        <p:spPr/>
+        <p:txBody>
+          <a:bodyPr/>
+          <a:lstStyle/>
+          <a:p>
+            <a:fld id="{49AF2050-A35D-D84D-8840-74500D44AACF}" type="slidenum">
+              <a:rPr lang="en-NL" smtClean="0"/>
+              <a:t>25</a:t>
+            </a:fld>
+            <a:endParaRPr lang="en-NL"/>
+          </a:p>
+        </p:txBody>
+      </p:sp>
+    </p:spTree>
+    <p:extLst>
+      <p:ext uri="{BB962C8B-B14F-4D97-AF65-F5344CB8AC3E}">
+        <p14:creationId xmlns:p14="http://schemas.microsoft.com/office/powerpoint/2010/main" val="2769587828"/>
+      </p:ext>
+    </p:extLst>
+  </p:cSld>
+  <p:clrMapOvr>
+    <a:masterClrMapping/>
+  </p:clrMapOvr>
+</p:notes>
+</file>
+
 <file path=ppt/notesSlides/notesSlide2.xml><?xml version="1.0" encoding="utf-8"?>
 <p:notes xmlns:a="http://schemas.openxmlformats.org/drawingml/2006/main" xmlns:r="http://schemas.openxmlformats.org/officeDocument/2006/relationships" xmlns:p="http://schemas.openxmlformats.org/presentationml/2006/main">
   <p:cSld>
@@ -728,19 +917,13 @@
           <a:lstStyle/>
           <a:p>
             <a:r>
-              <a:rPr lang="en-GB" dirty="0"/>
-              <a:t>N</a:t>
-            </a:r>
-            <a:r>
-              <a:rPr lang="en-NL" dirty="0"/>
-              <a:t>adeel?</a:t>
-            </a:r>
-          </a:p>
-          <a:p>
-            <a:pPr algn="l">
-              <a:buFont typeface="Arial" panose="020B0604020202020204" pitchFamily="34" charset="0"/>
-              <a:buChar char="•"/>
-            </a:pPr>
+              <a:rPr lang="nl-NL" dirty="0" err="1"/>
+              <a:t>Collaboration</a:t>
+            </a:r>
+            <a:r>
+              <a:rPr lang="nl-NL" dirty="0"/>
+              <a:t>: </a:t>
+            </a:r>
             <a:r>
               <a:rPr lang="en-GB" b="0" i="0" dirty="0">
                 <a:solidFill>
@@ -749,14 +932,10 @@
                 <a:effectLst/>
                 <a:latin typeface="Lato" panose="020F0502020204030204" pitchFamily="34" charset="0"/>
               </a:rPr>
-              <a:t> Giving a version to a collaborator and merging changes later with own changes sounds like lots of work.</a:t>
-            </a:r>
-          </a:p>
-          <a:p>
-            <a:pPr algn="l">
-              <a:buFont typeface="Arial" panose="020B0604020202020204" pitchFamily="34" charset="0"/>
-              <a:buChar char="•"/>
-            </a:pPr>
+              <a:t>merging changes later with own changes ... </a:t>
+            </a:r>
+          </a:p>
+          <a:p>
             <a:r>
               <a:rPr lang="en-GB" b="0" i="0" dirty="0">
                 <a:solidFill>
@@ -765,14 +944,20 @@
                 <a:effectLst/>
                 <a:latin typeface="Lato" panose="020F0502020204030204" pitchFamily="34" charset="0"/>
               </a:rPr>
-              <a:t>What if you discover a bug and want to know since when the bug existed?</a:t>
-            </a:r>
-          </a:p>
-          <a:p>
-            <a:pPr algn="l">
-              <a:buFont typeface="Arial" panose="020B0604020202020204" pitchFamily="34" charset="0"/>
-              <a:buChar char="•"/>
-            </a:pPr>
+              <a:t>Bugs: want to know since when the bug existed?</a:t>
+            </a:r>
+          </a:p>
+          <a:p>
+            <a:r>
+              <a:rPr lang="en-GB" b="0" i="0" dirty="0">
+                <a:solidFill>
+                  <a:srgbClr val="242424"/>
+                </a:solidFill>
+                <a:effectLst/>
+                <a:latin typeface="Lato" panose="020F0502020204030204" pitchFamily="34" charset="0"/>
+              </a:rPr>
+              <a:t>Compatibility: </a:t>
+            </a:r>
             <a:r>
               <a:rPr lang="en-GB" b="0" i="0" dirty="0">
                 <a:solidFill>
@@ -1019,7 +1204,7 @@
           <a:p>
             <a:r>
               <a:rPr lang="en-NL" dirty="0"/>
-              <a:t>Zoals zoveel handige tools: je meot wel kunnen programmeren</a:t>
+              <a:t>Also with different sets of changes</a:t>
             </a:r>
           </a:p>
         </p:txBody>
@@ -1041,7 +1226,7 @@
           <a:p>
             <a:fld id="{49AF2050-A35D-D84D-8840-74500D44AACF}" type="slidenum">
               <a:rPr lang="en-NL" smtClean="0"/>
-              <a:t>14</a:t>
+              <a:t>15</a:t>
             </a:fld>
             <a:endParaRPr lang="en-NL"/>
           </a:p>
@@ -1050,7 +1235,7 @@
     </p:spTree>
     <p:extLst>
       <p:ext uri="{BB962C8B-B14F-4D97-AF65-F5344CB8AC3E}">
-        <p14:creationId xmlns:p14="http://schemas.microsoft.com/office/powerpoint/2010/main" val="949562447"/>
+        <p14:creationId xmlns:p14="http://schemas.microsoft.com/office/powerpoint/2010/main" val="3115737829"/>
       </p:ext>
     </p:extLst>
   </p:cSld>
@@ -1106,11 +1291,11 @@
           <a:p>
             <a:r>
               <a:rPr lang="en-GB" dirty="0"/>
-              <a:t>O</a:t>
+              <a:t>W</a:t>
             </a:r>
             <a:r>
               <a:rPr lang="en-NL" dirty="0"/>
-              <a:t>r gitlab or bitbucket</a:t>
+              <a:t>hich can be merged later</a:t>
             </a:r>
           </a:p>
         </p:txBody>
@@ -1141,7 +1326,7 @@
     </p:spTree>
     <p:extLst>
       <p:ext uri="{BB962C8B-B14F-4D97-AF65-F5344CB8AC3E}">
-        <p14:creationId xmlns:p14="http://schemas.microsoft.com/office/powerpoint/2010/main" val="3029161824"/>
+        <p14:creationId xmlns:p14="http://schemas.microsoft.com/office/powerpoint/2010/main" val="3440418553"/>
       </p:ext>
     </p:extLst>
   </p:cSld>
@@ -1196,13 +1381,184 @@
           <a:lstStyle/>
           <a:p>
             <a:r>
+              <a:rPr lang="en-NL" dirty="0"/>
+              <a:t>Zoals zoveel handige tools: je meot wel kunnen programmeren</a:t>
+            </a:r>
+          </a:p>
+        </p:txBody>
+      </p:sp>
+      <p:sp>
+        <p:nvSpPr>
+          <p:cNvPr id="4" name="Slide Number Placeholder 3"/>
+          <p:cNvSpPr>
+            <a:spLocks noGrp="1"/>
+          </p:cNvSpPr>
+          <p:nvPr>
+            <p:ph type="sldNum" sz="quarter" idx="5"/>
+          </p:nvPr>
+        </p:nvSpPr>
+        <p:spPr/>
+        <p:txBody>
+          <a:bodyPr/>
+          <a:lstStyle/>
+          <a:p>
+            <a:fld id="{49AF2050-A35D-D84D-8840-74500D44AACF}" type="slidenum">
+              <a:rPr lang="en-NL" smtClean="0"/>
+              <a:t>17</a:t>
+            </a:fld>
+            <a:endParaRPr lang="en-NL"/>
+          </a:p>
+        </p:txBody>
+      </p:sp>
+    </p:spTree>
+    <p:extLst>
+      <p:ext uri="{BB962C8B-B14F-4D97-AF65-F5344CB8AC3E}">
+        <p14:creationId xmlns:p14="http://schemas.microsoft.com/office/powerpoint/2010/main" val="949562447"/>
+      </p:ext>
+    </p:extLst>
+  </p:cSld>
+  <p:clrMapOvr>
+    <a:masterClrMapping/>
+  </p:clrMapOvr>
+</p:notes>
+</file>
+
+<file path=ppt/notesSlides/notesSlide8.xml><?xml version="1.0" encoding="utf-8"?>
+<p:notes xmlns:a="http://schemas.openxmlformats.org/drawingml/2006/main" xmlns:r="http://schemas.openxmlformats.org/officeDocument/2006/relationships" xmlns:p="http://schemas.openxmlformats.org/presentationml/2006/main">
+  <p:cSld>
+    <p:spTree>
+      <p:nvGrpSpPr>
+        <p:cNvPr id="1" name=""/>
+        <p:cNvGrpSpPr/>
+        <p:nvPr/>
+      </p:nvGrpSpPr>
+      <p:grpSpPr>
+        <a:xfrm>
+          <a:off x="0" y="0"/>
+          <a:ext cx="0" cy="0"/>
+          <a:chOff x="0" y="0"/>
+          <a:chExt cx="0" cy="0"/>
+        </a:xfrm>
+      </p:grpSpPr>
+      <p:sp>
+        <p:nvSpPr>
+          <p:cNvPr id="2" name="Slide Image Placeholder 1"/>
+          <p:cNvSpPr>
+            <a:spLocks noGrp="1" noRot="1" noChangeAspect="1"/>
+          </p:cNvSpPr>
+          <p:nvPr>
+            <p:ph type="sldImg"/>
+          </p:nvPr>
+        </p:nvSpPr>
+        <p:spPr/>
+      </p:sp>
+      <p:sp>
+        <p:nvSpPr>
+          <p:cNvPr id="3" name="Notes Placeholder 2"/>
+          <p:cNvSpPr>
+            <a:spLocks noGrp="1"/>
+          </p:cNvSpPr>
+          <p:nvPr>
+            <p:ph type="body" idx="1"/>
+          </p:nvPr>
+        </p:nvSpPr>
+        <p:spPr/>
+        <p:txBody>
+          <a:bodyPr/>
+          <a:lstStyle/>
+          <a:p>
+            <a:r>
               <a:rPr lang="en-GB" dirty="0"/>
-              <a:t>U</a:t>
+              <a:t>O</a:t>
             </a:r>
             <a:r>
               <a:rPr lang="en-NL" dirty="0"/>
-              <a:t>sed for living documents. When done: give it a doi</a:t>
-            </a:r>
+              <a:t>r gitlab or bitbucket</a:t>
+            </a:r>
+          </a:p>
+        </p:txBody>
+      </p:sp>
+      <p:sp>
+        <p:nvSpPr>
+          <p:cNvPr id="4" name="Slide Number Placeholder 3"/>
+          <p:cNvSpPr>
+            <a:spLocks noGrp="1"/>
+          </p:cNvSpPr>
+          <p:nvPr>
+            <p:ph type="sldNum" sz="quarter" idx="5"/>
+          </p:nvPr>
+        </p:nvSpPr>
+        <p:spPr/>
+        <p:txBody>
+          <a:bodyPr/>
+          <a:lstStyle/>
+          <a:p>
+            <a:fld id="{49AF2050-A35D-D84D-8840-74500D44AACF}" type="slidenum">
+              <a:rPr lang="en-NL" smtClean="0"/>
+              <a:t>19</a:t>
+            </a:fld>
+            <a:endParaRPr lang="en-NL"/>
+          </a:p>
+        </p:txBody>
+      </p:sp>
+    </p:spTree>
+    <p:extLst>
+      <p:ext uri="{BB962C8B-B14F-4D97-AF65-F5344CB8AC3E}">
+        <p14:creationId xmlns:p14="http://schemas.microsoft.com/office/powerpoint/2010/main" val="3029161824"/>
+      </p:ext>
+    </p:extLst>
+  </p:cSld>
+  <p:clrMapOvr>
+    <a:masterClrMapping/>
+  </p:clrMapOvr>
+</p:notes>
+</file>
+
+<file path=ppt/notesSlides/notesSlide9.xml><?xml version="1.0" encoding="utf-8"?>
+<p:notes xmlns:a="http://schemas.openxmlformats.org/drawingml/2006/main" xmlns:r="http://schemas.openxmlformats.org/officeDocument/2006/relationships" xmlns:p="http://schemas.openxmlformats.org/presentationml/2006/main">
+  <p:cSld>
+    <p:spTree>
+      <p:nvGrpSpPr>
+        <p:cNvPr id="1" name=""/>
+        <p:cNvGrpSpPr/>
+        <p:nvPr/>
+      </p:nvGrpSpPr>
+      <p:grpSpPr>
+        <a:xfrm>
+          <a:off x="0" y="0"/>
+          <a:ext cx="0" cy="0"/>
+          <a:chOff x="0" y="0"/>
+          <a:chExt cx="0" cy="0"/>
+        </a:xfrm>
+      </p:grpSpPr>
+      <p:sp>
+        <p:nvSpPr>
+          <p:cNvPr id="2" name="Slide Image Placeholder 1"/>
+          <p:cNvSpPr>
+            <a:spLocks noGrp="1" noRot="1" noChangeAspect="1"/>
+          </p:cNvSpPr>
+          <p:nvPr>
+            <p:ph type="sldImg"/>
+          </p:nvPr>
+        </p:nvSpPr>
+        <p:spPr/>
+      </p:sp>
+      <p:sp>
+        <p:nvSpPr>
+          <p:cNvPr id="3" name="Notes Placeholder 2"/>
+          <p:cNvSpPr>
+            <a:spLocks noGrp="1"/>
+          </p:cNvSpPr>
+          <p:nvPr>
+            <p:ph type="body" idx="1"/>
+          </p:nvPr>
+        </p:nvSpPr>
+        <p:spPr/>
+        <p:txBody>
+          <a:bodyPr/>
+          <a:lstStyle/>
+          <a:p>
+            <a:endParaRPr lang="en-NL" dirty="0"/>
           </a:p>
         </p:txBody>
       </p:sp>
@@ -1232,7 +1588,7 @@
     </p:spTree>
     <p:extLst>
       <p:ext uri="{BB962C8B-B14F-4D97-AF65-F5344CB8AC3E}">
-        <p14:creationId xmlns:p14="http://schemas.microsoft.com/office/powerpoint/2010/main" val="2769587828"/>
+        <p14:creationId xmlns:p14="http://schemas.microsoft.com/office/powerpoint/2010/main" val="1697277563"/>
       </p:ext>
     </p:extLst>
   </p:cSld>
@@ -4603,7 +4959,7 @@
             </a:r>
             <a:r>
               <a:rPr lang="en-NL" dirty="0"/>
-              <a:t>ow-fi version control</a:t>
+              <a:t>ow-fi version control: copy and rename</a:t>
             </a:r>
           </a:p>
         </p:txBody>
@@ -4630,7 +4986,7 @@
         </p:blipFill>
         <p:spPr>
           <a:xfrm>
-            <a:off x="4559300" y="1693863"/>
+            <a:off x="5642142" y="1690688"/>
             <a:ext cx="7632700" cy="4483100"/>
           </a:xfrm>
           <a:prstGeom prst="rect">
@@ -4656,13 +5012,13 @@
         </p:nvSpPr>
         <p:spPr>
           <a:xfrm>
-            <a:off x="838200" y="1825625"/>
-            <a:ext cx="3517232" cy="4351338"/>
+            <a:off x="838199" y="1825625"/>
+            <a:ext cx="4491789" cy="4351338"/>
           </a:xfrm>
         </p:spPr>
         <p:txBody>
           <a:bodyPr>
-            <a:normAutofit lnSpcReduction="10000"/>
+            <a:normAutofit/>
           </a:bodyPr>
           <a:lstStyle/>
           <a:p>
@@ -5366,6 +5722,573 @@
           <p:cNvPr id="2" name="Title 1">
             <a:extLst>
               <a:ext uri="{FF2B5EF4-FFF2-40B4-BE49-F238E27FC236}">
+                <a16:creationId xmlns:a16="http://schemas.microsoft.com/office/drawing/2014/main" id="{E2323519-04E4-7DCD-54DB-D8D5EB62BE58}"/>
+              </a:ext>
+            </a:extLst>
+          </p:cNvPr>
+          <p:cNvSpPr>
+            <a:spLocks noGrp="1"/>
+          </p:cNvSpPr>
+          <p:nvPr>
+            <p:ph type="title"/>
+          </p:nvPr>
+        </p:nvSpPr>
+        <p:spPr/>
+        <p:txBody>
+          <a:bodyPr/>
+          <a:lstStyle/>
+          <a:p>
+            <a:r>
+              <a:rPr lang="en-GB" dirty="0"/>
+              <a:t>High-fi: V</a:t>
+            </a:r>
+            <a:r>
+              <a:rPr lang="en-NL" dirty="0"/>
+              <a:t>ersion control systems</a:t>
+            </a:r>
+          </a:p>
+        </p:txBody>
+      </p:sp>
+      <p:sp>
+        <p:nvSpPr>
+          <p:cNvPr id="3" name="Content Placeholder 2">
+            <a:extLst>
+              <a:ext uri="{FF2B5EF4-FFF2-40B4-BE49-F238E27FC236}">
+                <a16:creationId xmlns:a16="http://schemas.microsoft.com/office/drawing/2014/main" id="{26345B21-0B21-2697-26AE-7B8C63280A04}"/>
+              </a:ext>
+            </a:extLst>
+          </p:cNvPr>
+          <p:cNvSpPr>
+            <a:spLocks noGrp="1"/>
+          </p:cNvSpPr>
+          <p:nvPr>
+            <p:ph idx="1"/>
+          </p:nvPr>
+        </p:nvSpPr>
+        <p:spPr/>
+        <p:txBody>
+          <a:bodyPr/>
+          <a:lstStyle/>
+          <a:p>
+            <a:r>
+              <a:rPr lang="en-GB" b="0" i="0" dirty="0">
+                <a:solidFill>
+                  <a:srgbClr val="333333"/>
+                </a:solidFill>
+                <a:effectLst/>
+                <a:latin typeface="Helvetica Neue" panose="02000503000000020004" pitchFamily="2" charset="0"/>
+              </a:rPr>
+              <a:t>Version control systems start with a base version of the document and then save just the changes</a:t>
+            </a:r>
+            <a:endParaRPr lang="en-NL" dirty="0"/>
+          </a:p>
+        </p:txBody>
+      </p:sp>
+      <p:sp>
+        <p:nvSpPr>
+          <p:cNvPr id="8" name="TextBox 7">
+            <a:extLst>
+              <a:ext uri="{FF2B5EF4-FFF2-40B4-BE49-F238E27FC236}">
+                <a16:creationId xmlns:a16="http://schemas.microsoft.com/office/drawing/2014/main" id="{DDE964FB-E316-6020-C5C3-73BDB9ECE0E3}"/>
+              </a:ext>
+            </a:extLst>
+          </p:cNvPr>
+          <p:cNvSpPr txBox="1"/>
+          <p:nvPr/>
+        </p:nvSpPr>
+        <p:spPr>
+          <a:xfrm>
+            <a:off x="5468352" y="5988734"/>
+            <a:ext cx="6100010" cy="646331"/>
+          </a:xfrm>
+          <a:prstGeom prst="rect">
+            <a:avLst/>
+          </a:prstGeom>
+          <a:noFill/>
+        </p:spPr>
+        <p:txBody>
+          <a:bodyPr wrap="square">
+            <a:spAutoFit/>
+          </a:bodyPr>
+          <a:lstStyle/>
+          <a:p>
+            <a:r>
+              <a:rPr lang="en-GB" b="0" i="1" dirty="0">
+                <a:solidFill>
+                  <a:srgbClr val="333333"/>
+                </a:solidFill>
+                <a:effectLst/>
+                <a:latin typeface="Ubuntu" panose="020F0502020204030204" pitchFamily="34" charset="0"/>
+              </a:rPr>
+              <a:t>Image from: Version control with git (https://carpentries-</a:t>
+            </a:r>
+            <a:r>
+              <a:rPr lang="en-GB" b="0" i="1" dirty="0" err="1">
+                <a:solidFill>
+                  <a:srgbClr val="333333"/>
+                </a:solidFill>
+                <a:effectLst/>
+                <a:latin typeface="Ubuntu" panose="020F0502020204030204" pitchFamily="34" charset="0"/>
+              </a:rPr>
+              <a:t>incubator.github.io</a:t>
+            </a:r>
+            <a:r>
+              <a:rPr lang="en-GB" b="0" i="1" dirty="0">
+                <a:solidFill>
+                  <a:srgbClr val="333333"/>
+                </a:solidFill>
+                <a:effectLst/>
+                <a:latin typeface="Ubuntu" panose="020F0502020204030204" pitchFamily="34" charset="0"/>
+              </a:rPr>
+              <a:t>/git-novice-branch-pr/01-basics/)</a:t>
+            </a:r>
+            <a:endParaRPr lang="en-NL" dirty="0"/>
+          </a:p>
+        </p:txBody>
+      </p:sp>
+      <p:pic>
+        <p:nvPicPr>
+          <p:cNvPr id="11" name="Picture 10">
+            <a:extLst>
+              <a:ext uri="{FF2B5EF4-FFF2-40B4-BE49-F238E27FC236}">
+                <a16:creationId xmlns:a16="http://schemas.microsoft.com/office/drawing/2014/main" id="{2AA61888-F577-57FE-E134-D98F1252E1FD}"/>
+              </a:ext>
+            </a:extLst>
+          </p:cNvPr>
+          <p:cNvPicPr>
+            <a:picLocks noChangeAspect="1"/>
+          </p:cNvPicPr>
+          <p:nvPr/>
+        </p:nvPicPr>
+        <p:blipFill>
+          <a:blip r:embed="rId2"/>
+          <a:stretch>
+            <a:fillRect/>
+          </a:stretch>
+        </p:blipFill>
+        <p:spPr>
+          <a:xfrm>
+            <a:off x="2304715" y="2971223"/>
+            <a:ext cx="7287981" cy="1871913"/>
+          </a:xfrm>
+          <a:prstGeom prst="rect">
+            <a:avLst/>
+          </a:prstGeom>
+        </p:spPr>
+      </p:pic>
+    </p:spTree>
+    <p:extLst>
+      <p:ext uri="{BB962C8B-B14F-4D97-AF65-F5344CB8AC3E}">
+        <p14:creationId xmlns:p14="http://schemas.microsoft.com/office/powerpoint/2010/main" val="1097896942"/>
+      </p:ext>
+    </p:extLst>
+  </p:cSld>
+  <p:clrMapOvr>
+    <a:masterClrMapping/>
+  </p:clrMapOvr>
+</p:sld>
+</file>
+
+<file path=ppt/slides/slide15.xml><?xml version="1.0" encoding="utf-8"?>
+<p:sld xmlns:a="http://schemas.openxmlformats.org/drawingml/2006/main" xmlns:r="http://schemas.openxmlformats.org/officeDocument/2006/relationships" xmlns:p="http://schemas.openxmlformats.org/presentationml/2006/main">
+  <p:cSld>
+    <p:spTree>
+      <p:nvGrpSpPr>
+        <p:cNvPr id="1" name=""/>
+        <p:cNvGrpSpPr/>
+        <p:nvPr/>
+      </p:nvGrpSpPr>
+      <p:grpSpPr>
+        <a:xfrm>
+          <a:off x="0" y="0"/>
+          <a:ext cx="0" cy="0"/>
+          <a:chOff x="0" y="0"/>
+          <a:chExt cx="0" cy="0"/>
+        </a:xfrm>
+      </p:grpSpPr>
+      <p:sp>
+        <p:nvSpPr>
+          <p:cNvPr id="2" name="Title 1">
+            <a:extLst>
+              <a:ext uri="{FF2B5EF4-FFF2-40B4-BE49-F238E27FC236}">
+                <a16:creationId xmlns:a16="http://schemas.microsoft.com/office/drawing/2014/main" id="{E2323519-04E4-7DCD-54DB-D8D5EB62BE58}"/>
+              </a:ext>
+            </a:extLst>
+          </p:cNvPr>
+          <p:cNvSpPr>
+            <a:spLocks noGrp="1"/>
+          </p:cNvSpPr>
+          <p:nvPr>
+            <p:ph type="title"/>
+          </p:nvPr>
+        </p:nvSpPr>
+        <p:spPr/>
+        <p:txBody>
+          <a:bodyPr/>
+          <a:lstStyle/>
+          <a:p>
+            <a:r>
+              <a:rPr lang="en-GB" dirty="0"/>
+              <a:t>High-fi: V</a:t>
+            </a:r>
+            <a:r>
+              <a:rPr lang="en-NL" dirty="0"/>
+              <a:t>ersion control systems</a:t>
+            </a:r>
+          </a:p>
+        </p:txBody>
+      </p:sp>
+      <p:sp>
+        <p:nvSpPr>
+          <p:cNvPr id="3" name="Content Placeholder 2">
+            <a:extLst>
+              <a:ext uri="{FF2B5EF4-FFF2-40B4-BE49-F238E27FC236}">
+                <a16:creationId xmlns:a16="http://schemas.microsoft.com/office/drawing/2014/main" id="{26345B21-0B21-2697-26AE-7B8C63280A04}"/>
+              </a:ext>
+            </a:extLst>
+          </p:cNvPr>
+          <p:cNvSpPr>
+            <a:spLocks noGrp="1"/>
+          </p:cNvSpPr>
+          <p:nvPr>
+            <p:ph idx="1"/>
+          </p:nvPr>
+        </p:nvSpPr>
+        <p:spPr/>
+        <p:txBody>
+          <a:bodyPr/>
+          <a:lstStyle/>
+          <a:p>
+            <a:r>
+              <a:rPr lang="en-GB" b="0" i="0" dirty="0">
+                <a:solidFill>
+                  <a:srgbClr val="333333"/>
+                </a:solidFill>
+                <a:effectLst/>
+                <a:latin typeface="Helvetica Neue" panose="02000503000000020004" pitchFamily="2" charset="0"/>
+              </a:rPr>
+              <a:t>Version control systems start with a base version of the document and then save just the changes</a:t>
+            </a:r>
+            <a:endParaRPr lang="en-NL" dirty="0"/>
+          </a:p>
+        </p:txBody>
+      </p:sp>
+      <p:sp>
+        <p:nvSpPr>
+          <p:cNvPr id="8" name="TextBox 7">
+            <a:extLst>
+              <a:ext uri="{FF2B5EF4-FFF2-40B4-BE49-F238E27FC236}">
+                <a16:creationId xmlns:a16="http://schemas.microsoft.com/office/drawing/2014/main" id="{DDE964FB-E316-6020-C5C3-73BDB9ECE0E3}"/>
+              </a:ext>
+            </a:extLst>
+          </p:cNvPr>
+          <p:cNvSpPr txBox="1"/>
+          <p:nvPr/>
+        </p:nvSpPr>
+        <p:spPr>
+          <a:xfrm>
+            <a:off x="5468352" y="5988734"/>
+            <a:ext cx="6100010" cy="646331"/>
+          </a:xfrm>
+          <a:prstGeom prst="rect">
+            <a:avLst/>
+          </a:prstGeom>
+          <a:noFill/>
+        </p:spPr>
+        <p:txBody>
+          <a:bodyPr wrap="square">
+            <a:spAutoFit/>
+          </a:bodyPr>
+          <a:lstStyle/>
+          <a:p>
+            <a:r>
+              <a:rPr lang="en-GB" b="0" i="1" dirty="0">
+                <a:solidFill>
+                  <a:srgbClr val="333333"/>
+                </a:solidFill>
+                <a:effectLst/>
+                <a:latin typeface="Ubuntu" panose="020F0502020204030204" pitchFamily="34" charset="0"/>
+              </a:rPr>
+              <a:t>Image from: Version control with git (https://carpentries-</a:t>
+            </a:r>
+            <a:r>
+              <a:rPr lang="en-GB" b="0" i="1" dirty="0" err="1">
+                <a:solidFill>
+                  <a:srgbClr val="333333"/>
+                </a:solidFill>
+                <a:effectLst/>
+                <a:latin typeface="Ubuntu" panose="020F0502020204030204" pitchFamily="34" charset="0"/>
+              </a:rPr>
+              <a:t>incubator.github.io</a:t>
+            </a:r>
+            <a:r>
+              <a:rPr lang="en-GB" b="0" i="1" dirty="0">
+                <a:solidFill>
+                  <a:srgbClr val="333333"/>
+                </a:solidFill>
+                <a:effectLst/>
+                <a:latin typeface="Ubuntu" panose="020F0502020204030204" pitchFamily="34" charset="0"/>
+              </a:rPr>
+              <a:t>/git-novice-branch-pr/01-basics/)</a:t>
+            </a:r>
+            <a:endParaRPr lang="en-NL" dirty="0"/>
+          </a:p>
+        </p:txBody>
+      </p:sp>
+      <p:pic>
+        <p:nvPicPr>
+          <p:cNvPr id="5" name="Picture 4">
+            <a:extLst>
+              <a:ext uri="{FF2B5EF4-FFF2-40B4-BE49-F238E27FC236}">
+                <a16:creationId xmlns:a16="http://schemas.microsoft.com/office/drawing/2014/main" id="{E9E9ABEE-1D65-28D8-D910-FA51D3FB5B68}"/>
+              </a:ext>
+            </a:extLst>
+          </p:cNvPr>
+          <p:cNvPicPr>
+            <a:picLocks noChangeAspect="1"/>
+          </p:cNvPicPr>
+          <p:nvPr/>
+        </p:nvPicPr>
+        <p:blipFill>
+          <a:blip r:embed="rId3"/>
+          <a:stretch>
+            <a:fillRect/>
+          </a:stretch>
+        </p:blipFill>
+        <p:spPr>
+          <a:xfrm>
+            <a:off x="3947359" y="2731266"/>
+            <a:ext cx="3548313" cy="3257468"/>
+          </a:xfrm>
+          <a:prstGeom prst="rect">
+            <a:avLst/>
+          </a:prstGeom>
+        </p:spPr>
+      </p:pic>
+    </p:spTree>
+    <p:extLst>
+      <p:ext uri="{BB962C8B-B14F-4D97-AF65-F5344CB8AC3E}">
+        <p14:creationId xmlns:p14="http://schemas.microsoft.com/office/powerpoint/2010/main" val="3949127366"/>
+      </p:ext>
+    </p:extLst>
+  </p:cSld>
+  <p:clrMapOvr>
+    <a:masterClrMapping/>
+  </p:clrMapOvr>
+</p:sld>
+</file>
+
+<file path=ppt/slides/slide16.xml><?xml version="1.0" encoding="utf-8"?>
+<p:sld xmlns:a="http://schemas.openxmlformats.org/drawingml/2006/main" xmlns:r="http://schemas.openxmlformats.org/officeDocument/2006/relationships" xmlns:p="http://schemas.openxmlformats.org/presentationml/2006/main">
+  <p:cSld>
+    <p:spTree>
+      <p:nvGrpSpPr>
+        <p:cNvPr id="1" name=""/>
+        <p:cNvGrpSpPr/>
+        <p:nvPr/>
+      </p:nvGrpSpPr>
+      <p:grpSpPr>
+        <a:xfrm>
+          <a:off x="0" y="0"/>
+          <a:ext cx="0" cy="0"/>
+          <a:chOff x="0" y="0"/>
+          <a:chExt cx="0" cy="0"/>
+        </a:xfrm>
+      </p:grpSpPr>
+      <p:sp>
+        <p:nvSpPr>
+          <p:cNvPr id="2" name="Title 1">
+            <a:extLst>
+              <a:ext uri="{FF2B5EF4-FFF2-40B4-BE49-F238E27FC236}">
+                <a16:creationId xmlns:a16="http://schemas.microsoft.com/office/drawing/2014/main" id="{E2323519-04E4-7DCD-54DB-D8D5EB62BE58}"/>
+              </a:ext>
+            </a:extLst>
+          </p:cNvPr>
+          <p:cNvSpPr>
+            <a:spLocks noGrp="1"/>
+          </p:cNvSpPr>
+          <p:nvPr>
+            <p:ph type="title"/>
+          </p:nvPr>
+        </p:nvSpPr>
+        <p:spPr/>
+        <p:txBody>
+          <a:bodyPr/>
+          <a:lstStyle/>
+          <a:p>
+            <a:r>
+              <a:rPr lang="en-GB" dirty="0"/>
+              <a:t>High-fi: V</a:t>
+            </a:r>
+            <a:r>
+              <a:rPr lang="en-NL" dirty="0"/>
+              <a:t>ersion control systems</a:t>
+            </a:r>
+          </a:p>
+        </p:txBody>
+      </p:sp>
+      <p:sp>
+        <p:nvSpPr>
+          <p:cNvPr id="3" name="Content Placeholder 2">
+            <a:extLst>
+              <a:ext uri="{FF2B5EF4-FFF2-40B4-BE49-F238E27FC236}">
+                <a16:creationId xmlns:a16="http://schemas.microsoft.com/office/drawing/2014/main" id="{26345B21-0B21-2697-26AE-7B8C63280A04}"/>
+              </a:ext>
+            </a:extLst>
+          </p:cNvPr>
+          <p:cNvSpPr>
+            <a:spLocks noGrp="1"/>
+          </p:cNvSpPr>
+          <p:nvPr>
+            <p:ph idx="1"/>
+          </p:nvPr>
+        </p:nvSpPr>
+        <p:spPr/>
+        <p:txBody>
+          <a:bodyPr/>
+          <a:lstStyle/>
+          <a:p>
+            <a:r>
+              <a:rPr lang="en-GB" b="0" i="0" dirty="0">
+                <a:solidFill>
+                  <a:srgbClr val="333333"/>
+                </a:solidFill>
+                <a:effectLst/>
+                <a:latin typeface="Helvetica Neue" panose="02000503000000020004" pitchFamily="2" charset="0"/>
+              </a:rPr>
+              <a:t>Version control systems start with a base version of the document and then save just the changes</a:t>
+            </a:r>
+            <a:endParaRPr lang="en-NL" dirty="0"/>
+          </a:p>
+        </p:txBody>
+      </p:sp>
+      <p:sp>
+        <p:nvSpPr>
+          <p:cNvPr id="8" name="TextBox 7">
+            <a:extLst>
+              <a:ext uri="{FF2B5EF4-FFF2-40B4-BE49-F238E27FC236}">
+                <a16:creationId xmlns:a16="http://schemas.microsoft.com/office/drawing/2014/main" id="{DDE964FB-E316-6020-C5C3-73BDB9ECE0E3}"/>
+              </a:ext>
+            </a:extLst>
+          </p:cNvPr>
+          <p:cNvSpPr txBox="1"/>
+          <p:nvPr/>
+        </p:nvSpPr>
+        <p:spPr>
+          <a:xfrm>
+            <a:off x="5468352" y="5988734"/>
+            <a:ext cx="6100010" cy="646331"/>
+          </a:xfrm>
+          <a:prstGeom prst="rect">
+            <a:avLst/>
+          </a:prstGeom>
+          <a:noFill/>
+        </p:spPr>
+        <p:txBody>
+          <a:bodyPr wrap="square">
+            <a:spAutoFit/>
+          </a:bodyPr>
+          <a:lstStyle/>
+          <a:p>
+            <a:r>
+              <a:rPr lang="en-GB" b="0" i="1" dirty="0">
+                <a:solidFill>
+                  <a:srgbClr val="333333"/>
+                </a:solidFill>
+                <a:effectLst/>
+                <a:latin typeface="Ubuntu" panose="020F0502020204030204" pitchFamily="34" charset="0"/>
+              </a:rPr>
+              <a:t>Image from: Version control with git (https://carpentries-</a:t>
+            </a:r>
+            <a:r>
+              <a:rPr lang="en-GB" b="0" i="1" dirty="0" err="1">
+                <a:solidFill>
+                  <a:srgbClr val="333333"/>
+                </a:solidFill>
+                <a:effectLst/>
+                <a:latin typeface="Ubuntu" panose="020F0502020204030204" pitchFamily="34" charset="0"/>
+              </a:rPr>
+              <a:t>incubator.github.io</a:t>
+            </a:r>
+            <a:r>
+              <a:rPr lang="en-GB" b="0" i="1" dirty="0">
+                <a:solidFill>
+                  <a:srgbClr val="333333"/>
+                </a:solidFill>
+                <a:effectLst/>
+                <a:latin typeface="Ubuntu" panose="020F0502020204030204" pitchFamily="34" charset="0"/>
+              </a:rPr>
+              <a:t>/git-novice-branch-pr/01-basics/)</a:t>
+            </a:r>
+            <a:endParaRPr lang="en-NL" dirty="0"/>
+          </a:p>
+        </p:txBody>
+      </p:sp>
+      <p:pic>
+        <p:nvPicPr>
+          <p:cNvPr id="4" name="Picture 3">
+            <a:extLst>
+              <a:ext uri="{FF2B5EF4-FFF2-40B4-BE49-F238E27FC236}">
+                <a16:creationId xmlns:a16="http://schemas.microsoft.com/office/drawing/2014/main" id="{3D0E95E4-51C9-2CC0-3BA4-6AC442298120}"/>
+              </a:ext>
+            </a:extLst>
+          </p:cNvPr>
+          <p:cNvPicPr>
+            <a:picLocks noChangeAspect="1"/>
+          </p:cNvPicPr>
+          <p:nvPr/>
+        </p:nvPicPr>
+        <p:blipFill>
+          <a:blip r:embed="rId3"/>
+          <a:stretch>
+            <a:fillRect/>
+          </a:stretch>
+        </p:blipFill>
+        <p:spPr>
+          <a:xfrm>
+            <a:off x="3878512" y="2718135"/>
+            <a:ext cx="4134519" cy="3360570"/>
+          </a:xfrm>
+          <a:prstGeom prst="rect">
+            <a:avLst/>
+          </a:prstGeom>
+        </p:spPr>
+      </p:pic>
+    </p:spTree>
+    <p:extLst>
+      <p:ext uri="{BB962C8B-B14F-4D97-AF65-F5344CB8AC3E}">
+        <p14:creationId xmlns:p14="http://schemas.microsoft.com/office/powerpoint/2010/main" val="3163481980"/>
+      </p:ext>
+    </p:extLst>
+  </p:cSld>
+  <p:clrMapOvr>
+    <a:masterClrMapping/>
+  </p:clrMapOvr>
+</p:sld>
+</file>
+
+<file path=ppt/slides/slide17.xml><?xml version="1.0" encoding="utf-8"?>
+<p:sld xmlns:a="http://schemas.openxmlformats.org/drawingml/2006/main" xmlns:r="http://schemas.openxmlformats.org/officeDocument/2006/relationships" xmlns:p="http://schemas.openxmlformats.org/presentationml/2006/main">
+  <p:cSld>
+    <p:spTree>
+      <p:nvGrpSpPr>
+        <p:cNvPr id="1" name=""/>
+        <p:cNvGrpSpPr/>
+        <p:nvPr/>
+      </p:nvGrpSpPr>
+      <p:grpSpPr>
+        <a:xfrm>
+          <a:off x="0" y="0"/>
+          <a:ext cx="0" cy="0"/>
+          <a:chOff x="0" y="0"/>
+          <a:chExt cx="0" cy="0"/>
+        </a:xfrm>
+      </p:grpSpPr>
+      <p:sp>
+        <p:nvSpPr>
+          <p:cNvPr id="2" name="Title 1">
+            <a:extLst>
+              <a:ext uri="{FF2B5EF4-FFF2-40B4-BE49-F238E27FC236}">
                 <a16:creationId xmlns:a16="http://schemas.microsoft.com/office/drawing/2014/main" id="{E34F496F-695F-309F-9C3E-E208495B2A3F}"/>
               </a:ext>
             </a:extLst>
@@ -5514,631 +6437,6 @@
 </p:sld>
 </file>
 
-<file path=ppt/slides/slide15.xml><?xml version="1.0" encoding="utf-8"?>
-<p:sld xmlns:a="http://schemas.openxmlformats.org/drawingml/2006/main" xmlns:r="http://schemas.openxmlformats.org/officeDocument/2006/relationships" xmlns:p="http://schemas.openxmlformats.org/presentationml/2006/main">
-  <p:cSld>
-    <p:spTree>
-      <p:nvGrpSpPr>
-        <p:cNvPr id="1" name=""/>
-        <p:cNvGrpSpPr/>
-        <p:nvPr/>
-      </p:nvGrpSpPr>
-      <p:grpSpPr>
-        <a:xfrm>
-          <a:off x="0" y="0"/>
-          <a:ext cx="0" cy="0"/>
-          <a:chOff x="0" y="0"/>
-          <a:chExt cx="0" cy="0"/>
-        </a:xfrm>
-      </p:grpSpPr>
-      <p:sp>
-        <p:nvSpPr>
-          <p:cNvPr id="2" name="Title 1">
-            <a:extLst>
-              <a:ext uri="{FF2B5EF4-FFF2-40B4-BE49-F238E27FC236}">
-                <a16:creationId xmlns:a16="http://schemas.microsoft.com/office/drawing/2014/main" id="{46CBF11B-25B1-1154-B0BD-F2AC4493D97C}"/>
-              </a:ext>
-            </a:extLst>
-          </p:cNvPr>
-          <p:cNvSpPr>
-            <a:spLocks noGrp="1"/>
-          </p:cNvSpPr>
-          <p:nvPr>
-            <p:ph type="title"/>
-          </p:nvPr>
-        </p:nvSpPr>
-        <p:spPr/>
-        <p:txBody>
-          <a:bodyPr/>
-          <a:lstStyle/>
-          <a:p>
-            <a:r>
-              <a:rPr lang="en-NL" dirty="0"/>
-              <a:t>High-fi version control : Git</a:t>
-            </a:r>
-          </a:p>
-        </p:txBody>
-      </p:sp>
-      <p:sp>
-        <p:nvSpPr>
-          <p:cNvPr id="3" name="Content Placeholder 2">
-            <a:extLst>
-              <a:ext uri="{FF2B5EF4-FFF2-40B4-BE49-F238E27FC236}">
-                <a16:creationId xmlns:a16="http://schemas.microsoft.com/office/drawing/2014/main" id="{5FF6D385-011B-B96A-B94D-F66FDEEC16D2}"/>
-              </a:ext>
-            </a:extLst>
-          </p:cNvPr>
-          <p:cNvSpPr>
-            <a:spLocks noGrp="1"/>
-          </p:cNvSpPr>
-          <p:nvPr>
-            <p:ph idx="1"/>
-          </p:nvPr>
-        </p:nvSpPr>
-        <p:spPr/>
-        <p:txBody>
-          <a:bodyPr/>
-          <a:lstStyle/>
-          <a:p>
-            <a:pPr marL="0" indent="0" algn="ctr">
-              <a:buNone/>
-            </a:pPr>
-            <a:r>
-              <a:rPr lang="en-NL" i="1" dirty="0"/>
-              <a:t>“Oh great. But we are not programmers. </a:t>
-            </a:r>
-          </a:p>
-          <a:p>
-            <a:pPr marL="0" indent="0" algn="ctr">
-              <a:buNone/>
-            </a:pPr>
-            <a:r>
-              <a:rPr lang="en-NL" i="1" dirty="0"/>
-              <a:t>So unfortunately peanutbutter.”</a:t>
-            </a:r>
-          </a:p>
-        </p:txBody>
-      </p:sp>
-    </p:spTree>
-    <p:extLst>
-      <p:ext uri="{BB962C8B-B14F-4D97-AF65-F5344CB8AC3E}">
-        <p14:creationId xmlns:p14="http://schemas.microsoft.com/office/powerpoint/2010/main" val="3223172593"/>
-      </p:ext>
-    </p:extLst>
-  </p:cSld>
-  <p:clrMapOvr>
-    <a:masterClrMapping/>
-  </p:clrMapOvr>
-</p:sld>
-</file>
-
-<file path=ppt/slides/slide16.xml><?xml version="1.0" encoding="utf-8"?>
-<p:sld xmlns:a="http://schemas.openxmlformats.org/drawingml/2006/main" xmlns:r="http://schemas.openxmlformats.org/officeDocument/2006/relationships" xmlns:p="http://schemas.openxmlformats.org/presentationml/2006/main">
-  <p:cSld>
-    <p:spTree>
-      <p:nvGrpSpPr>
-        <p:cNvPr id="1" name=""/>
-        <p:cNvGrpSpPr/>
-        <p:nvPr/>
-      </p:nvGrpSpPr>
-      <p:grpSpPr>
-        <a:xfrm>
-          <a:off x="0" y="0"/>
-          <a:ext cx="0" cy="0"/>
-          <a:chOff x="0" y="0"/>
-          <a:chExt cx="0" cy="0"/>
-        </a:xfrm>
-      </p:grpSpPr>
-      <p:sp>
-        <p:nvSpPr>
-          <p:cNvPr id="2" name="Title 1">
-            <a:extLst>
-              <a:ext uri="{FF2B5EF4-FFF2-40B4-BE49-F238E27FC236}">
-                <a16:creationId xmlns:a16="http://schemas.microsoft.com/office/drawing/2014/main" id="{134BB777-0A04-D3D5-3FA5-756671BD452A}"/>
-              </a:ext>
-            </a:extLst>
-          </p:cNvPr>
-          <p:cNvSpPr>
-            <a:spLocks noGrp="1"/>
-          </p:cNvSpPr>
-          <p:nvPr>
-            <p:ph type="title"/>
-          </p:nvPr>
-        </p:nvSpPr>
-        <p:spPr/>
-        <p:txBody>
-          <a:bodyPr/>
-          <a:lstStyle/>
-          <a:p>
-            <a:r>
-              <a:rPr lang="en-NL" dirty="0"/>
-              <a:t>High-fi version control : Git with Github</a:t>
-            </a:r>
-          </a:p>
-        </p:txBody>
-      </p:sp>
-      <p:sp>
-        <p:nvSpPr>
-          <p:cNvPr id="3" name="Content Placeholder 2">
-            <a:extLst>
-              <a:ext uri="{FF2B5EF4-FFF2-40B4-BE49-F238E27FC236}">
-                <a16:creationId xmlns:a16="http://schemas.microsoft.com/office/drawing/2014/main" id="{879CFE73-1DF0-EFE0-80F4-CCA6BDAD6D8E}"/>
-              </a:ext>
-            </a:extLst>
-          </p:cNvPr>
-          <p:cNvSpPr>
-            <a:spLocks noGrp="1"/>
-          </p:cNvSpPr>
-          <p:nvPr>
-            <p:ph idx="1"/>
-          </p:nvPr>
-        </p:nvSpPr>
-        <p:spPr/>
-        <p:txBody>
-          <a:bodyPr/>
-          <a:lstStyle/>
-          <a:p>
-            <a:endParaRPr lang="en-NL" dirty="0"/>
-          </a:p>
-        </p:txBody>
-      </p:sp>
-      <p:pic>
-        <p:nvPicPr>
-          <p:cNvPr id="8" name="Picture 7">
-            <a:extLst>
-              <a:ext uri="{FF2B5EF4-FFF2-40B4-BE49-F238E27FC236}">
-                <a16:creationId xmlns:a16="http://schemas.microsoft.com/office/drawing/2014/main" id="{B756B507-60E0-F0F6-5458-48EAF404EF59}"/>
-              </a:ext>
-            </a:extLst>
-          </p:cNvPr>
-          <p:cNvPicPr>
-            <a:picLocks noChangeAspect="1"/>
-          </p:cNvPicPr>
-          <p:nvPr/>
-        </p:nvPicPr>
-        <p:blipFill>
-          <a:blip r:embed="rId3"/>
-          <a:stretch>
-            <a:fillRect/>
-          </a:stretch>
-        </p:blipFill>
-        <p:spPr>
-          <a:xfrm>
-            <a:off x="183421" y="1337555"/>
-            <a:ext cx="11170379" cy="4351337"/>
-          </a:xfrm>
-          <a:prstGeom prst="rect">
-            <a:avLst/>
-          </a:prstGeom>
-        </p:spPr>
-      </p:pic>
-      <p:sp>
-        <p:nvSpPr>
-          <p:cNvPr id="10" name="TextBox 9">
-            <a:extLst>
-              <a:ext uri="{FF2B5EF4-FFF2-40B4-BE49-F238E27FC236}">
-                <a16:creationId xmlns:a16="http://schemas.microsoft.com/office/drawing/2014/main" id="{9E315CF4-456D-C16F-EA8E-F46D7AC53861}"/>
-              </a:ext>
-            </a:extLst>
-          </p:cNvPr>
-          <p:cNvSpPr txBox="1"/>
-          <p:nvPr/>
-        </p:nvSpPr>
-        <p:spPr>
-          <a:xfrm>
-            <a:off x="105816" y="5934670"/>
-            <a:ext cx="6136104" cy="923330"/>
-          </a:xfrm>
-          <a:prstGeom prst="rect">
-            <a:avLst/>
-          </a:prstGeom>
-          <a:noFill/>
-        </p:spPr>
-        <p:txBody>
-          <a:bodyPr wrap="square">
-            <a:spAutoFit/>
-          </a:bodyPr>
-          <a:lstStyle/>
-          <a:p>
-            <a:pPr rtl="0" fontAlgn="base">
-              <a:spcBef>
-                <a:spcPts val="0"/>
-              </a:spcBef>
-              <a:spcAft>
-                <a:spcPts val="0"/>
-              </a:spcAft>
-              <a:buFont typeface="Arial" panose="020B0604020202020204" pitchFamily="34" charset="0"/>
-              <a:buChar char="•"/>
-            </a:pPr>
-            <a:r>
-              <a:rPr lang="en-GB" sz="1800" b="0" i="0" u="none" strike="noStrike" dirty="0">
-                <a:effectLst/>
-                <a:latin typeface="Trebuchet MS" panose="020B0703020202090204" pitchFamily="34" charset="0"/>
-              </a:rPr>
-              <a:t>Git handles version control on your repo</a:t>
-            </a:r>
-          </a:p>
-          <a:p>
-            <a:pPr rtl="0" fontAlgn="base">
-              <a:spcBef>
-                <a:spcPts val="0"/>
-              </a:spcBef>
-              <a:spcAft>
-                <a:spcPts val="0"/>
-              </a:spcAft>
-              <a:buFont typeface="Arial" panose="020B0604020202020204" pitchFamily="34" charset="0"/>
-              <a:buChar char="•"/>
-            </a:pPr>
-            <a:endParaRPr lang="en-GB" sz="1800" b="0" i="0" u="none" strike="noStrike" dirty="0">
-              <a:effectLst/>
-              <a:latin typeface="Trebuchet MS" panose="020B0703020202090204" pitchFamily="34" charset="0"/>
-            </a:endParaRPr>
-          </a:p>
-          <a:p>
-            <a:pPr rtl="0" fontAlgn="base">
-              <a:spcBef>
-                <a:spcPts val="0"/>
-              </a:spcBef>
-              <a:spcAft>
-                <a:spcPts val="1600"/>
-              </a:spcAft>
-              <a:buFont typeface="Arial" panose="020B0604020202020204" pitchFamily="34" charset="0"/>
-              <a:buChar char="•"/>
-            </a:pPr>
-            <a:r>
-              <a:rPr lang="en-GB" sz="1800" b="0" i="0" u="none" strike="noStrike" dirty="0">
-                <a:effectLst/>
-                <a:latin typeface="Trebuchet MS" panose="020B0703020202090204" pitchFamily="34" charset="0"/>
-              </a:rPr>
-              <a:t>When you use GitHub, Git is working behind the scenes.</a:t>
-            </a:r>
-          </a:p>
-        </p:txBody>
-      </p:sp>
-    </p:spTree>
-    <p:extLst>
-      <p:ext uri="{BB962C8B-B14F-4D97-AF65-F5344CB8AC3E}">
-        <p14:creationId xmlns:p14="http://schemas.microsoft.com/office/powerpoint/2010/main" val="2425700469"/>
-      </p:ext>
-    </p:extLst>
-  </p:cSld>
-  <p:clrMapOvr>
-    <a:masterClrMapping/>
-  </p:clrMapOvr>
-</p:sld>
-</file>
-
-<file path=ppt/slides/slide17.xml><?xml version="1.0" encoding="utf-8"?>
-<p:sld xmlns:a="http://schemas.openxmlformats.org/drawingml/2006/main" xmlns:r="http://schemas.openxmlformats.org/officeDocument/2006/relationships" xmlns:p="http://schemas.openxmlformats.org/presentationml/2006/main">
-  <p:cSld>
-    <p:spTree>
-      <p:nvGrpSpPr>
-        <p:cNvPr id="1" name=""/>
-        <p:cNvGrpSpPr/>
-        <p:nvPr/>
-      </p:nvGrpSpPr>
-      <p:grpSpPr>
-        <a:xfrm>
-          <a:off x="0" y="0"/>
-          <a:ext cx="0" cy="0"/>
-          <a:chOff x="0" y="0"/>
-          <a:chExt cx="0" cy="0"/>
-        </a:xfrm>
-      </p:grpSpPr>
-      <p:sp>
-        <p:nvSpPr>
-          <p:cNvPr id="2" name="Title 1">
-            <a:extLst>
-              <a:ext uri="{FF2B5EF4-FFF2-40B4-BE49-F238E27FC236}">
-                <a16:creationId xmlns:a16="http://schemas.microsoft.com/office/drawing/2014/main" id="{B23F1F98-532D-ABB2-5410-DD5A2A497D1B}"/>
-              </a:ext>
-            </a:extLst>
-          </p:cNvPr>
-          <p:cNvSpPr>
-            <a:spLocks noGrp="1"/>
-          </p:cNvSpPr>
-          <p:nvPr>
-            <p:ph type="title"/>
-          </p:nvPr>
-        </p:nvSpPr>
-        <p:spPr/>
-        <p:txBody>
-          <a:bodyPr/>
-          <a:lstStyle/>
-          <a:p>
-            <a:r>
-              <a:rPr lang="en-NL" dirty="0"/>
-              <a:t>High-fi version control : Git with Github</a:t>
-            </a:r>
-            <a:br>
-              <a:rPr lang="en-NL" dirty="0"/>
-            </a:br>
-            <a:endParaRPr lang="en-NL" dirty="0"/>
-          </a:p>
-        </p:txBody>
-      </p:sp>
-      <p:sp>
-        <p:nvSpPr>
-          <p:cNvPr id="3" name="Content Placeholder 2">
-            <a:extLst>
-              <a:ext uri="{FF2B5EF4-FFF2-40B4-BE49-F238E27FC236}">
-                <a16:creationId xmlns:a16="http://schemas.microsoft.com/office/drawing/2014/main" id="{99CAB18F-DF42-3D7D-8CE2-A7A676C890CB}"/>
-              </a:ext>
-            </a:extLst>
-          </p:cNvPr>
-          <p:cNvSpPr>
-            <a:spLocks noGrp="1"/>
-          </p:cNvSpPr>
-          <p:nvPr>
-            <p:ph idx="1"/>
-          </p:nvPr>
-        </p:nvSpPr>
-        <p:spPr/>
-        <p:txBody>
-          <a:bodyPr>
-            <a:normAutofit lnSpcReduction="10000"/>
-          </a:bodyPr>
-          <a:lstStyle/>
-          <a:p>
-            <a:pPr rtl="0" fontAlgn="base">
-              <a:spcBef>
-                <a:spcPts val="0"/>
-              </a:spcBef>
-              <a:spcAft>
-                <a:spcPts val="0"/>
-              </a:spcAft>
-              <a:buFont typeface="Arial" panose="020B0604020202020204" pitchFamily="34" charset="0"/>
-              <a:buChar char="•"/>
-            </a:pPr>
-            <a:r>
-              <a:rPr lang="en-GB" sz="2400" b="0" i="0" u="none" strike="noStrike" dirty="0">
-                <a:effectLst/>
-                <a:latin typeface="Trebuchet MS" panose="020B0703020202090204" pitchFamily="34" charset="0"/>
-              </a:rPr>
-              <a:t>GitHub is a cloud storage system for git repositories.</a:t>
-            </a:r>
-          </a:p>
-          <a:p>
-            <a:pPr rtl="0" fontAlgn="base">
-              <a:spcBef>
-                <a:spcPts val="0"/>
-              </a:spcBef>
-              <a:spcAft>
-                <a:spcPts val="0"/>
-              </a:spcAft>
-              <a:buFont typeface="Arial" panose="020B0604020202020204" pitchFamily="34" charset="0"/>
-              <a:buChar char="•"/>
-            </a:pPr>
-            <a:endParaRPr lang="en-GB" sz="2400" dirty="0">
-              <a:latin typeface="Trebuchet MS" panose="020B0703020202090204" pitchFamily="34" charset="0"/>
-            </a:endParaRPr>
-          </a:p>
-          <a:p>
-            <a:pPr rtl="0" fontAlgn="base">
-              <a:spcBef>
-                <a:spcPts val="0"/>
-              </a:spcBef>
-              <a:spcAft>
-                <a:spcPts val="0"/>
-              </a:spcAft>
-              <a:buFont typeface="Arial" panose="020B0604020202020204" pitchFamily="34" charset="0"/>
-              <a:buChar char="•"/>
-            </a:pPr>
-            <a:r>
-              <a:rPr lang="en-GB" sz="2400" dirty="0">
-                <a:latin typeface="Trebuchet MS" panose="020B0703020202090204" pitchFamily="34" charset="0"/>
-              </a:rPr>
-              <a:t>Offers additional tools for collaboration</a:t>
-            </a:r>
-          </a:p>
-          <a:p>
-            <a:pPr rtl="0" fontAlgn="base">
-              <a:spcBef>
-                <a:spcPts val="0"/>
-              </a:spcBef>
-              <a:spcAft>
-                <a:spcPts val="0"/>
-              </a:spcAft>
-              <a:buFont typeface="Arial" panose="020B0604020202020204" pitchFamily="34" charset="0"/>
-              <a:buChar char="•"/>
-            </a:pPr>
-            <a:endParaRPr lang="en-GB" sz="2400" dirty="0">
-              <a:latin typeface="Trebuchet MS" panose="020B0703020202090204" pitchFamily="34" charset="0"/>
-            </a:endParaRPr>
-          </a:p>
-          <a:p>
-            <a:pPr rtl="0" fontAlgn="base">
-              <a:spcBef>
-                <a:spcPts val="0"/>
-              </a:spcBef>
-              <a:spcAft>
-                <a:spcPts val="0"/>
-              </a:spcAft>
-              <a:buFont typeface="Arial" panose="020B0604020202020204" pitchFamily="34" charset="0"/>
-              <a:buChar char="•"/>
-            </a:pPr>
-            <a:r>
-              <a:rPr lang="en-GB" sz="2400" dirty="0">
-                <a:latin typeface="Trebuchet MS" panose="020B0703020202090204" pitchFamily="34" charset="0"/>
-              </a:rPr>
-              <a:t>Does not need to be code, also text, or just any file</a:t>
-            </a:r>
-          </a:p>
-          <a:p>
-            <a:pPr rtl="0" fontAlgn="base">
-              <a:spcBef>
-                <a:spcPts val="0"/>
-              </a:spcBef>
-              <a:spcAft>
-                <a:spcPts val="0"/>
-              </a:spcAft>
-              <a:buFont typeface="Arial" panose="020B0604020202020204" pitchFamily="34" charset="0"/>
-              <a:buChar char="•"/>
-            </a:pPr>
-            <a:endParaRPr lang="en-GB" sz="2400" dirty="0">
-              <a:latin typeface="Trebuchet MS" panose="020B0703020202090204" pitchFamily="34" charset="0"/>
-            </a:endParaRPr>
-          </a:p>
-          <a:p>
-            <a:pPr rtl="0" fontAlgn="base">
-              <a:spcBef>
-                <a:spcPts val="0"/>
-              </a:spcBef>
-              <a:spcAft>
-                <a:spcPts val="0"/>
-              </a:spcAft>
-              <a:buFont typeface="Arial" panose="020B0604020202020204" pitchFamily="34" charset="0"/>
-              <a:buChar char="•"/>
-            </a:pPr>
-            <a:r>
-              <a:rPr lang="en-GB" sz="2400" dirty="0">
-                <a:latin typeface="Trebuchet MS" panose="020B0703020202090204" pitchFamily="34" charset="0"/>
-              </a:rPr>
-              <a:t>Reproducible data analysis = code </a:t>
-            </a:r>
-          </a:p>
-          <a:p>
-            <a:pPr marL="0" indent="0" rtl="0" fontAlgn="base">
-              <a:spcBef>
-                <a:spcPts val="0"/>
-              </a:spcBef>
-              <a:spcAft>
-                <a:spcPts val="0"/>
-              </a:spcAft>
-              <a:buNone/>
-            </a:pPr>
-            <a:endParaRPr lang="en-GB" sz="2400" dirty="0">
-              <a:latin typeface="Trebuchet MS" panose="020B0703020202090204" pitchFamily="34" charset="0"/>
-            </a:endParaRPr>
-          </a:p>
-          <a:p>
-            <a:pPr marL="0" indent="0" rtl="0" fontAlgn="base">
-              <a:spcBef>
-                <a:spcPts val="0"/>
-              </a:spcBef>
-              <a:spcAft>
-                <a:spcPts val="0"/>
-              </a:spcAft>
-              <a:buNone/>
-            </a:pPr>
-            <a:endParaRPr lang="en-GB" sz="2400" dirty="0">
-              <a:latin typeface="Trebuchet MS" panose="020B0703020202090204" pitchFamily="34" charset="0"/>
-            </a:endParaRPr>
-          </a:p>
-          <a:p>
-            <a:pPr rtl="0" fontAlgn="base">
-              <a:spcBef>
-                <a:spcPts val="0"/>
-              </a:spcBef>
-              <a:spcAft>
-                <a:spcPts val="0"/>
-              </a:spcAft>
-              <a:buFont typeface="Arial" panose="020B0604020202020204" pitchFamily="34" charset="0"/>
-              <a:buChar char="•"/>
-            </a:pPr>
-            <a:r>
-              <a:rPr lang="en-GB" sz="2400" dirty="0">
-                <a:latin typeface="Trebuchet MS" panose="020B0703020202090204" pitchFamily="34" charset="0"/>
-              </a:rPr>
-              <a:t>Works with web interface, </a:t>
-            </a:r>
-            <a:br>
-              <a:rPr lang="en-GB" sz="2400" dirty="0">
-                <a:latin typeface="Trebuchet MS" panose="020B0703020202090204" pitchFamily="34" charset="0"/>
-              </a:rPr>
-            </a:br>
-            <a:r>
-              <a:rPr lang="en-GB" sz="2400" dirty="0">
-                <a:latin typeface="Trebuchet MS" panose="020B0703020202090204" pitchFamily="34" charset="0"/>
-              </a:rPr>
-              <a:t>or </a:t>
-            </a:r>
-            <a:r>
-              <a:rPr lang="en-GB" sz="2400" b="0" i="0" u="none" strike="noStrike" dirty="0" err="1">
-                <a:effectLst/>
-                <a:latin typeface="Trebuchet MS" panose="020B0703020202090204" pitchFamily="34" charset="0"/>
-              </a:rPr>
-              <a:t>Github</a:t>
-            </a:r>
-            <a:r>
-              <a:rPr lang="en-GB" sz="2400" b="0" i="0" u="none" strike="noStrike" dirty="0">
-                <a:effectLst/>
-                <a:latin typeface="Trebuchet MS" panose="020B0703020202090204" pitchFamily="34" charset="0"/>
-              </a:rPr>
-              <a:t> Desktop App , </a:t>
-            </a:r>
-            <a:br>
-              <a:rPr lang="en-GB" sz="2400" b="0" i="0" u="none" strike="noStrike" dirty="0">
-                <a:effectLst/>
-                <a:latin typeface="Trebuchet MS" panose="020B0703020202090204" pitchFamily="34" charset="0"/>
-              </a:rPr>
-            </a:br>
-            <a:r>
-              <a:rPr lang="en-GB" sz="2400" b="0" i="0" u="none" strike="noStrike" dirty="0">
-                <a:effectLst/>
-                <a:latin typeface="Trebuchet MS" panose="020B0703020202090204" pitchFamily="34" charset="0"/>
-              </a:rPr>
-              <a:t>or </a:t>
-            </a:r>
-            <a:r>
-              <a:rPr lang="en-GB" sz="2400" dirty="0">
-                <a:latin typeface="Trebuchet MS" panose="020B0703020202090204" pitchFamily="34" charset="0"/>
-              </a:rPr>
-              <a:t>Connects to </a:t>
-            </a:r>
-            <a:r>
-              <a:rPr lang="en-GB" sz="2400" dirty="0" err="1">
-                <a:latin typeface="Trebuchet MS" panose="020B0703020202090204" pitchFamily="34" charset="0"/>
-              </a:rPr>
-              <a:t>Rstudio</a:t>
-            </a:r>
-            <a:r>
-              <a:rPr lang="en-GB" sz="2400" dirty="0">
-                <a:latin typeface="Trebuchet MS" panose="020B0703020202090204" pitchFamily="34" charset="0"/>
-              </a:rPr>
-              <a:t>, </a:t>
-            </a:r>
-            <a:br>
-              <a:rPr lang="en-GB" sz="2400" dirty="0">
-                <a:latin typeface="Trebuchet MS" panose="020B0703020202090204" pitchFamily="34" charset="0"/>
-              </a:rPr>
-            </a:br>
-            <a:r>
-              <a:rPr lang="en-GB" sz="2400" dirty="0">
-                <a:latin typeface="Trebuchet MS" panose="020B0703020202090204" pitchFamily="34" charset="0"/>
-              </a:rPr>
-              <a:t>or command line, </a:t>
-            </a:r>
-            <a:br>
-              <a:rPr lang="en-GB" sz="2400" dirty="0">
-                <a:latin typeface="Trebuchet MS" panose="020B0703020202090204" pitchFamily="34" charset="0"/>
-              </a:rPr>
-            </a:br>
-            <a:r>
-              <a:rPr lang="en-GB" sz="2400" dirty="0">
-                <a:latin typeface="Trebuchet MS" panose="020B0703020202090204" pitchFamily="34" charset="0"/>
-              </a:rPr>
-              <a:t>or..</a:t>
-            </a:r>
-          </a:p>
-          <a:p>
-            <a:endParaRPr lang="en-NL" dirty="0"/>
-          </a:p>
-        </p:txBody>
-      </p:sp>
-    </p:spTree>
-    <p:extLst>
-      <p:ext uri="{BB962C8B-B14F-4D97-AF65-F5344CB8AC3E}">
-        <p14:creationId xmlns:p14="http://schemas.microsoft.com/office/powerpoint/2010/main" val="3623605110"/>
-      </p:ext>
-    </p:extLst>
-  </p:cSld>
-  <p:clrMapOvr>
-    <a:masterClrMapping/>
-  </p:clrMapOvr>
-</p:sld>
-</file>
-
 <file path=ppt/slides/slide18.xml><?xml version="1.0" encoding="utf-8"?>
 <p:sld xmlns:a="http://schemas.openxmlformats.org/drawingml/2006/main" xmlns:r="http://schemas.openxmlformats.org/officeDocument/2006/relationships" xmlns:p="http://schemas.openxmlformats.org/presentationml/2006/main">
   <p:cSld>
@@ -6158,38 +6456,10 @@
       </p:grpSpPr>
       <p:sp>
         <p:nvSpPr>
-          <p:cNvPr id="2" name="Title 1">
-            <a:extLst>
-              <a:ext uri="{FF2B5EF4-FFF2-40B4-BE49-F238E27FC236}">
-                <a16:creationId xmlns:a16="http://schemas.microsoft.com/office/drawing/2014/main" id="{5BA6F976-0B28-225A-2CE4-295D93B80657}"/>
-              </a:ext>
-            </a:extLst>
-          </p:cNvPr>
-          <p:cNvSpPr>
-            <a:spLocks noGrp="1"/>
-          </p:cNvSpPr>
-          <p:nvPr>
-            <p:ph type="title"/>
-          </p:nvPr>
-        </p:nvSpPr>
-        <p:spPr/>
-        <p:txBody>
-          <a:bodyPr/>
-          <a:lstStyle/>
-          <a:p>
-            <a:r>
-              <a:rPr lang="en-NL" dirty="0"/>
-              <a:t>High-fi version control : Git with Github</a:t>
-            </a:r>
-          </a:p>
-        </p:txBody>
-      </p:sp>
-      <p:sp>
-        <p:nvSpPr>
           <p:cNvPr id="3" name="Content Placeholder 2">
             <a:extLst>
               <a:ext uri="{FF2B5EF4-FFF2-40B4-BE49-F238E27FC236}">
-                <a16:creationId xmlns:a16="http://schemas.microsoft.com/office/drawing/2014/main" id="{D98C64F1-D4B8-F0EF-8C83-CF9E4E44089E}"/>
+                <a16:creationId xmlns:a16="http://schemas.microsoft.com/office/drawing/2014/main" id="{5FF6D385-011B-B96A-B94D-F66FDEEC16D2}"/>
               </a:ext>
             </a:extLst>
           </p:cNvPr>
@@ -6200,64 +6470,65 @@
             <p:ph idx="1"/>
           </p:nvPr>
         </p:nvSpPr>
-        <p:spPr>
-          <a:xfrm>
-            <a:off x="838200" y="1690688"/>
-            <a:ext cx="10515600" cy="4486275"/>
-          </a:xfrm>
-        </p:spPr>
-        <p:txBody>
-          <a:bodyPr/>
-          <a:lstStyle/>
-          <a:p>
-            <a:pPr marL="0" indent="0">
+        <p:spPr/>
+        <p:txBody>
+          <a:bodyPr/>
+          <a:lstStyle/>
+          <a:p>
+            <a:pPr marL="0" indent="0" algn="ctr">
               <a:buNone/>
             </a:pPr>
-            <a:r>
-              <a:rPr lang="en-GB" dirty="0"/>
-              <a:t>C</a:t>
-            </a:r>
-            <a:r>
-              <a:rPr lang="en-NL" dirty="0"/>
-              <a:t>ons</a:t>
-            </a:r>
-          </a:p>
-          <a:p>
-            <a:r>
-              <a:rPr lang="en-GB" dirty="0"/>
-              <a:t>D</a:t>
-            </a:r>
-            <a:r>
-              <a:rPr lang="en-NL" dirty="0"/>
-              <a:t>esigned for and by IT crowd</a:t>
-            </a:r>
-          </a:p>
-          <a:p>
-            <a:r>
-              <a:rPr lang="en-GB" dirty="0"/>
-              <a:t>P</a:t>
-            </a:r>
-            <a:r>
-              <a:rPr lang="en-NL" dirty="0"/>
-              <a:t>refers text files (but can handle all)</a:t>
-            </a:r>
-          </a:p>
-          <a:p>
-            <a:r>
-              <a:rPr lang="en-GB" dirty="0"/>
-              <a:t>N</a:t>
-            </a:r>
-            <a:r>
-              <a:rPr lang="en-NL" dirty="0"/>
-              <a:t>o automatic syncing </a:t>
-            </a:r>
+            <a:endParaRPr lang="en-NL" i="1" dirty="0"/>
+          </a:p>
+          <a:p>
+            <a:pPr marL="0" indent="0" algn="ctr">
+              <a:buNone/>
+            </a:pPr>
+            <a:r>
+              <a:rPr lang="en-NL" i="1" dirty="0"/>
+              <a:t>“Oh great. But we are not programmers. </a:t>
+            </a:r>
+          </a:p>
+          <a:p>
+            <a:pPr marL="0" indent="0" algn="ctr">
+              <a:buNone/>
+            </a:pPr>
+            <a:r>
+              <a:rPr lang="en-NL" i="1" dirty="0"/>
+              <a:t>So unfortunately peanutbutter.”</a:t>
+            </a:r>
+          </a:p>
+        </p:txBody>
+      </p:sp>
+      <p:sp>
+        <p:nvSpPr>
+          <p:cNvPr id="5" name="Title 4">
+            <a:extLst>
+              <a:ext uri="{FF2B5EF4-FFF2-40B4-BE49-F238E27FC236}">
+                <a16:creationId xmlns:a16="http://schemas.microsoft.com/office/drawing/2014/main" id="{FAB24F4B-B940-42E9-5AF9-E487F91FF29A}"/>
+              </a:ext>
+            </a:extLst>
+          </p:cNvPr>
+          <p:cNvSpPr>
+            <a:spLocks noGrp="1"/>
+          </p:cNvSpPr>
+          <p:nvPr>
+            <p:ph type="title"/>
+          </p:nvPr>
+        </p:nvSpPr>
+        <p:spPr/>
+        <p:txBody>
+          <a:bodyPr/>
+          <a:lstStyle/>
+          <a:p>
+            <a:endParaRPr lang="en-NL"/>
           </a:p>
         </p:txBody>
       </p:sp>
     </p:spTree>
     <p:extLst>
       <p:ext uri="{BB962C8B-B14F-4D97-AF65-F5344CB8AC3E}">
-        <p14:creationId xmlns:p14="http://schemas.microsoft.com/office/powerpoint/2010/main" val="639242225"/>
+        <p14:creationId xmlns:p14="http://schemas.microsoft.com/office/powerpoint/2010/main" val="3223172593"/>
       </p:ext>
     </p:extLst>
   </p:cSld>
@@ -6289,7 +6560,7 @@
           <p:cNvPr id="2" name="Title 1">
             <a:extLst>
               <a:ext uri="{FF2B5EF4-FFF2-40B4-BE49-F238E27FC236}">
-                <a16:creationId xmlns:a16="http://schemas.microsoft.com/office/drawing/2014/main" id="{97A1BDC4-9D12-C835-2B23-559522E7C169}"/>
+                <a16:creationId xmlns:a16="http://schemas.microsoft.com/office/drawing/2014/main" id="{134BB777-0A04-D3D5-3FA5-756671BD452A}"/>
               </a:ext>
             </a:extLst>
           </p:cNvPr>
@@ -6317,7 +6588,7 @@
           <p:cNvPr id="3" name="Content Placeholder 2">
             <a:extLst>
               <a:ext uri="{FF2B5EF4-FFF2-40B4-BE49-F238E27FC236}">
-                <a16:creationId xmlns:a16="http://schemas.microsoft.com/office/drawing/2014/main" id="{30A679FB-C3CD-E8FE-C907-60AA53D7F45B}"/>
+                <a16:creationId xmlns:a16="http://schemas.microsoft.com/office/drawing/2014/main" id="{879CFE73-1DF0-EFE0-80F4-CCA6BDAD6D8E}"/>
               </a:ext>
             </a:extLst>
           </p:cNvPr>
@@ -6330,80 +6601,130 @@
         </p:nvSpPr>
         <p:spPr/>
         <p:txBody>
-          <a:bodyPr>
-            <a:normAutofit/>
+          <a:bodyPr/>
+          <a:lstStyle/>
+          <a:p>
+            <a:endParaRPr lang="en-NL" dirty="0"/>
+          </a:p>
+        </p:txBody>
+      </p:sp>
+      <p:pic>
+        <p:nvPicPr>
+          <p:cNvPr id="8" name="Picture 7">
+            <a:extLst>
+              <a:ext uri="{FF2B5EF4-FFF2-40B4-BE49-F238E27FC236}">
+                <a16:creationId xmlns:a16="http://schemas.microsoft.com/office/drawing/2014/main" id="{B756B507-60E0-F0F6-5458-48EAF404EF59}"/>
+              </a:ext>
+            </a:extLst>
+          </p:cNvPr>
+          <p:cNvPicPr>
+            <a:picLocks noChangeAspect="1"/>
+          </p:cNvPicPr>
+          <p:nvPr/>
+        </p:nvPicPr>
+        <p:blipFill>
+          <a:blip r:embed="rId3"/>
+          <a:stretch>
+            <a:fillRect/>
+          </a:stretch>
+        </p:blipFill>
+        <p:spPr>
+          <a:xfrm>
+            <a:off x="183421" y="1337555"/>
+            <a:ext cx="11170379" cy="4351337"/>
+          </a:xfrm>
+          <a:prstGeom prst="rect">
+            <a:avLst/>
+          </a:prstGeom>
+        </p:spPr>
+      </p:pic>
+      <p:sp>
+        <p:nvSpPr>
+          <p:cNvPr id="10" name="TextBox 9">
+            <a:extLst>
+              <a:ext uri="{FF2B5EF4-FFF2-40B4-BE49-F238E27FC236}">
+                <a16:creationId xmlns:a16="http://schemas.microsoft.com/office/drawing/2014/main" id="{9E315CF4-456D-C16F-EA8E-F46D7AC53861}"/>
+              </a:ext>
+            </a:extLst>
+          </p:cNvPr>
+          <p:cNvSpPr txBox="1"/>
+          <p:nvPr/>
+        </p:nvSpPr>
+        <p:spPr>
+          <a:xfrm>
+            <a:off x="105816" y="5934670"/>
+            <a:ext cx="6136104" cy="923330"/>
+          </a:xfrm>
+          <a:prstGeom prst="rect">
+            <a:avLst/>
+          </a:prstGeom>
+          <a:noFill/>
+        </p:spPr>
+        <p:txBody>
+          <a:bodyPr wrap="square">
+            <a:spAutoFit/>
           </a:bodyPr>
           <a:lstStyle/>
           <a:p>
-            <a:pPr marL="0" indent="0">
-              <a:buNone/>
+            <a:pPr rtl="0" fontAlgn="base">
+              <a:spcBef>
+                <a:spcPts val="0"/>
+              </a:spcBef>
+              <a:spcAft>
+                <a:spcPts val="0"/>
+              </a:spcAft>
+              <a:buFont typeface="Arial" panose="020B0604020202020204" pitchFamily="34" charset="0"/>
+              <a:buChar char="•"/>
             </a:pPr>
             <a:r>
-              <a:rPr lang="en-GB" sz="2400" dirty="0"/>
-              <a:t>Pros:</a:t>
-            </a:r>
-          </a:p>
-          <a:p>
-            <a:r>
-              <a:rPr lang="en-GB" sz="2400" dirty="0"/>
-              <a:t>N</a:t>
-            </a:r>
-            <a:r>
-              <a:rPr lang="en-NL" sz="2400" dirty="0"/>
-              <a:t>o automatic syncing! You are in control </a:t>
-            </a:r>
-            <a:endParaRPr lang="en-GB" sz="2400" dirty="0"/>
-          </a:p>
-          <a:p>
-            <a:r>
-              <a:rPr lang="en-GB" sz="2400" dirty="0"/>
-              <a:t>Go back to a working version (releases)</a:t>
-            </a:r>
-          </a:p>
-          <a:p>
-            <a:r>
-              <a:rPr lang="en-GB" sz="2400" dirty="0"/>
-              <a:t>Work on stuff without breaking the working version (branches)</a:t>
-            </a:r>
-          </a:p>
-          <a:p>
-            <a:r>
-              <a:rPr lang="en-GB" sz="2400" dirty="0"/>
-              <a:t>W</a:t>
-            </a:r>
-            <a:r>
-              <a:rPr lang="en-NL" sz="2400" dirty="0"/>
-              <a:t>hen you find a bug, you can retrace when it was (meta data on changes)</a:t>
-            </a:r>
-            <a:endParaRPr lang="en-GB" sz="2400" dirty="0"/>
-          </a:p>
-          <a:p>
-            <a:r>
-              <a:rPr lang="en-GB" sz="2400" dirty="0"/>
-              <a:t>W</a:t>
-            </a:r>
-            <a:r>
-              <a:rPr lang="en-NL" sz="2400" dirty="0"/>
-              <a:t>ork on the same file with multiple people and have git solve the merging .. </a:t>
-            </a:r>
-            <a:r>
-              <a:rPr lang="en-GB" sz="2400" dirty="0"/>
-              <a:t>a</a:t>
-            </a:r>
-            <a:r>
-              <a:rPr lang="en-NL" sz="2400" dirty="0"/>
-              <a:t>lso when you worked offline and upload later (distributed)</a:t>
-            </a:r>
-          </a:p>
-          <a:p>
-            <a:endParaRPr lang="en-NL" sz="2400" dirty="0"/>
+              <a:rPr lang="en-GB" sz="1800" b="0" i="0" u="none" strike="noStrike" dirty="0">
+                <a:effectLst/>
+                <a:latin typeface="Trebuchet MS" panose="020B0703020202090204" pitchFamily="34" charset="0"/>
+              </a:rPr>
+              <a:t>Git handles version control on your repo</a:t>
+            </a:r>
+          </a:p>
+          <a:p>
+            <a:pPr rtl="0" fontAlgn="base">
+              <a:spcBef>
+                <a:spcPts val="0"/>
+              </a:spcBef>
+              <a:spcAft>
+                <a:spcPts val="0"/>
+              </a:spcAft>
+              <a:buFont typeface="Arial" panose="020B0604020202020204" pitchFamily="34" charset="0"/>
+              <a:buChar char="•"/>
+            </a:pPr>
+            <a:endParaRPr lang="en-GB" sz="1800" b="0" i="0" u="none" strike="noStrike" dirty="0">
+              <a:effectLst/>
+              <a:latin typeface="Trebuchet MS" panose="020B0703020202090204" pitchFamily="34" charset="0"/>
+            </a:endParaRPr>
+          </a:p>
+          <a:p>
+            <a:pPr rtl="0" fontAlgn="base">
+              <a:spcBef>
+                <a:spcPts val="0"/>
+              </a:spcBef>
+              <a:spcAft>
+                <a:spcPts val="1600"/>
+              </a:spcAft>
+              <a:buFont typeface="Arial" panose="020B0604020202020204" pitchFamily="34" charset="0"/>
+              <a:buChar char="•"/>
+            </a:pPr>
+            <a:r>
+              <a:rPr lang="en-GB" sz="1800" b="0" i="0" u="none" strike="noStrike" dirty="0">
+                <a:effectLst/>
+                <a:latin typeface="Trebuchet MS" panose="020B0703020202090204" pitchFamily="34" charset="0"/>
+              </a:rPr>
+              <a:t>When you use GitHub, Git is working behind the scenes.</a:t>
+            </a:r>
           </a:p>
         </p:txBody>
       </p:sp>
     </p:spTree>
     <p:extLst>
       <p:ext uri="{BB962C8B-B14F-4D97-AF65-F5344CB8AC3E}">
-        <p14:creationId xmlns:p14="http://schemas.microsoft.com/office/powerpoint/2010/main" val="1936265544"/>
+        <p14:creationId xmlns:p14="http://schemas.microsoft.com/office/powerpoint/2010/main" val="2425700469"/>
       </p:ext>
     </p:extLst>
   </p:cSld>
@@ -6595,57 +6916,12 @@
           <a:chExt cx="0" cy="0"/>
         </a:xfrm>
       </p:grpSpPr>
-      <p:pic>
-        <p:nvPicPr>
-          <p:cNvPr id="4" name="Picture 2">
-            <a:extLst>
-              <a:ext uri="{FF2B5EF4-FFF2-40B4-BE49-F238E27FC236}">
-                <a16:creationId xmlns:a16="http://schemas.microsoft.com/office/drawing/2014/main" id="{532D4E50-D8FB-432F-9A74-A856B26CC7F7}"/>
-              </a:ext>
-            </a:extLst>
-          </p:cNvPr>
-          <p:cNvPicPr>
-            <a:picLocks noChangeAspect="1" noChangeArrowheads="1"/>
-          </p:cNvPicPr>
-          <p:nvPr/>
-        </p:nvPicPr>
-        <p:blipFill rotWithShape="1">
-          <a:blip r:embed="rId2">
-            <a:extLst>
-              <a:ext uri="{28A0092B-C50C-407E-A947-70E740481C1C}">
-                <a14:useLocalDpi xmlns:a14="http://schemas.microsoft.com/office/drawing/2010/main" val="0"/>
-              </a:ext>
-            </a:extLst>
-          </a:blip>
-          <a:srcRect l="43288"/>
-          <a:stretch/>
-        </p:blipFill>
-        <p:spPr bwMode="auto">
-          <a:xfrm>
-            <a:off x="3694485" y="365125"/>
-            <a:ext cx="8324538" cy="6452682"/>
-          </a:xfrm>
-          <a:prstGeom prst="rect">
-            <a:avLst/>
-          </a:prstGeom>
-          <a:noFill/>
-          <a:extLst>
-            <a:ext uri="{909E8E84-426E-40DD-AFC4-6F175D3DCCD1}">
-              <a14:hiddenFill xmlns:a14="http://schemas.microsoft.com/office/drawing/2010/main">
-                <a:solidFill>
-                  <a:srgbClr val="FFFFFF"/>
-                </a:solidFill>
-              </a14:hiddenFill>
-            </a:ext>
-          </a:extLst>
-        </p:spPr>
-      </p:pic>
       <p:sp>
         <p:nvSpPr>
           <p:cNvPr id="2" name="Title 1">
             <a:extLst>
               <a:ext uri="{FF2B5EF4-FFF2-40B4-BE49-F238E27FC236}">
-                <a16:creationId xmlns:a16="http://schemas.microsoft.com/office/drawing/2014/main" id="{A8A032CF-C64F-87C2-7D19-CD16E62C77B9}"/>
+                <a16:creationId xmlns:a16="http://schemas.microsoft.com/office/drawing/2014/main" id="{B23F1F98-532D-ABB2-5410-DD5A2A497D1B}"/>
               </a:ext>
             </a:extLst>
           </p:cNvPr>
@@ -6662,13 +6938,13 @@
           <a:lstStyle/>
           <a:p>
             <a:r>
-              <a:rPr lang="en-GB" dirty="0"/>
-              <a:t>D</a:t>
-            </a:r>
-            <a:r>
               <a:rPr lang="en-NL" dirty="0"/>
-              <a:t>istributed?</a:t>
-            </a:r>
+              <a:t>High-fi version control : Git with Github</a:t>
+            </a:r>
+            <a:br>
+              <a:rPr lang="en-NL" dirty="0"/>
+            </a:br>
+            <a:endParaRPr lang="en-NL" dirty="0"/>
           </a:p>
         </p:txBody>
       </p:sp>
@@ -6677,7 +6953,7 @@
           <p:cNvPr id="3" name="Content Placeholder 2">
             <a:extLst>
               <a:ext uri="{FF2B5EF4-FFF2-40B4-BE49-F238E27FC236}">
-                <a16:creationId xmlns:a16="http://schemas.microsoft.com/office/drawing/2014/main" id="{CFB37296-ADF3-6271-73DC-3F98A34A4047}"/>
+                <a16:creationId xmlns:a16="http://schemas.microsoft.com/office/drawing/2014/main" id="{99CAB18F-DF42-3D7D-8CE2-A7A676C890CB}"/>
               </a:ext>
             </a:extLst>
           </p:cNvPr>
@@ -6688,61 +6964,175 @@
             <p:ph idx="1"/>
           </p:nvPr>
         </p:nvSpPr>
-        <p:spPr>
-          <a:xfrm>
-            <a:off x="172978" y="1825625"/>
-            <a:ext cx="3521508" cy="4351338"/>
-          </a:xfrm>
-        </p:spPr>
+        <p:spPr/>
         <p:txBody>
           <a:bodyPr>
             <a:normAutofit/>
           </a:bodyPr>
           <a:lstStyle/>
           <a:p>
-            <a:r>
-              <a:rPr lang="en-GB" sz="2400" dirty="0"/>
-              <a:t>Y</a:t>
-            </a:r>
-            <a:r>
-              <a:rPr lang="en-NL" sz="2400" dirty="0"/>
-              <a:t>ou do not add changes directly to the base camp (aka github)</a:t>
-            </a:r>
-          </a:p>
-          <a:p>
-            <a:endParaRPr lang="en-NL" sz="2400" dirty="0"/>
-          </a:p>
-          <a:p>
-            <a:pPr marL="0" indent="0">
+            <a:pPr rtl="0" fontAlgn="base">
+              <a:spcBef>
+                <a:spcPts val="0"/>
+              </a:spcBef>
+              <a:spcAft>
+                <a:spcPts val="0"/>
+              </a:spcAft>
+              <a:buFont typeface="Arial" panose="020B0604020202020204" pitchFamily="34" charset="0"/>
+              <a:buChar char="•"/>
+            </a:pPr>
+            <a:r>
+              <a:rPr lang="en-GB" sz="2400" b="0" i="0" u="none" strike="noStrike" dirty="0">
+                <a:effectLst/>
+                <a:latin typeface="Trebuchet MS" panose="020B0703020202090204" pitchFamily="34" charset="0"/>
+              </a:rPr>
+              <a:t>GitHub is a cloud storage system for git repositories.</a:t>
+            </a:r>
+          </a:p>
+          <a:p>
+            <a:pPr marL="0" indent="0" rtl="0" fontAlgn="base">
+              <a:spcBef>
+                <a:spcPts val="0"/>
+              </a:spcBef>
+              <a:spcAft>
+                <a:spcPts val="0"/>
+              </a:spcAft>
               <a:buNone/>
             </a:pPr>
-            <a:r>
-              <a:rPr lang="en-GB" sz="2400" dirty="0"/>
-              <a:t>N</a:t>
-            </a:r>
-            <a:r>
-              <a:rPr lang="en-NL" sz="2400" dirty="0"/>
-              <a:t>o single point of failure:</a:t>
-            </a:r>
-          </a:p>
-          <a:p>
-            <a:r>
-              <a:rPr lang="en-NL" sz="2400" dirty="0"/>
-              <a:t>Every local repo is a backup</a:t>
-            </a:r>
-          </a:p>
-          <a:p>
-            <a:r>
-              <a:rPr lang="en-NL" sz="2400" dirty="0"/>
-              <a:t>You can mess up locally</a:t>
-            </a:r>
+            <a:endParaRPr lang="en-GB" sz="2400" dirty="0">
+              <a:latin typeface="Trebuchet MS" panose="020B0703020202090204" pitchFamily="34" charset="0"/>
+            </a:endParaRPr>
+          </a:p>
+          <a:p>
+            <a:pPr rtl="0" fontAlgn="base">
+              <a:spcBef>
+                <a:spcPts val="0"/>
+              </a:spcBef>
+              <a:spcAft>
+                <a:spcPts val="0"/>
+              </a:spcAft>
+              <a:buFont typeface="Arial" panose="020B0604020202020204" pitchFamily="34" charset="0"/>
+              <a:buChar char="•"/>
+            </a:pPr>
+            <a:r>
+              <a:rPr lang="en-GB" sz="2400" dirty="0">
+                <a:latin typeface="Trebuchet MS" panose="020B0703020202090204" pitchFamily="34" charset="0"/>
+              </a:rPr>
+              <a:t>Does not need to be code, also text, or just any file</a:t>
+            </a:r>
+          </a:p>
+          <a:p>
+            <a:pPr rtl="0" fontAlgn="base">
+              <a:spcBef>
+                <a:spcPts val="0"/>
+              </a:spcBef>
+              <a:spcAft>
+                <a:spcPts val="0"/>
+              </a:spcAft>
+              <a:buFont typeface="Arial" panose="020B0604020202020204" pitchFamily="34" charset="0"/>
+              <a:buChar char="•"/>
+            </a:pPr>
+            <a:endParaRPr lang="en-GB" sz="2400" dirty="0">
+              <a:latin typeface="Trebuchet MS" panose="020B0703020202090204" pitchFamily="34" charset="0"/>
+            </a:endParaRPr>
+          </a:p>
+          <a:p>
+            <a:pPr rtl="0" fontAlgn="base">
+              <a:spcBef>
+                <a:spcPts val="0"/>
+              </a:spcBef>
+              <a:spcAft>
+                <a:spcPts val="0"/>
+              </a:spcAft>
+              <a:buFont typeface="Arial" panose="020B0604020202020204" pitchFamily="34" charset="0"/>
+              <a:buChar char="•"/>
+            </a:pPr>
+            <a:r>
+              <a:rPr lang="en-GB" sz="2400" dirty="0">
+                <a:latin typeface="Trebuchet MS" panose="020B0703020202090204" pitchFamily="34" charset="0"/>
+              </a:rPr>
+              <a:t>Reproducible data analysis = code (join a course!)</a:t>
+            </a:r>
+          </a:p>
+          <a:p>
+            <a:pPr rtl="0" fontAlgn="base">
+              <a:spcBef>
+                <a:spcPts val="0"/>
+              </a:spcBef>
+              <a:spcAft>
+                <a:spcPts val="0"/>
+              </a:spcAft>
+              <a:buFont typeface="Arial" panose="020B0604020202020204" pitchFamily="34" charset="0"/>
+              <a:buChar char="•"/>
+            </a:pPr>
+            <a:endParaRPr lang="en-GB" sz="2400" dirty="0">
+              <a:latin typeface="Trebuchet MS" panose="020B0703020202090204" pitchFamily="34" charset="0"/>
+            </a:endParaRPr>
+          </a:p>
+          <a:p>
+            <a:pPr rtl="0" fontAlgn="base">
+              <a:spcBef>
+                <a:spcPts val="0"/>
+              </a:spcBef>
+              <a:spcAft>
+                <a:spcPts val="0"/>
+              </a:spcAft>
+              <a:buFont typeface="Arial" panose="020B0604020202020204" pitchFamily="34" charset="0"/>
+              <a:buChar char="•"/>
+            </a:pPr>
+            <a:endParaRPr lang="en-GB" sz="2400" dirty="0">
+              <a:latin typeface="Trebuchet MS" panose="020B0703020202090204" pitchFamily="34" charset="0"/>
+            </a:endParaRPr>
+          </a:p>
+          <a:p>
+            <a:pPr rtl="0" fontAlgn="base">
+              <a:spcBef>
+                <a:spcPts val="0"/>
+              </a:spcBef>
+              <a:spcAft>
+                <a:spcPts val="0"/>
+              </a:spcAft>
+              <a:buFont typeface="Arial" panose="020B0604020202020204" pitchFamily="34" charset="0"/>
+              <a:buChar char="•"/>
+            </a:pPr>
+            <a:endParaRPr lang="en-GB" sz="2400" dirty="0">
+              <a:latin typeface="Trebuchet MS" panose="020B0703020202090204" pitchFamily="34" charset="0"/>
+            </a:endParaRPr>
+          </a:p>
+          <a:p>
+            <a:pPr fontAlgn="base">
+              <a:spcBef>
+                <a:spcPts val="0"/>
+              </a:spcBef>
+            </a:pPr>
+            <a:r>
+              <a:rPr lang="en-GB" sz="2400" dirty="0">
+                <a:latin typeface="Trebuchet MS" panose="020B0703020202090204" pitchFamily="34" charset="0"/>
+              </a:rPr>
+              <a:t>Offers additional tools for collaboration (demo this afternoon)</a:t>
+            </a:r>
+          </a:p>
+          <a:p>
+            <a:pPr rtl="0" fontAlgn="base">
+              <a:spcBef>
+                <a:spcPts val="0"/>
+              </a:spcBef>
+              <a:spcAft>
+                <a:spcPts val="0"/>
+              </a:spcAft>
+              <a:buFont typeface="Arial" panose="020B0604020202020204" pitchFamily="34" charset="0"/>
+              <a:buChar char="•"/>
+            </a:pPr>
+            <a:endParaRPr lang="en-GB" sz="2400" dirty="0">
+              <a:latin typeface="Trebuchet MS" panose="020B0703020202090204" pitchFamily="34" charset="0"/>
+            </a:endParaRPr>
           </a:p>
         </p:txBody>
       </p:sp>
     </p:spTree>
     <p:extLst>
       <p:ext uri="{BB962C8B-B14F-4D97-AF65-F5344CB8AC3E}">
-        <p14:creationId xmlns:p14="http://schemas.microsoft.com/office/powerpoint/2010/main" val="176230377"/>
+        <p14:creationId xmlns:p14="http://schemas.microsoft.com/office/powerpoint/2010/main" val="3623605110"/>
       </p:ext>
     </p:extLst>
   </p:cSld>
@@ -6774,7 +7164,7 @@
           <p:cNvPr id="2" name="Title 1">
             <a:extLst>
               <a:ext uri="{FF2B5EF4-FFF2-40B4-BE49-F238E27FC236}">
-                <a16:creationId xmlns:a16="http://schemas.microsoft.com/office/drawing/2014/main" id="{E5E3E03F-A95A-B88C-94EF-4B39278CDFAE}"/>
+                <a16:creationId xmlns:a16="http://schemas.microsoft.com/office/drawing/2014/main" id="{5BA6F976-0B28-225A-2CE4-295D93B80657}"/>
               </a:ext>
             </a:extLst>
           </p:cNvPr>
@@ -6792,7 +7182,7 @@
           <a:p>
             <a:r>
               <a:rPr lang="en-NL" dirty="0"/>
-              <a:t>When to use github</a:t>
+              <a:t>High-fi version control : Git with Github</a:t>
             </a:r>
           </a:p>
         </p:txBody>
@@ -6802,7 +7192,7 @@
           <p:cNvPr id="3" name="Content Placeholder 2">
             <a:extLst>
               <a:ext uri="{FF2B5EF4-FFF2-40B4-BE49-F238E27FC236}">
-                <a16:creationId xmlns:a16="http://schemas.microsoft.com/office/drawing/2014/main" id="{ED6CF073-87C8-6B8F-C260-B84B8823EB4F}"/>
+                <a16:creationId xmlns:a16="http://schemas.microsoft.com/office/drawing/2014/main" id="{D98C64F1-D4B8-F0EF-8C83-CF9E4E44089E}"/>
               </a:ext>
             </a:extLst>
           </p:cNvPr>
@@ -6813,62 +7203,33 @@
             <p:ph idx="1"/>
           </p:nvPr>
         </p:nvSpPr>
-        <p:spPr/>
-        <p:txBody>
-          <a:bodyPr/>
-          <a:lstStyle/>
-          <a:p>
+        <p:spPr>
+          <a:xfrm>
+            <a:off x="838200" y="1690688"/>
+            <a:ext cx="10515600" cy="4486275"/>
+          </a:xfrm>
+        </p:spPr>
+        <p:txBody>
+          <a:bodyPr/>
+          <a:lstStyle/>
+          <a:p>
+            <a:pPr marL="0" indent="0">
+              <a:buNone/>
+            </a:pPr>
+            <a:endParaRPr lang="en-GB" dirty="0"/>
+          </a:p>
+          <a:p>
+            <a:pPr marL="0" indent="0">
+              <a:buNone/>
+            </a:pPr>
             <a:r>
               <a:rPr lang="en-GB" dirty="0"/>
-              <a:t>L</a:t>
+              <a:t>C</a:t>
             </a:r>
             <a:r>
               <a:rPr lang="en-NL" dirty="0"/>
-              <a:t>iving project: github</a:t>
-            </a:r>
-          </a:p>
-          <a:p>
-            <a:pPr lvl="1"/>
-            <a:r>
-              <a:rPr lang="en-GB" b="0" i="0" dirty="0">
-                <a:solidFill>
-                  <a:srgbClr val="000000"/>
-                </a:solidFill>
-                <a:effectLst/>
-                <a:latin typeface="Fira Sans" panose="020B0503050000020004" pitchFamily="34" charset="0"/>
-              </a:rPr>
-              <a:t>Version control</a:t>
-            </a:r>
-          </a:p>
-          <a:p>
-            <a:pPr lvl="1"/>
-            <a:r>
-              <a:rPr lang="en-GB" b="0" i="0" dirty="0">
-                <a:solidFill>
-                  <a:srgbClr val="000000"/>
-                </a:solidFill>
-                <a:effectLst/>
-                <a:latin typeface="Fira Sans" panose="020B0503050000020004" pitchFamily="34" charset="0"/>
-              </a:rPr>
-              <a:t>allows publication of different releases</a:t>
-            </a:r>
-          </a:p>
-          <a:p>
-            <a:pPr lvl="1"/>
-            <a:r>
-              <a:rPr lang="en-GB" b="0" i="0" dirty="0">
-                <a:solidFill>
-                  <a:srgbClr val="000000"/>
-                </a:solidFill>
-                <a:effectLst/>
-                <a:latin typeface="Fira Sans" panose="020B0503050000020004" pitchFamily="34" charset="0"/>
-              </a:rPr>
-              <a:t>platform for collaboration</a:t>
-            </a:r>
-            <a:endParaRPr lang="en-NL" dirty="0"/>
-          </a:p>
-          <a:p>
-            <a:endParaRPr lang="en-NL" dirty="0"/>
+              <a:t>ons</a:t>
+            </a:r>
           </a:p>
           <a:p>
             <a:r>
@@ -6877,28 +7238,117 @@
             </a:r>
             <a:r>
               <a:rPr lang="en-NL" dirty="0"/>
-              <a:t>one: repositories such as OSF</a:t>
-            </a:r>
-          </a:p>
-          <a:p>
-            <a:pPr lvl="1"/>
+              <a:t>esigned for and by IT crowd *</a:t>
+            </a:r>
+          </a:p>
+          <a:p>
             <a:r>
               <a:rPr lang="en-GB" dirty="0"/>
-              <a:t>Why </a:t>
-            </a:r>
-            <a:r>
-              <a:rPr lang="en-GB" dirty="0">
-                <a:sym typeface="Wingdings" pitchFamily="2" charset="2"/>
-              </a:rPr>
-              <a:t> </a:t>
-            </a:r>
+              <a:t>P</a:t>
+            </a:r>
+            <a:r>
+              <a:rPr lang="en-NL" dirty="0"/>
+              <a:t>refers text files (but can handle all)</a:t>
+            </a:r>
+          </a:p>
+          <a:p>
             <a:r>
               <a:rPr lang="en-GB" dirty="0"/>
-              <a:t>G</a:t>
+              <a:t>N</a:t>
             </a:r>
             <a:r>
               <a:rPr lang="en-NL" dirty="0"/>
-              <a:t>ives a doi : makes code citeable </a:t>
+              <a:t>o automatic syncing </a:t>
+            </a:r>
+          </a:p>
+        </p:txBody>
+      </p:sp>
+      <p:pic>
+        <p:nvPicPr>
+          <p:cNvPr id="1030" name="Picture 6" descr="The IT Crowd | Netflix">
+            <a:extLst>
+              <a:ext uri="{FF2B5EF4-FFF2-40B4-BE49-F238E27FC236}">
+                <a16:creationId xmlns:a16="http://schemas.microsoft.com/office/drawing/2014/main" id="{4619F4CE-C24B-D514-4595-31740F9C71E9}"/>
+              </a:ext>
+            </a:extLst>
+          </p:cNvPr>
+          <p:cNvPicPr>
+            <a:picLocks noChangeAspect="1" noChangeArrowheads="1"/>
+          </p:cNvPicPr>
+          <p:nvPr/>
+        </p:nvPicPr>
+        <p:blipFill>
+          <a:blip r:embed="rId3">
+            <a:extLst>
+              <a:ext uri="{28A0092B-C50C-407E-A947-70E740481C1C}">
+                <a14:useLocalDpi xmlns:a14="http://schemas.microsoft.com/office/drawing/2010/main" val="0"/>
+              </a:ext>
+            </a:extLst>
+          </a:blip>
+          <a:srcRect/>
+          <a:stretch>
+            <a:fillRect/>
+          </a:stretch>
+        </p:blipFill>
+        <p:spPr bwMode="auto">
+          <a:xfrm>
+            <a:off x="7251030" y="4078704"/>
+            <a:ext cx="4940969" cy="2779295"/>
+          </a:xfrm>
+          <a:prstGeom prst="rect">
+            <a:avLst/>
+          </a:prstGeom>
+          <a:noFill/>
+          <a:extLst>
+            <a:ext uri="{909E8E84-426E-40DD-AFC4-6F175D3DCCD1}">
+              <a14:hiddenFill xmlns:a14="http://schemas.microsoft.com/office/drawing/2010/main">
+                <a:solidFill>
+                  <a:srgbClr val="FFFFFF"/>
+                </a:solidFill>
+              </a14:hiddenFill>
+            </a:ext>
+          </a:extLst>
+        </p:spPr>
+      </p:pic>
+      <p:sp>
+        <p:nvSpPr>
+          <p:cNvPr id="4" name="TextBox 3">
+            <a:extLst>
+              <a:ext uri="{FF2B5EF4-FFF2-40B4-BE49-F238E27FC236}">
+                <a16:creationId xmlns:a16="http://schemas.microsoft.com/office/drawing/2014/main" id="{096AB7D5-E6C2-FC7E-D657-6CDE3E47EEAB}"/>
+              </a:ext>
+            </a:extLst>
+          </p:cNvPr>
+          <p:cNvSpPr txBox="1"/>
+          <p:nvPr/>
+        </p:nvSpPr>
+        <p:spPr>
+          <a:xfrm>
+            <a:off x="2606842" y="6361641"/>
+            <a:ext cx="4944672" cy="369332"/>
+          </a:xfrm>
+          <a:prstGeom prst="rect">
+            <a:avLst/>
+          </a:prstGeom>
+          <a:noFill/>
+        </p:spPr>
+        <p:txBody>
+          <a:bodyPr wrap="square" rtlCol="0">
+            <a:spAutoFit/>
+          </a:bodyPr>
+          <a:lstStyle/>
+          <a:p>
+            <a:r>
+              <a:rPr lang="en-NL" dirty="0"/>
+              <a:t>* </a:t>
+            </a:r>
+            <a:r>
+              <a:rPr lang="en-GB" dirty="0"/>
+              <a:t>H</a:t>
+            </a:r>
+            <a:r>
+              <a:rPr lang="en-NL" dirty="0"/>
+              <a:t>ighly recommended by the way as a TV series</a:t>
             </a:r>
           </a:p>
         </p:txBody>
@@ -6906,7 +7356,7 @@
     </p:spTree>
     <p:extLst>
       <p:ext uri="{BB962C8B-B14F-4D97-AF65-F5344CB8AC3E}">
-        <p14:creationId xmlns:p14="http://schemas.microsoft.com/office/powerpoint/2010/main" val="1796995553"/>
+        <p14:creationId xmlns:p14="http://schemas.microsoft.com/office/powerpoint/2010/main" val="639242225"/>
       </p:ext>
     </p:extLst>
   </p:cSld>
@@ -6938,7 +7388,7 @@
           <p:cNvPr id="2" name="Title 1">
             <a:extLst>
               <a:ext uri="{FF2B5EF4-FFF2-40B4-BE49-F238E27FC236}">
-                <a16:creationId xmlns:a16="http://schemas.microsoft.com/office/drawing/2014/main" id="{F21C41D6-3F5F-936A-B859-CF4BB685A2D9}"/>
+                <a16:creationId xmlns:a16="http://schemas.microsoft.com/office/drawing/2014/main" id="{97A1BDC4-9D12-C835-2B23-559522E7C169}"/>
               </a:ext>
             </a:extLst>
           </p:cNvPr>
@@ -6956,7 +7406,7 @@
           <a:p>
             <a:r>
               <a:rPr lang="en-NL" dirty="0"/>
-              <a:t>So what about data?</a:t>
+              <a:t>High-fi version control : Git with Github</a:t>
             </a:r>
           </a:p>
         </p:txBody>
@@ -6966,7 +7416,7 @@
           <p:cNvPr id="3" name="Content Placeholder 2">
             <a:extLst>
               <a:ext uri="{FF2B5EF4-FFF2-40B4-BE49-F238E27FC236}">
-                <a16:creationId xmlns:a16="http://schemas.microsoft.com/office/drawing/2014/main" id="{5A028098-98C5-D14C-EFE7-87EF1430C18D}"/>
+                <a16:creationId xmlns:a16="http://schemas.microsoft.com/office/drawing/2014/main" id="{30A679FB-C3CD-E8FE-C907-60AA53D7F45B}"/>
               </a:ext>
             </a:extLst>
           </p:cNvPr>
@@ -6979,38 +7429,76 @@
         </p:nvSpPr>
         <p:spPr/>
         <p:txBody>
-          <a:bodyPr/>
-          <a:lstStyle/>
-          <a:p>
+          <a:bodyPr>
+            <a:normAutofit/>
+          </a:bodyPr>
+          <a:lstStyle/>
+          <a:p>
+            <a:pPr marL="0" indent="0">
+              <a:buNone/>
+            </a:pPr>
+            <a:r>
+              <a:rPr lang="en-GB" dirty="0"/>
+              <a:t>Pros:</a:t>
+            </a:r>
+          </a:p>
+          <a:p>
+            <a:r>
+              <a:rPr lang="en-GB" dirty="0"/>
+              <a:t>N</a:t>
+            </a:r>
             <a:r>
               <a:rPr lang="en-NL" dirty="0"/>
-              <a:t>Git is not a data platform</a:t>
-            </a:r>
-          </a:p>
-          <a:p>
-            <a:endParaRPr lang="en-NL" dirty="0"/>
-          </a:p>
-          <a:p>
+              <a:t>o automatic syncing! You are in control </a:t>
+            </a:r>
+            <a:endParaRPr lang="en-GB" dirty="0"/>
+          </a:p>
+          <a:p>
+            <a:r>
+              <a:rPr lang="en-GB" dirty="0"/>
+              <a:t>Go back to a working version (releases)</a:t>
+            </a:r>
+          </a:p>
+          <a:p>
+            <a:r>
+              <a:rPr lang="en-GB" dirty="0"/>
+              <a:t>Work on stuff without breaking the working version (branches)</a:t>
+            </a:r>
+          </a:p>
+          <a:p>
+            <a:r>
+              <a:rPr lang="en-GB" dirty="0"/>
+              <a:t>W</a:t>
+            </a:r>
             <a:r>
               <a:rPr lang="en-NL" dirty="0"/>
-              <a:t>But used to version control workflows surrounding data</a:t>
-            </a:r>
-          </a:p>
-          <a:p>
-            <a:endParaRPr lang="en-NL" dirty="0"/>
+              <a:t>hen you find a bug, you can retrace when it was (meta data on changes)</a:t>
+            </a:r>
+            <a:endParaRPr lang="en-GB" dirty="0"/>
           </a:p>
           <a:p>
             <a:r>
               <a:rPr lang="en-NL" dirty="0"/>
-              <a:t>Git workflow stimulates documentation, meta data, accessibility, transparency</a:t>
-            </a:r>
+              <a:t>have git solve merging .. </a:t>
+            </a:r>
+            <a:r>
+              <a:rPr lang="en-GB" dirty="0"/>
+              <a:t>a</a:t>
+            </a:r>
+            <a:r>
+              <a:rPr lang="en-NL" dirty="0"/>
+              <a:t>lso when you worked offline and upload later (distributed)</a:t>
+            </a:r>
+          </a:p>
+          <a:p>
+            <a:endParaRPr lang="en-NL" sz="2400" dirty="0"/>
           </a:p>
         </p:txBody>
       </p:sp>
     </p:spTree>
     <p:extLst>
       <p:ext uri="{BB962C8B-B14F-4D97-AF65-F5344CB8AC3E}">
-        <p14:creationId xmlns:p14="http://schemas.microsoft.com/office/powerpoint/2010/main" val="146179425"/>
+        <p14:creationId xmlns:p14="http://schemas.microsoft.com/office/powerpoint/2010/main" val="1936265544"/>
       </p:ext>
     </p:extLst>
   </p:cSld>
@@ -7042,6 +7530,756 @@
           <p:cNvPr id="2" name="Title 1">
             <a:extLst>
               <a:ext uri="{FF2B5EF4-FFF2-40B4-BE49-F238E27FC236}">
+                <a16:creationId xmlns:a16="http://schemas.microsoft.com/office/drawing/2014/main" id="{D580AB74-DC2D-5EB1-B4DD-6A5C4FA946F9}"/>
+              </a:ext>
+            </a:extLst>
+          </p:cNvPr>
+          <p:cNvSpPr>
+            <a:spLocks noGrp="1"/>
+          </p:cNvSpPr>
+          <p:nvPr>
+            <p:ph type="title"/>
+          </p:nvPr>
+        </p:nvSpPr>
+        <p:spPr/>
+        <p:txBody>
+          <a:bodyPr/>
+          <a:lstStyle/>
+          <a:p>
+            <a:r>
+              <a:rPr lang="en-NL" dirty="0"/>
+              <a:t>What is git?</a:t>
+            </a:r>
+          </a:p>
+        </p:txBody>
+      </p:sp>
+      <p:sp>
+        <p:nvSpPr>
+          <p:cNvPr id="3" name="Content Placeholder 2">
+            <a:extLst>
+              <a:ext uri="{FF2B5EF4-FFF2-40B4-BE49-F238E27FC236}">
+                <a16:creationId xmlns:a16="http://schemas.microsoft.com/office/drawing/2014/main" id="{47E90F93-A3D8-FAB4-555E-5DD3979949A1}"/>
+              </a:ext>
+            </a:extLst>
+          </p:cNvPr>
+          <p:cNvSpPr>
+            <a:spLocks noGrp="1"/>
+          </p:cNvSpPr>
+          <p:nvPr>
+            <p:ph idx="1"/>
+          </p:nvPr>
+        </p:nvSpPr>
+        <p:spPr>
+          <a:xfrm>
+            <a:off x="838200" y="1825625"/>
+            <a:ext cx="8823158" cy="4351338"/>
+          </a:xfrm>
+        </p:spPr>
+        <p:txBody>
+          <a:bodyPr>
+            <a:normAutofit/>
+          </a:bodyPr>
+          <a:lstStyle/>
+          <a:p>
+            <a:r>
+              <a:rPr lang="en-GB" sz="2000" b="0" i="0" dirty="0">
+                <a:solidFill>
+                  <a:schemeClr val="accent1"/>
+                </a:solidFill>
+                <a:effectLst/>
+                <a:latin typeface="Fira Sans" panose="020B0503050000020004" pitchFamily="34" charset="0"/>
+              </a:rPr>
+              <a:t>Distributed</a:t>
+            </a:r>
+            <a:r>
+              <a:rPr lang="en-GB" sz="2000" b="0" i="0" dirty="0">
+                <a:solidFill>
+                  <a:srgbClr val="000000"/>
+                </a:solidFill>
+                <a:effectLst/>
+                <a:latin typeface="Fira Sans" panose="020B0503050000020004" pitchFamily="34" charset="0"/>
+              </a:rPr>
+              <a:t> </a:t>
+            </a:r>
+            <a:r>
+              <a:rPr lang="en-GB" sz="2000" b="0" i="0" dirty="0">
+                <a:solidFill>
+                  <a:schemeClr val="accent2"/>
+                </a:solidFill>
+                <a:effectLst/>
+                <a:latin typeface="Fira Sans" panose="020B0503050000020004" pitchFamily="34" charset="0"/>
+              </a:rPr>
+              <a:t>Version Control </a:t>
+            </a:r>
+            <a:r>
+              <a:rPr lang="en-GB" sz="2000" b="0" i="0" dirty="0">
+                <a:solidFill>
+                  <a:srgbClr val="000000"/>
+                </a:solidFill>
+                <a:effectLst/>
+                <a:latin typeface="Fira Sans" panose="020B0503050000020004" pitchFamily="34" charset="0"/>
+              </a:rPr>
+              <a:t>system written by Linus Torvalds (Linux)</a:t>
+            </a:r>
+          </a:p>
+          <a:p>
+            <a:endParaRPr lang="en-GB" sz="2000" b="0" i="0" dirty="0">
+              <a:solidFill>
+                <a:srgbClr val="000000"/>
+              </a:solidFill>
+              <a:effectLst/>
+              <a:latin typeface="Fira Sans" panose="020B0503050000020004" pitchFamily="34" charset="0"/>
+            </a:endParaRPr>
+          </a:p>
+          <a:p>
+            <a:pPr algn="l">
+              <a:buFont typeface="Arial" panose="020B0604020202020204" pitchFamily="34" charset="0"/>
+              <a:buChar char="•"/>
+            </a:pPr>
+            <a:r>
+              <a:rPr lang="en-GB" sz="2000" b="0" i="0" dirty="0">
+                <a:solidFill>
+                  <a:srgbClr val="000000"/>
+                </a:solidFill>
+                <a:effectLst/>
+                <a:latin typeface="Fira Sans" panose="020B0503050000020004" pitchFamily="34" charset="0"/>
+              </a:rPr>
+              <a:t>Open Source software written for the command line</a:t>
+            </a:r>
+            <a:br>
+              <a:rPr lang="en-GB" sz="2000" b="0" i="0" dirty="0">
+                <a:solidFill>
+                  <a:srgbClr val="000000"/>
+                </a:solidFill>
+                <a:effectLst/>
+                <a:latin typeface="Fira Sans" panose="020B0503050000020004" pitchFamily="34" charset="0"/>
+              </a:rPr>
+            </a:br>
+            <a:br>
+              <a:rPr lang="en-GB" sz="2000" b="0" i="0" dirty="0">
+                <a:solidFill>
+                  <a:srgbClr val="000000"/>
+                </a:solidFill>
+                <a:effectLst/>
+                <a:latin typeface="Fira Sans" panose="020B0503050000020004" pitchFamily="34" charset="0"/>
+              </a:rPr>
+            </a:br>
+            <a:r>
+              <a:rPr lang="en-GB" sz="2000" b="0" i="0" dirty="0">
+                <a:solidFill>
+                  <a:srgbClr val="000000"/>
+                </a:solidFill>
+                <a:effectLst/>
+                <a:latin typeface="Fira Sans" panose="020B0503050000020004" pitchFamily="34" charset="0"/>
+              </a:rPr>
+              <a:t>But many GUI-clients exist</a:t>
+            </a:r>
+            <a:endParaRPr lang="en-NL" sz="2000" dirty="0"/>
+          </a:p>
+        </p:txBody>
+      </p:sp>
+    </p:spTree>
+    <p:extLst>
+      <p:ext uri="{BB962C8B-B14F-4D97-AF65-F5344CB8AC3E}">
+        <p14:creationId xmlns:p14="http://schemas.microsoft.com/office/powerpoint/2010/main" val="615703795"/>
+      </p:ext>
+    </p:extLst>
+  </p:cSld>
+  <p:clrMapOvr>
+    <a:masterClrMapping/>
+  </p:clrMapOvr>
+</p:sld>
+</file>
+
+<file path=ppt/slides/slide24.xml><?xml version="1.0" encoding="utf-8"?>
+<p:sld xmlns:a="http://schemas.openxmlformats.org/drawingml/2006/main" xmlns:r="http://schemas.openxmlformats.org/officeDocument/2006/relationships" xmlns:p="http://schemas.openxmlformats.org/presentationml/2006/main">
+  <p:cSld>
+    <p:spTree>
+      <p:nvGrpSpPr>
+        <p:cNvPr id="1" name=""/>
+        <p:cNvGrpSpPr/>
+        <p:nvPr/>
+      </p:nvGrpSpPr>
+      <p:grpSpPr>
+        <a:xfrm>
+          <a:off x="0" y="0"/>
+          <a:ext cx="0" cy="0"/>
+          <a:chOff x="0" y="0"/>
+          <a:chExt cx="0" cy="0"/>
+        </a:xfrm>
+      </p:grpSpPr>
+      <p:pic>
+        <p:nvPicPr>
+          <p:cNvPr id="4" name="Picture 2">
+            <a:extLst>
+              <a:ext uri="{FF2B5EF4-FFF2-40B4-BE49-F238E27FC236}">
+                <a16:creationId xmlns:a16="http://schemas.microsoft.com/office/drawing/2014/main" id="{532D4E50-D8FB-432F-9A74-A856B26CC7F7}"/>
+              </a:ext>
+            </a:extLst>
+          </p:cNvPr>
+          <p:cNvPicPr>
+            <a:picLocks noChangeAspect="1" noChangeArrowheads="1"/>
+          </p:cNvPicPr>
+          <p:nvPr/>
+        </p:nvPicPr>
+        <p:blipFill rotWithShape="1">
+          <a:blip r:embed="rId3">
+            <a:extLst>
+              <a:ext uri="{28A0092B-C50C-407E-A947-70E740481C1C}">
+                <a14:useLocalDpi xmlns:a14="http://schemas.microsoft.com/office/drawing/2010/main" val="0"/>
+              </a:ext>
+            </a:extLst>
+          </a:blip>
+          <a:srcRect l="43288"/>
+          <a:stretch/>
+        </p:blipFill>
+        <p:spPr bwMode="auto">
+          <a:xfrm>
+            <a:off x="3694485" y="365125"/>
+            <a:ext cx="8324538" cy="6452682"/>
+          </a:xfrm>
+          <a:prstGeom prst="rect">
+            <a:avLst/>
+          </a:prstGeom>
+          <a:noFill/>
+          <a:extLst>
+            <a:ext uri="{909E8E84-426E-40DD-AFC4-6F175D3DCCD1}">
+              <a14:hiddenFill xmlns:a14="http://schemas.microsoft.com/office/drawing/2010/main">
+                <a:solidFill>
+                  <a:srgbClr val="FFFFFF"/>
+                </a:solidFill>
+              </a14:hiddenFill>
+            </a:ext>
+          </a:extLst>
+        </p:spPr>
+      </p:pic>
+      <p:sp>
+        <p:nvSpPr>
+          <p:cNvPr id="2" name="Title 1">
+            <a:extLst>
+              <a:ext uri="{FF2B5EF4-FFF2-40B4-BE49-F238E27FC236}">
+                <a16:creationId xmlns:a16="http://schemas.microsoft.com/office/drawing/2014/main" id="{A8A032CF-C64F-87C2-7D19-CD16E62C77B9}"/>
+              </a:ext>
+            </a:extLst>
+          </p:cNvPr>
+          <p:cNvSpPr>
+            <a:spLocks noGrp="1"/>
+          </p:cNvSpPr>
+          <p:nvPr>
+            <p:ph type="title"/>
+          </p:nvPr>
+        </p:nvSpPr>
+        <p:spPr/>
+        <p:txBody>
+          <a:bodyPr/>
+          <a:lstStyle/>
+          <a:p>
+            <a:r>
+              <a:rPr lang="en-GB" dirty="0"/>
+              <a:t>D</a:t>
+            </a:r>
+            <a:r>
+              <a:rPr lang="en-NL" dirty="0"/>
+              <a:t>istributed?</a:t>
+            </a:r>
+          </a:p>
+        </p:txBody>
+      </p:sp>
+      <p:sp>
+        <p:nvSpPr>
+          <p:cNvPr id="3" name="Content Placeholder 2">
+            <a:extLst>
+              <a:ext uri="{FF2B5EF4-FFF2-40B4-BE49-F238E27FC236}">
+                <a16:creationId xmlns:a16="http://schemas.microsoft.com/office/drawing/2014/main" id="{CFB37296-ADF3-6271-73DC-3F98A34A4047}"/>
+              </a:ext>
+            </a:extLst>
+          </p:cNvPr>
+          <p:cNvSpPr>
+            <a:spLocks noGrp="1"/>
+          </p:cNvSpPr>
+          <p:nvPr>
+            <p:ph idx="1"/>
+          </p:nvPr>
+        </p:nvSpPr>
+        <p:spPr>
+          <a:xfrm>
+            <a:off x="172978" y="1825625"/>
+            <a:ext cx="3521508" cy="4351338"/>
+          </a:xfrm>
+        </p:spPr>
+        <p:txBody>
+          <a:bodyPr>
+            <a:normAutofit/>
+          </a:bodyPr>
+          <a:lstStyle/>
+          <a:p>
+            <a:r>
+              <a:rPr lang="en-GB" sz="2400" dirty="0"/>
+              <a:t>Y</a:t>
+            </a:r>
+            <a:r>
+              <a:rPr lang="en-NL" sz="2400" dirty="0"/>
+              <a:t>ou do not add changes directly to the base camp (aka github)</a:t>
+            </a:r>
+          </a:p>
+          <a:p>
+            <a:endParaRPr lang="en-NL" sz="2400" dirty="0"/>
+          </a:p>
+          <a:p>
+            <a:pPr marL="0" indent="0">
+              <a:buNone/>
+            </a:pPr>
+            <a:r>
+              <a:rPr lang="en-GB" sz="2400" dirty="0"/>
+              <a:t>N</a:t>
+            </a:r>
+            <a:r>
+              <a:rPr lang="en-NL" sz="2400" dirty="0"/>
+              <a:t>o single point of failure:</a:t>
+            </a:r>
+          </a:p>
+          <a:p>
+            <a:r>
+              <a:rPr lang="en-NL" sz="2400" dirty="0"/>
+              <a:t>Every local repo is a backup</a:t>
+            </a:r>
+          </a:p>
+          <a:p>
+            <a:r>
+              <a:rPr lang="en-NL" sz="2400" dirty="0"/>
+              <a:t>You can mess up locally</a:t>
+            </a:r>
+          </a:p>
+        </p:txBody>
+      </p:sp>
+    </p:spTree>
+    <p:extLst>
+      <p:ext uri="{BB962C8B-B14F-4D97-AF65-F5344CB8AC3E}">
+        <p14:creationId xmlns:p14="http://schemas.microsoft.com/office/powerpoint/2010/main" val="176230377"/>
+      </p:ext>
+    </p:extLst>
+  </p:cSld>
+  <p:clrMapOvr>
+    <a:masterClrMapping/>
+  </p:clrMapOvr>
+</p:sld>
+</file>
+
+<file path=ppt/slides/slide25.xml><?xml version="1.0" encoding="utf-8"?>
+<p:sld xmlns:a="http://schemas.openxmlformats.org/drawingml/2006/main" xmlns:r="http://schemas.openxmlformats.org/officeDocument/2006/relationships" xmlns:p="http://schemas.openxmlformats.org/presentationml/2006/main">
+  <p:cSld>
+    <p:spTree>
+      <p:nvGrpSpPr>
+        <p:cNvPr id="1" name=""/>
+        <p:cNvGrpSpPr/>
+        <p:nvPr/>
+      </p:nvGrpSpPr>
+      <p:grpSpPr>
+        <a:xfrm>
+          <a:off x="0" y="0"/>
+          <a:ext cx="0" cy="0"/>
+          <a:chOff x="0" y="0"/>
+          <a:chExt cx="0" cy="0"/>
+        </a:xfrm>
+      </p:grpSpPr>
+      <p:sp>
+        <p:nvSpPr>
+          <p:cNvPr id="2" name="Title 1">
+            <a:extLst>
+              <a:ext uri="{FF2B5EF4-FFF2-40B4-BE49-F238E27FC236}">
+                <a16:creationId xmlns:a16="http://schemas.microsoft.com/office/drawing/2014/main" id="{E5E3E03F-A95A-B88C-94EF-4B39278CDFAE}"/>
+              </a:ext>
+            </a:extLst>
+          </p:cNvPr>
+          <p:cNvSpPr>
+            <a:spLocks noGrp="1"/>
+          </p:cNvSpPr>
+          <p:nvPr>
+            <p:ph type="title"/>
+          </p:nvPr>
+        </p:nvSpPr>
+        <p:spPr/>
+        <p:txBody>
+          <a:bodyPr/>
+          <a:lstStyle/>
+          <a:p>
+            <a:r>
+              <a:rPr lang="en-NL" dirty="0"/>
+              <a:t>When to use github</a:t>
+            </a:r>
+          </a:p>
+        </p:txBody>
+      </p:sp>
+      <p:sp>
+        <p:nvSpPr>
+          <p:cNvPr id="3" name="Content Placeholder 2">
+            <a:extLst>
+              <a:ext uri="{FF2B5EF4-FFF2-40B4-BE49-F238E27FC236}">
+                <a16:creationId xmlns:a16="http://schemas.microsoft.com/office/drawing/2014/main" id="{ED6CF073-87C8-6B8F-C260-B84B8823EB4F}"/>
+              </a:ext>
+            </a:extLst>
+          </p:cNvPr>
+          <p:cNvSpPr>
+            <a:spLocks noGrp="1"/>
+          </p:cNvSpPr>
+          <p:nvPr>
+            <p:ph idx="1"/>
+          </p:nvPr>
+        </p:nvSpPr>
+        <p:spPr/>
+        <p:txBody>
+          <a:bodyPr/>
+          <a:lstStyle/>
+          <a:p>
+            <a:r>
+              <a:rPr lang="en-GB" dirty="0"/>
+              <a:t>L</a:t>
+            </a:r>
+            <a:r>
+              <a:rPr lang="en-NL" dirty="0"/>
+              <a:t>iving project: github</a:t>
+            </a:r>
+          </a:p>
+          <a:p>
+            <a:pPr lvl="1"/>
+            <a:r>
+              <a:rPr lang="en-GB" b="0" i="0" dirty="0">
+                <a:solidFill>
+                  <a:srgbClr val="000000"/>
+                </a:solidFill>
+                <a:effectLst/>
+                <a:latin typeface="Fira Sans" panose="020B0503050000020004" pitchFamily="34" charset="0"/>
+              </a:rPr>
+              <a:t>Version control</a:t>
+            </a:r>
+          </a:p>
+          <a:p>
+            <a:pPr lvl="1"/>
+            <a:r>
+              <a:rPr lang="en-GB" b="0" i="0" dirty="0">
+                <a:solidFill>
+                  <a:srgbClr val="000000"/>
+                </a:solidFill>
+                <a:effectLst/>
+                <a:latin typeface="Fira Sans" panose="020B0503050000020004" pitchFamily="34" charset="0"/>
+              </a:rPr>
+              <a:t>allows publication of different releases</a:t>
+            </a:r>
+          </a:p>
+          <a:p>
+            <a:pPr lvl="1"/>
+            <a:r>
+              <a:rPr lang="en-GB" b="0" i="0" dirty="0">
+                <a:solidFill>
+                  <a:srgbClr val="000000"/>
+                </a:solidFill>
+                <a:effectLst/>
+                <a:latin typeface="Fira Sans" panose="020B0503050000020004" pitchFamily="34" charset="0"/>
+              </a:rPr>
+              <a:t>platform for collaboration</a:t>
+            </a:r>
+            <a:endParaRPr lang="en-NL" dirty="0"/>
+          </a:p>
+          <a:p>
+            <a:endParaRPr lang="en-NL" dirty="0"/>
+          </a:p>
+          <a:p>
+            <a:r>
+              <a:rPr lang="en-GB" dirty="0"/>
+              <a:t>D</a:t>
+            </a:r>
+            <a:r>
+              <a:rPr lang="en-NL" dirty="0"/>
+              <a:t>one: repositories such as OSF</a:t>
+            </a:r>
+          </a:p>
+          <a:p>
+            <a:pPr lvl="1"/>
+            <a:r>
+              <a:rPr lang="en-GB" dirty="0"/>
+              <a:t>Why </a:t>
+            </a:r>
+            <a:r>
+              <a:rPr lang="en-GB" dirty="0">
+                <a:sym typeface="Wingdings" pitchFamily="2" charset="2"/>
+              </a:rPr>
+              <a:t> </a:t>
+            </a:r>
+            <a:r>
+              <a:rPr lang="en-GB" dirty="0"/>
+              <a:t>G</a:t>
+            </a:r>
+            <a:r>
+              <a:rPr lang="en-NL" dirty="0"/>
+              <a:t>ives a doi : makes code citeable </a:t>
+            </a:r>
+          </a:p>
+        </p:txBody>
+      </p:sp>
+    </p:spTree>
+    <p:extLst>
+      <p:ext uri="{BB962C8B-B14F-4D97-AF65-F5344CB8AC3E}">
+        <p14:creationId xmlns:p14="http://schemas.microsoft.com/office/powerpoint/2010/main" val="1796995553"/>
+      </p:ext>
+    </p:extLst>
+  </p:cSld>
+  <p:clrMapOvr>
+    <a:masterClrMapping/>
+  </p:clrMapOvr>
+</p:sld>
+</file>
+
+<file path=ppt/slides/slide26.xml><?xml version="1.0" encoding="utf-8"?>
+<p:sld xmlns:a="http://schemas.openxmlformats.org/drawingml/2006/main" xmlns:r="http://schemas.openxmlformats.org/officeDocument/2006/relationships" xmlns:p="http://schemas.openxmlformats.org/presentationml/2006/main">
+  <p:cSld>
+    <p:spTree>
+      <p:nvGrpSpPr>
+        <p:cNvPr id="1" name=""/>
+        <p:cNvGrpSpPr/>
+        <p:nvPr/>
+      </p:nvGrpSpPr>
+      <p:grpSpPr>
+        <a:xfrm>
+          <a:off x="0" y="0"/>
+          <a:ext cx="0" cy="0"/>
+          <a:chOff x="0" y="0"/>
+          <a:chExt cx="0" cy="0"/>
+        </a:xfrm>
+      </p:grpSpPr>
+      <p:sp>
+        <p:nvSpPr>
+          <p:cNvPr id="2" name="Title 1">
+            <a:extLst>
+              <a:ext uri="{FF2B5EF4-FFF2-40B4-BE49-F238E27FC236}">
+                <a16:creationId xmlns:a16="http://schemas.microsoft.com/office/drawing/2014/main" id="{F21C41D6-3F5F-936A-B859-CF4BB685A2D9}"/>
+              </a:ext>
+            </a:extLst>
+          </p:cNvPr>
+          <p:cNvSpPr>
+            <a:spLocks noGrp="1"/>
+          </p:cNvSpPr>
+          <p:nvPr>
+            <p:ph type="title"/>
+          </p:nvPr>
+        </p:nvSpPr>
+        <p:spPr/>
+        <p:txBody>
+          <a:bodyPr/>
+          <a:lstStyle/>
+          <a:p>
+            <a:r>
+              <a:rPr lang="en-NL" dirty="0"/>
+              <a:t>So what about data?</a:t>
+            </a:r>
+          </a:p>
+        </p:txBody>
+      </p:sp>
+      <p:sp>
+        <p:nvSpPr>
+          <p:cNvPr id="3" name="Content Placeholder 2">
+            <a:extLst>
+              <a:ext uri="{FF2B5EF4-FFF2-40B4-BE49-F238E27FC236}">
+                <a16:creationId xmlns:a16="http://schemas.microsoft.com/office/drawing/2014/main" id="{5A028098-98C5-D14C-EFE7-87EF1430C18D}"/>
+              </a:ext>
+            </a:extLst>
+          </p:cNvPr>
+          <p:cNvSpPr>
+            <a:spLocks noGrp="1"/>
+          </p:cNvSpPr>
+          <p:nvPr>
+            <p:ph idx="1"/>
+          </p:nvPr>
+        </p:nvSpPr>
+        <p:spPr/>
+        <p:txBody>
+          <a:bodyPr/>
+          <a:lstStyle/>
+          <a:p>
+            <a:r>
+              <a:rPr lang="en-NL" dirty="0"/>
+              <a:t>Git is not a data platform</a:t>
+            </a:r>
+          </a:p>
+          <a:p>
+            <a:endParaRPr lang="en-NL" dirty="0"/>
+          </a:p>
+          <a:p>
+            <a:r>
+              <a:rPr lang="en-NL" dirty="0"/>
+              <a:t>But used to version control workflows surrounding data</a:t>
+            </a:r>
+          </a:p>
+          <a:p>
+            <a:endParaRPr lang="en-NL" dirty="0"/>
+          </a:p>
+          <a:p>
+            <a:r>
+              <a:rPr lang="en-NL" dirty="0"/>
+              <a:t>Git workflow stimulates documentation, meta data, accessibility, transparency</a:t>
+            </a:r>
+          </a:p>
+        </p:txBody>
+      </p:sp>
+    </p:spTree>
+    <p:extLst>
+      <p:ext uri="{BB962C8B-B14F-4D97-AF65-F5344CB8AC3E}">
+        <p14:creationId xmlns:p14="http://schemas.microsoft.com/office/powerpoint/2010/main" val="146179425"/>
+      </p:ext>
+    </p:extLst>
+  </p:cSld>
+  <p:clrMapOvr>
+    <a:masterClrMapping/>
+  </p:clrMapOvr>
+</p:sld>
+</file>
+
+<file path=ppt/slides/slide27.xml><?xml version="1.0" encoding="utf-8"?>
+<p:sld xmlns:a="http://schemas.openxmlformats.org/drawingml/2006/main" xmlns:r="http://schemas.openxmlformats.org/officeDocument/2006/relationships" xmlns:p="http://schemas.openxmlformats.org/presentationml/2006/main">
+  <p:cSld>
+    <p:spTree>
+      <p:nvGrpSpPr>
+        <p:cNvPr id="1" name=""/>
+        <p:cNvGrpSpPr/>
+        <p:nvPr/>
+      </p:nvGrpSpPr>
+      <p:grpSpPr>
+        <a:xfrm>
+          <a:off x="0" y="0"/>
+          <a:ext cx="0" cy="0"/>
+          <a:chOff x="0" y="0"/>
+          <a:chExt cx="0" cy="0"/>
+        </a:xfrm>
+      </p:grpSpPr>
+      <p:sp>
+        <p:nvSpPr>
+          <p:cNvPr id="2" name="Title 1">
+            <a:extLst>
+              <a:ext uri="{FF2B5EF4-FFF2-40B4-BE49-F238E27FC236}">
+                <a16:creationId xmlns:a16="http://schemas.microsoft.com/office/drawing/2014/main" id="{9A94BA8F-44EB-33FA-3EA1-93A33651ADDA}"/>
+              </a:ext>
+            </a:extLst>
+          </p:cNvPr>
+          <p:cNvSpPr>
+            <a:spLocks noGrp="1"/>
+          </p:cNvSpPr>
+          <p:nvPr>
+            <p:ph type="title"/>
+          </p:nvPr>
+        </p:nvSpPr>
+        <p:spPr/>
+        <p:txBody>
+          <a:bodyPr/>
+          <a:lstStyle/>
+          <a:p>
+            <a:r>
+              <a:rPr lang="nl-NL" dirty="0" err="1"/>
+              <a:t>Maxime’s</a:t>
+            </a:r>
+            <a:r>
+              <a:rPr lang="nl-NL" dirty="0"/>
+              <a:t> </a:t>
+            </a:r>
+            <a:r>
+              <a:rPr lang="en-NL" dirty="0"/>
+              <a:t>video: </a:t>
+            </a:r>
+          </a:p>
+        </p:txBody>
+      </p:sp>
+      <p:sp>
+        <p:nvSpPr>
+          <p:cNvPr id="3" name="Content Placeholder 2">
+            <a:extLst>
+              <a:ext uri="{FF2B5EF4-FFF2-40B4-BE49-F238E27FC236}">
+                <a16:creationId xmlns:a16="http://schemas.microsoft.com/office/drawing/2014/main" id="{3D2B0718-A0A9-3EC7-D59D-B3145F93B767}"/>
+              </a:ext>
+            </a:extLst>
+          </p:cNvPr>
+          <p:cNvSpPr>
+            <a:spLocks noGrp="1"/>
+          </p:cNvSpPr>
+          <p:nvPr>
+            <p:ph idx="1"/>
+          </p:nvPr>
+        </p:nvSpPr>
+        <p:spPr/>
+        <p:txBody>
+          <a:bodyPr/>
+          <a:lstStyle/>
+          <a:p>
+            <a:r>
+              <a:rPr lang="en-GB" b="0" i="0" dirty="0">
+                <a:solidFill>
+                  <a:srgbClr val="333333"/>
+                </a:solidFill>
+                <a:effectLst/>
+                <a:latin typeface="Helvetica Neue" panose="02000503000000020004" pitchFamily="2" charset="0"/>
+              </a:rPr>
+              <a:t>Some people are way better at explaining stuff than at visual animations.</a:t>
+            </a:r>
+          </a:p>
+          <a:p>
+            <a:endParaRPr lang="en-GB" dirty="0">
+              <a:solidFill>
+                <a:srgbClr val="333333"/>
+              </a:solidFill>
+              <a:latin typeface="Helvetica Neue" panose="02000503000000020004" pitchFamily="2" charset="0"/>
+            </a:endParaRPr>
+          </a:p>
+          <a:p>
+            <a:r>
+              <a:rPr lang="en-GB" dirty="0">
+                <a:hlinkClick r:id="rId2"/>
+              </a:rPr>
+              <a:t>https://www.youtube.com/watch?v=PhyUy7z4S-M</a:t>
+            </a:r>
+            <a:endParaRPr lang="en-GB" dirty="0">
+              <a:solidFill>
+                <a:srgbClr val="333333"/>
+              </a:solidFill>
+              <a:latin typeface="Helvetica Neue" panose="02000503000000020004" pitchFamily="2" charset="0"/>
+            </a:endParaRPr>
+          </a:p>
+          <a:p>
+            <a:endParaRPr lang="en-NL" dirty="0"/>
+          </a:p>
+        </p:txBody>
+      </p:sp>
+    </p:spTree>
+    <p:extLst>
+      <p:ext uri="{BB962C8B-B14F-4D97-AF65-F5344CB8AC3E}">
+        <p14:creationId xmlns:p14="http://schemas.microsoft.com/office/powerpoint/2010/main" val="1296080577"/>
+      </p:ext>
+    </p:extLst>
+  </p:cSld>
+  <p:clrMapOvr>
+    <a:masterClrMapping/>
+  </p:clrMapOvr>
+</p:sld>
+</file>
+
+<file path=ppt/slides/slide28.xml><?xml version="1.0" encoding="utf-8"?>
+<p:sld xmlns:a="http://schemas.openxmlformats.org/drawingml/2006/main" xmlns:r="http://schemas.openxmlformats.org/officeDocument/2006/relationships" xmlns:p="http://schemas.openxmlformats.org/presentationml/2006/main">
+  <p:cSld>
+    <p:spTree>
+      <p:nvGrpSpPr>
+        <p:cNvPr id="1" name=""/>
+        <p:cNvGrpSpPr/>
+        <p:nvPr/>
+      </p:nvGrpSpPr>
+      <p:grpSpPr>
+        <a:xfrm>
+          <a:off x="0" y="0"/>
+          <a:ext cx="0" cy="0"/>
+          <a:chOff x="0" y="0"/>
+          <a:chExt cx="0" cy="0"/>
+        </a:xfrm>
+      </p:grpSpPr>
+      <p:sp>
+        <p:nvSpPr>
+          <p:cNvPr id="2" name="Title 1">
+            <a:extLst>
+              <a:ext uri="{FF2B5EF4-FFF2-40B4-BE49-F238E27FC236}">
                 <a16:creationId xmlns:a16="http://schemas.microsoft.com/office/drawing/2014/main" id="{EF7DD337-19B5-91AB-0BFB-4277EE103940}"/>
               </a:ext>
             </a:extLst>
@@ -7059,8 +8297,12 @@
           <a:lstStyle/>
           <a:p>
             <a:r>
+              <a:rPr lang="en-GB" dirty="0"/>
+              <a:t>B</a:t>
+            </a:r>
+            <a:r>
               <a:rPr lang="en-NL" dirty="0"/>
-              <a:t>Let’s do this</a:t>
+              <a:t>efore lunch</a:t>
             </a:r>
           </a:p>
         </p:txBody>
@@ -7085,14 +8327,29 @@
         <p:txBody>
           <a:bodyPr/>
           <a:lstStyle/>
+          <a:p>
+            <a:pPr marL="0" indent="0">
+              <a:buNone/>
+            </a:pPr>
+            <a:r>
+              <a:rPr lang="en-NL" dirty="0"/>
+              <a:t>This was the only powerpoint </a:t>
+            </a:r>
+          </a:p>
+          <a:p>
+            <a:pPr marL="0" indent="0">
+              <a:buNone/>
+            </a:pPr>
+            <a:endParaRPr lang="en-NL" dirty="0"/>
+          </a:p>
           <a:p>
             <a:pPr marL="514350" indent="-514350">
               <a:buFont typeface="+mj-lt"/>
               <a:buAutoNum type="arabicPeriod"/>
             </a:pPr>
             <a:r>
-              <a:rPr lang="en-NL" dirty="0"/>
-              <a:t>Explore a github repo (Exercise 1)</a:t>
+              <a:rPr lang="en-NL" strike="sngStrike" dirty="0"/>
+              <a:t>Watch a video together</a:t>
             </a:r>
           </a:p>
           <a:p>
@@ -7101,21 +8358,58 @@
               <a:buAutoNum type="arabicPeriod"/>
             </a:pPr>
             <a:r>
+              <a:rPr lang="en-NL" dirty="0"/>
+              <a:t>Explore a github repo (Exercise 1)</a:t>
+            </a:r>
+          </a:p>
+          <a:p>
+            <a:pPr marL="514350" indent="-514350">
+              <a:buFont typeface="+mj-lt"/>
+              <a:buAutoNum type="arabicPeriod"/>
+            </a:pPr>
+            <a:r>
               <a:rPr lang="en-GB" dirty="0"/>
               <a:t>M</a:t>
             </a:r>
             <a:r>
               <a:rPr lang="en-NL" dirty="0"/>
-              <a:t>ake a github repo , </a:t>
-            </a:r>
+              <a:t>ake a github repo (Exercise 2) </a:t>
+            </a:r>
+          </a:p>
+          <a:p>
+            <a:pPr marL="514350" indent="-514350">
+              <a:buFont typeface="+mj-lt"/>
+              <a:buAutoNum type="arabicPeriod"/>
+            </a:pPr>
             <a:r>
               <a:rPr lang="en-GB" dirty="0"/>
               <a:t>c</a:t>
             </a:r>
             <a:r>
               <a:rPr lang="en-NL" dirty="0"/>
-              <a:t>hange stuff in your repo and see what happens (Exercise 2)</a:t>
-            </a:r>
+              <a:t>hange stuff in your repo and see what happens (Exercise 3)</a:t>
+            </a:r>
+          </a:p>
+          <a:p>
+            <a:pPr marL="514350" indent="-514350">
+              <a:buFont typeface="+mj-lt"/>
+              <a:buAutoNum type="arabicPeriod"/>
+            </a:pPr>
+            <a:r>
+              <a:rPr lang="en-GB" dirty="0"/>
+              <a:t>D</a:t>
+            </a:r>
+            <a:r>
+              <a:rPr lang="en-NL" dirty="0"/>
+              <a:t>emo : git workflow from Rstudio</a:t>
+            </a:r>
+          </a:p>
+          <a:p>
+            <a:pPr marL="514350" indent="-514350">
+              <a:buFont typeface="+mj-lt"/>
+              <a:buAutoNum type="arabicPeriod"/>
+            </a:pPr>
+            <a:endParaRPr lang="en-NL" dirty="0"/>
           </a:p>
         </p:txBody>
       </p:sp>
@@ -7123,6 +8417,128 @@
     <p:extLst>
       <p:ext uri="{BB962C8B-B14F-4D97-AF65-F5344CB8AC3E}">
         <p14:creationId xmlns:p14="http://schemas.microsoft.com/office/powerpoint/2010/main" val="2751601727"/>
+      </p:ext>
+    </p:extLst>
+  </p:cSld>
+  <p:clrMapOvr>
+    <a:masterClrMapping/>
+  </p:clrMapOvr>
+</p:sld>
+</file>
+
+<file path=ppt/slides/slide29.xml><?xml version="1.0" encoding="utf-8"?>
+<p:sld xmlns:a="http://schemas.openxmlformats.org/drawingml/2006/main" xmlns:r="http://schemas.openxmlformats.org/officeDocument/2006/relationships" xmlns:p="http://schemas.openxmlformats.org/presentationml/2006/main">
+  <p:cSld>
+    <p:spTree>
+      <p:nvGrpSpPr>
+        <p:cNvPr id="1" name=""/>
+        <p:cNvGrpSpPr/>
+        <p:nvPr/>
+      </p:nvGrpSpPr>
+      <p:grpSpPr>
+        <a:xfrm>
+          <a:off x="0" y="0"/>
+          <a:ext cx="0" cy="0"/>
+          <a:chOff x="0" y="0"/>
+          <a:chExt cx="0" cy="0"/>
+        </a:xfrm>
+      </p:grpSpPr>
+      <p:sp>
+        <p:nvSpPr>
+          <p:cNvPr id="2" name="Title 1">
+            <a:extLst>
+              <a:ext uri="{FF2B5EF4-FFF2-40B4-BE49-F238E27FC236}">
+                <a16:creationId xmlns:a16="http://schemas.microsoft.com/office/drawing/2014/main" id="{56ADF847-84B4-B7FC-1ED7-1AD421015CFD}"/>
+              </a:ext>
+            </a:extLst>
+          </p:cNvPr>
+          <p:cNvSpPr>
+            <a:spLocks noGrp="1"/>
+          </p:cNvSpPr>
+          <p:nvPr>
+            <p:ph type="title"/>
+          </p:nvPr>
+        </p:nvSpPr>
+        <p:spPr/>
+        <p:txBody>
+          <a:bodyPr/>
+          <a:lstStyle/>
+          <a:p>
+            <a:r>
+              <a:rPr lang="en-NL" dirty="0"/>
+              <a:t>After lunch:</a:t>
+            </a:r>
+          </a:p>
+        </p:txBody>
+      </p:sp>
+      <p:sp>
+        <p:nvSpPr>
+          <p:cNvPr id="3" name="Content Placeholder 2">
+            <a:extLst>
+              <a:ext uri="{FF2B5EF4-FFF2-40B4-BE49-F238E27FC236}">
+                <a16:creationId xmlns:a16="http://schemas.microsoft.com/office/drawing/2014/main" id="{A54BDB80-533D-7798-037A-A792091C546D}"/>
+              </a:ext>
+            </a:extLst>
+          </p:cNvPr>
+          <p:cNvSpPr>
+            <a:spLocks noGrp="1"/>
+          </p:cNvSpPr>
+          <p:nvPr>
+            <p:ph idx="1"/>
+          </p:nvPr>
+        </p:nvSpPr>
+        <p:spPr/>
+        <p:txBody>
+          <a:bodyPr>
+            <a:normAutofit/>
+          </a:bodyPr>
+          <a:lstStyle/>
+          <a:p>
+            <a:r>
+              <a:rPr lang="en-GB" dirty="0" err="1"/>
+              <a:t>github</a:t>
+            </a:r>
+            <a:r>
+              <a:rPr lang="en-GB" dirty="0"/>
+              <a:t> tools and options:  releases, issues and projects</a:t>
+            </a:r>
+          </a:p>
+          <a:p>
+            <a:endParaRPr lang="en-GB" dirty="0"/>
+          </a:p>
+          <a:p>
+            <a:r>
+              <a:rPr lang="en-GB" dirty="0"/>
+              <a:t>collaborating on someone else’s project</a:t>
+            </a:r>
+          </a:p>
+          <a:p>
+            <a:endParaRPr lang="en-GB" dirty="0"/>
+          </a:p>
+          <a:p>
+            <a:r>
+              <a:rPr lang="en-GB" dirty="0"/>
+              <a:t>When things won’t merge: git conflicts </a:t>
+            </a:r>
+          </a:p>
+          <a:p>
+            <a:pPr marL="0" indent="0">
+              <a:buNone/>
+            </a:pPr>
+            <a:endParaRPr lang="en-GB" dirty="0"/>
+          </a:p>
+          <a:p>
+            <a:r>
+              <a:rPr lang="en-GB" dirty="0"/>
+              <a:t>Licenses and security </a:t>
+            </a:r>
+          </a:p>
+        </p:txBody>
+      </p:sp>
+    </p:spTree>
+    <p:extLst>
+      <p:ext uri="{BB962C8B-B14F-4D97-AF65-F5344CB8AC3E}">
+        <p14:creationId xmlns:p14="http://schemas.microsoft.com/office/powerpoint/2010/main" val="161429369"/>
       </p:ext>
     </p:extLst>
   </p:cSld>
@@ -7198,7 +8614,14 @@
           <a:bodyPr/>
           <a:lstStyle/>
           <a:p>
-            <a:endParaRPr lang="en-NL" dirty="0"/>
+            <a:r>
+              <a:rPr lang="en-GB" dirty="0"/>
+              <a:t>C</a:t>
+            </a:r>
+            <a:r>
+              <a:rPr lang="en-NL" dirty="0"/>
+              <a:t>a 20-30 minutes while we drink coffee</a:t>
+            </a:r>
           </a:p>
         </p:txBody>
       </p:sp>
@@ -7206,6 +8629,142 @@
     <p:extLst>
       <p:ext uri="{BB962C8B-B14F-4D97-AF65-F5344CB8AC3E}">
         <p14:creationId xmlns:p14="http://schemas.microsoft.com/office/powerpoint/2010/main" val="1599557094"/>
+      </p:ext>
+    </p:extLst>
+  </p:cSld>
+  <p:clrMapOvr>
+    <a:masterClrMapping/>
+  </p:clrMapOvr>
+</p:sld>
+</file>
+
+<file path=ppt/slides/slide30.xml><?xml version="1.0" encoding="utf-8"?>
+<p:sld xmlns:a="http://schemas.openxmlformats.org/drawingml/2006/main" xmlns:r="http://schemas.openxmlformats.org/officeDocument/2006/relationships" xmlns:p="http://schemas.openxmlformats.org/presentationml/2006/main">
+  <p:cSld>
+    <p:spTree>
+      <p:nvGrpSpPr>
+        <p:cNvPr id="1" name=""/>
+        <p:cNvGrpSpPr/>
+        <p:nvPr/>
+      </p:nvGrpSpPr>
+      <p:grpSpPr>
+        <a:xfrm>
+          <a:off x="0" y="0"/>
+          <a:ext cx="0" cy="0"/>
+          <a:chOff x="0" y="0"/>
+          <a:chExt cx="0" cy="0"/>
+        </a:xfrm>
+      </p:grpSpPr>
+      <p:sp>
+        <p:nvSpPr>
+          <p:cNvPr id="2" name="Title 1">
+            <a:extLst>
+              <a:ext uri="{FF2B5EF4-FFF2-40B4-BE49-F238E27FC236}">
+                <a16:creationId xmlns:a16="http://schemas.microsoft.com/office/drawing/2014/main" id="{D1B66856-47F6-9167-346B-707F908FDECF}"/>
+              </a:ext>
+            </a:extLst>
+          </p:cNvPr>
+          <p:cNvSpPr>
+            <a:spLocks noGrp="1"/>
+          </p:cNvSpPr>
+          <p:nvPr>
+            <p:ph type="title"/>
+          </p:nvPr>
+        </p:nvSpPr>
+        <p:spPr/>
+        <p:txBody>
+          <a:bodyPr/>
+          <a:lstStyle/>
+          <a:p>
+            <a:endParaRPr lang="en-NL"/>
+          </a:p>
+        </p:txBody>
+      </p:sp>
+      <p:sp>
+        <p:nvSpPr>
+          <p:cNvPr id="3" name="Content Placeholder 2">
+            <a:extLst>
+              <a:ext uri="{FF2B5EF4-FFF2-40B4-BE49-F238E27FC236}">
+                <a16:creationId xmlns:a16="http://schemas.microsoft.com/office/drawing/2014/main" id="{B5966262-628E-E562-694B-8B8092F240F7}"/>
+              </a:ext>
+            </a:extLst>
+          </p:cNvPr>
+          <p:cNvSpPr>
+            <a:spLocks noGrp="1"/>
+          </p:cNvSpPr>
+          <p:nvPr>
+            <p:ph idx="1"/>
+          </p:nvPr>
+        </p:nvSpPr>
+        <p:spPr>
+          <a:xfrm>
+            <a:off x="4812632" y="1825625"/>
+            <a:ext cx="6541168" cy="4351338"/>
+          </a:xfrm>
+        </p:spPr>
+        <p:txBody>
+          <a:bodyPr>
+            <a:normAutofit/>
+          </a:bodyPr>
+          <a:lstStyle/>
+          <a:p>
+            <a:pPr marL="0" indent="0">
+              <a:buNone/>
+            </a:pPr>
+            <a:r>
+              <a:rPr lang="en-GB" sz="2400" dirty="0"/>
+              <a:t>https://</a:t>
+            </a:r>
+            <a:r>
+              <a:rPr lang="en-GB" sz="2400" dirty="0" err="1"/>
+              <a:t>lesmaterialen.rstudio.hu.nl</a:t>
+            </a:r>
+            <a:r>
+              <a:rPr lang="en-GB" sz="2400" dirty="0"/>
+              <a:t>/</a:t>
+            </a:r>
+            <a:r>
+              <a:rPr lang="en-GB" sz="2400" dirty="0" err="1"/>
+              <a:t>github_intro</a:t>
+            </a:r>
+            <a:endParaRPr lang="en-NL" sz="2400" dirty="0"/>
+          </a:p>
+        </p:txBody>
+      </p:sp>
+      <p:pic>
+        <p:nvPicPr>
+          <p:cNvPr id="6" name="Picture 5">
+            <a:extLst>
+              <a:ext uri="{FF2B5EF4-FFF2-40B4-BE49-F238E27FC236}">
+                <a16:creationId xmlns:a16="http://schemas.microsoft.com/office/drawing/2014/main" id="{5F5D344A-B349-6164-127C-81B03EFE60D9}"/>
+              </a:ext>
+            </a:extLst>
+          </p:cNvPr>
+          <p:cNvPicPr>
+            <a:picLocks noChangeAspect="1"/>
+          </p:cNvPicPr>
+          <p:nvPr/>
+        </p:nvPicPr>
+        <p:blipFill>
+          <a:blip r:embed="rId2"/>
+          <a:stretch>
+            <a:fillRect/>
+          </a:stretch>
+        </p:blipFill>
+        <p:spPr>
+          <a:xfrm>
+            <a:off x="204137" y="0"/>
+            <a:ext cx="4307902" cy="6871500"/>
+          </a:xfrm>
+          <a:prstGeom prst="rect">
+            <a:avLst/>
+          </a:prstGeom>
+        </p:spPr>
+      </p:pic>
+    </p:spTree>
+    <p:extLst>
+      <p:ext uri="{BB962C8B-B14F-4D97-AF65-F5344CB8AC3E}">
+        <p14:creationId xmlns:p14="http://schemas.microsoft.com/office/powerpoint/2010/main" val="1153918577"/>
       </p:ext>
     </p:extLst>
   </p:cSld>
@@ -7279,7 +8838,7 @@
         <p:spPr>
           <a:xfrm>
             <a:off x="838200" y="1825625"/>
-            <a:ext cx="4198495" cy="4351338"/>
+            <a:ext cx="8823158" cy="4351338"/>
           </a:xfrm>
         </p:spPr>
         <p:txBody>
@@ -7289,7 +8848,7 @@
           <a:lstStyle/>
           <a:p>
             <a:r>
-              <a:rPr lang="en-GB" sz="1800" b="0" i="0" dirty="0">
+              <a:rPr lang="en-GB" sz="2000" b="0" i="0" dirty="0">
                 <a:solidFill>
                   <a:schemeClr val="accent1"/>
                 </a:solidFill>
@@ -7299,7 +8858,7 @@
               <a:t>Distributed</a:t>
             </a:r>
             <a:r>
-              <a:rPr lang="en-GB" sz="1800" b="0" i="0" dirty="0">
+              <a:rPr lang="en-GB" sz="2000" b="0" i="0" dirty="0">
                 <a:solidFill>
                   <a:srgbClr val="000000"/>
                 </a:solidFill>
@@ -7309,7 +8868,7 @@
               <a:t> </a:t>
             </a:r>
             <a:r>
-              <a:rPr lang="en-GB" sz="1800" b="0" i="0" dirty="0">
+              <a:rPr lang="en-GB" sz="2000" b="0" i="0" dirty="0">
                 <a:solidFill>
                   <a:schemeClr val="accent2"/>
                 </a:solidFill>
@@ -7319,7 +8878,7 @@
               <a:t>Version Control </a:t>
             </a:r>
             <a:r>
-              <a:rPr lang="en-GB" sz="1800" b="0" i="0" dirty="0">
+              <a:rPr lang="en-GB" sz="2000" b="0" i="0" dirty="0">
                 <a:solidFill>
                   <a:srgbClr val="000000"/>
                 </a:solidFill>
@@ -7330,7 +8889,7 @@
             </a:r>
           </a:p>
           <a:p>
-            <a:endParaRPr lang="en-GB" sz="1800" b="0" i="0" dirty="0">
+            <a:endParaRPr lang="en-GB" sz="2000" b="0" i="0" dirty="0">
               <a:solidFill>
                 <a:srgbClr val="000000"/>
               </a:solidFill>
@@ -7344,7 +8903,7 @@
               <a:buChar char="•"/>
             </a:pPr>
             <a:r>
-              <a:rPr lang="en-GB" sz="1800" b="0" i="0" dirty="0">
+              <a:rPr lang="en-GB" sz="2000" b="0" i="0" dirty="0">
                 <a:solidFill>
                   <a:srgbClr val="000000"/>
                 </a:solidFill>
@@ -7354,7 +8913,7 @@
               <a:t>Open Source software written for the command line</a:t>
             </a:r>
             <a:br>
-              <a:rPr lang="en-GB" sz="1800" b="0" i="0" dirty="0">
+              <a:rPr lang="en-GB" sz="2000" b="0" i="0" dirty="0">
                 <a:solidFill>
                   <a:srgbClr val="000000"/>
                 </a:solidFill>
@@ -7363,7 +8922,7 @@
               </a:rPr>
             </a:br>
             <a:br>
-              <a:rPr lang="en-GB" sz="1800" b="0" i="0" dirty="0">
+              <a:rPr lang="en-GB" sz="2000" b="0" i="0" dirty="0">
                 <a:solidFill>
                   <a:srgbClr val="000000"/>
                 </a:solidFill>
@@ -7372,7 +8931,7 @@
               </a:rPr>
             </a:br>
             <a:r>
-              <a:rPr lang="en-GB" sz="1800" b="0" i="0" dirty="0">
+              <a:rPr lang="en-GB" sz="2000" b="0" i="0" dirty="0">
                 <a:solidFill>
                   <a:srgbClr val="000000"/>
                 </a:solidFill>
@@ -7381,7 +8940,7 @@
               </a:rPr>
               <a:t>But many GUI-clients exist</a:t>
             </a:r>
-            <a:endParaRPr lang="en-NL" sz="1800" dirty="0"/>
+            <a:endParaRPr lang="en-NL" sz="2000" dirty="0"/>
           </a:p>
         </p:txBody>
       </p:sp>
@@ -7438,7 +8997,7 @@
           <a:p>
             <a:r>
               <a:rPr lang="en-GB" dirty="0"/>
-              <a:t>V</a:t>
+              <a:t>Okay then, why v</a:t>
             </a:r>
             <a:r>
               <a:rPr lang="en-NL" dirty="0"/>
@@ -7525,7 +9084,15 @@
           <a:p>
             <a:r>
               <a:rPr lang="en-NL" dirty="0"/>
-              <a:t>Why version control?</a:t>
+              <a:t>Why version control? </a:t>
+            </a:r>
+            <a:r>
+              <a:rPr lang="en-GB" dirty="0"/>
+              <a:t>T</a:t>
+            </a:r>
+            <a:r>
+              <a:rPr lang="en-NL" dirty="0"/>
+              <a:t>o solve:</a:t>
             </a:r>
           </a:p>
         </p:txBody>
@@ -7771,7 +9338,7 @@
                 <a:effectLst/>
                 <a:latin typeface="Open Sans" panose="020B0606030504020204" pitchFamily="34" charset="0"/>
               </a:rPr>
-              <a:t>“management of changes to documents, computer programs, large web sites, and other collections of information.” (Wikipedia)</a:t>
+              <a:t>“.. management of changes to documents, computer programs, large web sites, and other collections of information.” (Wikipedia)</a:t>
             </a:r>
           </a:p>
           <a:p>
@@ -7804,53 +9371,6 @@
                 <a:srgbClr val="797979"/>
               </a:solidFill>
               <a:latin typeface="Open Sans" panose="020B0606030504020204" pitchFamily="34" charset="0"/>
-            </a:endParaRPr>
-          </a:p>
-          <a:p>
-            <a:pPr marL="0" indent="0" algn="r">
-              <a:buNone/>
-            </a:pPr>
-            <a:r>
-              <a:rPr lang="en-GB" dirty="0">
-                <a:solidFill>
-                  <a:schemeClr val="bg1">
-                    <a:lumMod val="50000"/>
-                  </a:schemeClr>
-                </a:solidFill>
-              </a:rPr>
-              <a:t>A</a:t>
-            </a:r>
-            <a:r>
-              <a:rPr lang="en-NL" dirty="0">
-                <a:solidFill>
-                  <a:schemeClr val="bg1">
-                    <a:lumMod val="50000"/>
-                  </a:schemeClr>
-                </a:solidFill>
-              </a:rPr>
-              <a:t>lways find the latest version on the same spot</a:t>
-            </a:r>
-          </a:p>
-          <a:p>
-            <a:pPr marL="0" indent="0" algn="r">
-              <a:buNone/>
-            </a:pPr>
-            <a:r>
-              <a:rPr lang="en-GB" dirty="0">
-                <a:solidFill>
-                  <a:schemeClr val="bg1">
-                    <a:lumMod val="50000"/>
-                  </a:schemeClr>
-                </a:solidFill>
-              </a:rPr>
-              <a:t>No more “thesis_final_final_v2_thisone_THISONE.docx”</a:t>
-            </a:r>
-            <a:endParaRPr lang="en-NL" dirty="0">
-              <a:solidFill>
-                <a:schemeClr val="bg1">
-                  <a:lumMod val="50000"/>
-                </a:schemeClr>
-              </a:solidFill>
             </a:endParaRPr>
           </a:p>
           <a:p>
@@ -8088,7 +9608,7 @@
             </a:r>
             <a:r>
               <a:rPr lang="en-NL" dirty="0"/>
-              <a:t>ow-fi version control</a:t>
+              <a:t>ow-fi version control: copy and rename</a:t>
             </a:r>
           </a:p>
         </p:txBody>

</xml_diff>